<commit_message>
You forgot TM :\ you bad person!
</commit_message>
<xml_diff>
--- a/Final Presentation/Presentation.pptx
+++ b/Final Presentation/Presentation.pptx
@@ -15,17 +15,17 @@
     <p:sldId id="272" r:id="rId9"/>
     <p:sldId id="273" r:id="rId10"/>
     <p:sldId id="274" r:id="rId11"/>
-    <p:sldId id="275" r:id="rId12"/>
-    <p:sldId id="277" r:id="rId13"/>
-    <p:sldId id="276" r:id="rId14"/>
-    <p:sldId id="280" r:id="rId15"/>
-    <p:sldId id="293" r:id="rId16"/>
-    <p:sldId id="294" r:id="rId17"/>
-    <p:sldId id="295" r:id="rId18"/>
-    <p:sldId id="296" r:id="rId19"/>
-    <p:sldId id="297" r:id="rId20"/>
-    <p:sldId id="298" r:id="rId21"/>
-    <p:sldId id="279" r:id="rId22"/>
+    <p:sldId id="276" r:id="rId12"/>
+    <p:sldId id="280" r:id="rId13"/>
+    <p:sldId id="293" r:id="rId14"/>
+    <p:sldId id="294" r:id="rId15"/>
+    <p:sldId id="295" r:id="rId16"/>
+    <p:sldId id="296" r:id="rId17"/>
+    <p:sldId id="297" r:id="rId18"/>
+    <p:sldId id="298" r:id="rId19"/>
+    <p:sldId id="279" r:id="rId20"/>
+    <p:sldId id="302" r:id="rId21"/>
+    <p:sldId id="301" r:id="rId22"/>
     <p:sldId id="281" r:id="rId23"/>
     <p:sldId id="299" r:id="rId24"/>
     <p:sldId id="300" r:id="rId25"/>
@@ -3754,7 +3754,7 @@
             <a:fld id="{F71B3DB1-8543-40E0-A2D1-830196AD91DE}" type="datetimeFigureOut">
               <a:rPr lang="pt-PT" smtClean="0"/>
               <a:pPr/>
-              <a:t>29/06/2013</a:t>
+              <a:t>30/06/2013</a:t>
             </a:fld>
             <a:endParaRPr lang="pt-PT" dirty="0"/>
           </a:p>
@@ -3807,7 +3807,7 @@
             <a:fld id="{5D26EDD4-363A-4236-A170-49C0FA725754}" type="slidenum">
               <a:rPr lang="pt-PT" smtClean="0"/>
               <a:pPr/>
-              <a:t>‹nº›</a:t>
+              <a:t>‹#›</a:t>
             </a:fld>
             <a:endParaRPr lang="pt-PT" dirty="0"/>
           </a:p>
@@ -4088,7 +4088,7 @@
             <a:fld id="{F71B3DB1-8543-40E0-A2D1-830196AD91DE}" type="datetimeFigureOut">
               <a:rPr lang="pt-PT" smtClean="0"/>
               <a:pPr/>
-              <a:t>29/06/2013</a:t>
+              <a:t>30/06/2013</a:t>
             </a:fld>
             <a:endParaRPr lang="pt-PT" dirty="0"/>
           </a:p>
@@ -4131,7 +4131,7 @@
             <a:fld id="{5D26EDD4-363A-4236-A170-49C0FA725754}" type="slidenum">
               <a:rPr lang="pt-PT" smtClean="0"/>
               <a:pPr/>
-              <a:t>‹nº›</a:t>
+              <a:t>‹#›</a:t>
             </a:fld>
             <a:endParaRPr lang="pt-PT" dirty="0"/>
           </a:p>
@@ -4338,7 +4338,7 @@
             <a:fld id="{F71B3DB1-8543-40E0-A2D1-830196AD91DE}" type="datetimeFigureOut">
               <a:rPr lang="pt-PT" smtClean="0"/>
               <a:pPr/>
-              <a:t>29/06/2013</a:t>
+              <a:t>30/06/2013</a:t>
             </a:fld>
             <a:endParaRPr lang="pt-PT" dirty="0"/>
           </a:p>
@@ -4381,7 +4381,7 @@
             <a:fld id="{5D26EDD4-363A-4236-A170-49C0FA725754}" type="slidenum">
               <a:rPr lang="pt-PT" smtClean="0"/>
               <a:pPr/>
-              <a:t>‹nº›</a:t>
+              <a:t>‹#›</a:t>
             </a:fld>
             <a:endParaRPr lang="pt-PT" dirty="0"/>
           </a:p>
@@ -4686,7 +4686,7 @@
             <a:fld id="{F71B3DB1-8543-40E0-A2D1-830196AD91DE}" type="datetimeFigureOut">
               <a:rPr lang="pt-PT" smtClean="0"/>
               <a:pPr/>
-              <a:t>29/06/2013</a:t>
+              <a:t>30/06/2013</a:t>
             </a:fld>
             <a:endParaRPr lang="pt-PT" dirty="0"/>
           </a:p>
@@ -4729,7 +4729,7 @@
             <a:fld id="{5D26EDD4-363A-4236-A170-49C0FA725754}" type="slidenum">
               <a:rPr lang="pt-PT" smtClean="0"/>
               <a:pPr/>
-              <a:t>‹nº›</a:t>
+              <a:t>‹#›</a:t>
             </a:fld>
             <a:endParaRPr lang="pt-PT" dirty="0"/>
           </a:p>
@@ -5042,7 +5042,7 @@
             <a:fld id="{F71B3DB1-8543-40E0-A2D1-830196AD91DE}" type="datetimeFigureOut">
               <a:rPr lang="pt-PT" smtClean="0"/>
               <a:pPr/>
-              <a:t>29/06/2013</a:t>
+              <a:t>30/06/2013</a:t>
             </a:fld>
             <a:endParaRPr lang="pt-PT" dirty="0"/>
           </a:p>
@@ -5085,7 +5085,7 @@
             <a:fld id="{5D26EDD4-363A-4236-A170-49C0FA725754}" type="slidenum">
               <a:rPr lang="pt-PT" smtClean="0"/>
               <a:pPr/>
-              <a:t>‹nº›</a:t>
+              <a:t>‹#›</a:t>
             </a:fld>
             <a:endParaRPr lang="pt-PT" dirty="0"/>
           </a:p>
@@ -5418,7 +5418,7 @@
             <a:fld id="{F71B3DB1-8543-40E0-A2D1-830196AD91DE}" type="datetimeFigureOut">
               <a:rPr lang="pt-PT" smtClean="0"/>
               <a:pPr/>
-              <a:t>29/06/2013</a:t>
+              <a:t>30/06/2013</a:t>
             </a:fld>
             <a:endParaRPr lang="pt-PT" dirty="0"/>
           </a:p>
@@ -5461,7 +5461,7 @@
             <a:fld id="{5D26EDD4-363A-4236-A170-49C0FA725754}" type="slidenum">
               <a:rPr lang="pt-PT" smtClean="0"/>
               <a:pPr/>
-              <a:t>‹nº›</a:t>
+              <a:t>‹#›</a:t>
             </a:fld>
             <a:endParaRPr lang="pt-PT" dirty="0"/>
           </a:p>
@@ -5897,7 +5897,7 @@
             <a:fld id="{F71B3DB1-8543-40E0-A2D1-830196AD91DE}" type="datetimeFigureOut">
               <a:rPr lang="pt-PT" smtClean="0"/>
               <a:pPr/>
-              <a:t>29/06/2013</a:t>
+              <a:t>30/06/2013</a:t>
             </a:fld>
             <a:endParaRPr lang="pt-PT" dirty="0"/>
           </a:p>
@@ -5940,7 +5940,7 @@
             <a:fld id="{5D26EDD4-363A-4236-A170-49C0FA725754}" type="slidenum">
               <a:rPr lang="pt-PT" smtClean="0"/>
               <a:pPr/>
-              <a:t>‹nº›</a:t>
+              <a:t>‹#›</a:t>
             </a:fld>
             <a:endParaRPr lang="pt-PT" dirty="0"/>
           </a:p>
@@ -6111,7 +6111,7 @@
             <a:fld id="{F71B3DB1-8543-40E0-A2D1-830196AD91DE}" type="datetimeFigureOut">
               <a:rPr lang="pt-PT" smtClean="0"/>
               <a:pPr/>
-              <a:t>29/06/2013</a:t>
+              <a:t>30/06/2013</a:t>
             </a:fld>
             <a:endParaRPr lang="pt-PT" dirty="0"/>
           </a:p>
@@ -6154,7 +6154,7 @@
             <a:fld id="{5D26EDD4-363A-4236-A170-49C0FA725754}" type="slidenum">
               <a:rPr lang="pt-PT" smtClean="0"/>
               <a:pPr/>
-              <a:t>‹nº›</a:t>
+              <a:t>‹#›</a:t>
             </a:fld>
             <a:endParaRPr lang="pt-PT" dirty="0"/>
           </a:p>
@@ -6331,7 +6331,7 @@
             <a:fld id="{F71B3DB1-8543-40E0-A2D1-830196AD91DE}" type="datetimeFigureOut">
               <a:rPr lang="pt-PT" smtClean="0"/>
               <a:pPr/>
-              <a:t>29/06/2013</a:t>
+              <a:t>30/06/2013</a:t>
             </a:fld>
             <a:endParaRPr lang="pt-PT" dirty="0"/>
           </a:p>
@@ -6374,7 +6374,7 @@
             <a:fld id="{5D26EDD4-363A-4236-A170-49C0FA725754}" type="slidenum">
               <a:rPr lang="pt-PT" smtClean="0"/>
               <a:pPr/>
-              <a:t>‹nº›</a:t>
+              <a:t>‹#›</a:t>
             </a:fld>
             <a:endParaRPr lang="pt-PT" dirty="0"/>
           </a:p>
@@ -6579,7 +6579,7 @@
             <a:fld id="{F71B3DB1-8543-40E0-A2D1-830196AD91DE}" type="datetimeFigureOut">
               <a:rPr lang="pt-PT" smtClean="0"/>
               <a:pPr/>
-              <a:t>29/06/2013</a:t>
+              <a:t>30/06/2013</a:t>
             </a:fld>
             <a:endParaRPr lang="pt-PT" dirty="0"/>
           </a:p>
@@ -6622,7 +6622,7 @@
             <a:fld id="{5D26EDD4-363A-4236-A170-49C0FA725754}" type="slidenum">
               <a:rPr lang="pt-PT" smtClean="0"/>
               <a:pPr/>
-              <a:t>‹nº›</a:t>
+              <a:t>‹#›</a:t>
             </a:fld>
             <a:endParaRPr lang="pt-PT" dirty="0"/>
           </a:p>
@@ -6829,7 +6829,7 @@
             <a:fld id="{F71B3DB1-8543-40E0-A2D1-830196AD91DE}" type="datetimeFigureOut">
               <a:rPr lang="pt-PT" smtClean="0"/>
               <a:pPr/>
-              <a:t>29/06/2013</a:t>
+              <a:t>30/06/2013</a:t>
             </a:fld>
             <a:endParaRPr lang="pt-PT" dirty="0"/>
           </a:p>
@@ -6872,7 +6872,7 @@
             <a:fld id="{5D26EDD4-363A-4236-A170-49C0FA725754}" type="slidenum">
               <a:rPr lang="pt-PT" smtClean="0"/>
               <a:pPr/>
-              <a:t>‹nº›</a:t>
+              <a:t>‹#›</a:t>
             </a:fld>
             <a:endParaRPr lang="pt-PT" dirty="0"/>
           </a:p>
@@ -7143,7 +7143,7 @@
             <a:fld id="{F71B3DB1-8543-40E0-A2D1-830196AD91DE}" type="datetimeFigureOut">
               <a:rPr lang="pt-PT" smtClean="0"/>
               <a:pPr/>
-              <a:t>29/06/2013</a:t>
+              <a:t>30/06/2013</a:t>
             </a:fld>
             <a:endParaRPr lang="pt-PT" dirty="0"/>
           </a:p>
@@ -7186,7 +7186,7 @@
             <a:fld id="{5D26EDD4-363A-4236-A170-49C0FA725754}" type="slidenum">
               <a:rPr lang="pt-PT" smtClean="0"/>
               <a:pPr/>
-              <a:t>‹nº›</a:t>
+              <a:t>‹#›</a:t>
             </a:fld>
             <a:endParaRPr lang="pt-PT" dirty="0"/>
           </a:p>
@@ -7527,7 +7527,7 @@
             <a:fld id="{F71B3DB1-8543-40E0-A2D1-830196AD91DE}" type="datetimeFigureOut">
               <a:rPr lang="pt-PT" smtClean="0"/>
               <a:pPr/>
-              <a:t>29/06/2013</a:t>
+              <a:t>30/06/2013</a:t>
             </a:fld>
             <a:endParaRPr lang="pt-PT" dirty="0"/>
           </a:p>
@@ -7570,7 +7570,7 @@
             <a:fld id="{5D26EDD4-363A-4236-A170-49C0FA725754}" type="slidenum">
               <a:rPr lang="pt-PT" smtClean="0"/>
               <a:pPr/>
-              <a:t>‹nº›</a:t>
+              <a:t>‹#›</a:t>
             </a:fld>
             <a:endParaRPr lang="pt-PT" dirty="0"/>
           </a:p>
@@ -7685,7 +7685,7 @@
             <a:fld id="{F71B3DB1-8543-40E0-A2D1-830196AD91DE}" type="datetimeFigureOut">
               <a:rPr lang="pt-PT" smtClean="0"/>
               <a:pPr/>
-              <a:t>29/06/2013</a:t>
+              <a:t>30/06/2013</a:t>
             </a:fld>
             <a:endParaRPr lang="pt-PT" dirty="0"/>
           </a:p>
@@ -7728,7 +7728,7 @@
             <a:fld id="{5D26EDD4-363A-4236-A170-49C0FA725754}" type="slidenum">
               <a:rPr lang="pt-PT" smtClean="0"/>
               <a:pPr/>
-              <a:t>‹nº›</a:t>
+              <a:t>‹#›</a:t>
             </a:fld>
             <a:endParaRPr lang="pt-PT" dirty="0"/>
           </a:p>
@@ -7820,7 +7820,7 @@
             <a:fld id="{F71B3DB1-8543-40E0-A2D1-830196AD91DE}" type="datetimeFigureOut">
               <a:rPr lang="pt-PT" smtClean="0"/>
               <a:pPr/>
-              <a:t>29/06/2013</a:t>
+              <a:t>30/06/2013</a:t>
             </a:fld>
             <a:endParaRPr lang="pt-PT" dirty="0"/>
           </a:p>
@@ -7863,7 +7863,7 @@
             <a:fld id="{5D26EDD4-363A-4236-A170-49C0FA725754}" type="slidenum">
               <a:rPr lang="pt-PT" smtClean="0"/>
               <a:pPr/>
-              <a:t>‹nº›</a:t>
+              <a:t>‹#›</a:t>
             </a:fld>
             <a:endParaRPr lang="pt-PT" dirty="0"/>
           </a:p>
@@ -8077,7 +8077,7 @@
             <a:fld id="{F71B3DB1-8543-40E0-A2D1-830196AD91DE}" type="datetimeFigureOut">
               <a:rPr lang="pt-PT" smtClean="0"/>
               <a:pPr/>
-              <a:t>29/06/2013</a:t>
+              <a:t>30/06/2013</a:t>
             </a:fld>
             <a:endParaRPr lang="pt-PT" dirty="0"/>
           </a:p>
@@ -8120,7 +8120,7 @@
             <a:fld id="{5D26EDD4-363A-4236-A170-49C0FA725754}" type="slidenum">
               <a:rPr lang="pt-PT" smtClean="0"/>
               <a:pPr/>
-              <a:t>‹nº›</a:t>
+              <a:t>‹#›</a:t>
             </a:fld>
             <a:endParaRPr lang="pt-PT" dirty="0"/>
           </a:p>
@@ -8401,7 +8401,7 @@
             <a:fld id="{F71B3DB1-8543-40E0-A2D1-830196AD91DE}" type="datetimeFigureOut">
               <a:rPr lang="pt-PT" smtClean="0"/>
               <a:pPr/>
-              <a:t>29/06/2013</a:t>
+              <a:t>30/06/2013</a:t>
             </a:fld>
             <a:endParaRPr lang="pt-PT" dirty="0"/>
           </a:p>
@@ -8444,7 +8444,7 @@
             <a:fld id="{5D26EDD4-363A-4236-A170-49C0FA725754}" type="slidenum">
               <a:rPr lang="pt-PT" smtClean="0"/>
               <a:pPr/>
-              <a:t>‹nº›</a:t>
+              <a:t>‹#›</a:t>
             </a:fld>
             <a:endParaRPr lang="pt-PT" dirty="0"/>
           </a:p>
@@ -8647,7 +8647,7 @@
             <a:fld id="{F71B3DB1-8543-40E0-A2D1-830196AD91DE}" type="datetimeFigureOut">
               <a:rPr lang="pt-PT" smtClean="0"/>
               <a:pPr/>
-              <a:t>29/06/2013</a:t>
+              <a:t>30/06/2013</a:t>
             </a:fld>
             <a:endParaRPr lang="pt-PT" dirty="0"/>
           </a:p>
@@ -8726,7 +8726,7 @@
             <a:fld id="{5D26EDD4-363A-4236-A170-49C0FA725754}" type="slidenum">
               <a:rPr lang="pt-PT" smtClean="0"/>
               <a:pPr/>
-              <a:t>‹nº›</a:t>
+              <a:t>‹#›</a:t>
             </a:fld>
             <a:endParaRPr lang="pt-PT" dirty="0"/>
           </a:p>
@@ -9354,7 +9354,7 @@
       </p:grpSpPr>
       <p:sp>
         <p:nvSpPr>
-          <p:cNvPr id="4" name="Title 3"/>
+          <p:cNvPr id="2" name="Título 1"/>
           <p:cNvSpPr>
             <a:spLocks noGrp="1"/>
           </p:cNvSpPr>
@@ -9369,7 +9369,7 @@
           <a:p>
             <a:r>
               <a:rPr lang="en-US" dirty="0" smtClean="0"/>
-              <a:t>Document</a:t>
+              <a:t>Project Quality</a:t>
             </a:r>
             <a:endParaRPr lang="en-US" dirty="0"/>
           </a:p>
@@ -9377,7 +9377,7 @@
       </p:sp>
       <p:sp>
         <p:nvSpPr>
-          <p:cNvPr id="5" name="Text Placeholder 4"/>
+          <p:cNvPr id="3" name="Marcador de Posição do Texto 2"/>
           <p:cNvSpPr>
             <a:spLocks noGrp="1"/>
           </p:cNvSpPr>
@@ -9392,29 +9392,17 @@
           <a:p>
             <a:r>
               <a:rPr lang="pt-PT" dirty="0" smtClean="0"/>
-              <a:t>Mário Oliveira</a:t>
+              <a:t>Carla Machado</a:t>
             </a:r>
             <a:endParaRPr lang="pt-PT" dirty="0"/>
           </a:p>
         </p:txBody>
       </p:sp>
     </p:spTree>
-    <p:extLst>
-      <p:ext uri="{BB962C8B-B14F-4D97-AF65-F5344CB8AC3E}">
-        <p14:creationId xmlns:p14="http://schemas.microsoft.com/office/powerpoint/2010/main" val="905212791"/>
-      </p:ext>
-    </p:extLst>
   </p:cSld>
   <p:clrMapOvr>
     <a:masterClrMapping/>
   </p:clrMapOvr>
-  <p:timing>
-    <p:tnLst>
-      <p:par>
-        <p:cTn id="1" dur="indefinite" restart="never" nodeType="tmRoot"/>
-      </p:par>
-    </p:tnLst>
-  </p:timing>
 </p:sld>
 </file>
 
@@ -9450,6 +9438,10 @@
           <a:bodyPr/>
           <a:lstStyle/>
           <a:p>
+            <a:r>
+              <a:rPr lang="en-US" dirty="0" smtClean="0"/>
+              <a:t>Processes and Process Analysis</a:t>
+            </a:r>
             <a:endParaRPr lang="pt-PT" dirty="0"/>
           </a:p>
         </p:txBody>
@@ -9466,10 +9458,63 @@
         </p:nvSpPr>
         <p:spPr/>
         <p:txBody>
-          <a:bodyPr/>
-          <a:lstStyle/>
-          <a:p>
-            <a:endParaRPr lang="pt-PT"/>
+          <a:bodyPr>
+            <a:normAutofit fontScale="92500" lnSpcReduction="10000"/>
+          </a:bodyPr>
+          <a:lstStyle/>
+          <a:p>
+            <a:r>
+              <a:rPr lang="en-US" dirty="0" smtClean="0"/>
+              <a:t>Document Management Process</a:t>
+            </a:r>
+          </a:p>
+          <a:p>
+            <a:pPr lvl="1"/>
+            <a:r>
+              <a:rPr lang="en-US" dirty="0" smtClean="0"/>
+              <a:t>It was followed in the majority of documents although some unconformities were detected </a:t>
+            </a:r>
+          </a:p>
+          <a:p>
+            <a:pPr lvl="2"/>
+            <a:r>
+              <a:rPr lang="en-US" dirty="0" smtClean="0"/>
+              <a:t>Not following correctly the hierarchy for the different roles</a:t>
+            </a:r>
+          </a:p>
+          <a:p>
+            <a:pPr lvl="1"/>
+            <a:r>
+              <a:rPr lang="en-US" dirty="0" smtClean="0"/>
+              <a:t>The process lacked flexibility in choosing the persons for the different roles</a:t>
+            </a:r>
+          </a:p>
+          <a:p>
+            <a:r>
+              <a:rPr lang="en-US" dirty="0" smtClean="0"/>
+              <a:t>Project Assessment and Control Process</a:t>
+            </a:r>
+          </a:p>
+          <a:p>
+            <a:pPr lvl="1"/>
+            <a:r>
+              <a:rPr lang="en-US" dirty="0" smtClean="0"/>
+              <a:t>Project and risk control weren’t very accurate</a:t>
+            </a:r>
+          </a:p>
+          <a:p>
+            <a:pPr lvl="2"/>
+            <a:r>
+              <a:rPr lang="en-US" dirty="0" smtClean="0"/>
+              <a:t>Process wasn’t always exactly followed</a:t>
+            </a:r>
+          </a:p>
+          <a:p>
+            <a:pPr lvl="2"/>
+            <a:r>
+              <a:rPr lang="en-US" dirty="0" smtClean="0"/>
+              <a:t>Problems with some of the used tools</a:t>
+            </a:r>
           </a:p>
         </p:txBody>
       </p:sp>
@@ -9527,32 +9572,67 @@
           <a:p>
             <a:r>
               <a:rPr lang="en-US" dirty="0" smtClean="0"/>
-              <a:t>Project Quality</a:t>
-            </a:r>
-            <a:endParaRPr lang="en-US" dirty="0"/>
-          </a:p>
-        </p:txBody>
-      </p:sp>
-      <p:sp>
-        <p:nvSpPr>
-          <p:cNvPr id="3" name="Marcador de Posição do Texto 2"/>
-          <p:cNvSpPr>
-            <a:spLocks noGrp="1"/>
-          </p:cNvSpPr>
-          <p:nvPr>
-            <p:ph type="body" idx="1"/>
+              <a:t>Processes and Process Analysis</a:t>
+            </a:r>
+            <a:endParaRPr lang="pt-PT" dirty="0"/>
+          </a:p>
+        </p:txBody>
+      </p:sp>
+      <p:sp>
+        <p:nvSpPr>
+          <p:cNvPr id="3" name="Marcador de Posição de Conteúdo 2"/>
+          <p:cNvSpPr>
+            <a:spLocks noGrp="1"/>
+          </p:cNvSpPr>
+          <p:nvPr>
+            <p:ph idx="1"/>
           </p:nvPr>
         </p:nvSpPr>
         <p:spPr/>
         <p:txBody>
-          <a:bodyPr/>
-          <a:lstStyle/>
-          <a:p>
-            <a:r>
-              <a:rPr lang="pt-PT" dirty="0" smtClean="0"/>
-              <a:t>Carla Machado</a:t>
-            </a:r>
-            <a:endParaRPr lang="pt-PT" dirty="0"/>
+          <a:bodyPr>
+            <a:normAutofit/>
+          </a:bodyPr>
+          <a:lstStyle/>
+          <a:p>
+            <a:r>
+              <a:rPr lang="en-US" dirty="0" smtClean="0"/>
+              <a:t>Project Planning Process</a:t>
+            </a:r>
+          </a:p>
+          <a:p>
+            <a:pPr lvl="1"/>
+            <a:r>
+              <a:rPr lang="en-US" dirty="0" smtClean="0"/>
+              <a:t>Plan was updated</a:t>
+            </a:r>
+          </a:p>
+          <a:p>
+            <a:pPr lvl="2"/>
+            <a:r>
+              <a:rPr lang="en-US" dirty="0" smtClean="0"/>
+              <a:t>Redefinition of some concepts - milestones</a:t>
+            </a:r>
+          </a:p>
+          <a:p>
+            <a:r>
+              <a:rPr lang="en-US" dirty="0" smtClean="0"/>
+              <a:t>Requirements Analysis Process</a:t>
+            </a:r>
+          </a:p>
+          <a:p>
+            <a:pPr lvl="1"/>
+            <a:r>
+              <a:rPr lang="en-US" dirty="0" smtClean="0"/>
+              <a:t>Major unconformity</a:t>
+            </a:r>
+          </a:p>
+          <a:p>
+            <a:pPr lvl="2"/>
+            <a:r>
+              <a:rPr lang="en-US" dirty="0" smtClean="0"/>
+              <a:t> changes were made that didn´t follow the change requirements process and documentation wasn’t updated </a:t>
+            </a:r>
           </a:p>
         </p:txBody>
       </p:sp>
@@ -9583,7 +9663,7 @@
       </p:grpSpPr>
       <p:sp>
         <p:nvSpPr>
-          <p:cNvPr id="2" name="Title 1"/>
+          <p:cNvPr id="2" name="Título 1"/>
           <p:cNvSpPr>
             <a:spLocks noGrp="1"/>
           </p:cNvSpPr>
@@ -9606,7 +9686,7 @@
       </p:sp>
       <p:sp>
         <p:nvSpPr>
-          <p:cNvPr id="3" name="Content Placeholder 2"/>
+          <p:cNvPr id="3" name="Marcador de Posição de Conteúdo 2"/>
           <p:cNvSpPr>
             <a:spLocks noGrp="1"/>
           </p:cNvSpPr>
@@ -9617,82 +9697,70 @@
         <p:spPr/>
         <p:txBody>
           <a:bodyPr>
-            <a:normAutofit fontScale="92500" lnSpcReduction="10000"/>
+            <a:normAutofit lnSpcReduction="10000"/>
           </a:bodyPr>
           <a:lstStyle/>
           <a:p>
             <a:r>
               <a:rPr lang="en-US" dirty="0" smtClean="0"/>
-              <a:t>Document Management Process</a:t>
+              <a:t>Review Process</a:t>
             </a:r>
           </a:p>
           <a:p>
             <a:pPr lvl="1"/>
             <a:r>
               <a:rPr lang="en-US" dirty="0" smtClean="0"/>
-              <a:t>It was followed in the majority of documents although some unconformities were detected </a:t>
+              <a:t>Major unconformity associated with the walkthrough </a:t>
             </a:r>
           </a:p>
           <a:p>
             <a:pPr lvl="2"/>
             <a:r>
               <a:rPr lang="en-US" dirty="0" smtClean="0"/>
-              <a:t>Not following correctly the hierarchy for the different roles</a:t>
+              <a:t>The process wasn´t followed and measures weren’t recorded</a:t>
+            </a:r>
+          </a:p>
+          <a:p>
+            <a:r>
+              <a:rPr lang="en-US" dirty="0" smtClean="0"/>
+              <a:t>Verification &amp; Validation Process </a:t>
             </a:r>
           </a:p>
           <a:p>
             <a:pPr lvl="1"/>
             <a:r>
               <a:rPr lang="en-US" dirty="0" smtClean="0"/>
-              <a:t>The process lacked flexibility in choosing the persons for the different roles</a:t>
-            </a:r>
-          </a:p>
-          <a:p>
+              <a:t>Doesn’t mention ad-hoc testing</a:t>
+            </a:r>
+          </a:p>
+          <a:p>
+            <a:pPr lvl="2"/>
             <a:r>
               <a:rPr lang="en-US" dirty="0" smtClean="0"/>
-              <a:t>Project Assessment and Control Process</a:t>
+              <a:t>How to report defects not associated with tests</a:t>
             </a:r>
           </a:p>
           <a:p>
             <a:pPr lvl="1"/>
             <a:r>
               <a:rPr lang="en-US" dirty="0" smtClean="0"/>
-              <a:t>Project and risk control weren’t very accurate</a:t>
-            </a:r>
-          </a:p>
-          <a:p>
-            <a:pPr lvl="2"/>
+              <a:t>What to do in cases of reopen</a:t>
+            </a:r>
+          </a:p>
+          <a:p>
+            <a:pPr lvl="1"/>
             <a:r>
               <a:rPr lang="en-US" dirty="0" smtClean="0"/>
-              <a:t>Process wasn’t always exactly followed</a:t>
-            </a:r>
-          </a:p>
-          <a:p>
-            <a:pPr lvl="2"/>
-            <a:r>
-              <a:rPr lang="en-US" dirty="0" smtClean="0"/>
-              <a:t>Problems with some of the used tools</a:t>
+              <a:t>Test plan wasn’t concluded</a:t>
             </a:r>
           </a:p>
         </p:txBody>
       </p:sp>
     </p:spTree>
-    <p:extLst>
-      <p:ext uri="{BB962C8B-B14F-4D97-AF65-F5344CB8AC3E}">
-        <p14:creationId xmlns:p14="http://schemas.microsoft.com/office/powerpoint/2010/main" val="3857988853"/>
-      </p:ext>
-    </p:extLst>
   </p:cSld>
   <p:clrMapOvr>
     <a:masterClrMapping/>
   </p:clrMapOvr>
-  <p:timing>
-    <p:tnLst>
-      <p:par>
-        <p:cTn id="1" dur="indefinite" restart="never" nodeType="tmRoot"/>
-      </p:par>
-    </p:tnLst>
-  </p:timing>
 </p:sld>
 </file>
 
@@ -9748,49 +9816,37 @@
         </p:nvSpPr>
         <p:spPr/>
         <p:txBody>
-          <a:bodyPr>
-            <a:normAutofit/>
-          </a:bodyPr>
+          <a:bodyPr/>
           <a:lstStyle/>
           <a:p>
             <a:r>
               <a:rPr lang="en-US" dirty="0" smtClean="0"/>
-              <a:t>Project Planning Process</a:t>
+              <a:t>Common issues in following the processes</a:t>
             </a:r>
           </a:p>
           <a:p>
             <a:pPr lvl="1"/>
             <a:r>
               <a:rPr lang="en-US" dirty="0" smtClean="0"/>
-              <a:t>Plan was updated</a:t>
-            </a:r>
-          </a:p>
-          <a:p>
-            <a:pPr lvl="2"/>
+              <a:t>Process measures weren’t always recorded or updated timely</a:t>
+            </a:r>
+          </a:p>
+          <a:p>
+            <a:pPr lvl="1"/>
             <a:r>
               <a:rPr lang="en-US" dirty="0" smtClean="0"/>
-              <a:t>Redefinition of some concepts - milestones</a:t>
-            </a:r>
-          </a:p>
-          <a:p>
+              <a:t>The processes weren’t always exactly followed as defined</a:t>
+            </a:r>
+          </a:p>
+          <a:p>
+            <a:pPr lvl="1"/>
             <a:r>
               <a:rPr lang="en-US" dirty="0" smtClean="0"/>
-              <a:t>Requirements Analysis Process</a:t>
-            </a:r>
-          </a:p>
-          <a:p>
-            <a:pPr lvl="1"/>
-            <a:r>
-              <a:rPr lang="en-US" dirty="0" smtClean="0"/>
-              <a:t>Major unconformity</a:t>
-            </a:r>
-          </a:p>
-          <a:p>
-            <a:pPr lvl="2"/>
-            <a:r>
-              <a:rPr lang="en-US" dirty="0" smtClean="0"/>
-              <a:t> changes were made that didn´t follow the change requirements process and documentation wasn’t updated </a:t>
-            </a:r>
+              <a:t>Some processes were overcomplicated for the team and project needs</a:t>
+            </a:r>
+          </a:p>
+          <a:p>
+            <a:endParaRPr lang="pt-PT" dirty="0"/>
           </a:p>
         </p:txBody>
       </p:sp>
@@ -9836,7 +9892,7 @@
           <a:p>
             <a:r>
               <a:rPr lang="en-US" dirty="0" smtClean="0"/>
-              <a:t>Processes and Process Analysis</a:t>
+              <a:t>Quality Activities</a:t>
             </a:r>
             <a:endParaRPr lang="pt-PT" dirty="0"/>
           </a:p>
@@ -9855,61 +9911,67 @@
         <p:spPr/>
         <p:txBody>
           <a:bodyPr>
-            <a:normAutofit lnSpcReduction="10000"/>
+            <a:normAutofit fontScale="85000" lnSpcReduction="20000"/>
           </a:bodyPr>
           <a:lstStyle/>
           <a:p>
             <a:r>
               <a:rPr lang="en-US" dirty="0" smtClean="0"/>
-              <a:t>Review Process</a:t>
+              <a:t>Reviews</a:t>
             </a:r>
           </a:p>
           <a:p>
             <a:pPr lvl="1"/>
             <a:r>
               <a:rPr lang="en-US" dirty="0" smtClean="0"/>
-              <a:t>Major unconformity associated with the walkthrough </a:t>
-            </a:r>
-          </a:p>
-          <a:p>
-            <a:pPr lvl="2"/>
+              <a:t>Inspections</a:t>
+            </a:r>
+          </a:p>
+          <a:p>
+            <a:pPr lvl="1"/>
             <a:r>
               <a:rPr lang="en-US" dirty="0" smtClean="0"/>
-              <a:t>The process wasn´t followed and measures weren’t recorded</a:t>
-            </a:r>
-          </a:p>
-          <a:p>
+              <a:t>Walkthrough</a:t>
+            </a:r>
+          </a:p>
+          <a:p>
+            <a:pPr lvl="1"/>
             <a:r>
               <a:rPr lang="en-US" dirty="0" smtClean="0"/>
-              <a:t>Verification &amp; Validation Process </a:t>
+              <a:t>Desk checks</a:t>
+            </a:r>
+          </a:p>
+          <a:p>
+            <a:r>
+              <a:rPr lang="en-US" dirty="0" smtClean="0"/>
+              <a:t>Quality verifications</a:t>
             </a:r>
           </a:p>
           <a:p>
             <a:pPr lvl="1"/>
             <a:r>
               <a:rPr lang="en-US" dirty="0" smtClean="0"/>
-              <a:t>Doesn’t mention ad-hoc testing</a:t>
-            </a:r>
-          </a:p>
-          <a:p>
-            <a:pPr lvl="2"/>
+              <a:t>Processes were followed</a:t>
+            </a:r>
+          </a:p>
+          <a:p>
             <a:r>
               <a:rPr lang="en-US" dirty="0" smtClean="0"/>
-              <a:t>How to report defects not associated with tests</a:t>
+              <a:t> Testing</a:t>
             </a:r>
           </a:p>
           <a:p>
             <a:pPr lvl="1"/>
             <a:r>
               <a:rPr lang="en-US" dirty="0" smtClean="0"/>
-              <a:t>What to do in cases of reopen</a:t>
+              <a:t>Unit testing</a:t>
             </a:r>
           </a:p>
           <a:p>
             <a:pPr lvl="1"/>
             <a:r>
               <a:rPr lang="en-US" dirty="0" smtClean="0"/>
-              <a:t>Test plan wasn’t concluded</a:t>
+              <a:t>Acceptance and system testing</a:t>
             </a:r>
           </a:p>
         </p:txBody>
@@ -9956,9 +10018,9 @@
           <a:p>
             <a:r>
               <a:rPr lang="en-US" dirty="0" smtClean="0"/>
-              <a:t>Processes and Process Analysis</a:t>
-            </a:r>
-            <a:endParaRPr lang="pt-PT" dirty="0"/>
+              <a:t>Quality Cost</a:t>
+            </a:r>
+            <a:endParaRPr lang="en-US" dirty="0"/>
           </a:p>
         </p:txBody>
       </p:sp>
@@ -9977,34 +10039,7 @@
           <a:bodyPr/>
           <a:lstStyle/>
           <a:p>
-            <a:r>
-              <a:rPr lang="en-US" dirty="0" smtClean="0"/>
-              <a:t>Common issues in following the processes</a:t>
-            </a:r>
-          </a:p>
-          <a:p>
-            <a:pPr lvl="1"/>
-            <a:r>
-              <a:rPr lang="en-US" dirty="0" smtClean="0"/>
-              <a:t>Process measures weren’t always recorded or updated timely</a:t>
-            </a:r>
-          </a:p>
-          <a:p>
-            <a:pPr lvl="1"/>
-            <a:r>
-              <a:rPr lang="en-US" dirty="0" smtClean="0"/>
-              <a:t>The processes weren’t always exactly followed as defined</a:t>
-            </a:r>
-          </a:p>
-          <a:p>
-            <a:pPr lvl="1"/>
-            <a:r>
-              <a:rPr lang="en-US" dirty="0" smtClean="0"/>
-              <a:t>Some processes were overcomplicated for the team and project needs</a:t>
-            </a:r>
-          </a:p>
-          <a:p>
-            <a:endParaRPr lang="pt-PT" dirty="0"/>
+            <a:endParaRPr lang="pt-PT"/>
           </a:p>
         </p:txBody>
       </p:sp>
@@ -10049,10 +10084,10 @@
           <a:lstStyle/>
           <a:p>
             <a:r>
-              <a:rPr lang="en-US" dirty="0" smtClean="0"/>
-              <a:t>Quality Activities</a:t>
-            </a:r>
-            <a:endParaRPr lang="pt-PT" dirty="0"/>
+              <a:rPr lang="en-US" smtClean="0"/>
+              <a:t>Quality Perception</a:t>
+            </a:r>
+            <a:endParaRPr lang="en-US"/>
           </a:p>
         </p:txBody>
       </p:sp>
@@ -10068,69 +10103,10 @@
         </p:nvSpPr>
         <p:spPr/>
         <p:txBody>
-          <a:bodyPr>
-            <a:normAutofit fontScale="85000" lnSpcReduction="20000"/>
-          </a:bodyPr>
-          <a:lstStyle/>
-          <a:p>
-            <a:r>
-              <a:rPr lang="en-US" dirty="0" smtClean="0"/>
-              <a:t>Reviews</a:t>
-            </a:r>
-          </a:p>
-          <a:p>
-            <a:pPr lvl="1"/>
-            <a:r>
-              <a:rPr lang="en-US" dirty="0" smtClean="0"/>
-              <a:t>Inspections</a:t>
-            </a:r>
-          </a:p>
-          <a:p>
-            <a:pPr lvl="1"/>
-            <a:r>
-              <a:rPr lang="en-US" dirty="0" smtClean="0"/>
-              <a:t>Walkthrough</a:t>
-            </a:r>
-          </a:p>
-          <a:p>
-            <a:pPr lvl="1"/>
-            <a:r>
-              <a:rPr lang="en-US" dirty="0" smtClean="0"/>
-              <a:t>Desk checks</a:t>
-            </a:r>
-          </a:p>
-          <a:p>
-            <a:r>
-              <a:rPr lang="en-US" dirty="0" smtClean="0"/>
-              <a:t>Quality verifications</a:t>
-            </a:r>
-          </a:p>
-          <a:p>
-            <a:pPr lvl="1"/>
-            <a:r>
-              <a:rPr lang="en-US" dirty="0" smtClean="0"/>
-              <a:t>Processes were followed</a:t>
-            </a:r>
-          </a:p>
-          <a:p>
-            <a:r>
-              <a:rPr lang="en-US" dirty="0" smtClean="0"/>
-              <a:t> Testing</a:t>
-            </a:r>
-          </a:p>
-          <a:p>
-            <a:pPr lvl="1"/>
-            <a:r>
-              <a:rPr lang="en-US" dirty="0" smtClean="0"/>
-              <a:t>Unit testing</a:t>
-            </a:r>
-          </a:p>
-          <a:p>
-            <a:pPr lvl="1"/>
-            <a:r>
-              <a:rPr lang="en-US" dirty="0" smtClean="0"/>
-              <a:t>Acceptance and system testing</a:t>
-            </a:r>
+          <a:bodyPr/>
+          <a:lstStyle/>
+          <a:p>
+            <a:endParaRPr lang="pt-PT"/>
           </a:p>
         </p:txBody>
       </p:sp>
@@ -10176,7 +10152,7 @@
           <a:p>
             <a:r>
               <a:rPr lang="en-US" dirty="0" smtClean="0"/>
-              <a:t>Quality Cost</a:t>
+              <a:t>Architecture</a:t>
             </a:r>
             <a:endParaRPr lang="en-US" dirty="0"/>
           </a:p>
@@ -10184,12 +10160,12 @@
       </p:sp>
       <p:sp>
         <p:nvSpPr>
-          <p:cNvPr id="3" name="Marcador de Posição de Conteúdo 2"/>
-          <p:cNvSpPr>
-            <a:spLocks noGrp="1"/>
-          </p:cNvSpPr>
-          <p:nvPr>
-            <p:ph idx="1"/>
+          <p:cNvPr id="3" name="Marcador de Posição do Texto 2"/>
+          <p:cNvSpPr>
+            <a:spLocks noGrp="1"/>
+          </p:cNvSpPr>
+          <p:nvPr>
+            <p:ph type="body" idx="1"/>
           </p:nvPr>
         </p:nvSpPr>
         <p:spPr/>
@@ -10197,7 +10173,11 @@
           <a:bodyPr/>
           <a:lstStyle/>
           <a:p>
-            <a:endParaRPr lang="pt-PT"/>
+            <a:r>
+              <a:rPr lang="pt-PT" dirty="0" smtClean="0"/>
+              <a:t>Rui Ganhoto</a:t>
+            </a:r>
+            <a:endParaRPr lang="pt-PT" dirty="0"/>
           </a:p>
         </p:txBody>
       </p:sp>
@@ -10206,6 +10186,13 @@
   <p:clrMapOvr>
     <a:masterClrMapping/>
   </p:clrMapOvr>
+  <p:timing>
+    <p:tnLst>
+      <p:par>
+        <p:cTn id="1" dur="indefinite" restart="never" nodeType="tmRoot"/>
+      </p:par>
+    </p:tnLst>
+  </p:timing>
 </p:sld>
 </file>
 
@@ -10320,11 +10307,7 @@
           <a:bodyPr/>
           <a:lstStyle/>
           <a:p>
-            <a:r>
-              <a:rPr lang="en-US" smtClean="0"/>
-              <a:t>Quality Perception</a:t>
-            </a:r>
-            <a:endParaRPr lang="en-US"/>
+            <a:endParaRPr lang="en-US" dirty="0"/>
           </a:p>
         </p:txBody>
       </p:sp>
@@ -10348,6 +10331,11 @@
         </p:txBody>
       </p:sp>
     </p:spTree>
+    <p:extLst>
+      <p:ext uri="{BB962C8B-B14F-4D97-AF65-F5344CB8AC3E}">
+        <p14:creationId xmlns:p14="http://schemas.microsoft.com/office/powerpoint/2010/main" val="2470495484"/>
+      </p:ext>
+    </p:extLst>
   </p:cSld>
   <p:clrMapOvr>
     <a:masterClrMapping/>
@@ -10419,6 +10407,11 @@
         </p:txBody>
       </p:sp>
     </p:spTree>
+    <p:extLst>
+      <p:ext uri="{BB962C8B-B14F-4D97-AF65-F5344CB8AC3E}">
+        <p14:creationId xmlns:p14="http://schemas.microsoft.com/office/powerpoint/2010/main" val="745076154"/>
+      </p:ext>
+    </p:extLst>
   </p:cSld>
   <p:clrMapOvr>
     <a:masterClrMapping/>

</xml_diff>

<commit_message>
Ganhoto Individual Self Evaluation
</commit_message>
<xml_diff>
--- a/Final Presentation/Presentation.pptx
+++ b/Final Presentation/Presentation.pptx
@@ -5,7 +5,7 @@
     <p:sldMasterId id="2147484047" r:id="rId1"/>
   </p:sldMasterIdLst>
   <p:notesMasterIdLst>
-    <p:notesMasterId r:id="rId69"/>
+    <p:notesMasterId r:id="rId70"/>
   </p:notesMasterIdLst>
   <p:sldIdLst>
     <p:sldId id="256" r:id="rId2"/>
@@ -75,6 +75,7 @@
     <p:sldId id="306" r:id="rId66"/>
     <p:sldId id="291" r:id="rId67"/>
     <p:sldId id="292" r:id="rId68"/>
+    <p:sldId id="337" r:id="rId69"/>
   </p:sldIdLst>
   <p:sldSz cx="12192000" cy="6858000"/>
   <p:notesSz cx="6858000" cy="9144000"/>
@@ -175,7 +176,7 @@
   </p:defaultTextStyle>
   <p:extLst>
     <p:ext uri="{EFAFB233-063F-42B5-8137-9DF3F51BA10A}">
-      <p15:sldGuideLst xmlns:p15="http://schemas.microsoft.com/office/powerpoint/2012/main" xmlns="">
+      <p15:sldGuideLst xmlns:p15="http://schemas.microsoft.com/office/powerpoint/2012/main">
         <p15:guide id="1" orient="horz" pos="2160">
           <p15:clr>
             <a:srgbClr val="A4A3A4"/>
@@ -194,7 +195,17 @@
 
 <file path=ppt/charts/chart1.xml><?xml version="1.0" encoding="utf-8"?>
 <c:chartSpace xmlns:c="http://schemas.openxmlformats.org/drawingml/2006/chart" xmlns:a="http://schemas.openxmlformats.org/drawingml/2006/main" xmlns:r="http://schemas.openxmlformats.org/officeDocument/2006/relationships">
-  <c:lang val="pt-PT"/>
+  <c:date1904 val="0"/>
+  <c:lang val="en-US"/>
+  <c:roundedCorners val="0"/>
+  <mc:AlternateContent xmlns:mc="http://schemas.openxmlformats.org/markup-compatibility/2006">
+    <mc:Choice xmlns:c14="http://schemas.microsoft.com/office/drawing/2007/8/2/chart" Requires="c14">
+      <c14:style val="102"/>
+    </mc:Choice>
+    <mc:Fallback>
+      <c:style val="2"/>
+    </mc:Fallback>
+  </mc:AlternateContent>
   <c:chart>
     <c:title>
       <c:tx>
@@ -222,7 +233,7 @@
           </a:p>
         </c:rich>
       </c:tx>
-      <c:layout/>
+      <c:overlay val="0"/>
       <c:spPr>
         <a:noFill/>
         <a:ln>
@@ -230,12 +241,34 @@
         </a:ln>
         <a:effectLst/>
       </c:spPr>
+      <c:txPr>
+        <a:bodyPr rot="0" spcFirstLastPara="1" vertOverflow="ellipsis" vert="horz" wrap="square" anchor="ctr" anchorCtr="1"/>
+        <a:lstStyle/>
+        <a:p>
+          <a:pPr>
+            <a:defRPr sz="2128" b="1" i="0" u="none" strike="noStrike" kern="1200" cap="all" spc="120" normalizeH="0" baseline="0">
+              <a:solidFill>
+                <a:schemeClr val="tx1">
+                  <a:lumMod val="65000"/>
+                  <a:lumOff val="35000"/>
+                </a:schemeClr>
+              </a:solidFill>
+              <a:latin typeface="+mn-lt"/>
+              <a:ea typeface="+mn-ea"/>
+              <a:cs typeface="+mn-cs"/>
+            </a:defRPr>
+          </a:pPr>
+          <a:endParaRPr lang="pt-PT"/>
+        </a:p>
+      </c:txPr>
     </c:title>
+    <c:autoTitleDeleted val="0"/>
     <c:plotArea>
       <c:layout/>
       <c:barChart>
         <c:barDir val="col"/>
         <c:grouping val="clustered"/>
+        <c:varyColors val="0"/>
         <c:ser>
           <c:idx val="0"/>
           <c:order val="0"/>
@@ -259,6 +292,7 @@
             </a:ln>
             <a:effectLst/>
           </c:spPr>
+          <c:invertIfNegative val="0"/>
           <c:dLbls>
             <c:spPr>
               <a:noFill/>
@@ -290,10 +324,15 @@
               </a:p>
             </c:txPr>
             <c:dLblPos val="outEnd"/>
+            <c:showLegendKey val="0"/>
             <c:showVal val="1"/>
+            <c:showCatName val="0"/>
+            <c:showSerName val="0"/>
+            <c:showPercent val="0"/>
+            <c:showBubbleSize val="0"/>
+            <c:showLeaderLines val="0"/>
             <c:extLst>
               <c:ext xmlns:c15="http://schemas.microsoft.com/office/drawing/2012/chart" uri="{CE6537A1-D6FC-4f65-9D91-7224C49458BB}">
-                <c15:layout/>
                 <c15:showLeaderLines val="1"/>
                 <c15:leaderLines>
                   <c:spPr>
@@ -335,7 +374,7 @@
             <c:numRef>
               <c:f>Folha1!$O$44:$R$44</c:f>
               <c:numCache>
-                <c:formatCode>Estandar</c:formatCode>
+                <c:formatCode>General</c:formatCode>
                 <c:ptCount val="4"/>
                 <c:pt idx="0">
                   <c:v>100</c:v>
@@ -373,6 +412,7 @@
             </a:ln>
             <a:effectLst/>
           </c:spPr>
+          <c:invertIfNegative val="0"/>
           <c:dLbls>
             <c:spPr>
               <a:noFill/>
@@ -404,10 +444,15 @@
               </a:p>
             </c:txPr>
             <c:dLblPos val="outEnd"/>
+            <c:showLegendKey val="0"/>
             <c:showVal val="1"/>
+            <c:showCatName val="0"/>
+            <c:showSerName val="0"/>
+            <c:showPercent val="0"/>
+            <c:showBubbleSize val="0"/>
+            <c:showLeaderLines val="0"/>
             <c:extLst>
               <c:ext xmlns:c15="http://schemas.microsoft.com/office/drawing/2012/chart" uri="{CE6537A1-D6FC-4f65-9D91-7224C49458BB}">
-                <c15:layout/>
                 <c15:showLeaderLines val="1"/>
                 <c15:leaderLines>
                   <c:spPr>
@@ -449,7 +494,7 @@
             <c:numRef>
               <c:f>Folha1!$O$45:$R$45</c:f>
               <c:numCache>
-                <c:formatCode>Estandar</c:formatCode>
+                <c:formatCode>General</c:formatCode>
                 <c:ptCount val="4"/>
                 <c:pt idx="1">
                   <c:v>93</c:v>
@@ -465,18 +510,24 @@
           </c:val>
         </c:ser>
         <c:dLbls>
+          <c:showLegendKey val="0"/>
           <c:showVal val="1"/>
+          <c:showCatName val="0"/>
+          <c:showSerName val="0"/>
+          <c:showPercent val="0"/>
+          <c:showBubbleSize val="0"/>
         </c:dLbls>
         <c:gapWidth val="444"/>
         <c:overlap val="-90"/>
-        <c:axId val="92445312"/>
-        <c:axId val="92459392"/>
+        <c:axId val="863674848"/>
+        <c:axId val="863676480"/>
       </c:barChart>
       <c:catAx>
-        <c:axId val="92445312"/>
+        <c:axId val="863674848"/>
         <c:scaling>
           <c:orientation val="minMax"/>
         </c:scaling>
+        <c:delete val="0"/>
         <c:axPos val="b"/>
         <c:majorGridlines>
           <c:spPr>
@@ -492,8 +543,9 @@
             <a:effectLst/>
           </c:spPr>
         </c:majorGridlines>
-        <c:numFmt formatCode="Estandar" sourceLinked="1"/>
+        <c:numFmt formatCode="General" sourceLinked="1"/>
         <c:majorTickMark val="none"/>
+        <c:minorTickMark val="none"/>
         <c:tickLblPos val="nextTo"/>
         <c:spPr>
           <a:noFill/>
@@ -528,23 +580,25 @@
             <a:endParaRPr lang="pt-PT"/>
           </a:p>
         </c:txPr>
-        <c:crossAx val="92459392"/>
+        <c:crossAx val="863676480"/>
         <c:crosses val="autoZero"/>
         <c:auto val="1"/>
         <c:lblAlgn val="ctr"/>
         <c:lblOffset val="100"/>
+        <c:noMultiLvlLbl val="0"/>
       </c:catAx>
       <c:valAx>
-        <c:axId val="92459392"/>
+        <c:axId val="863676480"/>
         <c:scaling>
           <c:orientation val="minMax"/>
         </c:scaling>
         <c:delete val="1"/>
         <c:axPos val="l"/>
-        <c:numFmt formatCode="Estandar" sourceLinked="1"/>
+        <c:numFmt formatCode="General" sourceLinked="1"/>
         <c:majorTickMark val="none"/>
+        <c:minorTickMark val="none"/>
         <c:tickLblPos val="none"/>
-        <c:crossAx val="92445312"/>
+        <c:crossAx val="863674848"/>
         <c:crosses val="autoZero"/>
         <c:crossBetween val="between"/>
       </c:valAx>
@@ -558,7 +612,7 @@
     </c:plotArea>
     <c:legend>
       <c:legendPos val="t"/>
-      <c:layout/>
+      <c:overlay val="0"/>
       <c:spPr>
         <a:noFill/>
         <a:ln>
@@ -589,6 +643,7 @@
     </c:legend>
     <c:plotVisOnly val="1"/>
     <c:dispBlanksAs val="gap"/>
+    <c:showDLblsOverMax val="0"/>
   </c:chart>
   <c:spPr>
     <a:noFill/>
@@ -607,13 +662,25 @@
       <a:endParaRPr lang="pt-PT"/>
     </a:p>
   </c:txPr>
-  <c:externalData r:id="rId1"/>
+  <c:externalData r:id="rId3">
+    <c:autoUpdate val="0"/>
+  </c:externalData>
 </c:chartSpace>
 </file>
 
 <file path=ppt/charts/chart2.xml><?xml version="1.0" encoding="utf-8"?>
 <c:chartSpace xmlns:c="http://schemas.openxmlformats.org/drawingml/2006/chart" xmlns:a="http://schemas.openxmlformats.org/drawingml/2006/main" xmlns:r="http://schemas.openxmlformats.org/officeDocument/2006/relationships">
-  <c:lang val="pt-PT"/>
+  <c:date1904 val="0"/>
+  <c:lang val="en-US"/>
+  <c:roundedCorners val="0"/>
+  <mc:AlternateContent xmlns:mc="http://schemas.openxmlformats.org/markup-compatibility/2006">
+    <mc:Choice xmlns:c14="http://schemas.microsoft.com/office/drawing/2007/8/2/chart" Requires="c14">
+      <c14:style val="102"/>
+    </mc:Choice>
+    <mc:Fallback>
+      <c:style val="2"/>
+    </mc:Fallback>
+  </mc:AlternateContent>
   <c:chart>
     <c:title>
       <c:tx>
@@ -649,6 +716,7 @@
           <c:y val="2.4482108622810719E-2"/>
         </c:manualLayout>
       </c:layout>
+      <c:overlay val="0"/>
       <c:spPr>
         <a:noFill/>
         <a:ln>
@@ -656,12 +724,34 @@
         </a:ln>
         <a:effectLst/>
       </c:spPr>
+      <c:txPr>
+        <a:bodyPr rot="0" spcFirstLastPara="1" vertOverflow="ellipsis" vert="horz" wrap="square" anchor="ctr" anchorCtr="1"/>
+        <a:lstStyle/>
+        <a:p>
+          <a:pPr>
+            <a:defRPr sz="2128" b="1" i="0" u="none" strike="noStrike" kern="1200" cap="all" spc="120" normalizeH="0" baseline="0">
+              <a:solidFill>
+                <a:schemeClr val="tx1">
+                  <a:lumMod val="65000"/>
+                  <a:lumOff val="35000"/>
+                </a:schemeClr>
+              </a:solidFill>
+              <a:latin typeface="+mn-lt"/>
+              <a:ea typeface="+mn-ea"/>
+              <a:cs typeface="+mn-cs"/>
+            </a:defRPr>
+          </a:pPr>
+          <a:endParaRPr lang="pt-PT"/>
+        </a:p>
+      </c:txPr>
     </c:title>
+    <c:autoTitleDeleted val="0"/>
     <c:plotArea>
       <c:layout/>
       <c:barChart>
         <c:barDir val="col"/>
         <c:grouping val="clustered"/>
+        <c:varyColors val="0"/>
         <c:ser>
           <c:idx val="0"/>
           <c:order val="0"/>
@@ -685,6 +775,7 @@
             </a:ln>
             <a:effectLst/>
           </c:spPr>
+          <c:invertIfNegative val="0"/>
           <c:dLbls>
             <c:spPr>
               <a:noFill/>
@@ -716,10 +807,15 @@
               </a:p>
             </c:txPr>
             <c:dLblPos val="outEnd"/>
+            <c:showLegendKey val="0"/>
             <c:showVal val="1"/>
+            <c:showCatName val="0"/>
+            <c:showSerName val="0"/>
+            <c:showPercent val="0"/>
+            <c:showBubbleSize val="0"/>
+            <c:showLeaderLines val="0"/>
             <c:extLst>
               <c:ext xmlns:c15="http://schemas.microsoft.com/office/drawing/2012/chart" uri="{CE6537A1-D6FC-4f65-9D91-7224C49458BB}">
-                <c15:layout/>
                 <c15:showLeaderLines val="1"/>
                 <c15:leaderLines>
                   <c:spPr>
@@ -761,7 +857,7 @@
             <c:numRef>
               <c:f>Folha1!$L$69:$O$69</c:f>
               <c:numCache>
-                <c:formatCode>Estandar</c:formatCode>
+                <c:formatCode>General</c:formatCode>
                 <c:ptCount val="4"/>
                 <c:pt idx="0">
                   <c:v>100</c:v>
@@ -802,6 +898,7 @@
             </a:ln>
             <a:effectLst/>
           </c:spPr>
+          <c:invertIfNegative val="0"/>
           <c:dLbls>
             <c:spPr>
               <a:noFill/>
@@ -833,10 +930,15 @@
               </a:p>
             </c:txPr>
             <c:dLblPos val="outEnd"/>
+            <c:showLegendKey val="0"/>
             <c:showVal val="1"/>
+            <c:showCatName val="0"/>
+            <c:showSerName val="0"/>
+            <c:showPercent val="0"/>
+            <c:showBubbleSize val="0"/>
+            <c:showLeaderLines val="0"/>
             <c:extLst>
               <c:ext xmlns:c15="http://schemas.microsoft.com/office/drawing/2012/chart" uri="{CE6537A1-D6FC-4f65-9D91-7224C49458BB}">
-                <c15:layout/>
                 <c15:showLeaderLines val="1"/>
                 <c15:leaderLines>
                   <c:spPr>
@@ -878,7 +980,7 @@
             <c:numRef>
               <c:f>Folha1!$L$70:$O$70</c:f>
               <c:numCache>
-                <c:formatCode>Estandar</c:formatCode>
+                <c:formatCode>General</c:formatCode>
                 <c:ptCount val="4"/>
                 <c:pt idx="0">
                   <c:v>107.75</c:v>
@@ -897,18 +999,24 @@
           </c:val>
         </c:ser>
         <c:dLbls>
+          <c:showLegendKey val="0"/>
           <c:showVal val="1"/>
+          <c:showCatName val="0"/>
+          <c:showSerName val="0"/>
+          <c:showPercent val="0"/>
+          <c:showBubbleSize val="0"/>
         </c:dLbls>
         <c:gapWidth val="444"/>
         <c:overlap val="-90"/>
-        <c:axId val="94329472"/>
-        <c:axId val="94343552"/>
+        <c:axId val="700149408"/>
+        <c:axId val="700150496"/>
       </c:barChart>
       <c:catAx>
-        <c:axId val="94329472"/>
+        <c:axId val="700149408"/>
         <c:scaling>
           <c:orientation val="minMax"/>
         </c:scaling>
+        <c:delete val="0"/>
         <c:axPos val="b"/>
         <c:majorGridlines>
           <c:spPr>
@@ -924,8 +1032,9 @@
             <a:effectLst/>
           </c:spPr>
         </c:majorGridlines>
-        <c:numFmt formatCode="Estandar" sourceLinked="1"/>
+        <c:numFmt formatCode="General" sourceLinked="1"/>
         <c:majorTickMark val="none"/>
+        <c:minorTickMark val="none"/>
         <c:tickLblPos val="nextTo"/>
         <c:spPr>
           <a:noFill/>
@@ -960,23 +1069,25 @@
             <a:endParaRPr lang="pt-PT"/>
           </a:p>
         </c:txPr>
-        <c:crossAx val="94343552"/>
+        <c:crossAx val="700150496"/>
         <c:crosses val="autoZero"/>
         <c:auto val="1"/>
         <c:lblAlgn val="ctr"/>
         <c:lblOffset val="100"/>
+        <c:noMultiLvlLbl val="0"/>
       </c:catAx>
       <c:valAx>
-        <c:axId val="94343552"/>
+        <c:axId val="700150496"/>
         <c:scaling>
           <c:orientation val="minMax"/>
         </c:scaling>
         <c:delete val="1"/>
         <c:axPos val="l"/>
-        <c:numFmt formatCode="Estandar" sourceLinked="1"/>
+        <c:numFmt formatCode="General" sourceLinked="1"/>
         <c:majorTickMark val="none"/>
+        <c:minorTickMark val="none"/>
         <c:tickLblPos val="none"/>
-        <c:crossAx val="94329472"/>
+        <c:crossAx val="700149408"/>
         <c:crosses val="autoZero"/>
         <c:crossBetween val="between"/>
       </c:valAx>
@@ -1036,7 +1147,7 @@
           </a:p>
         </c:txPr>
       </c:legendEntry>
-      <c:layout/>
+      <c:overlay val="0"/>
       <c:spPr>
         <a:noFill/>
         <a:ln>
@@ -1067,6 +1178,7 @@
     </c:legend>
     <c:plotVisOnly val="1"/>
     <c:dispBlanksAs val="gap"/>
+    <c:showDLblsOverMax val="0"/>
   </c:chart>
   <c:spPr>
     <a:noFill/>
@@ -1085,13 +1197,25 @@
       <a:endParaRPr lang="pt-PT"/>
     </a:p>
   </c:txPr>
-  <c:externalData r:id="rId1"/>
+  <c:externalData r:id="rId3">
+    <c:autoUpdate val="0"/>
+  </c:externalData>
 </c:chartSpace>
 </file>
 
 <file path=ppt/charts/chart3.xml><?xml version="1.0" encoding="utf-8"?>
 <c:chartSpace xmlns:c="http://schemas.openxmlformats.org/drawingml/2006/chart" xmlns:a="http://schemas.openxmlformats.org/drawingml/2006/main" xmlns:r="http://schemas.openxmlformats.org/officeDocument/2006/relationships">
-  <c:lang val="pt-PT"/>
+  <c:date1904 val="0"/>
+  <c:lang val="en-US"/>
+  <c:roundedCorners val="0"/>
+  <mc:AlternateContent xmlns:mc="http://schemas.openxmlformats.org/markup-compatibility/2006">
+    <mc:Choice xmlns:c14="http://schemas.microsoft.com/office/drawing/2007/8/2/chart" Requires="c14">
+      <c14:style val="102"/>
+    </mc:Choice>
+    <mc:Fallback>
+      <c:style val="2"/>
+    </mc:Fallback>
+  </mc:AlternateContent>
   <c:chart>
     <c:title>
       <c:tx>
@@ -1119,7 +1243,7 @@
           </a:p>
         </c:rich>
       </c:tx>
-      <c:layout/>
+      <c:overlay val="0"/>
       <c:spPr>
         <a:noFill/>
         <a:ln>
@@ -1127,12 +1251,34 @@
         </a:ln>
         <a:effectLst/>
       </c:spPr>
+      <c:txPr>
+        <a:bodyPr rot="0" spcFirstLastPara="1" vertOverflow="ellipsis" vert="horz" wrap="square" anchor="ctr" anchorCtr="1"/>
+        <a:lstStyle/>
+        <a:p>
+          <a:pPr>
+            <a:defRPr sz="2128" b="1" i="0" u="none" strike="noStrike" kern="1200" cap="all" spc="120" normalizeH="0" baseline="0">
+              <a:solidFill>
+                <a:schemeClr val="tx1">
+                  <a:lumMod val="65000"/>
+                  <a:lumOff val="35000"/>
+                </a:schemeClr>
+              </a:solidFill>
+              <a:latin typeface="+mn-lt"/>
+              <a:ea typeface="+mn-ea"/>
+              <a:cs typeface="+mn-cs"/>
+            </a:defRPr>
+          </a:pPr>
+          <a:endParaRPr lang="pt-PT"/>
+        </a:p>
+      </c:txPr>
     </c:title>
+    <c:autoTitleDeleted val="0"/>
     <c:plotArea>
       <c:layout/>
       <c:barChart>
         <c:barDir val="col"/>
         <c:grouping val="clustered"/>
+        <c:varyColors val="0"/>
         <c:ser>
           <c:idx val="0"/>
           <c:order val="0"/>
@@ -1145,6 +1291,7 @@
             </a:ln>
             <a:effectLst/>
           </c:spPr>
+          <c:invertIfNegative val="0"/>
           <c:dLbls>
             <c:spPr>
               <a:noFill/>
@@ -1176,10 +1323,15 @@
               </a:p>
             </c:txPr>
             <c:dLblPos val="outEnd"/>
+            <c:showLegendKey val="0"/>
             <c:showVal val="1"/>
+            <c:showCatName val="0"/>
+            <c:showSerName val="0"/>
+            <c:showPercent val="0"/>
+            <c:showBubbleSize val="0"/>
+            <c:showLeaderLines val="0"/>
             <c:extLst>
               <c:ext xmlns:c15="http://schemas.microsoft.com/office/drawing/2012/chart" uri="{CE6537A1-D6FC-4f65-9D91-7224C49458BB}">
-                <c15:layout/>
                 <c15:showLeaderLines val="1"/>
                 <c15:leaderLines>
                   <c:spPr>
@@ -1224,7 +1376,7 @@
             <c:numRef>
               <c:f>'Team Log'!$G$2:$G$6</c:f>
               <c:numCache>
-                <c:formatCode>Estandar</c:formatCode>
+                <c:formatCode>General</c:formatCode>
                 <c:ptCount val="5"/>
                 <c:pt idx="0">
                   <c:v>262</c:v>
@@ -1246,18 +1398,24 @@
           </c:val>
         </c:ser>
         <c:dLbls>
+          <c:showLegendKey val="0"/>
           <c:showVal val="1"/>
+          <c:showCatName val="0"/>
+          <c:showSerName val="0"/>
+          <c:showPercent val="0"/>
+          <c:showBubbleSize val="0"/>
         </c:dLbls>
         <c:gapWidth val="444"/>
         <c:overlap val="-90"/>
-        <c:axId val="16328960"/>
-        <c:axId val="16338944"/>
+        <c:axId val="700153216"/>
+        <c:axId val="914617296"/>
       </c:barChart>
       <c:catAx>
-        <c:axId val="16328960"/>
+        <c:axId val="700153216"/>
         <c:scaling>
           <c:orientation val="minMax"/>
         </c:scaling>
+        <c:delete val="0"/>
         <c:axPos val="b"/>
         <c:majorGridlines>
           <c:spPr>
@@ -1273,8 +1431,9 @@
             <a:effectLst/>
           </c:spPr>
         </c:majorGridlines>
-        <c:numFmt formatCode="Estandar" sourceLinked="1"/>
+        <c:numFmt formatCode="General" sourceLinked="1"/>
         <c:majorTickMark val="none"/>
+        <c:minorTickMark val="none"/>
         <c:tickLblPos val="nextTo"/>
         <c:spPr>
           <a:noFill/>
@@ -1309,23 +1468,25 @@
             <a:endParaRPr lang="pt-PT"/>
           </a:p>
         </c:txPr>
-        <c:crossAx val="16338944"/>
+        <c:crossAx val="914617296"/>
         <c:crosses val="autoZero"/>
         <c:auto val="1"/>
         <c:lblAlgn val="ctr"/>
         <c:lblOffset val="100"/>
+        <c:noMultiLvlLbl val="0"/>
       </c:catAx>
       <c:valAx>
-        <c:axId val="16338944"/>
+        <c:axId val="914617296"/>
         <c:scaling>
           <c:orientation val="minMax"/>
         </c:scaling>
         <c:delete val="1"/>
         <c:axPos val="l"/>
-        <c:numFmt formatCode="Estandar" sourceLinked="1"/>
+        <c:numFmt formatCode="General" sourceLinked="1"/>
         <c:majorTickMark val="none"/>
+        <c:minorTickMark val="none"/>
         <c:tickLblPos val="none"/>
-        <c:crossAx val="16328960"/>
+        <c:crossAx val="700153216"/>
         <c:crosses val="autoZero"/>
         <c:crossBetween val="between"/>
       </c:valAx>
@@ -1339,6 +1500,7 @@
     </c:plotArea>
     <c:plotVisOnly val="1"/>
     <c:dispBlanksAs val="gap"/>
+    <c:showDLblsOverMax val="0"/>
   </c:chart>
   <c:spPr>
     <a:noFill/>
@@ -1357,13 +1519,25 @@
       <a:endParaRPr lang="pt-PT"/>
     </a:p>
   </c:txPr>
-  <c:externalData r:id="rId1"/>
+  <c:externalData r:id="rId3">
+    <c:autoUpdate val="0"/>
+  </c:externalData>
 </c:chartSpace>
 </file>
 
 <file path=ppt/charts/chart4.xml><?xml version="1.0" encoding="utf-8"?>
 <c:chartSpace xmlns:c="http://schemas.openxmlformats.org/drawingml/2006/chart" xmlns:a="http://schemas.openxmlformats.org/drawingml/2006/main" xmlns:r="http://schemas.openxmlformats.org/officeDocument/2006/relationships">
-  <c:lang val="pt-PT"/>
+  <c:date1904 val="0"/>
+  <c:lang val="en-US"/>
+  <c:roundedCorners val="0"/>
+  <mc:AlternateContent xmlns:mc="http://schemas.openxmlformats.org/markup-compatibility/2006">
+    <mc:Choice xmlns:c14="http://schemas.microsoft.com/office/drawing/2007/8/2/chart" Requires="c14">
+      <c14:style val="102"/>
+    </mc:Choice>
+    <mc:Fallback>
+      <c:style val="2"/>
+    </mc:Fallback>
+  </mc:AlternateContent>
   <c:chart>
     <c:autoTitleDeleted val="1"/>
     <c:plotArea>
@@ -1371,6 +1545,7 @@
       <c:barChart>
         <c:barDir val="col"/>
         <c:grouping val="clustered"/>
+        <c:varyColors val="0"/>
         <c:ser>
           <c:idx val="0"/>
           <c:order val="0"/>
@@ -1394,8 +1569,11 @@
             </a:ln>
             <a:effectLst/>
           </c:spPr>
+          <c:invertIfNegative val="0"/>
           <c:dPt>
             <c:idx val="7"/>
+            <c:invertIfNegative val="0"/>
+            <c:bubble3D val="0"/>
             <c:spPr>
               <a:solidFill>
                 <a:schemeClr val="accent1">
@@ -1444,7 +1622,7 @@
             <c:numRef>
               <c:f>'Team Log'!$F$23:$F$30</c:f>
               <c:numCache>
-                <c:formatCode>Estandar</c:formatCode>
+                <c:formatCode>General</c:formatCode>
                 <c:ptCount val="8"/>
                 <c:pt idx="0">
                   <c:v>40.5</c:v>
@@ -1497,8 +1675,11 @@
             </a:ln>
             <a:effectLst/>
           </c:spPr>
+          <c:invertIfNegative val="0"/>
           <c:dPt>
             <c:idx val="7"/>
+            <c:invertIfNegative val="0"/>
+            <c:bubble3D val="0"/>
             <c:spPr>
               <a:solidFill>
                 <a:schemeClr val="bg2">
@@ -1547,7 +1728,7 @@
             <c:numRef>
               <c:f>'Team Log'!$G$23:$G$30</c:f>
               <c:numCache>
-                <c:formatCode>Estandar</c:formatCode>
+                <c:formatCode>General</c:formatCode>
                 <c:ptCount val="8"/>
                 <c:pt idx="0">
                   <c:v>45.5</c:v>
@@ -1600,6 +1781,7 @@
             </a:ln>
             <a:effectLst/>
           </c:spPr>
+          <c:invertIfNegative val="0"/>
           <c:cat>
             <c:strRef>
               <c:f>'Team Log'!$E$23:$E$30</c:f>
@@ -1636,7 +1818,7 @@
             <c:numRef>
               <c:f>'Team Log'!$H$23:$H$30</c:f>
               <c:numCache>
-                <c:formatCode>Estandar</c:formatCode>
+                <c:formatCode>General</c:formatCode>
                 <c:ptCount val="8"/>
                 <c:pt idx="0">
                   <c:v>3</c:v>
@@ -1651,20 +1833,29 @@
             </c:numRef>
           </c:val>
         </c:ser>
-        <c:dLbls/>
+        <c:dLbls>
+          <c:showLegendKey val="0"/>
+          <c:showVal val="0"/>
+          <c:showCatName val="0"/>
+          <c:showSerName val="0"/>
+          <c:showPercent val="0"/>
+          <c:showBubbleSize val="0"/>
+        </c:dLbls>
         <c:gapWidth val="219"/>
         <c:overlap val="-27"/>
-        <c:axId val="96496256"/>
-        <c:axId val="96510336"/>
+        <c:axId val="914620560"/>
+        <c:axId val="914614032"/>
       </c:barChart>
       <c:catAx>
-        <c:axId val="96496256"/>
+        <c:axId val="914620560"/>
         <c:scaling>
           <c:orientation val="minMax"/>
         </c:scaling>
+        <c:delete val="0"/>
         <c:axPos val="b"/>
-        <c:numFmt formatCode="Estandar" sourceLinked="1"/>
+        <c:numFmt formatCode="General" sourceLinked="1"/>
         <c:majorTickMark val="none"/>
+        <c:minorTickMark val="none"/>
         <c:tickLblPos val="nextTo"/>
         <c:spPr>
           <a:noFill/>
@@ -1699,17 +1890,19 @@
             <a:endParaRPr lang="pt-PT"/>
           </a:p>
         </c:txPr>
-        <c:crossAx val="96510336"/>
+        <c:crossAx val="914614032"/>
         <c:crosses val="autoZero"/>
         <c:auto val="1"/>
         <c:lblAlgn val="ctr"/>
         <c:lblOffset val="100"/>
+        <c:noMultiLvlLbl val="0"/>
       </c:catAx>
       <c:valAx>
-        <c:axId val="96510336"/>
+        <c:axId val="914614032"/>
         <c:scaling>
           <c:orientation val="minMax"/>
         </c:scaling>
+        <c:delete val="0"/>
         <c:axPos val="l"/>
         <c:majorGridlines>
           <c:spPr>
@@ -1725,8 +1918,9 @@
             <a:effectLst/>
           </c:spPr>
         </c:majorGridlines>
-        <c:numFmt formatCode="Estandar" sourceLinked="1"/>
+        <c:numFmt formatCode="General" sourceLinked="1"/>
         <c:majorTickMark val="none"/>
+        <c:minorTickMark val="none"/>
         <c:tickLblPos val="nextTo"/>
         <c:spPr>
           <a:noFill/>
@@ -1755,7 +1949,7 @@
             <a:endParaRPr lang="pt-PT"/>
           </a:p>
         </c:txPr>
-        <c:crossAx val="96496256"/>
+        <c:crossAx val="914620560"/>
         <c:crosses val="autoZero"/>
         <c:crossBetween val="between"/>
       </c:valAx>
@@ -1769,7 +1963,7 @@
     </c:plotArea>
     <c:legend>
       <c:legendPos val="b"/>
-      <c:layout/>
+      <c:overlay val="0"/>
       <c:spPr>
         <a:noFill/>
         <a:ln>
@@ -1800,6 +1994,7 @@
     </c:legend>
     <c:plotVisOnly val="1"/>
     <c:dispBlanksAs val="gap"/>
+    <c:showDLblsOverMax val="0"/>
   </c:chart>
   <c:spPr>
     <a:noFill/>
@@ -1818,13 +2013,25 @@
       <a:endParaRPr lang="pt-PT"/>
     </a:p>
   </c:txPr>
-  <c:externalData r:id="rId1"/>
+  <c:externalData r:id="rId1">
+    <c:autoUpdate val="0"/>
+  </c:externalData>
 </c:chartSpace>
 </file>
 
 <file path=ppt/charts/chart5.xml><?xml version="1.0" encoding="utf-8"?>
 <c:chartSpace xmlns:c="http://schemas.openxmlformats.org/drawingml/2006/chart" xmlns:a="http://schemas.openxmlformats.org/drawingml/2006/main" xmlns:r="http://schemas.openxmlformats.org/officeDocument/2006/relationships">
-  <c:lang val="pt-PT"/>
+  <c:date1904 val="0"/>
+  <c:lang val="en-US"/>
+  <c:roundedCorners val="0"/>
+  <mc:AlternateContent xmlns:mc="http://schemas.openxmlformats.org/markup-compatibility/2006">
+    <mc:Choice xmlns:c14="http://schemas.microsoft.com/office/drawing/2007/8/2/chart" Requires="c14">
+      <c14:style val="102"/>
+    </mc:Choice>
+    <mc:Fallback>
+      <c:style val="2"/>
+    </mc:Fallback>
+  </mc:AlternateContent>
   <c:chart>
     <c:autoTitleDeleted val="1"/>
     <c:plotArea>
@@ -1893,7 +2100,7 @@
             <c:numRef>
               <c:f>Folha1!$C$2:$C$8</c:f>
               <c:numCache>
-                <c:formatCode>Estandar</c:formatCode>
+                <c:formatCode>General</c:formatCode>
                 <c:ptCount val="7"/>
                 <c:pt idx="0">
                   <c:v>5.5</c:v>
@@ -1919,6 +2126,7 @@
               </c:numCache>
             </c:numRef>
           </c:val>
+          <c:smooth val="0"/>
         </c:ser>
         <c:ser>
           <c:idx val="2"/>
@@ -1983,7 +2191,7 @@
             <c:numRef>
               <c:f>Folha1!$D$2:$D$8</c:f>
               <c:numCache>
-                <c:formatCode>Estandar</c:formatCode>
+                <c:formatCode>General</c:formatCode>
                 <c:ptCount val="7"/>
                 <c:pt idx="0">
                   <c:v>8.5</c:v>
@@ -2009,6 +2217,7 @@
               </c:numCache>
             </c:numRef>
           </c:val>
+          <c:smooth val="0"/>
         </c:ser>
         <c:ser>
           <c:idx val="3"/>
@@ -2092,7 +2301,7 @@
             <c:numRef>
               <c:f>Folha1!$E$2:$E$8</c:f>
               <c:numCache>
-                <c:formatCode>Estandar</c:formatCode>
+                <c:formatCode>General</c:formatCode>
                 <c:ptCount val="7"/>
                 <c:pt idx="0">
                   <c:v>6.615384615384615</c:v>
@@ -2118,8 +2327,16 @@
               </c:numCache>
             </c:numRef>
           </c:val>
+          <c:smooth val="0"/>
         </c:ser>
-        <c:dLbls/>
+        <c:dLbls>
+          <c:showLegendKey val="0"/>
+          <c:showVal val="0"/>
+          <c:showCatName val="0"/>
+          <c:showSerName val="0"/>
+          <c:showPercent val="0"/>
+          <c:showBubbleSize val="0"/>
+        </c:dLbls>
         <c:hiLowLines>
           <c:spPr>
             <a:ln w="9525" cap="flat" cmpd="sng" algn="ctr">
@@ -2134,17 +2351,19 @@
             <a:effectLst/>
           </c:spPr>
         </c:hiLowLines>
-        <c:axId val="96553984"/>
-        <c:axId val="96568064"/>
+        <c:axId val="914614576"/>
+        <c:axId val="914615120"/>
       </c:stockChart>
       <c:catAx>
-        <c:axId val="96553984"/>
+        <c:axId val="914614576"/>
         <c:scaling>
           <c:orientation val="minMax"/>
         </c:scaling>
+        <c:delete val="0"/>
         <c:axPos val="b"/>
-        <c:numFmt formatCode="Estandar" sourceLinked="1"/>
+        <c:numFmt formatCode="General" sourceLinked="1"/>
         <c:majorTickMark val="none"/>
+        <c:minorTickMark val="none"/>
         <c:tickLblPos val="nextTo"/>
         <c:spPr>
           <a:noFill/>
@@ -2179,17 +2398,19 @@
             <a:endParaRPr lang="pt-PT"/>
           </a:p>
         </c:txPr>
-        <c:crossAx val="96568064"/>
+        <c:crossAx val="914615120"/>
         <c:crosses val="autoZero"/>
         <c:auto val="1"/>
         <c:lblAlgn val="ctr"/>
         <c:lblOffset val="100"/>
+        <c:noMultiLvlLbl val="0"/>
       </c:catAx>
       <c:valAx>
-        <c:axId val="96568064"/>
+        <c:axId val="914615120"/>
         <c:scaling>
           <c:orientation val="minMax"/>
         </c:scaling>
+        <c:delete val="0"/>
         <c:axPos val="l"/>
         <c:majorGridlines>
           <c:spPr>
@@ -2205,8 +2426,9 @@
             <a:effectLst/>
           </c:spPr>
         </c:majorGridlines>
-        <c:numFmt formatCode="Estandar" sourceLinked="1"/>
+        <c:numFmt formatCode="General" sourceLinked="1"/>
         <c:majorTickMark val="none"/>
+        <c:minorTickMark val="none"/>
         <c:tickLblPos val="nextTo"/>
         <c:spPr>
           <a:noFill/>
@@ -2235,7 +2457,7 @@
             <a:endParaRPr lang="pt-PT"/>
           </a:p>
         </c:txPr>
-        <c:crossAx val="96553984"/>
+        <c:crossAx val="914614576"/>
         <c:crosses val="autoZero"/>
         <c:crossBetween val="between"/>
         <c:majorUnit val="1"/>
@@ -2251,6 +2473,7 @@
     </c:plotArea>
     <c:plotVisOnly val="1"/>
     <c:dispBlanksAs val="gap"/>
+    <c:showDLblsOverMax val="0"/>
   </c:chart>
   <c:spPr>
     <a:noFill/>
@@ -2269,14 +2492,25 @@
       <a:endParaRPr lang="pt-PT"/>
     </a:p>
   </c:txPr>
-  <c:externalData r:id="rId1"/>
+  <c:externalData r:id="rId1">
+    <c:autoUpdate val="0"/>
+  </c:externalData>
 </c:chartSpace>
 </file>
 
 <file path=ppt/charts/chart6.xml><?xml version="1.0" encoding="utf-8"?>
 <c:chartSpace xmlns:c="http://schemas.openxmlformats.org/drawingml/2006/chart" xmlns:a="http://schemas.openxmlformats.org/drawingml/2006/main" xmlns:r="http://schemas.openxmlformats.org/officeDocument/2006/relationships">
-  <c:lang val="pt-PT"/>
-  <c:style val="34"/>
+  <c:date1904 val="0"/>
+  <c:lang val="en-US"/>
+  <c:roundedCorners val="0"/>
+  <mc:AlternateContent xmlns:mc="http://schemas.openxmlformats.org/markup-compatibility/2006">
+    <mc:Choice xmlns:c14="http://schemas.microsoft.com/office/drawing/2007/8/2/chart" Requires="c14">
+      <c14:style val="134"/>
+    </mc:Choice>
+    <mc:Fallback>
+      <c:style val="34"/>
+    </mc:Fallback>
+  </mc:AlternateContent>
   <c:chart>
     <c:title>
       <c:tx>
@@ -2294,8 +2528,9 @@
           </a:p>
         </c:rich>
       </c:tx>
-      <c:layout/>
+      <c:overlay val="0"/>
     </c:title>
+    <c:autoTitleDeleted val="0"/>
     <c:plotArea>
       <c:layout>
         <c:manualLayout>
@@ -2334,7 +2569,12 @@
               <a:effectLst/>
             </c:spPr>
             <c:dLblPos val="bestFit"/>
+            <c:showLegendKey val="0"/>
+            <c:showVal val="0"/>
+            <c:showCatName val="0"/>
+            <c:showSerName val="0"/>
             <c:showPercent val="1"/>
+            <c:showBubbleSize val="0"/>
             <c:showLeaderLines val="1"/>
             <c:extLst>
               <c:ext xmlns:c15="http://schemas.microsoft.com/office/drawing/2012/chart" uri="{CE6537A1-D6FC-4f65-9D91-7224C49458BB}"/>
@@ -2364,7 +2604,7 @@
             <c:numRef>
               <c:f>Folha1!$B$2:$B$5</c:f>
               <c:numCache>
-                <c:formatCode>Estandar</c:formatCode>
+                <c:formatCode>General</c:formatCode>
                 <c:ptCount val="4"/>
                 <c:pt idx="0">
                   <c:v>46</c:v>
@@ -2383,7 +2623,13 @@
           </c:val>
         </c:ser>
         <c:dLbls>
+          <c:showLegendKey val="0"/>
+          <c:showVal val="0"/>
+          <c:showCatName val="0"/>
+          <c:showSerName val="0"/>
           <c:showPercent val="1"/>
+          <c:showBubbleSize val="0"/>
+          <c:showLeaderLines val="1"/>
         </c:dLbls>
         <c:gapWidth val="150"/>
         <c:secondPieSize val="75"/>
@@ -2402,11 +2648,15 @@
           <c:h val="6.8887289088863907E-2"/>
         </c:manualLayout>
       </c:layout>
+      <c:overlay val="0"/>
     </c:legend>
     <c:plotVisOnly val="1"/>
     <c:dispBlanksAs val="zero"/>
+    <c:showDLblsOverMax val="0"/>
   </c:chart>
-  <c:externalData r:id="rId1"/>
+  <c:externalData r:id="rId1">
+    <c:autoUpdate val="0"/>
+  </c:externalData>
 </c:chartSpace>
 </file>
 
@@ -2491,86 +2741,6 @@
 </file>
 
 <file path=ppt/charts/colors3.xml><?xml version="1.0" encoding="utf-8"?>
-<cs:colorStyle xmlns:cs="http://schemas.microsoft.com/office/drawing/2012/chartStyle" xmlns:a="http://schemas.openxmlformats.org/drawingml/2006/main" meth="cycle" id="10">
-  <a:schemeClr val="accent1"/>
-  <a:schemeClr val="accent2"/>
-  <a:schemeClr val="accent3"/>
-  <a:schemeClr val="accent4"/>
-  <a:schemeClr val="accent5"/>
-  <a:schemeClr val="accent6"/>
-  <cs:variation/>
-  <cs:variation>
-    <a:lumMod val="60000"/>
-  </cs:variation>
-  <cs:variation>
-    <a:lumMod val="80000"/>
-    <a:lumOff val="20000"/>
-  </cs:variation>
-  <cs:variation>
-    <a:lumMod val="80000"/>
-  </cs:variation>
-  <cs:variation>
-    <a:lumMod val="60000"/>
-    <a:lumOff val="40000"/>
-  </cs:variation>
-  <cs:variation>
-    <a:lumMod val="50000"/>
-  </cs:variation>
-  <cs:variation>
-    <a:lumMod val="70000"/>
-    <a:lumOff val="30000"/>
-  </cs:variation>
-  <cs:variation>
-    <a:lumMod val="70000"/>
-  </cs:variation>
-  <cs:variation>
-    <a:lumMod val="50000"/>
-    <a:lumOff val="50000"/>
-  </cs:variation>
-</cs:colorStyle>
-</file>
-
-<file path=ppt/charts/colors4.xml><?xml version="1.0" encoding="utf-8"?>
-<cs:colorStyle xmlns:cs="http://schemas.microsoft.com/office/drawing/2012/chartStyle" xmlns:a="http://schemas.openxmlformats.org/drawingml/2006/main" meth="cycle" id="10">
-  <a:schemeClr val="accent1"/>
-  <a:schemeClr val="accent2"/>
-  <a:schemeClr val="accent3"/>
-  <a:schemeClr val="accent4"/>
-  <a:schemeClr val="accent5"/>
-  <a:schemeClr val="accent6"/>
-  <cs:variation/>
-  <cs:variation>
-    <a:lumMod val="60000"/>
-  </cs:variation>
-  <cs:variation>
-    <a:lumMod val="80000"/>
-    <a:lumOff val="20000"/>
-  </cs:variation>
-  <cs:variation>
-    <a:lumMod val="80000"/>
-  </cs:variation>
-  <cs:variation>
-    <a:lumMod val="60000"/>
-    <a:lumOff val="40000"/>
-  </cs:variation>
-  <cs:variation>
-    <a:lumMod val="50000"/>
-  </cs:variation>
-  <cs:variation>
-    <a:lumMod val="70000"/>
-    <a:lumOff val="30000"/>
-  </cs:variation>
-  <cs:variation>
-    <a:lumMod val="70000"/>
-  </cs:variation>
-  <cs:variation>
-    <a:lumMod val="50000"/>
-    <a:lumOff val="50000"/>
-  </cs:variation>
-</cs:colorStyle>
-</file>
-
-<file path=ppt/charts/colors5.xml><?xml version="1.0" encoding="utf-8"?>
 <cs:colorStyle xmlns:cs="http://schemas.microsoft.com/office/drawing/2012/chartStyle" xmlns:a="http://schemas.openxmlformats.org/drawingml/2006/main" meth="cycle" id="10">
   <a:schemeClr val="accent1"/>
   <a:schemeClr val="accent2"/>
@@ -4182,1011 +4352,6 @@
 </cs:chartStyle>
 </file>
 
-<file path=ppt/charts/style4.xml><?xml version="1.0" encoding="utf-8"?>
-<cs:chartStyle xmlns:cs="http://schemas.microsoft.com/office/drawing/2012/chartStyle" xmlns:a="http://schemas.openxmlformats.org/drawingml/2006/main" id="201">
-  <cs:axisTitle>
-    <cs:lnRef idx="0"/>
-    <cs:fillRef idx="0"/>
-    <cs:effectRef idx="0"/>
-    <cs:fontRef idx="minor">
-      <a:schemeClr val="tx1">
-        <a:lumMod val="65000"/>
-        <a:lumOff val="35000"/>
-      </a:schemeClr>
-    </cs:fontRef>
-    <cs:defRPr sz="1000" kern="1200"/>
-  </cs:axisTitle>
-  <cs:categoryAxis>
-    <cs:lnRef idx="0"/>
-    <cs:fillRef idx="0"/>
-    <cs:effectRef idx="0"/>
-    <cs:fontRef idx="minor">
-      <a:schemeClr val="tx1">
-        <a:lumMod val="65000"/>
-        <a:lumOff val="35000"/>
-      </a:schemeClr>
-    </cs:fontRef>
-    <cs:spPr>
-      <a:ln w="9525" cap="flat" cmpd="sng" algn="ctr">
-        <a:solidFill>
-          <a:schemeClr val="tx1">
-            <a:lumMod val="15000"/>
-            <a:lumOff val="85000"/>
-          </a:schemeClr>
-        </a:solidFill>
-        <a:round/>
-      </a:ln>
-    </cs:spPr>
-    <cs:defRPr sz="900" kern="1200"/>
-  </cs:categoryAxis>
-  <cs:chartArea mods="allowNoFillOverride allowNoLineOverride">
-    <cs:lnRef idx="0"/>
-    <cs:fillRef idx="0"/>
-    <cs:effectRef idx="0"/>
-    <cs:fontRef idx="minor">
-      <a:schemeClr val="tx1"/>
-    </cs:fontRef>
-    <cs:spPr>
-      <a:solidFill>
-        <a:schemeClr val="bg1"/>
-      </a:solidFill>
-      <a:ln w="9525" cap="flat" cmpd="sng" algn="ctr">
-        <a:solidFill>
-          <a:schemeClr val="tx1">
-            <a:lumMod val="15000"/>
-            <a:lumOff val="85000"/>
-          </a:schemeClr>
-        </a:solidFill>
-        <a:round/>
-      </a:ln>
-    </cs:spPr>
-    <cs:defRPr sz="1000" kern="1200"/>
-  </cs:chartArea>
-  <cs:dataLabel>
-    <cs:lnRef idx="0"/>
-    <cs:fillRef idx="0"/>
-    <cs:effectRef idx="0"/>
-    <cs:fontRef idx="minor">
-      <a:schemeClr val="tx1">
-        <a:lumMod val="75000"/>
-        <a:lumOff val="25000"/>
-      </a:schemeClr>
-    </cs:fontRef>
-    <cs:defRPr sz="900" kern="1200"/>
-  </cs:dataLabel>
-  <cs:dataLabelCallout>
-    <cs:lnRef idx="0"/>
-    <cs:fillRef idx="0"/>
-    <cs:effectRef idx="0"/>
-    <cs:fontRef idx="minor">
-      <a:schemeClr val="dk1">
-        <a:lumMod val="65000"/>
-        <a:lumOff val="35000"/>
-      </a:schemeClr>
-    </cs:fontRef>
-    <cs:spPr>
-      <a:solidFill>
-        <a:schemeClr val="lt1"/>
-      </a:solidFill>
-      <a:ln>
-        <a:solidFill>
-          <a:schemeClr val="dk1">
-            <a:lumMod val="25000"/>
-            <a:lumOff val="75000"/>
-          </a:schemeClr>
-        </a:solidFill>
-      </a:ln>
-    </cs:spPr>
-    <cs:defRPr sz="900" kern="1200"/>
-    <cs:bodyPr rot="0" spcFirstLastPara="1" vertOverflow="clip" horzOverflow="clip" vert="horz" wrap="square" lIns="36576" tIns="18288" rIns="36576" bIns="18288" anchor="ctr" anchorCtr="1">
-      <a:spAutoFit/>
-    </cs:bodyPr>
-  </cs:dataLabelCallout>
-  <cs:dataPoint>
-    <cs:lnRef idx="0"/>
-    <cs:fillRef idx="1">
-      <cs:styleClr val="auto"/>
-    </cs:fillRef>
-    <cs:effectRef idx="0"/>
-    <cs:fontRef idx="minor">
-      <a:schemeClr val="tx1"/>
-    </cs:fontRef>
-  </cs:dataPoint>
-  <cs:dataPoint3D>
-    <cs:lnRef idx="0"/>
-    <cs:fillRef idx="1">
-      <cs:styleClr val="auto"/>
-    </cs:fillRef>
-    <cs:effectRef idx="0"/>
-    <cs:fontRef idx="minor">
-      <a:schemeClr val="tx1"/>
-    </cs:fontRef>
-  </cs:dataPoint3D>
-  <cs:dataPointLine>
-    <cs:lnRef idx="0">
-      <cs:styleClr val="auto"/>
-    </cs:lnRef>
-    <cs:fillRef idx="1"/>
-    <cs:effectRef idx="0"/>
-    <cs:fontRef idx="minor">
-      <a:schemeClr val="tx1"/>
-    </cs:fontRef>
-    <cs:spPr>
-      <a:ln w="28575" cap="rnd">
-        <a:solidFill>
-          <a:schemeClr val="phClr"/>
-        </a:solidFill>
-        <a:round/>
-      </a:ln>
-    </cs:spPr>
-  </cs:dataPointLine>
-  <cs:dataPointMarker>
-    <cs:lnRef idx="0">
-      <cs:styleClr val="auto"/>
-    </cs:lnRef>
-    <cs:fillRef idx="1">
-      <cs:styleClr val="auto"/>
-    </cs:fillRef>
-    <cs:effectRef idx="0"/>
-    <cs:fontRef idx="minor">
-      <a:schemeClr val="tx1"/>
-    </cs:fontRef>
-    <cs:spPr>
-      <a:ln w="9525">
-        <a:solidFill>
-          <a:schemeClr val="phClr"/>
-        </a:solidFill>
-      </a:ln>
-    </cs:spPr>
-  </cs:dataPointMarker>
-  <cs:dataPointMarkerLayout symbol="circle" size="5"/>
-  <cs:dataPointWireframe>
-    <cs:lnRef idx="0">
-      <cs:styleClr val="auto"/>
-    </cs:lnRef>
-    <cs:fillRef idx="1"/>
-    <cs:effectRef idx="0"/>
-    <cs:fontRef idx="minor">
-      <a:schemeClr val="tx1"/>
-    </cs:fontRef>
-    <cs:spPr>
-      <a:ln w="9525" cap="rnd">
-        <a:solidFill>
-          <a:schemeClr val="phClr"/>
-        </a:solidFill>
-        <a:round/>
-      </a:ln>
-    </cs:spPr>
-  </cs:dataPointWireframe>
-  <cs:dataTable>
-    <cs:lnRef idx="0"/>
-    <cs:fillRef idx="0"/>
-    <cs:effectRef idx="0"/>
-    <cs:fontRef idx="minor">
-      <a:schemeClr val="tx1">
-        <a:lumMod val="65000"/>
-        <a:lumOff val="35000"/>
-      </a:schemeClr>
-    </cs:fontRef>
-    <cs:spPr>
-      <a:noFill/>
-      <a:ln w="9525" cap="flat" cmpd="sng" algn="ctr">
-        <a:solidFill>
-          <a:schemeClr val="tx1">
-            <a:lumMod val="15000"/>
-            <a:lumOff val="85000"/>
-          </a:schemeClr>
-        </a:solidFill>
-        <a:round/>
-      </a:ln>
-    </cs:spPr>
-    <cs:defRPr sz="900" kern="1200"/>
-  </cs:dataTable>
-  <cs:downBar>
-    <cs:lnRef idx="0"/>
-    <cs:fillRef idx="0"/>
-    <cs:effectRef idx="0"/>
-    <cs:fontRef idx="minor">
-      <a:schemeClr val="dk1"/>
-    </cs:fontRef>
-    <cs:spPr>
-      <a:solidFill>
-        <a:schemeClr val="dk1">
-          <a:lumMod val="65000"/>
-          <a:lumOff val="35000"/>
-        </a:schemeClr>
-      </a:solidFill>
-      <a:ln w="9525">
-        <a:solidFill>
-          <a:schemeClr val="tx1">
-            <a:lumMod val="65000"/>
-            <a:lumOff val="35000"/>
-          </a:schemeClr>
-        </a:solidFill>
-      </a:ln>
-    </cs:spPr>
-  </cs:downBar>
-  <cs:dropLine>
-    <cs:lnRef idx="0"/>
-    <cs:fillRef idx="0"/>
-    <cs:effectRef idx="0"/>
-    <cs:fontRef idx="minor">
-      <a:schemeClr val="tx1"/>
-    </cs:fontRef>
-    <cs:spPr>
-      <a:ln w="9525" cap="flat" cmpd="sng" algn="ctr">
-        <a:solidFill>
-          <a:schemeClr val="tx1">
-            <a:lumMod val="35000"/>
-            <a:lumOff val="65000"/>
-          </a:schemeClr>
-        </a:solidFill>
-        <a:round/>
-      </a:ln>
-    </cs:spPr>
-  </cs:dropLine>
-  <cs:errorBar>
-    <cs:lnRef idx="0"/>
-    <cs:fillRef idx="0"/>
-    <cs:effectRef idx="0"/>
-    <cs:fontRef idx="minor">
-      <a:schemeClr val="tx1"/>
-    </cs:fontRef>
-    <cs:spPr>
-      <a:ln w="9525" cap="flat" cmpd="sng" algn="ctr">
-        <a:solidFill>
-          <a:schemeClr val="tx1">
-            <a:lumMod val="65000"/>
-            <a:lumOff val="35000"/>
-          </a:schemeClr>
-        </a:solidFill>
-        <a:round/>
-      </a:ln>
-    </cs:spPr>
-  </cs:errorBar>
-  <cs:floor>
-    <cs:lnRef idx="0"/>
-    <cs:fillRef idx="0"/>
-    <cs:effectRef idx="0"/>
-    <cs:fontRef idx="minor">
-      <a:schemeClr val="tx1"/>
-    </cs:fontRef>
-    <cs:spPr>
-      <a:noFill/>
-      <a:ln>
-        <a:noFill/>
-      </a:ln>
-    </cs:spPr>
-  </cs:floor>
-  <cs:gridlineMajor>
-    <cs:lnRef idx="0"/>
-    <cs:fillRef idx="0"/>
-    <cs:effectRef idx="0"/>
-    <cs:fontRef idx="minor">
-      <a:schemeClr val="tx1"/>
-    </cs:fontRef>
-    <cs:spPr>
-      <a:ln w="9525" cap="flat" cmpd="sng" algn="ctr">
-        <a:solidFill>
-          <a:schemeClr val="tx1">
-            <a:lumMod val="15000"/>
-            <a:lumOff val="85000"/>
-          </a:schemeClr>
-        </a:solidFill>
-        <a:round/>
-      </a:ln>
-    </cs:spPr>
-  </cs:gridlineMajor>
-  <cs:gridlineMinor>
-    <cs:lnRef idx="0"/>
-    <cs:fillRef idx="0"/>
-    <cs:effectRef idx="0"/>
-    <cs:fontRef idx="minor">
-      <a:schemeClr val="tx1"/>
-    </cs:fontRef>
-    <cs:spPr>
-      <a:ln w="9525" cap="flat" cmpd="sng" algn="ctr">
-        <a:solidFill>
-          <a:schemeClr val="tx1">
-            <a:lumMod val="5000"/>
-            <a:lumOff val="95000"/>
-          </a:schemeClr>
-        </a:solidFill>
-        <a:round/>
-      </a:ln>
-    </cs:spPr>
-  </cs:gridlineMinor>
-  <cs:hiLoLine>
-    <cs:lnRef idx="0"/>
-    <cs:fillRef idx="0"/>
-    <cs:effectRef idx="0"/>
-    <cs:fontRef idx="minor">
-      <a:schemeClr val="tx1"/>
-    </cs:fontRef>
-    <cs:spPr>
-      <a:ln w="9525" cap="flat" cmpd="sng" algn="ctr">
-        <a:solidFill>
-          <a:schemeClr val="tx1">
-            <a:lumMod val="75000"/>
-            <a:lumOff val="25000"/>
-          </a:schemeClr>
-        </a:solidFill>
-        <a:round/>
-      </a:ln>
-    </cs:spPr>
-  </cs:hiLoLine>
-  <cs:leaderLine>
-    <cs:lnRef idx="0"/>
-    <cs:fillRef idx="0"/>
-    <cs:effectRef idx="0"/>
-    <cs:fontRef idx="minor">
-      <a:schemeClr val="tx1"/>
-    </cs:fontRef>
-    <cs:spPr>
-      <a:ln w="9525" cap="flat" cmpd="sng" algn="ctr">
-        <a:solidFill>
-          <a:schemeClr val="tx1">
-            <a:lumMod val="35000"/>
-            <a:lumOff val="65000"/>
-          </a:schemeClr>
-        </a:solidFill>
-        <a:round/>
-      </a:ln>
-    </cs:spPr>
-  </cs:leaderLine>
-  <cs:legend>
-    <cs:lnRef idx="0"/>
-    <cs:fillRef idx="0"/>
-    <cs:effectRef idx="0"/>
-    <cs:fontRef idx="minor">
-      <a:schemeClr val="tx1">
-        <a:lumMod val="65000"/>
-        <a:lumOff val="35000"/>
-      </a:schemeClr>
-    </cs:fontRef>
-    <cs:defRPr sz="900" kern="1200"/>
-  </cs:legend>
-  <cs:plotArea mods="allowNoFillOverride allowNoLineOverride">
-    <cs:lnRef idx="0"/>
-    <cs:fillRef idx="0"/>
-    <cs:effectRef idx="0"/>
-    <cs:fontRef idx="minor">
-      <a:schemeClr val="tx1"/>
-    </cs:fontRef>
-  </cs:plotArea>
-  <cs:plotArea3D mods="allowNoFillOverride allowNoLineOverride">
-    <cs:lnRef idx="0"/>
-    <cs:fillRef idx="0"/>
-    <cs:effectRef idx="0"/>
-    <cs:fontRef idx="minor">
-      <a:schemeClr val="tx1"/>
-    </cs:fontRef>
-  </cs:plotArea3D>
-  <cs:seriesAxis>
-    <cs:lnRef idx="0"/>
-    <cs:fillRef idx="0"/>
-    <cs:effectRef idx="0"/>
-    <cs:fontRef idx="minor">
-      <a:schemeClr val="tx1">
-        <a:lumMod val="65000"/>
-        <a:lumOff val="35000"/>
-      </a:schemeClr>
-    </cs:fontRef>
-    <cs:defRPr sz="900" kern="1200"/>
-  </cs:seriesAxis>
-  <cs:seriesLine>
-    <cs:lnRef idx="0"/>
-    <cs:fillRef idx="0"/>
-    <cs:effectRef idx="0"/>
-    <cs:fontRef idx="minor">
-      <a:schemeClr val="tx1"/>
-    </cs:fontRef>
-    <cs:spPr>
-      <a:ln w="9525" cap="flat" cmpd="sng" algn="ctr">
-        <a:solidFill>
-          <a:schemeClr val="tx1">
-            <a:lumMod val="35000"/>
-            <a:lumOff val="65000"/>
-          </a:schemeClr>
-        </a:solidFill>
-        <a:round/>
-      </a:ln>
-    </cs:spPr>
-  </cs:seriesLine>
-  <cs:title>
-    <cs:lnRef idx="0"/>
-    <cs:fillRef idx="0"/>
-    <cs:effectRef idx="0"/>
-    <cs:fontRef idx="minor">
-      <a:schemeClr val="tx1">
-        <a:lumMod val="65000"/>
-        <a:lumOff val="35000"/>
-      </a:schemeClr>
-    </cs:fontRef>
-    <cs:defRPr sz="1400" b="0" kern="1200" spc="0" baseline="0"/>
-  </cs:title>
-  <cs:trendline>
-    <cs:lnRef idx="0">
-      <cs:styleClr val="auto"/>
-    </cs:lnRef>
-    <cs:fillRef idx="0"/>
-    <cs:effectRef idx="0"/>
-    <cs:fontRef idx="minor">
-      <a:schemeClr val="tx1"/>
-    </cs:fontRef>
-    <cs:spPr>
-      <a:ln w="19050" cap="rnd">
-        <a:solidFill>
-          <a:schemeClr val="phClr"/>
-        </a:solidFill>
-        <a:prstDash val="sysDot"/>
-      </a:ln>
-    </cs:spPr>
-  </cs:trendline>
-  <cs:trendlineLabel>
-    <cs:lnRef idx="0"/>
-    <cs:fillRef idx="0"/>
-    <cs:effectRef idx="0"/>
-    <cs:fontRef idx="minor">
-      <a:schemeClr val="tx1">
-        <a:lumMod val="65000"/>
-        <a:lumOff val="35000"/>
-      </a:schemeClr>
-    </cs:fontRef>
-    <cs:defRPr sz="900" kern="1200"/>
-  </cs:trendlineLabel>
-  <cs:upBar>
-    <cs:lnRef idx="0"/>
-    <cs:fillRef idx="0"/>
-    <cs:effectRef idx="0"/>
-    <cs:fontRef idx="minor">
-      <a:schemeClr val="dk1"/>
-    </cs:fontRef>
-    <cs:spPr>
-      <a:solidFill>
-        <a:schemeClr val="lt1"/>
-      </a:solidFill>
-      <a:ln w="9525">
-        <a:solidFill>
-          <a:schemeClr val="tx1">
-            <a:lumMod val="15000"/>
-            <a:lumOff val="85000"/>
-          </a:schemeClr>
-        </a:solidFill>
-      </a:ln>
-    </cs:spPr>
-  </cs:upBar>
-  <cs:valueAxis>
-    <cs:lnRef idx="0"/>
-    <cs:fillRef idx="0"/>
-    <cs:effectRef idx="0"/>
-    <cs:fontRef idx="minor">
-      <a:schemeClr val="tx1">
-        <a:lumMod val="65000"/>
-        <a:lumOff val="35000"/>
-      </a:schemeClr>
-    </cs:fontRef>
-    <cs:defRPr sz="900" kern="1200"/>
-  </cs:valueAxis>
-  <cs:wall>
-    <cs:lnRef idx="0"/>
-    <cs:fillRef idx="0"/>
-    <cs:effectRef idx="0"/>
-    <cs:fontRef idx="minor">
-      <a:schemeClr val="tx1"/>
-    </cs:fontRef>
-    <cs:spPr>
-      <a:noFill/>
-      <a:ln>
-        <a:noFill/>
-      </a:ln>
-    </cs:spPr>
-  </cs:wall>
-</cs:chartStyle>
-</file>
-
-<file path=ppt/charts/style5.xml><?xml version="1.0" encoding="utf-8"?>
-<cs:chartStyle xmlns:cs="http://schemas.microsoft.com/office/drawing/2012/chartStyle" xmlns:a="http://schemas.openxmlformats.org/drawingml/2006/main" id="352">
-  <cs:axisTitle>
-    <cs:lnRef idx="0"/>
-    <cs:fillRef idx="0"/>
-    <cs:effectRef idx="0"/>
-    <cs:fontRef idx="minor">
-      <a:schemeClr val="tx1">
-        <a:lumMod val="65000"/>
-        <a:lumOff val="35000"/>
-      </a:schemeClr>
-    </cs:fontRef>
-    <cs:defRPr sz="1197" kern="1200"/>
-  </cs:axisTitle>
-  <cs:categoryAxis>
-    <cs:lnRef idx="0"/>
-    <cs:fillRef idx="0"/>
-    <cs:effectRef idx="0"/>
-    <cs:fontRef idx="minor">
-      <a:schemeClr val="tx1">
-        <a:lumMod val="65000"/>
-        <a:lumOff val="35000"/>
-      </a:schemeClr>
-    </cs:fontRef>
-    <cs:spPr>
-      <a:ln w="12700" cap="flat" cmpd="sng" algn="ctr">
-        <a:solidFill>
-          <a:schemeClr val="tx1">
-            <a:lumMod val="15000"/>
-            <a:lumOff val="85000"/>
-          </a:schemeClr>
-        </a:solidFill>
-        <a:round/>
-      </a:ln>
-    </cs:spPr>
-    <cs:defRPr sz="1197" kern="1200"/>
-  </cs:categoryAxis>
-  <cs:chartArea mods="allowNoFillOverride allowNoLineOverride">
-    <cs:lnRef idx="0"/>
-    <cs:fillRef idx="0"/>
-    <cs:effectRef idx="0"/>
-    <cs:fontRef idx="minor">
-      <a:schemeClr val="tx2"/>
-    </cs:fontRef>
-    <cs:spPr>
-      <a:solidFill>
-        <a:schemeClr val="bg1"/>
-      </a:solidFill>
-      <a:ln w="9525" cap="flat" cmpd="sng" algn="ctr">
-        <a:solidFill>
-          <a:schemeClr val="tx1">
-            <a:lumMod val="15000"/>
-            <a:lumOff val="85000"/>
-          </a:schemeClr>
-        </a:solidFill>
-        <a:round/>
-      </a:ln>
-    </cs:spPr>
-    <cs:defRPr sz="1197" kern="1200"/>
-  </cs:chartArea>
-  <cs:dataLabel>
-    <cs:lnRef idx="0"/>
-    <cs:fillRef idx="0"/>
-    <cs:effectRef idx="0"/>
-    <cs:fontRef idx="minor">
-      <a:schemeClr val="tx1">
-        <a:lumMod val="75000"/>
-        <a:lumOff val="25000"/>
-      </a:schemeClr>
-    </cs:fontRef>
-    <cs:defRPr sz="1197" kern="1200"/>
-  </cs:dataLabel>
-  <cs:dataLabelCallout>
-    <cs:lnRef idx="0"/>
-    <cs:fillRef idx="0"/>
-    <cs:effectRef idx="0"/>
-    <cs:fontRef idx="minor">
-      <a:schemeClr val="dk1">
-        <a:lumMod val="65000"/>
-        <a:lumOff val="35000"/>
-      </a:schemeClr>
-    </cs:fontRef>
-    <cs:spPr>
-      <a:solidFill>
-        <a:schemeClr val="lt1"/>
-      </a:solidFill>
-      <a:ln>
-        <a:solidFill>
-          <a:schemeClr val="dk1">
-            <a:lumMod val="25000"/>
-            <a:lumOff val="75000"/>
-          </a:schemeClr>
-        </a:solidFill>
-      </a:ln>
-    </cs:spPr>
-    <cs:defRPr sz="1197" kern="1200"/>
-    <cs:bodyPr rot="0" spcFirstLastPara="1" vertOverflow="clip" horzOverflow="clip" vert="horz" wrap="square" lIns="36576" tIns="18288" rIns="36576" bIns="18288" anchor="ctr" anchorCtr="1">
-      <a:spAutoFit/>
-    </cs:bodyPr>
-  </cs:dataLabelCallout>
-  <cs:dataPoint>
-    <cs:lnRef idx="0"/>
-    <cs:fillRef idx="3">
-      <cs:styleClr val="auto"/>
-    </cs:fillRef>
-    <cs:effectRef idx="3"/>
-    <cs:fontRef idx="minor">
-      <a:schemeClr val="tx1"/>
-    </cs:fontRef>
-  </cs:dataPoint>
-  <cs:dataPoint3D>
-    <cs:lnRef idx="0"/>
-    <cs:fillRef idx="3">
-      <cs:styleClr val="auto"/>
-    </cs:fillRef>
-    <cs:effectRef idx="3"/>
-    <cs:fontRef idx="minor">
-      <a:schemeClr val="tx1"/>
-    </cs:fontRef>
-  </cs:dataPoint3D>
-  <cs:dataPointLine>
-    <cs:lnRef idx="0">
-      <cs:styleClr val="auto"/>
-    </cs:lnRef>
-    <cs:fillRef idx="3"/>
-    <cs:effectRef idx="3"/>
-    <cs:fontRef idx="minor">
-      <a:schemeClr val="tx1"/>
-    </cs:fontRef>
-    <cs:spPr>
-      <a:ln w="34925" cap="rnd">
-        <a:solidFill>
-          <a:schemeClr val="phClr"/>
-        </a:solidFill>
-        <a:round/>
-      </a:ln>
-    </cs:spPr>
-  </cs:dataPointLine>
-  <cs:dataPointMarker>
-    <cs:lnRef idx="0">
-      <cs:styleClr val="auto"/>
-    </cs:lnRef>
-    <cs:fillRef idx="3">
-      <cs:styleClr val="auto"/>
-    </cs:fillRef>
-    <cs:effectRef idx="3"/>
-    <cs:fontRef idx="minor">
-      <a:schemeClr val="tx1"/>
-    </cs:fontRef>
-    <cs:spPr>
-      <a:ln w="9525">
-        <a:solidFill>
-          <a:schemeClr val="phClr"/>
-        </a:solidFill>
-        <a:round/>
-      </a:ln>
-    </cs:spPr>
-  </cs:dataPointMarker>
-  <cs:dataPointMarkerLayout symbol="circle" size="6"/>
-  <cs:dataPointWireframe>
-    <cs:lnRef idx="0">
-      <cs:styleClr val="auto"/>
-    </cs:lnRef>
-    <cs:fillRef idx="3"/>
-    <cs:effectRef idx="3"/>
-    <cs:fontRef idx="minor">
-      <a:schemeClr val="tx1"/>
-    </cs:fontRef>
-    <cs:spPr>
-      <a:ln w="9525" cap="rnd">
-        <a:solidFill>
-          <a:schemeClr val="phClr"/>
-        </a:solidFill>
-        <a:round/>
-      </a:ln>
-    </cs:spPr>
-  </cs:dataPointWireframe>
-  <cs:dataTable>
-    <cs:lnRef idx="0"/>
-    <cs:fillRef idx="0"/>
-    <cs:effectRef idx="0"/>
-    <cs:fontRef idx="minor">
-      <a:schemeClr val="tx1">
-        <a:lumMod val="65000"/>
-        <a:lumOff val="35000"/>
-      </a:schemeClr>
-    </cs:fontRef>
-    <cs:spPr>
-      <a:noFill/>
-      <a:ln w="9525" cap="flat" cmpd="sng" algn="ctr">
-        <a:solidFill>
-          <a:schemeClr val="tx1">
-            <a:lumMod val="15000"/>
-            <a:lumOff val="85000"/>
-          </a:schemeClr>
-        </a:solidFill>
-        <a:round/>
-      </a:ln>
-    </cs:spPr>
-    <cs:defRPr sz="1197" kern="1200"/>
-  </cs:dataTable>
-  <cs:downBar>
-    <cs:lnRef idx="0"/>
-    <cs:fillRef idx="0"/>
-    <cs:effectRef idx="0"/>
-    <cs:fontRef idx="minor">
-      <a:schemeClr val="dk1"/>
-    </cs:fontRef>
-    <cs:spPr>
-      <a:solidFill>
-        <a:schemeClr val="dk1">
-          <a:lumMod val="65000"/>
-          <a:lumOff val="35000"/>
-        </a:schemeClr>
-      </a:solidFill>
-      <a:ln w="9525">
-        <a:solidFill>
-          <a:schemeClr val="tx1">
-            <a:lumMod val="65000"/>
-            <a:lumOff val="35000"/>
-          </a:schemeClr>
-        </a:solidFill>
-      </a:ln>
-    </cs:spPr>
-  </cs:downBar>
-  <cs:dropLine>
-    <cs:lnRef idx="0"/>
-    <cs:fillRef idx="0"/>
-    <cs:effectRef idx="0"/>
-    <cs:fontRef idx="minor">
-      <a:schemeClr val="tx1"/>
-    </cs:fontRef>
-    <cs:spPr>
-      <a:ln w="9525" cap="flat" cmpd="sng" algn="ctr">
-        <a:solidFill>
-          <a:schemeClr val="tx1">
-            <a:lumMod val="35000"/>
-            <a:lumOff val="65000"/>
-          </a:schemeClr>
-        </a:solidFill>
-        <a:round/>
-      </a:ln>
-    </cs:spPr>
-  </cs:dropLine>
-  <cs:errorBar>
-    <cs:lnRef idx="0"/>
-    <cs:fillRef idx="0"/>
-    <cs:effectRef idx="0"/>
-    <cs:fontRef idx="minor">
-      <a:schemeClr val="tx1"/>
-    </cs:fontRef>
-    <cs:spPr>
-      <a:ln w="9525" cap="flat" cmpd="sng" algn="ctr">
-        <a:solidFill>
-          <a:schemeClr val="tx1">
-            <a:lumMod val="65000"/>
-            <a:lumOff val="35000"/>
-          </a:schemeClr>
-        </a:solidFill>
-        <a:round/>
-      </a:ln>
-    </cs:spPr>
-  </cs:errorBar>
-  <cs:floor>
-    <cs:lnRef idx="0"/>
-    <cs:fillRef idx="0"/>
-    <cs:effectRef idx="0"/>
-    <cs:fontRef idx="minor">
-      <a:schemeClr val="lt1"/>
-    </cs:fontRef>
-  </cs:floor>
-  <cs:gridlineMajor>
-    <cs:lnRef idx="0"/>
-    <cs:fillRef idx="0"/>
-    <cs:effectRef idx="0"/>
-    <cs:fontRef idx="minor">
-      <a:schemeClr val="tx1"/>
-    </cs:fontRef>
-    <cs:spPr>
-      <a:ln w="9525" cap="flat" cmpd="sng" algn="ctr">
-        <a:solidFill>
-          <a:schemeClr val="tx1">
-            <a:lumMod val="15000"/>
-            <a:lumOff val="85000"/>
-          </a:schemeClr>
-        </a:solidFill>
-        <a:round/>
-      </a:ln>
-    </cs:spPr>
-  </cs:gridlineMajor>
-  <cs:gridlineMinor>
-    <cs:lnRef idx="0"/>
-    <cs:fillRef idx="0"/>
-    <cs:effectRef idx="0"/>
-    <cs:fontRef idx="minor">
-      <a:schemeClr val="tx1"/>
-    </cs:fontRef>
-    <cs:spPr>
-      <a:ln w="9525" cap="flat" cmpd="sng" algn="ctr">
-        <a:solidFill>
-          <a:schemeClr val="tx1">
-            <a:lumMod val="5000"/>
-            <a:lumOff val="95000"/>
-          </a:schemeClr>
-        </a:solidFill>
-        <a:round/>
-      </a:ln>
-    </cs:spPr>
-  </cs:gridlineMinor>
-  <cs:hiLoLine>
-    <cs:lnRef idx="0"/>
-    <cs:fillRef idx="0"/>
-    <cs:effectRef idx="0"/>
-    <cs:fontRef idx="minor">
-      <a:schemeClr val="tx1"/>
-    </cs:fontRef>
-    <cs:spPr>
-      <a:ln w="9525" cap="flat" cmpd="sng" algn="ctr">
-        <a:solidFill>
-          <a:schemeClr val="tx1">
-            <a:lumMod val="75000"/>
-            <a:lumOff val="25000"/>
-          </a:schemeClr>
-        </a:solidFill>
-        <a:round/>
-      </a:ln>
-    </cs:spPr>
-  </cs:hiLoLine>
-  <cs:leaderLine>
-    <cs:lnRef idx="0"/>
-    <cs:fillRef idx="0"/>
-    <cs:effectRef idx="0"/>
-    <cs:fontRef idx="minor">
-      <a:schemeClr val="tx1"/>
-    </cs:fontRef>
-    <cs:spPr>
-      <a:ln w="9525" cap="flat" cmpd="sng" algn="ctr">
-        <a:solidFill>
-          <a:schemeClr val="tx1">
-            <a:lumMod val="35000"/>
-            <a:lumOff val="65000"/>
-          </a:schemeClr>
-        </a:solidFill>
-        <a:round/>
-      </a:ln>
-    </cs:spPr>
-  </cs:leaderLine>
-  <cs:legend>
-    <cs:lnRef idx="0"/>
-    <cs:fillRef idx="0"/>
-    <cs:effectRef idx="0"/>
-    <cs:fontRef idx="minor">
-      <a:schemeClr val="tx1">
-        <a:lumMod val="65000"/>
-        <a:lumOff val="35000"/>
-      </a:schemeClr>
-    </cs:fontRef>
-    <cs:defRPr sz="1197" kern="1200"/>
-  </cs:legend>
-  <cs:plotArea>
-    <cs:lnRef idx="0"/>
-    <cs:fillRef idx="0"/>
-    <cs:effectRef idx="0"/>
-    <cs:fontRef idx="minor">
-      <a:schemeClr val="lt1"/>
-    </cs:fontRef>
-  </cs:plotArea>
-  <cs:plotArea3D>
-    <cs:lnRef idx="0"/>
-    <cs:fillRef idx="0"/>
-    <cs:effectRef idx="0"/>
-    <cs:fontRef idx="minor">
-      <a:schemeClr val="lt1"/>
-    </cs:fontRef>
-  </cs:plotArea3D>
-  <cs:seriesAxis>
-    <cs:lnRef idx="0"/>
-    <cs:fillRef idx="0"/>
-    <cs:effectRef idx="0"/>
-    <cs:fontRef idx="minor">
-      <a:schemeClr val="tx1">
-        <a:lumMod val="65000"/>
-        <a:lumOff val="35000"/>
-      </a:schemeClr>
-    </cs:fontRef>
-    <cs:spPr>
-      <a:ln w="12700" cap="flat" cmpd="sng" algn="ctr">
-        <a:solidFill>
-          <a:schemeClr val="tx1">
-            <a:lumMod val="15000"/>
-            <a:lumOff val="85000"/>
-          </a:schemeClr>
-        </a:solidFill>
-        <a:round/>
-      </a:ln>
-    </cs:spPr>
-    <cs:defRPr sz="1197" kern="1200"/>
-  </cs:seriesAxis>
-  <cs:seriesLine>
-    <cs:lnRef idx="0"/>
-    <cs:fillRef idx="0"/>
-    <cs:effectRef idx="0"/>
-    <cs:fontRef idx="minor">
-      <a:schemeClr val="tx1"/>
-    </cs:fontRef>
-    <cs:spPr>
-      <a:ln w="9525" cap="flat" cmpd="sng" algn="ctr">
-        <a:solidFill>
-          <a:schemeClr val="tx1">
-            <a:lumMod val="35000"/>
-            <a:lumOff val="65000"/>
-          </a:schemeClr>
-        </a:solidFill>
-        <a:round/>
-      </a:ln>
-    </cs:spPr>
-  </cs:seriesLine>
-  <cs:title>
-    <cs:lnRef idx="0"/>
-    <cs:fillRef idx="0"/>
-    <cs:effectRef idx="0"/>
-    <cs:fontRef idx="minor">
-      <a:schemeClr val="tx1">
-        <a:lumMod val="65000"/>
-        <a:lumOff val="35000"/>
-      </a:schemeClr>
-    </cs:fontRef>
-    <cs:defRPr sz="2128" b="1" kern="1200" baseline="0"/>
-  </cs:title>
-  <cs:trendline>
-    <cs:lnRef idx="0">
-      <cs:styleClr val="auto"/>
-    </cs:lnRef>
-    <cs:fillRef idx="0"/>
-    <cs:effectRef idx="0"/>
-    <cs:fontRef idx="minor">
-      <a:schemeClr val="lt1"/>
-    </cs:fontRef>
-    <cs:spPr>
-      <a:ln w="19050" cap="rnd">
-        <a:solidFill>
-          <a:schemeClr val="phClr"/>
-        </a:solidFill>
-      </a:ln>
-    </cs:spPr>
-  </cs:trendline>
-  <cs:trendlineLabel>
-    <cs:lnRef idx="0"/>
-    <cs:fillRef idx="0"/>
-    <cs:effectRef idx="0"/>
-    <cs:fontRef idx="minor">
-      <a:schemeClr val="tx1">
-        <a:lumMod val="65000"/>
-        <a:lumOff val="35000"/>
-      </a:schemeClr>
-    </cs:fontRef>
-    <cs:defRPr sz="1197" kern="1200"/>
-  </cs:trendlineLabel>
-  <cs:upBar>
-    <cs:lnRef idx="0"/>
-    <cs:fillRef idx="0"/>
-    <cs:effectRef idx="0"/>
-    <cs:fontRef idx="minor">
-      <a:schemeClr val="dk1"/>
-    </cs:fontRef>
-    <cs:spPr>
-      <a:solidFill>
-        <a:schemeClr val="lt1"/>
-      </a:solidFill>
-      <a:ln w="9525">
-        <a:solidFill>
-          <a:schemeClr val="tx1">
-            <a:lumMod val="15000"/>
-            <a:lumOff val="85000"/>
-          </a:schemeClr>
-        </a:solidFill>
-      </a:ln>
-    </cs:spPr>
-  </cs:upBar>
-  <cs:valueAxis>
-    <cs:lnRef idx="0"/>
-    <cs:fillRef idx="0"/>
-    <cs:effectRef idx="0"/>
-    <cs:fontRef idx="minor">
-      <a:schemeClr val="tx1">
-        <a:lumMod val="65000"/>
-        <a:lumOff val="35000"/>
-      </a:schemeClr>
-    </cs:fontRef>
-    <cs:defRPr sz="1197" kern="1200"/>
-  </cs:valueAxis>
-  <cs:wall>
-    <cs:lnRef idx="0"/>
-    <cs:fillRef idx="0"/>
-    <cs:effectRef idx="0"/>
-    <cs:fontRef idx="minor">
-      <a:schemeClr val="lt1"/>
-    </cs:fontRef>
-  </cs:wall>
-</cs:chartStyle>
-</file>
-
 <file path=ppt/diagrams/colors1.xml><?xml version="1.0" encoding="utf-8"?>
 <dgm:colorsDef xmlns:dgm="http://schemas.openxmlformats.org/drawingml/2006/diagram" xmlns:a="http://schemas.openxmlformats.org/drawingml/2006/main" uniqueId="urn:microsoft.com/office/officeart/2005/8/colors/accent1_2">
   <dgm:title val=""/>
@@ -6404,21 +5569,21 @@
     </dgm:pt>
   </dgm:ptLst>
   <dgm:cxnLst>
+    <dgm:cxn modelId="{1FFE94F7-1A23-436C-BE75-E8E800979E17}" srcId="{C306C341-D599-4B1B-99D5-C33838902528}" destId="{2FDC2C24-CC4E-4D25-B09B-59FD6E82C3EE}" srcOrd="1" destOrd="0" parTransId="{E7F2584E-86F9-4ED7-9B8D-A99EC47827F9}" sibTransId="{81A6B66D-8321-4A73-A293-0D29707D523C}"/>
+    <dgm:cxn modelId="{74AB5348-BE90-4678-A34C-0914E1E30C30}" type="presOf" srcId="{D7A1B3F6-9A96-443D-918B-6A83D726860E}" destId="{6810232A-C069-4BBA-BBD2-7BC82D197AC8}" srcOrd="0" destOrd="0" presId="urn:microsoft.com/office/officeart/2005/8/layout/hProcess11"/>
+    <dgm:cxn modelId="{30F53C6F-EC07-427E-851F-3E97E605AFC9}" srcId="{C306C341-D599-4B1B-99D5-C33838902528}" destId="{454E9A41-EB5C-4D21-A500-1A0F7280DF0F}" srcOrd="6" destOrd="0" parTransId="{1E224352-DCA1-4654-B392-6D76C795B7BE}" sibTransId="{AA42D578-BCA4-460B-AE10-0875155B9415}"/>
+    <dgm:cxn modelId="{8B924237-C27F-443D-B948-7413A94D4D27}" type="presOf" srcId="{136AD6A2-B441-479A-860B-9C60598DF083}" destId="{DF520769-FC51-4284-84DC-D345C7025315}" srcOrd="0" destOrd="0" presId="urn:microsoft.com/office/officeart/2005/8/layout/hProcess11"/>
+    <dgm:cxn modelId="{A8E9508F-E201-4F3A-B45C-83967300D4A6}" type="presOf" srcId="{BB8E58C9-394E-4BB7-956B-15FD8F0F4DF6}" destId="{F622832A-050B-4EB9-99E6-8F1AAFA7A166}" srcOrd="0" destOrd="0" presId="urn:microsoft.com/office/officeart/2005/8/layout/hProcess11"/>
+    <dgm:cxn modelId="{FB5D8D0E-9186-481B-B91B-876243A2F8C3}" srcId="{C306C341-D599-4B1B-99D5-C33838902528}" destId="{9059B768-CD7D-43D2-80D2-6FDF0EAA0156}" srcOrd="2" destOrd="0" parTransId="{1EDF92A5-B373-4C08-A41F-FC4842BC317C}" sibTransId="{7F219E18-92F5-4220-8440-CDF23E2C86DD}"/>
+    <dgm:cxn modelId="{7DB08E90-EBF1-4B81-81C1-240E3FCE3996}" type="presOf" srcId="{C306C341-D599-4B1B-99D5-C33838902528}" destId="{6BAF5AC4-12C4-475D-890B-181061458B36}" srcOrd="0" destOrd="0" presId="urn:microsoft.com/office/officeart/2005/8/layout/hProcess11"/>
+    <dgm:cxn modelId="{2531456E-1B85-4C5E-8AF6-C60E58F43067}" srcId="{C306C341-D599-4B1B-99D5-C33838902528}" destId="{BB8E58C9-394E-4BB7-956B-15FD8F0F4DF6}" srcOrd="3" destOrd="0" parTransId="{A1E3FDCD-492B-4046-91FD-A19D4F38F245}" sibTransId="{1808AAF0-8272-4577-B8B5-78D78CC4E805}"/>
     <dgm:cxn modelId="{531B340F-8630-438B-9B38-8C2716FAD3B4}" type="presOf" srcId="{9059B768-CD7D-43D2-80D2-6FDF0EAA0156}" destId="{49B98997-A726-433D-94FF-467BFB2ADCAF}" srcOrd="0" destOrd="0" presId="urn:microsoft.com/office/officeart/2005/8/layout/hProcess11"/>
+    <dgm:cxn modelId="{B9E36F7A-BBBE-4C6F-BF41-35D339983B88}" type="presOf" srcId="{1A49080C-0DE7-47E8-922A-4D0B1B6C485A}" destId="{50085456-D334-4C9E-B8C2-A46683D1A093}" srcOrd="0" destOrd="0" presId="urn:microsoft.com/office/officeart/2005/8/layout/hProcess11"/>
     <dgm:cxn modelId="{48AC722D-ACE2-4875-8C63-0C6D0EFEC009}" srcId="{C306C341-D599-4B1B-99D5-C33838902528}" destId="{136AD6A2-B441-479A-860B-9C60598DF083}" srcOrd="5" destOrd="0" parTransId="{B3AAAF1D-C6F6-49CE-A21B-B1132F4E369E}" sibTransId="{B013FFB8-9869-4AB3-A2B5-FDAEE2CD0557}"/>
-    <dgm:cxn modelId="{2531456E-1B85-4C5E-8AF6-C60E58F43067}" srcId="{C306C341-D599-4B1B-99D5-C33838902528}" destId="{BB8E58C9-394E-4BB7-956B-15FD8F0F4DF6}" srcOrd="3" destOrd="0" parTransId="{A1E3FDCD-492B-4046-91FD-A19D4F38F245}" sibTransId="{1808AAF0-8272-4577-B8B5-78D78CC4E805}"/>
-    <dgm:cxn modelId="{B9E36F7A-BBBE-4C6F-BF41-35D339983B88}" type="presOf" srcId="{1A49080C-0DE7-47E8-922A-4D0B1B6C485A}" destId="{50085456-D334-4C9E-B8C2-A46683D1A093}" srcOrd="0" destOrd="0" presId="urn:microsoft.com/office/officeart/2005/8/layout/hProcess11"/>
-    <dgm:cxn modelId="{FB5D8D0E-9186-481B-B91B-876243A2F8C3}" srcId="{C306C341-D599-4B1B-99D5-C33838902528}" destId="{9059B768-CD7D-43D2-80D2-6FDF0EAA0156}" srcOrd="2" destOrd="0" parTransId="{1EDF92A5-B373-4C08-A41F-FC4842BC317C}" sibTransId="{7F219E18-92F5-4220-8440-CDF23E2C86DD}"/>
     <dgm:cxn modelId="{02A0FDDF-750D-4E70-AEEE-212E089D8451}" srcId="{C306C341-D599-4B1B-99D5-C33838902528}" destId="{D7A1B3F6-9A96-443D-918B-6A83D726860E}" srcOrd="0" destOrd="0" parTransId="{E621CA8E-4955-42BA-A043-EA33F0C1521B}" sibTransId="{39AA8962-6813-4284-95C5-BF4AE6D9DB14}"/>
+    <dgm:cxn modelId="{4EF651BC-29A7-4411-A2C1-5D5C76CDC2E0}" type="presOf" srcId="{454E9A41-EB5C-4D21-A500-1A0F7280DF0F}" destId="{03D8AACE-E855-4D1F-9736-1957EAD159E9}" srcOrd="0" destOrd="0" presId="urn:microsoft.com/office/officeart/2005/8/layout/hProcess11"/>
+    <dgm:cxn modelId="{5B4D9666-1585-4473-894E-27F0786F7A9C}" srcId="{C306C341-D599-4B1B-99D5-C33838902528}" destId="{1A49080C-0DE7-47E8-922A-4D0B1B6C485A}" srcOrd="4" destOrd="0" parTransId="{F7B8845B-EEB5-4952-882F-D415FAF8B60E}" sibTransId="{1A70AC7A-7F03-4D55-B5D0-E2003D1A4324}"/>
     <dgm:cxn modelId="{767A3C01-869E-45E9-9525-49AE88355A73}" type="presOf" srcId="{2FDC2C24-CC4E-4D25-B09B-59FD6E82C3EE}" destId="{D9A28F98-9710-4524-B177-E78A77379D8B}" srcOrd="0" destOrd="0" presId="urn:microsoft.com/office/officeart/2005/8/layout/hProcess11"/>
-    <dgm:cxn modelId="{74AB5348-BE90-4678-A34C-0914E1E30C30}" type="presOf" srcId="{D7A1B3F6-9A96-443D-918B-6A83D726860E}" destId="{6810232A-C069-4BBA-BBD2-7BC82D197AC8}" srcOrd="0" destOrd="0" presId="urn:microsoft.com/office/officeart/2005/8/layout/hProcess11"/>
-    <dgm:cxn modelId="{5B4D9666-1585-4473-894E-27F0786F7A9C}" srcId="{C306C341-D599-4B1B-99D5-C33838902528}" destId="{1A49080C-0DE7-47E8-922A-4D0B1B6C485A}" srcOrd="4" destOrd="0" parTransId="{F7B8845B-EEB5-4952-882F-D415FAF8B60E}" sibTransId="{1A70AC7A-7F03-4D55-B5D0-E2003D1A4324}"/>
-    <dgm:cxn modelId="{8B924237-C27F-443D-B948-7413A94D4D27}" type="presOf" srcId="{136AD6A2-B441-479A-860B-9C60598DF083}" destId="{DF520769-FC51-4284-84DC-D345C7025315}" srcOrd="0" destOrd="0" presId="urn:microsoft.com/office/officeart/2005/8/layout/hProcess11"/>
-    <dgm:cxn modelId="{30F53C6F-EC07-427E-851F-3E97E605AFC9}" srcId="{C306C341-D599-4B1B-99D5-C33838902528}" destId="{454E9A41-EB5C-4D21-A500-1A0F7280DF0F}" srcOrd="6" destOrd="0" parTransId="{1E224352-DCA1-4654-B392-6D76C795B7BE}" sibTransId="{AA42D578-BCA4-460B-AE10-0875155B9415}"/>
-    <dgm:cxn modelId="{4EF651BC-29A7-4411-A2C1-5D5C76CDC2E0}" type="presOf" srcId="{454E9A41-EB5C-4D21-A500-1A0F7280DF0F}" destId="{03D8AACE-E855-4D1F-9736-1957EAD159E9}" srcOrd="0" destOrd="0" presId="urn:microsoft.com/office/officeart/2005/8/layout/hProcess11"/>
-    <dgm:cxn modelId="{1FFE94F7-1A23-436C-BE75-E8E800979E17}" srcId="{C306C341-D599-4B1B-99D5-C33838902528}" destId="{2FDC2C24-CC4E-4D25-B09B-59FD6E82C3EE}" srcOrd="1" destOrd="0" parTransId="{E7F2584E-86F9-4ED7-9B8D-A99EC47827F9}" sibTransId="{81A6B66D-8321-4A73-A293-0D29707D523C}"/>
-    <dgm:cxn modelId="{A8E9508F-E201-4F3A-B45C-83967300D4A6}" type="presOf" srcId="{BB8E58C9-394E-4BB7-956B-15FD8F0F4DF6}" destId="{F622832A-050B-4EB9-99E6-8F1AAFA7A166}" srcOrd="0" destOrd="0" presId="urn:microsoft.com/office/officeart/2005/8/layout/hProcess11"/>
-    <dgm:cxn modelId="{7DB08E90-EBF1-4B81-81C1-240E3FCE3996}" type="presOf" srcId="{C306C341-D599-4B1B-99D5-C33838902528}" destId="{6BAF5AC4-12C4-475D-890B-181061458B36}" srcOrd="0" destOrd="0" presId="urn:microsoft.com/office/officeart/2005/8/layout/hProcess11"/>
     <dgm:cxn modelId="{B10D7C1E-A564-43B7-8CF6-53A3B45427EA}" type="presParOf" srcId="{6BAF5AC4-12C4-475D-890B-181061458B36}" destId="{60799F41-7989-4AA1-B9E8-4EF51F0FF333}" srcOrd="0" destOrd="0" presId="urn:microsoft.com/office/officeart/2005/8/layout/hProcess11"/>
     <dgm:cxn modelId="{3D4CF2F4-D5DA-4E6E-B60C-17291E4CBF35}" type="presParOf" srcId="{6BAF5AC4-12C4-475D-890B-181061458B36}" destId="{5CCD0D81-360B-4CC0-98C6-6C8129CE7187}" srcOrd="1" destOrd="0" presId="urn:microsoft.com/office/officeart/2005/8/layout/hProcess11"/>
     <dgm:cxn modelId="{CB43A1D7-7FEB-4CF0-8076-B30824FA5BA7}" type="presParOf" srcId="{5CCD0D81-360B-4CC0-98C6-6C8129CE7187}" destId="{1683355D-447B-4404-8E2E-EE43BAA2B137}" srcOrd="0" destOrd="0" presId="urn:microsoft.com/office/officeart/2005/8/layout/hProcess11"/>
@@ -6460,14 +5625,14 @@
   <dgm:whole/>
   <dgm:extLst>
     <a:ext uri="http://schemas.microsoft.com/office/drawing/2008/diagram">
-      <dsp:dataModelExt xmlns:dsp="http://schemas.microsoft.com/office/drawing/2008/diagram" xmlns="" relId="rId6" minVer="http://schemas.openxmlformats.org/drawingml/2006/diagram"/>
+      <dsp:dataModelExt xmlns:dsp="http://schemas.microsoft.com/office/drawing/2008/diagram" relId="rId6" minVer="http://schemas.openxmlformats.org/drawingml/2006/diagram"/>
     </a:ext>
   </dgm:extLst>
 </dgm:dataModel>
 </file>
 
 <file path=ppt/diagrams/drawing1.xml><?xml version="1.0" encoding="utf-8"?>
-<dsp:drawing xmlns:dgm="http://schemas.openxmlformats.org/drawingml/2006/diagram" xmlns:a="http://schemas.openxmlformats.org/drawingml/2006/main" xmlns:dsp="http://schemas.microsoft.com/office/drawing/2008/diagram">
+<dsp:drawing xmlns:dgm="http://schemas.openxmlformats.org/drawingml/2006/diagram" xmlns:dsp="http://schemas.microsoft.com/office/drawing/2008/diagram" xmlns:a="http://schemas.openxmlformats.org/drawingml/2006/main">
   <dsp:spTree>
     <dsp:nvGrpSpPr>
       <dsp:cNvPr id="0" name=""/>
@@ -8642,7 +7807,7 @@
             <a:fld id="{82948236-07A4-447C-AC43-06AAF24DC65B}" type="datetimeFigureOut">
               <a:rPr lang="pt-PT" smtClean="0"/>
               <a:pPr/>
-              <a:t>01-07-2013</a:t>
+              <a:t>02/07/2013</a:t>
             </a:fld>
             <a:endParaRPr lang="pt-PT"/>
           </a:p>
@@ -8802,7 +7967,7 @@
             <a:fld id="{0E4FF081-3A8B-4019-8856-6C60FECB4303}" type="slidenum">
               <a:rPr lang="pt-PT" smtClean="0"/>
               <a:pPr/>
-              <a:t>‹nº›</a:t>
+              <a:t>‹#›</a:t>
             </a:fld>
             <a:endParaRPr lang="pt-PT"/>
           </a:p>
@@ -8811,7 +7976,7 @@
     </p:spTree>
     <p:extLst>
       <p:ext uri="{BB962C8B-B14F-4D97-AF65-F5344CB8AC3E}">
-        <p14:creationId xmlns:p14="http://schemas.microsoft.com/office/powerpoint/2010/main" xmlns="" val="2332033991"/>
+        <p14:creationId xmlns:p14="http://schemas.microsoft.com/office/powerpoint/2010/main" val="2332033991"/>
       </p:ext>
     </p:extLst>
   </p:cSld>
@@ -9286,7 +8451,7 @@
     </p:spTree>
     <p:extLst>
       <p:ext uri="{BB962C8B-B14F-4D97-AF65-F5344CB8AC3E}">
-        <p14:creationId xmlns:p14="http://schemas.microsoft.com/office/powerpoint/2010/main" xmlns="" val="2905257727"/>
+        <p14:creationId xmlns:p14="http://schemas.microsoft.com/office/powerpoint/2010/main" val="2905257727"/>
       </p:ext>
     </p:extLst>
   </p:cSld>
@@ -9506,7 +8671,7 @@
     </p:spTree>
     <p:extLst>
       <p:ext uri="{BB962C8B-B14F-4D97-AF65-F5344CB8AC3E}">
-        <p14:creationId xmlns:p14="http://schemas.microsoft.com/office/powerpoint/2010/main" xmlns="" val="4251687254"/>
+        <p14:creationId xmlns:p14="http://schemas.microsoft.com/office/powerpoint/2010/main" val="4251687254"/>
       </p:ext>
     </p:extLst>
   </p:cSld>
@@ -9591,7 +8756,7 @@
     </p:spTree>
     <p:extLst>
       <p:ext uri="{BB962C8B-B14F-4D97-AF65-F5344CB8AC3E}">
-        <p14:creationId xmlns:p14="http://schemas.microsoft.com/office/powerpoint/2010/main" xmlns="" val="2118353209"/>
+        <p14:creationId xmlns:p14="http://schemas.microsoft.com/office/powerpoint/2010/main" val="2118353209"/>
       </p:ext>
     </p:extLst>
   </p:cSld>
@@ -9676,7 +8841,7 @@
     </p:spTree>
     <p:extLst>
       <p:ext uri="{BB962C8B-B14F-4D97-AF65-F5344CB8AC3E}">
-        <p14:creationId xmlns:p14="http://schemas.microsoft.com/office/powerpoint/2010/main" xmlns="" val="1216955315"/>
+        <p14:creationId xmlns:p14="http://schemas.microsoft.com/office/powerpoint/2010/main" val="1216955315"/>
       </p:ext>
     </p:extLst>
   </p:cSld>
@@ -9836,7 +9001,7 @@
     </p:spTree>
     <p:extLst>
       <p:ext uri="{BB962C8B-B14F-4D97-AF65-F5344CB8AC3E}">
-        <p14:creationId xmlns:p14="http://schemas.microsoft.com/office/powerpoint/2010/main" xmlns="" val="4072347644"/>
+        <p14:creationId xmlns:p14="http://schemas.microsoft.com/office/powerpoint/2010/main" val="4072347644"/>
       </p:ext>
     </p:extLst>
   </p:cSld>
@@ -9921,7 +9086,7 @@
     </p:spTree>
     <p:extLst>
       <p:ext uri="{BB962C8B-B14F-4D97-AF65-F5344CB8AC3E}">
-        <p14:creationId xmlns:p14="http://schemas.microsoft.com/office/powerpoint/2010/main" xmlns="" val="2598853279"/>
+        <p14:creationId xmlns:p14="http://schemas.microsoft.com/office/powerpoint/2010/main" val="2598853279"/>
       </p:ext>
     </p:extLst>
   </p:cSld>
@@ -10006,7 +9171,7 @@
     </p:spTree>
     <p:extLst>
       <p:ext uri="{BB962C8B-B14F-4D97-AF65-F5344CB8AC3E}">
-        <p14:creationId xmlns:p14="http://schemas.microsoft.com/office/powerpoint/2010/main" xmlns="" val="3001826006"/>
+        <p14:creationId xmlns:p14="http://schemas.microsoft.com/office/powerpoint/2010/main" val="3001826006"/>
       </p:ext>
     </p:extLst>
   </p:cSld>
@@ -10091,7 +9256,7 @@
     </p:spTree>
     <p:extLst>
       <p:ext uri="{BB962C8B-B14F-4D97-AF65-F5344CB8AC3E}">
-        <p14:creationId xmlns:p14="http://schemas.microsoft.com/office/powerpoint/2010/main" xmlns="" val="3337223467"/>
+        <p14:creationId xmlns:p14="http://schemas.microsoft.com/office/powerpoint/2010/main" val="3337223467"/>
       </p:ext>
     </p:extLst>
   </p:cSld>
@@ -10176,7 +9341,7 @@
     </p:spTree>
     <p:extLst>
       <p:ext uri="{BB962C8B-B14F-4D97-AF65-F5344CB8AC3E}">
-        <p14:creationId xmlns:p14="http://schemas.microsoft.com/office/powerpoint/2010/main" xmlns="" val="2724149497"/>
+        <p14:creationId xmlns:p14="http://schemas.microsoft.com/office/powerpoint/2010/main" val="2724149497"/>
       </p:ext>
     </p:extLst>
   </p:cSld>
@@ -10297,7 +9462,7 @@
     </p:spTree>
     <p:extLst>
       <p:ext uri="{BB962C8B-B14F-4D97-AF65-F5344CB8AC3E}">
-        <p14:creationId xmlns:p14="http://schemas.microsoft.com/office/powerpoint/2010/main" xmlns="" val="572649040"/>
+        <p14:creationId xmlns:p14="http://schemas.microsoft.com/office/powerpoint/2010/main" val="572649040"/>
       </p:ext>
     </p:extLst>
   </p:cSld>
@@ -10471,7 +9636,7 @@
     </p:spTree>
     <p:extLst>
       <p:ext uri="{BB962C8B-B14F-4D97-AF65-F5344CB8AC3E}">
-        <p14:creationId xmlns:p14="http://schemas.microsoft.com/office/powerpoint/2010/main" xmlns="" val="474988129"/>
+        <p14:creationId xmlns:p14="http://schemas.microsoft.com/office/powerpoint/2010/main" val="474988129"/>
       </p:ext>
     </p:extLst>
   </p:cSld>
@@ -10591,7 +9756,7 @@
     </p:spTree>
     <p:extLst>
       <p:ext uri="{BB962C8B-B14F-4D97-AF65-F5344CB8AC3E}">
-        <p14:creationId xmlns:p14="http://schemas.microsoft.com/office/powerpoint/2010/main" xmlns="" val="3919745491"/>
+        <p14:creationId xmlns:p14="http://schemas.microsoft.com/office/powerpoint/2010/main" val="3919745491"/>
       </p:ext>
     </p:extLst>
   </p:cSld>
@@ -10834,7 +9999,7 @@
     </p:spTree>
     <p:extLst>
       <p:ext uri="{BB962C8B-B14F-4D97-AF65-F5344CB8AC3E}">
-        <p14:creationId xmlns:p14="http://schemas.microsoft.com/office/powerpoint/2010/main" xmlns="" val="2006419056"/>
+        <p14:creationId xmlns:p14="http://schemas.microsoft.com/office/powerpoint/2010/main" val="2006419056"/>
       </p:ext>
     </p:extLst>
   </p:cSld>
@@ -10923,7 +10088,7 @@
     </p:spTree>
     <p:extLst>
       <p:ext uri="{BB962C8B-B14F-4D97-AF65-F5344CB8AC3E}">
-        <p14:creationId xmlns:p14="http://schemas.microsoft.com/office/powerpoint/2010/main" xmlns="" val="1979049812"/>
+        <p14:creationId xmlns:p14="http://schemas.microsoft.com/office/powerpoint/2010/main" val="1979049812"/>
       </p:ext>
     </p:extLst>
   </p:cSld>
@@ -11034,7 +10199,7 @@
     </p:spTree>
     <p:extLst>
       <p:ext uri="{BB962C8B-B14F-4D97-AF65-F5344CB8AC3E}">
-        <p14:creationId xmlns:p14="http://schemas.microsoft.com/office/powerpoint/2010/main" xmlns="" val="736461960"/>
+        <p14:creationId xmlns:p14="http://schemas.microsoft.com/office/powerpoint/2010/main" val="736461960"/>
       </p:ext>
     </p:extLst>
   </p:cSld>
@@ -11123,7 +10288,7 @@
     </p:spTree>
     <p:extLst>
       <p:ext uri="{BB962C8B-B14F-4D97-AF65-F5344CB8AC3E}">
-        <p14:creationId xmlns:p14="http://schemas.microsoft.com/office/powerpoint/2010/main" xmlns="" val="184239105"/>
+        <p14:creationId xmlns:p14="http://schemas.microsoft.com/office/powerpoint/2010/main" val="184239105"/>
       </p:ext>
     </p:extLst>
   </p:cSld>
@@ -11162,7 +10327,7 @@
           <a:blip r:embed="rId2" cstate="print">
             <a:extLst>
               <a:ext uri="{28A0092B-C50C-407E-A947-70E740481C1C}">
-                <a14:useLocalDpi xmlns:a14="http://schemas.microsoft.com/office/drawing/2010/main" xmlns="" val="0"/>
+                <a14:useLocalDpi xmlns:a14="http://schemas.microsoft.com/office/drawing/2010/main" val="0"/>
               </a:ext>
             </a:extLst>
           </a:blip>
@@ -11358,7 +10523,7 @@
             <a:fld id="{F71B3DB1-8543-40E0-A2D1-830196AD91DE}" type="datetimeFigureOut">
               <a:rPr lang="pt-PT" smtClean="0"/>
               <a:pPr/>
-              <a:t>01-07-2013</a:t>
+              <a:t>02/07/2013</a:t>
             </a:fld>
             <a:endParaRPr lang="pt-PT" dirty="0"/>
           </a:p>
@@ -11411,7 +10576,7 @@
             <a:fld id="{5D26EDD4-363A-4236-A170-49C0FA725754}" type="slidenum">
               <a:rPr lang="pt-PT" smtClean="0"/>
               <a:pPr/>
-              <a:t>‹nº›</a:t>
+              <a:t>‹#›</a:t>
             </a:fld>
             <a:endParaRPr lang="pt-PT" dirty="0"/>
           </a:p>
@@ -11458,7 +10623,7 @@
     </p:spTree>
     <p:extLst>
       <p:ext uri="{BB962C8B-B14F-4D97-AF65-F5344CB8AC3E}">
-        <p14:creationId xmlns:p14="http://schemas.microsoft.com/office/powerpoint/2010/main" xmlns="" val="4283900998"/>
+        <p14:creationId xmlns:p14="http://schemas.microsoft.com/office/powerpoint/2010/main" val="4283900998"/>
       </p:ext>
     </p:extLst>
   </p:cSld>
@@ -11692,7 +10857,7 @@
             <a:fld id="{F71B3DB1-8543-40E0-A2D1-830196AD91DE}" type="datetimeFigureOut">
               <a:rPr lang="pt-PT" smtClean="0"/>
               <a:pPr/>
-              <a:t>01-07-2013</a:t>
+              <a:t>02/07/2013</a:t>
             </a:fld>
             <a:endParaRPr lang="pt-PT" dirty="0"/>
           </a:p>
@@ -11735,7 +10900,7 @@
             <a:fld id="{5D26EDD4-363A-4236-A170-49C0FA725754}" type="slidenum">
               <a:rPr lang="pt-PT" smtClean="0"/>
               <a:pPr/>
-              <a:t>‹nº›</a:t>
+              <a:t>‹#›</a:t>
             </a:fld>
             <a:endParaRPr lang="pt-PT" dirty="0"/>
           </a:p>
@@ -11744,7 +10909,7 @@
     </p:spTree>
     <p:extLst>
       <p:ext uri="{BB962C8B-B14F-4D97-AF65-F5344CB8AC3E}">
-        <p14:creationId xmlns:p14="http://schemas.microsoft.com/office/powerpoint/2010/main" xmlns="" val="3834483316"/>
+        <p14:creationId xmlns:p14="http://schemas.microsoft.com/office/powerpoint/2010/main" val="3834483316"/>
       </p:ext>
     </p:extLst>
   </p:cSld>
@@ -11942,7 +11107,7 @@
             <a:fld id="{F71B3DB1-8543-40E0-A2D1-830196AD91DE}" type="datetimeFigureOut">
               <a:rPr lang="pt-PT" smtClean="0"/>
               <a:pPr/>
-              <a:t>01-07-2013</a:t>
+              <a:t>02/07/2013</a:t>
             </a:fld>
             <a:endParaRPr lang="pt-PT" dirty="0"/>
           </a:p>
@@ -11985,7 +11150,7 @@
             <a:fld id="{5D26EDD4-363A-4236-A170-49C0FA725754}" type="slidenum">
               <a:rPr lang="pt-PT" smtClean="0"/>
               <a:pPr/>
-              <a:t>‹nº›</a:t>
+              <a:t>‹#›</a:t>
             </a:fld>
             <a:endParaRPr lang="pt-PT" dirty="0"/>
           </a:p>
@@ -12032,7 +11197,7 @@
     </p:spTree>
     <p:extLst>
       <p:ext uri="{BB962C8B-B14F-4D97-AF65-F5344CB8AC3E}">
-        <p14:creationId xmlns:p14="http://schemas.microsoft.com/office/powerpoint/2010/main" xmlns="" val="3278742630"/>
+        <p14:creationId xmlns:p14="http://schemas.microsoft.com/office/powerpoint/2010/main" val="3278742630"/>
       </p:ext>
     </p:extLst>
   </p:cSld>
@@ -12290,7 +11455,7 @@
             <a:fld id="{F71B3DB1-8543-40E0-A2D1-830196AD91DE}" type="datetimeFigureOut">
               <a:rPr lang="pt-PT" smtClean="0"/>
               <a:pPr/>
-              <a:t>01-07-2013</a:t>
+              <a:t>02/07/2013</a:t>
             </a:fld>
             <a:endParaRPr lang="pt-PT" dirty="0"/>
           </a:p>
@@ -12333,7 +11498,7 @@
             <a:fld id="{5D26EDD4-363A-4236-A170-49C0FA725754}" type="slidenum">
               <a:rPr lang="pt-PT" smtClean="0"/>
               <a:pPr/>
-              <a:t>‹nº›</a:t>
+              <a:t>‹#›</a:t>
             </a:fld>
             <a:endParaRPr lang="pt-PT" dirty="0"/>
           </a:p>
@@ -12448,7 +11613,7 @@
     </p:spTree>
     <p:extLst>
       <p:ext uri="{BB962C8B-B14F-4D97-AF65-F5344CB8AC3E}">
-        <p14:creationId xmlns:p14="http://schemas.microsoft.com/office/powerpoint/2010/main" xmlns="" val="1960482330"/>
+        <p14:creationId xmlns:p14="http://schemas.microsoft.com/office/powerpoint/2010/main" val="1960482330"/>
       </p:ext>
     </p:extLst>
   </p:cSld>
@@ -12646,7 +11811,7 @@
             <a:fld id="{F71B3DB1-8543-40E0-A2D1-830196AD91DE}" type="datetimeFigureOut">
               <a:rPr lang="pt-PT" smtClean="0"/>
               <a:pPr/>
-              <a:t>01-07-2013</a:t>
+              <a:t>02/07/2013</a:t>
             </a:fld>
             <a:endParaRPr lang="pt-PT" dirty="0"/>
           </a:p>
@@ -12689,7 +11854,7 @@
             <a:fld id="{5D26EDD4-363A-4236-A170-49C0FA725754}" type="slidenum">
               <a:rPr lang="pt-PT" smtClean="0"/>
               <a:pPr/>
-              <a:t>‹nº›</a:t>
+              <a:t>‹#›</a:t>
             </a:fld>
             <a:endParaRPr lang="pt-PT" dirty="0"/>
           </a:p>
@@ -12698,7 +11863,7 @@
     </p:spTree>
     <p:extLst>
       <p:ext uri="{BB962C8B-B14F-4D97-AF65-F5344CB8AC3E}">
-        <p14:creationId xmlns:p14="http://schemas.microsoft.com/office/powerpoint/2010/main" xmlns="" val="1169910341"/>
+        <p14:creationId xmlns:p14="http://schemas.microsoft.com/office/powerpoint/2010/main" val="1169910341"/>
       </p:ext>
     </p:extLst>
   </p:cSld>
@@ -13022,7 +12187,7 @@
             <a:fld id="{F71B3DB1-8543-40E0-A2D1-830196AD91DE}" type="datetimeFigureOut">
               <a:rPr lang="pt-PT" smtClean="0"/>
               <a:pPr/>
-              <a:t>01-07-2013</a:t>
+              <a:t>02/07/2013</a:t>
             </a:fld>
             <a:endParaRPr lang="pt-PT" dirty="0"/>
           </a:p>
@@ -13065,7 +12230,7 @@
             <a:fld id="{5D26EDD4-363A-4236-A170-49C0FA725754}" type="slidenum">
               <a:rPr lang="pt-PT" smtClean="0"/>
               <a:pPr/>
-              <a:t>‹nº›</a:t>
+              <a:t>‹#›</a:t>
             </a:fld>
             <a:endParaRPr lang="pt-PT" dirty="0"/>
           </a:p>
@@ -13180,7 +12345,7 @@
     </p:spTree>
     <p:extLst>
       <p:ext uri="{BB962C8B-B14F-4D97-AF65-F5344CB8AC3E}">
-        <p14:creationId xmlns:p14="http://schemas.microsoft.com/office/powerpoint/2010/main" xmlns="" val="2244926200"/>
+        <p14:creationId xmlns:p14="http://schemas.microsoft.com/office/powerpoint/2010/main" val="2244926200"/>
       </p:ext>
     </p:extLst>
   </p:cSld>
@@ -13501,7 +12666,7 @@
             <a:fld id="{F71B3DB1-8543-40E0-A2D1-830196AD91DE}" type="datetimeFigureOut">
               <a:rPr lang="pt-PT" smtClean="0"/>
               <a:pPr/>
-              <a:t>01-07-2013</a:t>
+              <a:t>02/07/2013</a:t>
             </a:fld>
             <a:endParaRPr lang="pt-PT" dirty="0"/>
           </a:p>
@@ -13544,7 +12709,7 @@
             <a:fld id="{5D26EDD4-363A-4236-A170-49C0FA725754}" type="slidenum">
               <a:rPr lang="pt-PT" smtClean="0"/>
               <a:pPr/>
-              <a:t>‹nº›</a:t>
+              <a:t>‹#›</a:t>
             </a:fld>
             <a:endParaRPr lang="pt-PT" dirty="0"/>
           </a:p>
@@ -13591,7 +12756,7 @@
     </p:spTree>
     <p:extLst>
       <p:ext uri="{BB962C8B-B14F-4D97-AF65-F5344CB8AC3E}">
-        <p14:creationId xmlns:p14="http://schemas.microsoft.com/office/powerpoint/2010/main" xmlns="" val="3141152998"/>
+        <p14:creationId xmlns:p14="http://schemas.microsoft.com/office/powerpoint/2010/main" val="3141152998"/>
       </p:ext>
     </p:extLst>
   </p:cSld>
@@ -13715,7 +12880,7 @@
             <a:fld id="{F71B3DB1-8543-40E0-A2D1-830196AD91DE}" type="datetimeFigureOut">
               <a:rPr lang="pt-PT" smtClean="0"/>
               <a:pPr/>
-              <a:t>01-07-2013</a:t>
+              <a:t>02/07/2013</a:t>
             </a:fld>
             <a:endParaRPr lang="pt-PT" dirty="0"/>
           </a:p>
@@ -13758,7 +12923,7 @@
             <a:fld id="{5D26EDD4-363A-4236-A170-49C0FA725754}" type="slidenum">
               <a:rPr lang="pt-PT" smtClean="0"/>
               <a:pPr/>
-              <a:t>‹nº›</a:t>
+              <a:t>‹#›</a:t>
             </a:fld>
             <a:endParaRPr lang="pt-PT" dirty="0"/>
           </a:p>
@@ -13805,7 +12970,7 @@
     </p:spTree>
     <p:extLst>
       <p:ext uri="{BB962C8B-B14F-4D97-AF65-F5344CB8AC3E}">
-        <p14:creationId xmlns:p14="http://schemas.microsoft.com/office/powerpoint/2010/main" xmlns="" val="4127282010"/>
+        <p14:creationId xmlns:p14="http://schemas.microsoft.com/office/powerpoint/2010/main" val="4127282010"/>
       </p:ext>
     </p:extLst>
   </p:cSld>
@@ -13935,7 +13100,7 @@
             <a:fld id="{F71B3DB1-8543-40E0-A2D1-830196AD91DE}" type="datetimeFigureOut">
               <a:rPr lang="pt-PT" smtClean="0"/>
               <a:pPr/>
-              <a:t>01-07-2013</a:t>
+              <a:t>02/07/2013</a:t>
             </a:fld>
             <a:endParaRPr lang="pt-PT" dirty="0"/>
           </a:p>
@@ -13978,7 +13143,7 @@
             <a:fld id="{5D26EDD4-363A-4236-A170-49C0FA725754}" type="slidenum">
               <a:rPr lang="pt-PT" smtClean="0"/>
               <a:pPr/>
-              <a:t>‹nº›</a:t>
+              <a:t>‹#›</a:t>
             </a:fld>
             <a:endParaRPr lang="pt-PT" dirty="0"/>
           </a:p>
@@ -14025,7 +13190,7 @@
     </p:spTree>
     <p:extLst>
       <p:ext uri="{BB962C8B-B14F-4D97-AF65-F5344CB8AC3E}">
-        <p14:creationId xmlns:p14="http://schemas.microsoft.com/office/powerpoint/2010/main" xmlns="" val="1016382411"/>
+        <p14:creationId xmlns:p14="http://schemas.microsoft.com/office/powerpoint/2010/main" val="1016382411"/>
       </p:ext>
     </p:extLst>
   </p:cSld>
@@ -14183,7 +13348,7 @@
             <a:fld id="{F71B3DB1-8543-40E0-A2D1-830196AD91DE}" type="datetimeFigureOut">
               <a:rPr lang="pt-PT" smtClean="0"/>
               <a:pPr/>
-              <a:t>01-07-2013</a:t>
+              <a:t>02/07/2013</a:t>
             </a:fld>
             <a:endParaRPr lang="pt-PT" dirty="0"/>
           </a:p>
@@ -14226,7 +13391,7 @@
             <a:fld id="{5D26EDD4-363A-4236-A170-49C0FA725754}" type="slidenum">
               <a:rPr lang="pt-PT" smtClean="0"/>
               <a:pPr/>
-              <a:t>‹nº›</a:t>
+              <a:t>‹#›</a:t>
             </a:fld>
             <a:endParaRPr lang="pt-PT" dirty="0"/>
           </a:p>
@@ -14235,7 +13400,7 @@
     </p:spTree>
     <p:extLst>
       <p:ext uri="{BB962C8B-B14F-4D97-AF65-F5344CB8AC3E}">
-        <p14:creationId xmlns:p14="http://schemas.microsoft.com/office/powerpoint/2010/main" xmlns="" val="548973029"/>
+        <p14:creationId xmlns:p14="http://schemas.microsoft.com/office/powerpoint/2010/main" val="548973029"/>
       </p:ext>
     </p:extLst>
   </p:cSld>
@@ -14433,7 +13598,7 @@
             <a:fld id="{F71B3DB1-8543-40E0-A2D1-830196AD91DE}" type="datetimeFigureOut">
               <a:rPr lang="pt-PT" smtClean="0"/>
               <a:pPr/>
-              <a:t>01-07-2013</a:t>
+              <a:t>02/07/2013</a:t>
             </a:fld>
             <a:endParaRPr lang="pt-PT" dirty="0"/>
           </a:p>
@@ -14476,7 +13641,7 @@
             <a:fld id="{5D26EDD4-363A-4236-A170-49C0FA725754}" type="slidenum">
               <a:rPr lang="pt-PT" smtClean="0"/>
               <a:pPr/>
-              <a:t>‹nº›</a:t>
+              <a:t>‹#›</a:t>
             </a:fld>
             <a:endParaRPr lang="pt-PT" dirty="0"/>
           </a:p>
@@ -14523,7 +13688,7 @@
     </p:spTree>
     <p:extLst>
       <p:ext uri="{BB962C8B-B14F-4D97-AF65-F5344CB8AC3E}">
-        <p14:creationId xmlns:p14="http://schemas.microsoft.com/office/powerpoint/2010/main" xmlns="" val="963473943"/>
+        <p14:creationId xmlns:p14="http://schemas.microsoft.com/office/powerpoint/2010/main" val="963473943"/>
       </p:ext>
     </p:extLst>
   </p:cSld>
@@ -14747,7 +13912,7 @@
             <a:fld id="{F71B3DB1-8543-40E0-A2D1-830196AD91DE}" type="datetimeFigureOut">
               <a:rPr lang="pt-PT" smtClean="0"/>
               <a:pPr/>
-              <a:t>01-07-2013</a:t>
+              <a:t>02/07/2013</a:t>
             </a:fld>
             <a:endParaRPr lang="pt-PT" dirty="0"/>
           </a:p>
@@ -14790,7 +13955,7 @@
             <a:fld id="{5D26EDD4-363A-4236-A170-49C0FA725754}" type="slidenum">
               <a:rPr lang="pt-PT" smtClean="0"/>
               <a:pPr/>
-              <a:t>‹nº›</a:t>
+              <a:t>‹#›</a:t>
             </a:fld>
             <a:endParaRPr lang="pt-PT" dirty="0"/>
           </a:p>
@@ -14799,7 +13964,7 @@
     </p:spTree>
     <p:extLst>
       <p:ext uri="{BB962C8B-B14F-4D97-AF65-F5344CB8AC3E}">
-        <p14:creationId xmlns:p14="http://schemas.microsoft.com/office/powerpoint/2010/main" xmlns="" val="2490349985"/>
+        <p14:creationId xmlns:p14="http://schemas.microsoft.com/office/powerpoint/2010/main" val="2490349985"/>
       </p:ext>
     </p:extLst>
   </p:cSld>
@@ -15131,7 +14296,7 @@
             <a:fld id="{F71B3DB1-8543-40E0-A2D1-830196AD91DE}" type="datetimeFigureOut">
               <a:rPr lang="pt-PT" smtClean="0"/>
               <a:pPr/>
-              <a:t>01-07-2013</a:t>
+              <a:t>02/07/2013</a:t>
             </a:fld>
             <a:endParaRPr lang="pt-PT" dirty="0"/>
           </a:p>
@@ -15174,7 +14339,7 @@
             <a:fld id="{5D26EDD4-363A-4236-A170-49C0FA725754}" type="slidenum">
               <a:rPr lang="pt-PT" smtClean="0"/>
               <a:pPr/>
-              <a:t>‹nº›</a:t>
+              <a:t>‹#›</a:t>
             </a:fld>
             <a:endParaRPr lang="pt-PT" dirty="0"/>
           </a:p>
@@ -15221,7 +14386,7 @@
     </p:spTree>
     <p:extLst>
       <p:ext uri="{BB962C8B-B14F-4D97-AF65-F5344CB8AC3E}">
-        <p14:creationId xmlns:p14="http://schemas.microsoft.com/office/powerpoint/2010/main" xmlns="" val="1183446009"/>
+        <p14:creationId xmlns:p14="http://schemas.microsoft.com/office/powerpoint/2010/main" val="1183446009"/>
       </p:ext>
     </p:extLst>
   </p:cSld>
@@ -15289,7 +14454,7 @@
             <a:fld id="{F71B3DB1-8543-40E0-A2D1-830196AD91DE}" type="datetimeFigureOut">
               <a:rPr lang="pt-PT" smtClean="0"/>
               <a:pPr/>
-              <a:t>01-07-2013</a:t>
+              <a:t>02/07/2013</a:t>
             </a:fld>
             <a:endParaRPr lang="pt-PT" dirty="0"/>
           </a:p>
@@ -15332,7 +14497,7 @@
             <a:fld id="{5D26EDD4-363A-4236-A170-49C0FA725754}" type="slidenum">
               <a:rPr lang="pt-PT" smtClean="0"/>
               <a:pPr/>
-              <a:t>‹nº›</a:t>
+              <a:t>‹#›</a:t>
             </a:fld>
             <a:endParaRPr lang="pt-PT" dirty="0"/>
           </a:p>
@@ -15379,7 +14544,7 @@
     </p:spTree>
     <p:extLst>
       <p:ext uri="{BB962C8B-B14F-4D97-AF65-F5344CB8AC3E}">
-        <p14:creationId xmlns:p14="http://schemas.microsoft.com/office/powerpoint/2010/main" xmlns="" val="1349716058"/>
+        <p14:creationId xmlns:p14="http://schemas.microsoft.com/office/powerpoint/2010/main" val="1349716058"/>
       </p:ext>
     </p:extLst>
   </p:cSld>
@@ -15424,7 +14589,7 @@
             <a:fld id="{F71B3DB1-8543-40E0-A2D1-830196AD91DE}" type="datetimeFigureOut">
               <a:rPr lang="pt-PT" smtClean="0"/>
               <a:pPr/>
-              <a:t>01-07-2013</a:t>
+              <a:t>02/07/2013</a:t>
             </a:fld>
             <a:endParaRPr lang="pt-PT" dirty="0"/>
           </a:p>
@@ -15467,7 +14632,7 @@
             <a:fld id="{5D26EDD4-363A-4236-A170-49C0FA725754}" type="slidenum">
               <a:rPr lang="pt-PT" smtClean="0"/>
               <a:pPr/>
-              <a:t>‹nº›</a:t>
+              <a:t>‹#›</a:t>
             </a:fld>
             <a:endParaRPr lang="pt-PT" dirty="0"/>
           </a:p>
@@ -15476,7 +14641,7 @@
     </p:spTree>
     <p:extLst>
       <p:ext uri="{BB962C8B-B14F-4D97-AF65-F5344CB8AC3E}">
-        <p14:creationId xmlns:p14="http://schemas.microsoft.com/office/powerpoint/2010/main" xmlns="" val="1135282261"/>
+        <p14:creationId xmlns:p14="http://schemas.microsoft.com/office/powerpoint/2010/main" val="1135282261"/>
       </p:ext>
     </p:extLst>
   </p:cSld>
@@ -15681,7 +14846,7 @@
             <a:fld id="{F71B3DB1-8543-40E0-A2D1-830196AD91DE}" type="datetimeFigureOut">
               <a:rPr lang="pt-PT" smtClean="0"/>
               <a:pPr/>
-              <a:t>01-07-2013</a:t>
+              <a:t>02/07/2013</a:t>
             </a:fld>
             <a:endParaRPr lang="pt-PT" dirty="0"/>
           </a:p>
@@ -15724,7 +14889,7 @@
             <a:fld id="{5D26EDD4-363A-4236-A170-49C0FA725754}" type="slidenum">
               <a:rPr lang="pt-PT" smtClean="0"/>
               <a:pPr/>
-              <a:t>‹nº›</a:t>
+              <a:t>‹#›</a:t>
             </a:fld>
             <a:endParaRPr lang="pt-PT" dirty="0"/>
           </a:p>
@@ -15771,7 +14936,7 @@
     </p:spTree>
     <p:extLst>
       <p:ext uri="{BB962C8B-B14F-4D97-AF65-F5344CB8AC3E}">
-        <p14:creationId xmlns:p14="http://schemas.microsoft.com/office/powerpoint/2010/main" xmlns="" val="3016415161"/>
+        <p14:creationId xmlns:p14="http://schemas.microsoft.com/office/powerpoint/2010/main" val="3016415161"/>
       </p:ext>
     </p:extLst>
   </p:cSld>
@@ -16005,7 +15170,7 @@
             <a:fld id="{F71B3DB1-8543-40E0-A2D1-830196AD91DE}" type="datetimeFigureOut">
               <a:rPr lang="pt-PT" smtClean="0"/>
               <a:pPr/>
-              <a:t>01-07-2013</a:t>
+              <a:t>02/07/2013</a:t>
             </a:fld>
             <a:endParaRPr lang="pt-PT" dirty="0"/>
           </a:p>
@@ -16048,7 +15213,7 @@
             <a:fld id="{5D26EDD4-363A-4236-A170-49C0FA725754}" type="slidenum">
               <a:rPr lang="pt-PT" smtClean="0"/>
               <a:pPr/>
-              <a:t>‹nº›</a:t>
+              <a:t>‹#›</a:t>
             </a:fld>
             <a:endParaRPr lang="pt-PT" dirty="0"/>
           </a:p>
@@ -16057,7 +15222,7 @@
     </p:spTree>
     <p:extLst>
       <p:ext uri="{BB962C8B-B14F-4D97-AF65-F5344CB8AC3E}">
-        <p14:creationId xmlns:p14="http://schemas.microsoft.com/office/powerpoint/2010/main" xmlns="" val="2799130186"/>
+        <p14:creationId xmlns:p14="http://schemas.microsoft.com/office/powerpoint/2010/main" val="2799130186"/>
       </p:ext>
     </p:extLst>
   </p:cSld>
@@ -16101,7 +15266,7 @@
           <a:blip r:embed="rId19" cstate="print">
             <a:extLst>
               <a:ext uri="{28A0092B-C50C-407E-A947-70E740481C1C}">
-                <a14:useLocalDpi xmlns:a14="http://schemas.microsoft.com/office/drawing/2010/main" xmlns="" val="0"/>
+                <a14:useLocalDpi xmlns:a14="http://schemas.microsoft.com/office/drawing/2010/main" val="0"/>
               </a:ext>
             </a:extLst>
           </a:blip>
@@ -16251,7 +15416,7 @@
             <a:fld id="{F71B3DB1-8543-40E0-A2D1-830196AD91DE}" type="datetimeFigureOut">
               <a:rPr lang="pt-PT" smtClean="0"/>
               <a:pPr/>
-              <a:t>01-07-2013</a:t>
+              <a:t>02/07/2013</a:t>
             </a:fld>
             <a:endParaRPr lang="pt-PT" dirty="0"/>
           </a:p>
@@ -16330,7 +15495,7 @@
             <a:fld id="{5D26EDD4-363A-4236-A170-49C0FA725754}" type="slidenum">
               <a:rPr lang="pt-PT" smtClean="0"/>
               <a:pPr/>
-              <a:t>‹nº›</a:t>
+              <a:t>‹#›</a:t>
             </a:fld>
             <a:endParaRPr lang="pt-PT" dirty="0"/>
           </a:p>
@@ -16339,7 +15504,7 @@
     </p:spTree>
     <p:extLst>
       <p:ext uri="{BB962C8B-B14F-4D97-AF65-F5344CB8AC3E}">
-        <p14:creationId xmlns:p14="http://schemas.microsoft.com/office/powerpoint/2010/main" xmlns="" val="3664009446"/>
+        <p14:creationId xmlns:p14="http://schemas.microsoft.com/office/powerpoint/2010/main" val="3664009446"/>
       </p:ext>
     </p:extLst>
   </p:cSld>
@@ -16847,7 +16012,7 @@
     </p:spTree>
     <p:extLst>
       <p:ext uri="{BB962C8B-B14F-4D97-AF65-F5344CB8AC3E}">
-        <p14:creationId xmlns:p14="http://schemas.microsoft.com/office/powerpoint/2010/main" xmlns="" val="404200990"/>
+        <p14:creationId xmlns:p14="http://schemas.microsoft.com/office/powerpoint/2010/main" val="404200990"/>
       </p:ext>
     </p:extLst>
   </p:cSld>
@@ -16930,7 +16095,7 @@
     </p:spTree>
     <p:extLst>
       <p:ext uri="{BB962C8B-B14F-4D97-AF65-F5344CB8AC3E}">
-        <p14:creationId xmlns:p14="http://schemas.microsoft.com/office/powerpoint/2010/main" xmlns="" val="1280194573"/>
+        <p14:creationId xmlns:p14="http://schemas.microsoft.com/office/powerpoint/2010/main" val="1280194573"/>
       </p:ext>
     </p:extLst>
   </p:cSld>
@@ -17005,7 +16170,7 @@
     </p:spTree>
     <p:extLst>
       <p:ext uri="{BB962C8B-B14F-4D97-AF65-F5344CB8AC3E}">
-        <p14:creationId xmlns:p14="http://schemas.microsoft.com/office/powerpoint/2010/main" xmlns="" val="3292307339"/>
+        <p14:creationId xmlns:p14="http://schemas.microsoft.com/office/powerpoint/2010/main" val="3292307339"/>
       </p:ext>
     </p:extLst>
   </p:cSld>
@@ -17088,7 +16253,7 @@
     </p:spTree>
     <p:extLst>
       <p:ext uri="{BB962C8B-B14F-4D97-AF65-F5344CB8AC3E}">
-        <p14:creationId xmlns:p14="http://schemas.microsoft.com/office/powerpoint/2010/main" xmlns="" val="2525735037"/>
+        <p14:creationId xmlns:p14="http://schemas.microsoft.com/office/powerpoint/2010/main" val="2525735037"/>
       </p:ext>
     </p:extLst>
   </p:cSld>
@@ -17360,7 +16525,7 @@
     </p:spTree>
     <p:extLst>
       <p:ext uri="{BB962C8B-B14F-4D97-AF65-F5344CB8AC3E}">
-        <p14:creationId xmlns:p14="http://schemas.microsoft.com/office/powerpoint/2010/main" xmlns="" val="95242113"/>
+        <p14:creationId xmlns:p14="http://schemas.microsoft.com/office/powerpoint/2010/main" val="95242113"/>
       </p:ext>
     </p:extLst>
   </p:cSld>
@@ -18271,7 +17436,7 @@
     </p:spTree>
     <p:extLst>
       <p:ext uri="{BB962C8B-B14F-4D97-AF65-F5344CB8AC3E}">
-        <p14:creationId xmlns:p14="http://schemas.microsoft.com/office/powerpoint/2010/main" xmlns="" val="2652038306"/>
+        <p14:creationId xmlns:p14="http://schemas.microsoft.com/office/powerpoint/2010/main" val="2652038306"/>
       </p:ext>
     </p:extLst>
   </p:cSld>
@@ -18525,7 +17690,7 @@
     </p:spTree>
     <p:extLst>
       <p:ext uri="{BB962C8B-B14F-4D97-AF65-F5344CB8AC3E}">
-        <p14:creationId xmlns:p14="http://schemas.microsoft.com/office/powerpoint/2010/main" xmlns="" val="2278680210"/>
+        <p14:creationId xmlns:p14="http://schemas.microsoft.com/office/powerpoint/2010/main" val="2278680210"/>
       </p:ext>
     </p:extLst>
   </p:cSld>
@@ -18876,7 +18041,7 @@
     </p:spTree>
     <p:extLst>
       <p:ext uri="{BB962C8B-B14F-4D97-AF65-F5344CB8AC3E}">
-        <p14:creationId xmlns:p14="http://schemas.microsoft.com/office/powerpoint/2010/main" xmlns="" val="2466546361"/>
+        <p14:creationId xmlns:p14="http://schemas.microsoft.com/office/powerpoint/2010/main" val="2466546361"/>
       </p:ext>
     </p:extLst>
   </p:cSld>
@@ -18958,7 +18123,7 @@
           <p:nvPr>
             <p:extLst>
               <p:ext uri="{D42A27DB-BD31-4B8C-83A1-F6EECF244321}">
-                <p14:modId xmlns:p14="http://schemas.microsoft.com/office/powerpoint/2010/main" xmlns="" val="2639408096"/>
+                <p14:modId xmlns:p14="http://schemas.microsoft.com/office/powerpoint/2010/main" val="2639408096"/>
               </p:ext>
             </p:extLst>
           </p:nvPr>
@@ -18976,7 +18141,7 @@
     </p:spTree>
     <p:extLst>
       <p:ext uri="{BB962C8B-B14F-4D97-AF65-F5344CB8AC3E}">
-        <p14:creationId xmlns:p14="http://schemas.microsoft.com/office/powerpoint/2010/main" xmlns="" val="980046083"/>
+        <p14:creationId xmlns:p14="http://schemas.microsoft.com/office/powerpoint/2010/main" val="980046083"/>
       </p:ext>
     </p:extLst>
   </p:cSld>
@@ -19058,7 +18223,7 @@
           <p:nvPr>
             <p:extLst>
               <p:ext uri="{D42A27DB-BD31-4B8C-83A1-F6EECF244321}">
-                <p14:modId xmlns:p14="http://schemas.microsoft.com/office/powerpoint/2010/main" xmlns="" val="3968378676"/>
+                <p14:modId xmlns:p14="http://schemas.microsoft.com/office/powerpoint/2010/main" val="3968378676"/>
               </p:ext>
             </p:extLst>
           </p:nvPr>
@@ -19076,7 +18241,7 @@
     </p:spTree>
     <p:extLst>
       <p:ext uri="{BB962C8B-B14F-4D97-AF65-F5344CB8AC3E}">
-        <p14:creationId xmlns:p14="http://schemas.microsoft.com/office/powerpoint/2010/main" xmlns="" val="197448477"/>
+        <p14:creationId xmlns:p14="http://schemas.microsoft.com/office/powerpoint/2010/main" val="197448477"/>
       </p:ext>
     </p:extLst>
   </p:cSld>
@@ -19210,7 +18375,7 @@
           <p:nvPr>
             <p:extLst>
               <p:ext uri="{D42A27DB-BD31-4B8C-83A1-F6EECF244321}">
-                <p14:modId xmlns:p14="http://schemas.microsoft.com/office/powerpoint/2010/main" xmlns="" val="2079267717"/>
+                <p14:modId xmlns:p14="http://schemas.microsoft.com/office/powerpoint/2010/main" val="2079267717"/>
               </p:ext>
             </p:extLst>
           </p:nvPr>
@@ -19228,7 +18393,7 @@
     </p:spTree>
     <p:extLst>
       <p:ext uri="{BB962C8B-B14F-4D97-AF65-F5344CB8AC3E}">
-        <p14:creationId xmlns:p14="http://schemas.microsoft.com/office/powerpoint/2010/main" xmlns="" val="3967897178"/>
+        <p14:creationId xmlns:p14="http://schemas.microsoft.com/office/powerpoint/2010/main" val="3967897178"/>
       </p:ext>
     </p:extLst>
   </p:cSld>
@@ -19307,7 +18472,7 @@
     </p:spTree>
     <p:extLst>
       <p:ext uri="{BB962C8B-B14F-4D97-AF65-F5344CB8AC3E}">
-        <p14:creationId xmlns:p14="http://schemas.microsoft.com/office/powerpoint/2010/main" xmlns="" val="3708106417"/>
+        <p14:creationId xmlns:p14="http://schemas.microsoft.com/office/powerpoint/2010/main" val="3708106417"/>
       </p:ext>
     </p:extLst>
   </p:cSld>
@@ -20312,7 +19477,7 @@
     </p:spTree>
     <p:extLst>
       <p:ext uri="{BB962C8B-B14F-4D97-AF65-F5344CB8AC3E}">
-        <p14:creationId xmlns:p14="http://schemas.microsoft.com/office/powerpoint/2010/main" xmlns="" val="810377202"/>
+        <p14:creationId xmlns:p14="http://schemas.microsoft.com/office/powerpoint/2010/main" val="810377202"/>
       </p:ext>
     </p:extLst>
   </p:cSld>
@@ -20390,7 +19555,7 @@
           <p:nvPr>
             <p:extLst>
               <p:ext uri="{D42A27DB-BD31-4B8C-83A1-F6EECF244321}">
-                <p14:modId xmlns:p14="http://schemas.microsoft.com/office/powerpoint/2010/main" xmlns="" val="2002974256"/>
+                <p14:modId xmlns:p14="http://schemas.microsoft.com/office/powerpoint/2010/main" val="2002974256"/>
               </p:ext>
             </p:extLst>
           </p:nvPr>
@@ -20408,7 +19573,7 @@
     </p:spTree>
     <p:extLst>
       <p:ext uri="{BB962C8B-B14F-4D97-AF65-F5344CB8AC3E}">
-        <p14:creationId xmlns:p14="http://schemas.microsoft.com/office/powerpoint/2010/main" xmlns="" val="1637874217"/>
+        <p14:creationId xmlns:p14="http://schemas.microsoft.com/office/powerpoint/2010/main" val="1637874217"/>
       </p:ext>
     </p:extLst>
   </p:cSld>
@@ -20484,7 +19649,7 @@
           <p:nvPr>
             <p:extLst>
               <p:ext uri="{D42A27DB-BD31-4B8C-83A1-F6EECF244321}">
-                <p14:modId xmlns:p14="http://schemas.microsoft.com/office/powerpoint/2010/main" xmlns="" val="3456624213"/>
+                <p14:modId xmlns:p14="http://schemas.microsoft.com/office/powerpoint/2010/main" val="3456624213"/>
               </p:ext>
             </p:extLst>
           </p:nvPr>
@@ -20502,7 +19667,7 @@
     </p:spTree>
     <p:extLst>
       <p:ext uri="{BB962C8B-B14F-4D97-AF65-F5344CB8AC3E}">
-        <p14:creationId xmlns:p14="http://schemas.microsoft.com/office/powerpoint/2010/main" xmlns="" val="2330439383"/>
+        <p14:creationId xmlns:p14="http://schemas.microsoft.com/office/powerpoint/2010/main" val="2330439383"/>
       </p:ext>
     </p:extLst>
   </p:cSld>
@@ -20851,7 +20016,7 @@
     </p:spTree>
     <p:extLst>
       <p:ext uri="{BB962C8B-B14F-4D97-AF65-F5344CB8AC3E}">
-        <p14:creationId xmlns:p14="http://schemas.microsoft.com/office/powerpoint/2010/main" xmlns="" val="3651665137"/>
+        <p14:creationId xmlns:p14="http://schemas.microsoft.com/office/powerpoint/2010/main" val="3651665137"/>
       </p:ext>
     </p:extLst>
   </p:cSld>
@@ -21249,7 +20414,7 @@
     </p:spTree>
     <p:extLst>
       <p:ext uri="{BB962C8B-B14F-4D97-AF65-F5344CB8AC3E}">
-        <p14:creationId xmlns:p14="http://schemas.microsoft.com/office/powerpoint/2010/main" xmlns="" val="4024771090"/>
+        <p14:creationId xmlns:p14="http://schemas.microsoft.com/office/powerpoint/2010/main" val="4024771090"/>
       </p:ext>
     </p:extLst>
   </p:cSld>
@@ -21479,7 +20644,7 @@
     </p:spTree>
     <p:extLst>
       <p:ext uri="{BB962C8B-B14F-4D97-AF65-F5344CB8AC3E}">
-        <p14:creationId xmlns:p14="http://schemas.microsoft.com/office/powerpoint/2010/main" xmlns="" val="3337746042"/>
+        <p14:creationId xmlns:p14="http://schemas.microsoft.com/office/powerpoint/2010/main" val="3337746042"/>
       </p:ext>
     </p:extLst>
   </p:cSld>
@@ -21562,7 +20727,7 @@
     </p:spTree>
     <p:extLst>
       <p:ext uri="{BB962C8B-B14F-4D97-AF65-F5344CB8AC3E}">
-        <p14:creationId xmlns:p14="http://schemas.microsoft.com/office/powerpoint/2010/main" xmlns="" val="1036071785"/>
+        <p14:creationId xmlns:p14="http://schemas.microsoft.com/office/powerpoint/2010/main" val="1036071785"/>
       </p:ext>
     </p:extLst>
   </p:cSld>
@@ -21637,7 +20802,7 @@
     </p:spTree>
     <p:extLst>
       <p:ext uri="{BB962C8B-B14F-4D97-AF65-F5344CB8AC3E}">
-        <p14:creationId xmlns:p14="http://schemas.microsoft.com/office/powerpoint/2010/main" xmlns="" val="4029259654"/>
+        <p14:creationId xmlns:p14="http://schemas.microsoft.com/office/powerpoint/2010/main" val="4029259654"/>
       </p:ext>
     </p:extLst>
   </p:cSld>
@@ -22029,18 +21194,18 @@
     </p:spTree>
     <p:extLst>
       <p:ext uri="{BB962C8B-B14F-4D97-AF65-F5344CB8AC3E}">
-        <p14:creationId xmlns:p14="http://schemas.microsoft.com/office/powerpoint/2010/main" xmlns="" val="2323100813"/>
+        <p14:creationId xmlns:p14="http://schemas.microsoft.com/office/powerpoint/2010/main" val="2323100813"/>
       </p:ext>
     </p:extLst>
   </p:cSld>
   <p:clrMapOvr>
     <a:masterClrMapping/>
   </p:clrMapOvr>
-  <mc:AlternateContent xmlns:mc="http://schemas.openxmlformats.org/markup-compatibility/2006">
-    <mc:Choice xmlns:p14="http://schemas.microsoft.com/office/powerpoint/2010/main" xmlns="" Requires="p14">
+  <mc:AlternateContent xmlns:mc="http://schemas.openxmlformats.org/markup-compatibility/2006" xmlns:p14="http://schemas.microsoft.com/office/powerpoint/2010/main">
+    <mc:Choice Requires="p14">
       <p:transition p14:dur="0"/>
     </mc:Choice>
-    <mc:Fallback>
+    <mc:Fallback xmlns="">
       <p:transition/>
     </mc:Fallback>
   </mc:AlternateContent>
@@ -22305,7 +21470,7 @@
           <p:nvPr>
             <p:extLst>
               <p:ext uri="{D42A27DB-BD31-4B8C-83A1-F6EECF244321}">
-                <p14:modId xmlns:p14="http://schemas.microsoft.com/office/powerpoint/2010/main" xmlns="" val="963427250"/>
+                <p14:modId xmlns:p14="http://schemas.microsoft.com/office/powerpoint/2010/main" val="963427250"/>
               </p:ext>
             </p:extLst>
           </p:nvPr>
@@ -22839,7 +22004,7 @@
     </p:spTree>
     <p:extLst>
       <p:ext uri="{BB962C8B-B14F-4D97-AF65-F5344CB8AC3E}">
-        <p14:creationId xmlns:p14="http://schemas.microsoft.com/office/powerpoint/2010/main" xmlns="" val="2960815596"/>
+        <p14:creationId xmlns:p14="http://schemas.microsoft.com/office/powerpoint/2010/main" val="2960815596"/>
       </p:ext>
     </p:extLst>
   </p:cSld>
@@ -23077,7 +22242,7 @@
     </p:spTree>
     <p:extLst>
       <p:ext uri="{BB962C8B-B14F-4D97-AF65-F5344CB8AC3E}">
-        <p14:creationId xmlns:p14="http://schemas.microsoft.com/office/powerpoint/2010/main" xmlns="" val="1616575088"/>
+        <p14:creationId xmlns:p14="http://schemas.microsoft.com/office/powerpoint/2010/main" val="1616575088"/>
       </p:ext>
     </p:extLst>
   </p:cSld>
@@ -23274,7 +22439,7 @@
     </p:spTree>
     <p:extLst>
       <p:ext uri="{BB962C8B-B14F-4D97-AF65-F5344CB8AC3E}">
-        <p14:creationId xmlns:p14="http://schemas.microsoft.com/office/powerpoint/2010/main" xmlns="" val="1314162854"/>
+        <p14:creationId xmlns:p14="http://schemas.microsoft.com/office/powerpoint/2010/main" val="1314162854"/>
       </p:ext>
     </p:extLst>
   </p:cSld>
@@ -23361,7 +22526,7 @@
     </p:spTree>
     <p:extLst>
       <p:ext uri="{BB962C8B-B14F-4D97-AF65-F5344CB8AC3E}">
-        <p14:creationId xmlns:p14="http://schemas.microsoft.com/office/powerpoint/2010/main" xmlns="" val="1350559237"/>
+        <p14:creationId xmlns:p14="http://schemas.microsoft.com/office/powerpoint/2010/main" val="1350559237"/>
       </p:ext>
     </p:extLst>
   </p:cSld>
@@ -23436,7 +22601,7 @@
     </p:spTree>
     <p:extLst>
       <p:ext uri="{BB962C8B-B14F-4D97-AF65-F5344CB8AC3E}">
-        <p14:creationId xmlns:p14="http://schemas.microsoft.com/office/powerpoint/2010/main" xmlns="" val="3857988853"/>
+        <p14:creationId xmlns:p14="http://schemas.microsoft.com/office/powerpoint/2010/main" val="3857988853"/>
       </p:ext>
     </p:extLst>
   </p:cSld>
@@ -23646,7 +22811,7 @@
     </p:spTree>
     <p:extLst>
       <p:ext uri="{BB962C8B-B14F-4D97-AF65-F5344CB8AC3E}">
-        <p14:creationId xmlns:p14="http://schemas.microsoft.com/office/powerpoint/2010/main" xmlns="" val="3857988853"/>
+        <p14:creationId xmlns:p14="http://schemas.microsoft.com/office/powerpoint/2010/main" val="3857988853"/>
       </p:ext>
     </p:extLst>
   </p:cSld>
@@ -24438,7 +23603,7 @@
     </p:spTree>
     <p:extLst>
       <p:ext uri="{BB962C8B-B14F-4D97-AF65-F5344CB8AC3E}">
-        <p14:creationId xmlns:p14="http://schemas.microsoft.com/office/powerpoint/2010/main" xmlns="" val="755519461"/>
+        <p14:creationId xmlns:p14="http://schemas.microsoft.com/office/powerpoint/2010/main" val="755519461"/>
       </p:ext>
     </p:extLst>
   </p:cSld>
@@ -24737,7 +23902,7 @@
     </p:spTree>
     <p:extLst>
       <p:ext uri="{BB962C8B-B14F-4D97-AF65-F5344CB8AC3E}">
-        <p14:creationId xmlns:p14="http://schemas.microsoft.com/office/powerpoint/2010/main" xmlns="" val="1569197944"/>
+        <p14:creationId xmlns:p14="http://schemas.microsoft.com/office/powerpoint/2010/main" val="1569197944"/>
       </p:ext>
     </p:extLst>
   </p:cSld>
@@ -24776,7 +23941,7 @@
           <a:blip r:embed="rId2" cstate="print">
             <a:extLst>
               <a:ext uri="{28A0092B-C50C-407E-A947-70E740481C1C}">
-                <a14:useLocalDpi xmlns:a14="http://schemas.microsoft.com/office/drawing/2010/main" xmlns="" val="0"/>
+                <a14:useLocalDpi xmlns:a14="http://schemas.microsoft.com/office/drawing/2010/main" val="0"/>
               </a:ext>
             </a:extLst>
           </a:blip>
@@ -24896,7 +24061,7 @@
           <a:blip r:embed="rId3" cstate="print">
             <a:extLst>
               <a:ext uri="{28A0092B-C50C-407E-A947-70E740481C1C}">
-                <a14:useLocalDpi xmlns:a14="http://schemas.microsoft.com/office/drawing/2010/main" xmlns="" val="0"/>
+                <a14:useLocalDpi xmlns:a14="http://schemas.microsoft.com/office/drawing/2010/main" val="0"/>
               </a:ext>
             </a:extLst>
           </a:blip>
@@ -24926,7 +24091,7 @@
           <a:blip r:embed="rId4" cstate="print">
             <a:extLst>
               <a:ext uri="{28A0092B-C50C-407E-A947-70E740481C1C}">
-                <a14:useLocalDpi xmlns:a14="http://schemas.microsoft.com/office/drawing/2010/main" xmlns="" val="0"/>
+                <a14:useLocalDpi xmlns:a14="http://schemas.microsoft.com/office/drawing/2010/main" val="0"/>
               </a:ext>
             </a:extLst>
           </a:blip>
@@ -24974,7 +24139,7 @@
           <a:blip r:embed="rId5" cstate="print">
             <a:extLst>
               <a:ext uri="{28A0092B-C50C-407E-A947-70E740481C1C}">
-                <a14:useLocalDpi xmlns:a14="http://schemas.microsoft.com/office/drawing/2010/main" xmlns="" val="0"/>
+                <a14:useLocalDpi xmlns:a14="http://schemas.microsoft.com/office/drawing/2010/main" val="0"/>
               </a:ext>
             </a:extLst>
           </a:blip>
@@ -24995,7 +24160,7 @@
     </p:spTree>
     <p:extLst>
       <p:ext uri="{BB962C8B-B14F-4D97-AF65-F5344CB8AC3E}">
-        <p14:creationId xmlns:p14="http://schemas.microsoft.com/office/powerpoint/2010/main" xmlns="" val="3458532491"/>
+        <p14:creationId xmlns:p14="http://schemas.microsoft.com/office/powerpoint/2010/main" val="3458532491"/>
       </p:ext>
     </p:extLst>
   </p:cSld>
@@ -25140,7 +24305,7 @@
     </p:spTree>
     <p:extLst>
       <p:ext uri="{BB962C8B-B14F-4D97-AF65-F5344CB8AC3E}">
-        <p14:creationId xmlns:p14="http://schemas.microsoft.com/office/powerpoint/2010/main" xmlns="" val="3599542048"/>
+        <p14:creationId xmlns:p14="http://schemas.microsoft.com/office/powerpoint/2010/main" val="3599542048"/>
       </p:ext>
     </p:extLst>
   </p:cSld>
@@ -25572,7 +24737,7 @@
     </p:spTree>
     <p:extLst>
       <p:ext uri="{BB962C8B-B14F-4D97-AF65-F5344CB8AC3E}">
-        <p14:creationId xmlns:p14="http://schemas.microsoft.com/office/powerpoint/2010/main" xmlns="" val="1933947800"/>
+        <p14:creationId xmlns:p14="http://schemas.microsoft.com/office/powerpoint/2010/main" val="1933947800"/>
       </p:ext>
     </p:extLst>
   </p:cSld>
@@ -25658,7 +24823,7 @@
     </p:spTree>
     <p:extLst>
       <p:ext uri="{BB962C8B-B14F-4D97-AF65-F5344CB8AC3E}">
-        <p14:creationId xmlns:p14="http://schemas.microsoft.com/office/powerpoint/2010/main" xmlns="" val="256484290"/>
+        <p14:creationId xmlns:p14="http://schemas.microsoft.com/office/powerpoint/2010/main" val="256484290"/>
       </p:ext>
     </p:extLst>
   </p:cSld>
@@ -25777,7 +24942,7 @@
     </p:spTree>
     <p:extLst>
       <p:ext uri="{BB962C8B-B14F-4D97-AF65-F5344CB8AC3E}">
-        <p14:creationId xmlns:p14="http://schemas.microsoft.com/office/powerpoint/2010/main" xmlns="" val="286368229"/>
+        <p14:creationId xmlns:p14="http://schemas.microsoft.com/office/powerpoint/2010/main" val="286368229"/>
       </p:ext>
     </p:extLst>
   </p:cSld>
@@ -25853,7 +25018,7 @@
     </p:spTree>
     <p:extLst>
       <p:ext uri="{BB962C8B-B14F-4D97-AF65-F5344CB8AC3E}">
-        <p14:creationId xmlns:p14="http://schemas.microsoft.com/office/powerpoint/2010/main" xmlns="" val="745076154"/>
+        <p14:creationId xmlns:p14="http://schemas.microsoft.com/office/powerpoint/2010/main" val="745076154"/>
       </p:ext>
     </p:extLst>
   </p:cSld>
@@ -25977,7 +25142,7 @@
                   <p:nvPr>
                     <p:extLst>
                       <p:ext uri="{D42A27DB-BD31-4B8C-83A1-F6EECF244321}">
-                        <p14:modId xmlns:p14="http://schemas.microsoft.com/office/powerpoint/2010/main" xmlns="" val="568955525"/>
+                        <p14:modId xmlns:p14="http://schemas.microsoft.com/office/powerpoint/2010/main" val="568955525"/>
                       </p:ext>
                     </p:extLst>
                   </p:nvPr>
@@ -26909,7 +26074,7 @@
     </p:spTree>
     <p:extLst>
       <p:ext uri="{BB962C8B-B14F-4D97-AF65-F5344CB8AC3E}">
-        <p14:creationId xmlns:p14="http://schemas.microsoft.com/office/powerpoint/2010/main" xmlns="" val="3857988853"/>
+        <p14:creationId xmlns:p14="http://schemas.microsoft.com/office/powerpoint/2010/main" val="3857988853"/>
       </p:ext>
     </p:extLst>
   </p:cSld>
@@ -27003,7 +26168,7 @@
     </p:spTree>
     <p:extLst>
       <p:ext uri="{BB962C8B-B14F-4D97-AF65-F5344CB8AC3E}">
-        <p14:creationId xmlns:p14="http://schemas.microsoft.com/office/powerpoint/2010/main" xmlns="" val="1515372593"/>
+        <p14:creationId xmlns:p14="http://schemas.microsoft.com/office/powerpoint/2010/main" val="1515372593"/>
       </p:ext>
     </p:extLst>
   </p:cSld>
@@ -27194,7 +26359,7 @@
     </p:spTree>
     <p:extLst>
       <p:ext uri="{BB962C8B-B14F-4D97-AF65-F5344CB8AC3E}">
-        <p14:creationId xmlns:p14="http://schemas.microsoft.com/office/powerpoint/2010/main" xmlns="" val="576009203"/>
+        <p14:creationId xmlns:p14="http://schemas.microsoft.com/office/powerpoint/2010/main" val="576009203"/>
       </p:ext>
     </p:extLst>
   </p:cSld>
@@ -27343,7 +26508,7 @@
     </p:spTree>
     <p:extLst>
       <p:ext uri="{BB962C8B-B14F-4D97-AF65-F5344CB8AC3E}">
-        <p14:creationId xmlns:p14="http://schemas.microsoft.com/office/powerpoint/2010/main" xmlns="" val="2359148607"/>
+        <p14:creationId xmlns:p14="http://schemas.microsoft.com/office/powerpoint/2010/main" val="2359148607"/>
       </p:ext>
     </p:extLst>
   </p:cSld>
@@ -27703,11 +26868,7 @@
             <a:pPr lvl="1"/>
             <a:r>
               <a:rPr lang="en-US" dirty="0" smtClean="0"/>
-              <a:t>Enterprise Architect </a:t>
-            </a:r>
-            <a:r>
-              <a:rPr lang="en-US" dirty="0" smtClean="0"/>
-              <a:t>knowledge</a:t>
+              <a:t>Enterprise Architect knowledge</a:t>
             </a:r>
           </a:p>
           <a:p>
@@ -27716,7 +26877,6 @@
               <a:rPr lang="en-US" dirty="0" smtClean="0"/>
               <a:t>Testing</a:t>
             </a:r>
-            <a:endParaRPr lang="en-US" dirty="0" smtClean="0"/>
           </a:p>
           <a:p>
             <a:r>
@@ -27824,27 +26984,14 @@
             <a:pPr lvl="1"/>
             <a:r>
               <a:rPr lang="en-US" dirty="0" smtClean="0"/>
-              <a:t>Level of </a:t>
-            </a:r>
+              <a:t>Level of commitment and motivation</a:t>
+            </a:r>
+          </a:p>
+          <a:p>
+            <a:pPr lvl="2"/>
             <a:r>
               <a:rPr lang="en-US" dirty="0" smtClean="0"/>
-              <a:t>commitment and motivation</a:t>
-            </a:r>
-            <a:endParaRPr lang="en-US" dirty="0" smtClean="0"/>
-          </a:p>
-          <a:p>
-            <a:pPr lvl="2"/>
-            <a:r>
-              <a:rPr lang="en-US" dirty="0" smtClean="0"/>
-              <a:t> similar </a:t>
-            </a:r>
-            <a:r>
-              <a:rPr lang="en-US" dirty="0" smtClean="0"/>
-              <a:t>for </a:t>
-            </a:r>
-            <a:r>
-              <a:rPr lang="en-US" dirty="0" smtClean="0"/>
-              <a:t>all members </a:t>
+              <a:t> similar for all members </a:t>
             </a:r>
           </a:p>
           <a:p>
@@ -27858,11 +27005,7 @@
             <a:pPr lvl="1"/>
             <a:r>
               <a:rPr lang="en-US" dirty="0" smtClean="0"/>
-              <a:t>Working together and regular </a:t>
-            </a:r>
-            <a:r>
-              <a:rPr lang="en-US" dirty="0" smtClean="0"/>
-              <a:t>meetings</a:t>
+              <a:t>Working together and regular meetings</a:t>
             </a:r>
           </a:p>
           <a:p>
@@ -27871,7 +27014,6 @@
               <a:rPr lang="en-US" dirty="0" smtClean="0"/>
               <a:t>Take advantage of individual strengths and knowledge </a:t>
             </a:r>
-            <a:endParaRPr lang="en-US" dirty="0" smtClean="0"/>
           </a:p>
           <a:p>
             <a:endParaRPr lang="pt-PT" dirty="0"/>
@@ -28121,7 +27263,7 @@
     </p:spTree>
     <p:extLst>
       <p:ext uri="{BB962C8B-B14F-4D97-AF65-F5344CB8AC3E}">
-        <p14:creationId xmlns:p14="http://schemas.microsoft.com/office/powerpoint/2010/main" xmlns="" val="139459399"/>
+        <p14:creationId xmlns:p14="http://schemas.microsoft.com/office/powerpoint/2010/main" val="139459399"/>
       </p:ext>
     </p:extLst>
   </p:cSld>
@@ -28335,7 +27477,7 @@
     </p:spTree>
     <p:extLst>
       <p:ext uri="{BB962C8B-B14F-4D97-AF65-F5344CB8AC3E}">
-        <p14:creationId xmlns:p14="http://schemas.microsoft.com/office/powerpoint/2010/main" xmlns="" val="529958241"/>
+        <p14:creationId xmlns:p14="http://schemas.microsoft.com/office/powerpoint/2010/main" val="529958241"/>
       </p:ext>
     </p:extLst>
   </p:cSld>
@@ -28529,7 +27671,7 @@
     </p:spTree>
     <p:extLst>
       <p:ext uri="{BB962C8B-B14F-4D97-AF65-F5344CB8AC3E}">
-        <p14:creationId xmlns:p14="http://schemas.microsoft.com/office/powerpoint/2010/main" xmlns="" val="1756093289"/>
+        <p14:creationId xmlns:p14="http://schemas.microsoft.com/office/powerpoint/2010/main" val="1756093289"/>
       </p:ext>
     </p:extLst>
   </p:cSld>
@@ -29194,7 +28336,7 @@
     </p:spTree>
     <p:extLst>
       <p:ext uri="{BB962C8B-B14F-4D97-AF65-F5344CB8AC3E}">
-        <p14:creationId xmlns:p14="http://schemas.microsoft.com/office/powerpoint/2010/main" xmlns="" val="3608220894"/>
+        <p14:creationId xmlns:p14="http://schemas.microsoft.com/office/powerpoint/2010/main" val="3608220894"/>
       </p:ext>
     </p:extLst>
   </p:cSld>
@@ -29501,7 +28643,7 @@
     </p:spTree>
     <p:extLst>
       <p:ext uri="{BB962C8B-B14F-4D97-AF65-F5344CB8AC3E}">
-        <p14:creationId xmlns:p14="http://schemas.microsoft.com/office/powerpoint/2010/main" xmlns="" val="1960690833"/>
+        <p14:creationId xmlns:p14="http://schemas.microsoft.com/office/powerpoint/2010/main" val="1960690833"/>
       </p:ext>
     </p:extLst>
   </p:cSld>
@@ -29644,30 +28786,265 @@
         </p:nvSpPr>
         <p:spPr/>
         <p:txBody>
-          <a:bodyPr/>
+          <a:bodyPr>
+            <a:normAutofit/>
+          </a:bodyPr>
           <a:lstStyle/>
           <a:p>
             <a:r>
               <a:rPr lang="en-US" dirty="0" smtClean="0"/>
-              <a:t>Main Contributions</a:t>
-            </a:r>
-          </a:p>
-          <a:p>
+              <a:t>Main </a:t>
+            </a:r>
             <a:r>
               <a:rPr lang="en-US" dirty="0" smtClean="0"/>
-              <a:t>Participation in Team Results</a:t>
-            </a:r>
-          </a:p>
-          <a:p>
-            <a:r>
-              <a:rPr lang="en-US" smtClean="0"/>
-              <a:t>Lessons Learned</a:t>
-            </a:r>
+              <a:t>Contributions</a:t>
+            </a:r>
+          </a:p>
+          <a:p>
+            <a:pPr lvl="1"/>
+            <a:r>
+              <a:rPr lang="en-US" dirty="0"/>
+              <a:t>Software Main </a:t>
+            </a:r>
+            <a:r>
+              <a:rPr lang="en-US" dirty="0" smtClean="0"/>
+              <a:t>Idea</a:t>
+            </a:r>
+          </a:p>
+          <a:p>
+            <a:pPr lvl="1"/>
+            <a:r>
+              <a:rPr lang="en-US" dirty="0" smtClean="0"/>
+              <a:t>Technical </a:t>
+            </a:r>
+            <a:r>
+              <a:rPr lang="en-US" dirty="0"/>
+              <a:t>Knowledge and Helping the whole team in developing their </a:t>
+            </a:r>
+            <a:r>
+              <a:rPr lang="en-US" dirty="0" smtClean="0"/>
+              <a:t>assignments</a:t>
+            </a:r>
+          </a:p>
+          <a:p>
+            <a:pPr lvl="1"/>
+            <a:r>
+              <a:rPr lang="en-US" dirty="0"/>
+              <a:t>Software Base Architecture, </a:t>
+            </a:r>
+            <a:r>
+              <a:rPr lang="en-US" dirty="0" smtClean="0"/>
+              <a:t>Functionality </a:t>
+            </a:r>
+            <a:r>
+              <a:rPr lang="en-US" dirty="0"/>
+              <a:t>and UI </a:t>
+            </a:r>
+            <a:r>
+              <a:rPr lang="en-US" dirty="0" smtClean="0"/>
+              <a:t>Development</a:t>
+            </a:r>
+          </a:p>
+          <a:p>
+            <a:pPr lvl="1"/>
+            <a:r>
+              <a:rPr lang="en-US" dirty="0"/>
+              <a:t>Help In Requirement definitions when </a:t>
+            </a:r>
+            <a:r>
+              <a:rPr lang="en-US" dirty="0" smtClean="0"/>
+              <a:t>prompted</a:t>
+            </a:r>
+            <a:endParaRPr lang="en-US" dirty="0"/>
+          </a:p>
+          <a:p>
+            <a:pPr lvl="1"/>
+            <a:r>
+              <a:rPr lang="en-US" dirty="0" smtClean="0"/>
+              <a:t>Trying to help the team thinking about the future helping them get focused</a:t>
+            </a:r>
+          </a:p>
+          <a:p>
+            <a:pPr marL="457200" lvl="1" indent="0">
+              <a:buNone/>
+            </a:pPr>
             <a:endParaRPr lang="en-US" dirty="0"/>
           </a:p>
         </p:txBody>
       </p:sp>
     </p:spTree>
+  </p:cSld>
+  <p:clrMapOvr>
+    <a:masterClrMapping/>
+  </p:clrMapOvr>
+</p:sld>
+</file>
+
+<file path=ppt/slides/slide68.xml><?xml version="1.0" encoding="utf-8"?>
+<p:sld xmlns:a="http://schemas.openxmlformats.org/drawingml/2006/main" xmlns:r="http://schemas.openxmlformats.org/officeDocument/2006/relationships" xmlns:p="http://schemas.openxmlformats.org/presentationml/2006/main">
+  <p:cSld>
+    <p:spTree>
+      <p:nvGrpSpPr>
+        <p:cNvPr id="1" name=""/>
+        <p:cNvGrpSpPr/>
+        <p:nvPr/>
+      </p:nvGrpSpPr>
+      <p:grpSpPr>
+        <a:xfrm>
+          <a:off x="0" y="0"/>
+          <a:ext cx="0" cy="0"/>
+          <a:chOff x="0" y="0"/>
+          <a:chExt cx="0" cy="0"/>
+        </a:xfrm>
+      </p:grpSpPr>
+      <p:sp>
+        <p:nvSpPr>
+          <p:cNvPr id="2" name="Título 1"/>
+          <p:cNvSpPr>
+            <a:spLocks noGrp="1"/>
+          </p:cNvSpPr>
+          <p:nvPr>
+            <p:ph type="title"/>
+          </p:nvPr>
+        </p:nvSpPr>
+        <p:spPr/>
+        <p:txBody>
+          <a:bodyPr/>
+          <a:lstStyle/>
+          <a:p>
+            <a:r>
+              <a:rPr lang="pt-PT" dirty="0" smtClean="0"/>
+              <a:t>Rui Ganhoto</a:t>
+            </a:r>
+            <a:endParaRPr lang="pt-PT" dirty="0"/>
+          </a:p>
+        </p:txBody>
+      </p:sp>
+      <p:sp>
+        <p:nvSpPr>
+          <p:cNvPr id="3" name="Marcador de Posição de Conteúdo 2"/>
+          <p:cNvSpPr>
+            <a:spLocks noGrp="1"/>
+          </p:cNvSpPr>
+          <p:nvPr>
+            <p:ph idx="1"/>
+          </p:nvPr>
+        </p:nvSpPr>
+        <p:spPr/>
+        <p:txBody>
+          <a:bodyPr>
+            <a:normAutofit fontScale="92500" lnSpcReduction="10000"/>
+          </a:bodyPr>
+          <a:lstStyle/>
+          <a:p>
+            <a:r>
+              <a:rPr lang="en-US" dirty="0" smtClean="0"/>
+              <a:t>Participation </a:t>
+            </a:r>
+            <a:r>
+              <a:rPr lang="en-US" dirty="0" smtClean="0"/>
+              <a:t>in Team </a:t>
+            </a:r>
+            <a:r>
+              <a:rPr lang="en-US" dirty="0" smtClean="0"/>
+              <a:t>Results</a:t>
+            </a:r>
+          </a:p>
+          <a:p>
+            <a:pPr lvl="1"/>
+            <a:r>
+              <a:rPr lang="en-US" dirty="0"/>
+              <a:t>Active </a:t>
+            </a:r>
+            <a:r>
+              <a:rPr lang="en-US" dirty="0" smtClean="0"/>
+              <a:t>participation</a:t>
+            </a:r>
+          </a:p>
+          <a:p>
+            <a:pPr lvl="1"/>
+            <a:r>
+              <a:rPr lang="en-US" dirty="0"/>
+              <a:t>Always trying to help my coworkers when </a:t>
+            </a:r>
+            <a:r>
+              <a:rPr lang="en-US" dirty="0" smtClean="0"/>
+              <a:t>necessary</a:t>
+            </a:r>
+          </a:p>
+          <a:p>
+            <a:pPr lvl="1"/>
+            <a:r>
+              <a:rPr lang="en-US" dirty="0"/>
+              <a:t>Good commitment and positive </a:t>
+            </a:r>
+            <a:r>
+              <a:rPr lang="en-US" dirty="0" smtClean="0"/>
+              <a:t>participation </a:t>
+            </a:r>
+            <a:r>
+              <a:rPr lang="en-US" dirty="0"/>
+              <a:t>in the </a:t>
+            </a:r>
+            <a:r>
+              <a:rPr lang="en-US" dirty="0" smtClean="0"/>
+              <a:t>team</a:t>
+            </a:r>
+          </a:p>
+          <a:p>
+            <a:pPr lvl="1"/>
+            <a:r>
+              <a:rPr lang="en-US" dirty="0" smtClean="0"/>
+              <a:t>While developing, I tried to keep the team focused on the task</a:t>
+            </a:r>
+            <a:endParaRPr lang="en-US" dirty="0" smtClean="0"/>
+          </a:p>
+          <a:p>
+            <a:r>
+              <a:rPr lang="en-US" dirty="0" smtClean="0"/>
+              <a:t>Lessons </a:t>
+            </a:r>
+            <a:r>
+              <a:rPr lang="en-US" dirty="0" smtClean="0"/>
+              <a:t>Learned</a:t>
+            </a:r>
+          </a:p>
+          <a:p>
+            <a:pPr lvl="1"/>
+            <a:r>
+              <a:rPr lang="en-US" dirty="0"/>
+              <a:t>It's not easy to keep a big team to </a:t>
+            </a:r>
+            <a:r>
+              <a:rPr lang="en-US" dirty="0" smtClean="0"/>
+              <a:t>work in synchrony</a:t>
+            </a:r>
+          </a:p>
+          <a:p>
+            <a:pPr lvl="1"/>
+            <a:r>
+              <a:rPr lang="en-US" dirty="0"/>
+              <a:t>Rigid documents that doesn't predict exceptions, sometimes </a:t>
+            </a:r>
+            <a:r>
+              <a:rPr lang="en-US" dirty="0" smtClean="0"/>
+              <a:t>will not fit in reality.</a:t>
+            </a:r>
+          </a:p>
+          <a:p>
+            <a:pPr marL="457200" lvl="1" indent="0">
+              <a:buNone/>
+            </a:pPr>
+            <a:endParaRPr lang="en-US" dirty="0"/>
+          </a:p>
+        </p:txBody>
+      </p:sp>
+    </p:spTree>
+    <p:extLst>
+      <p:ext uri="{BB962C8B-B14F-4D97-AF65-F5344CB8AC3E}">
+        <p14:creationId xmlns:p14="http://schemas.microsoft.com/office/powerpoint/2010/main" val="1399430186"/>
+      </p:ext>
+    </p:extLst>
   </p:cSld>
   <p:clrMapOvr>
     <a:masterClrMapping/>
@@ -29776,7 +29153,7 @@
     </p:spTree>
     <p:extLst>
       <p:ext uri="{BB962C8B-B14F-4D97-AF65-F5344CB8AC3E}">
-        <p14:creationId xmlns:p14="http://schemas.microsoft.com/office/powerpoint/2010/main" xmlns="" val="1996551084"/>
+        <p14:creationId xmlns:p14="http://schemas.microsoft.com/office/powerpoint/2010/main" val="1996551084"/>
       </p:ext>
     </p:extLst>
   </p:cSld>
@@ -29863,7 +29240,7 @@
     </p:spTree>
     <p:extLst>
       <p:ext uri="{BB962C8B-B14F-4D97-AF65-F5344CB8AC3E}">
-        <p14:creationId xmlns:p14="http://schemas.microsoft.com/office/powerpoint/2010/main" xmlns="" val="4109416244"/>
+        <p14:creationId xmlns:p14="http://schemas.microsoft.com/office/powerpoint/2010/main" val="4109416244"/>
       </p:ext>
     </p:extLst>
   </p:cSld>
@@ -30101,7 +29478,7 @@
     </p:spTree>
     <p:extLst>
       <p:ext uri="{BB962C8B-B14F-4D97-AF65-F5344CB8AC3E}">
-        <p14:creationId xmlns:p14="http://schemas.microsoft.com/office/powerpoint/2010/main" xmlns="" val="3388566770"/>
+        <p14:creationId xmlns:p14="http://schemas.microsoft.com/office/powerpoint/2010/main" val="3388566770"/>
       </p:ext>
     </p:extLst>
   </p:cSld>
@@ -30345,7 +29722,7 @@
   <a:extraClrSchemeLst/>
   <a:extLst>
     <a:ext uri="{05A4C25C-085E-4340-85A3-A5531E510DB2}">
-      <thm15:themeFamily xmlns:thm15="http://schemas.microsoft.com/office/thememl/2012/main" xmlns="" name="Organic" id="{28CDC826-8792-45C0-861B-85EB3ADEDA33}" vid="{E4E49EB0-FB00-41F5-9359-4843D783A23D}"/>
+      <thm15:themeFamily xmlns:thm15="http://schemas.microsoft.com/office/thememl/2012/main" name="Organic" id="{28CDC826-8792-45C0-861B-85EB3ADEDA33}" vid="{E4E49EB0-FB00-41F5-9359-4843D783A23D}"/>
     </a:ext>
   </a:extLst>
 </a:theme>
@@ -30606,7 +29983,7 @@
   <a:extraClrSchemeLst/>
   <a:extLst>
     <a:ext uri="{05A4C25C-085E-4340-85A3-A5531E510DB2}">
-      <thm15:themeFamily xmlns:thm15="http://schemas.microsoft.com/office/thememl/2012/main" xmlns="" name="Office Theme" id="{62F939B6-93AF-4DB8-9C6B-D6C7DFDC589F}" vid="{4A3C46E8-61CC-4603-A589-7422A47A8E4A}"/>
+      <thm15:themeFamily xmlns:thm15="http://schemas.microsoft.com/office/thememl/2012/main" name="Office Theme" id="{62F939B6-93AF-4DB8-9C6B-D6C7DFDC589F}" vid="{4A3C46E8-61CC-4603-A589-7422A47A8E4A}"/>
     </a:ext>
   </a:extLst>
 </a:theme>

</xml_diff>

<commit_message>
Team Members Had Space
</commit_message>
<xml_diff>
--- a/Final Presentation/Presentation.pptx
+++ b/Final Presentation/Presentation.pptx
@@ -181,7 +181,7 @@
   </p:defaultTextStyle>
   <p:extLst>
     <p:ext uri="{EFAFB233-063F-42B5-8137-9DF3F51BA10A}">
-      <p15:sldGuideLst xmlns:p15="http://schemas.microsoft.com/office/powerpoint/2012/main" xmlns="">
+      <p15:sldGuideLst xmlns:p15="http://schemas.microsoft.com/office/powerpoint/2012/main">
         <p15:guide id="1" orient="horz" pos="2160">
           <p15:clr>
             <a:srgbClr val="A4A3A4"/>
@@ -200,7 +200,17 @@
 
 <file path=ppt/charts/chart1.xml><?xml version="1.0" encoding="utf-8"?>
 <c:chartSpace xmlns:c="http://schemas.openxmlformats.org/drawingml/2006/chart" xmlns:a="http://schemas.openxmlformats.org/drawingml/2006/main" xmlns:r="http://schemas.openxmlformats.org/officeDocument/2006/relationships">
-  <c:lang val="pt-PT"/>
+  <c:date1904 val="0"/>
+  <c:lang val="en-US"/>
+  <c:roundedCorners val="0"/>
+  <mc:AlternateContent xmlns:mc="http://schemas.openxmlformats.org/markup-compatibility/2006">
+    <mc:Choice xmlns:c14="http://schemas.microsoft.com/office/drawing/2007/8/2/chart" Requires="c14">
+      <c14:style val="102"/>
+    </mc:Choice>
+    <mc:Fallback>
+      <c:style val="2"/>
+    </mc:Fallback>
+  </mc:AlternateContent>
   <c:chart>
     <c:title>
       <c:tx>
@@ -228,7 +238,7 @@
           </a:p>
         </c:rich>
       </c:tx>
-      <c:layout/>
+      <c:overlay val="0"/>
       <c:spPr>
         <a:noFill/>
         <a:ln>
@@ -236,12 +246,34 @@
         </a:ln>
         <a:effectLst/>
       </c:spPr>
+      <c:txPr>
+        <a:bodyPr rot="0" spcFirstLastPara="1" vertOverflow="ellipsis" vert="horz" wrap="square" anchor="ctr" anchorCtr="1"/>
+        <a:lstStyle/>
+        <a:p>
+          <a:pPr>
+            <a:defRPr sz="2128" b="1" i="0" u="none" strike="noStrike" kern="1200" cap="all" spc="120" normalizeH="0" baseline="0">
+              <a:solidFill>
+                <a:schemeClr val="tx1">
+                  <a:lumMod val="65000"/>
+                  <a:lumOff val="35000"/>
+                </a:schemeClr>
+              </a:solidFill>
+              <a:latin typeface="+mn-lt"/>
+              <a:ea typeface="+mn-ea"/>
+              <a:cs typeface="+mn-cs"/>
+            </a:defRPr>
+          </a:pPr>
+          <a:endParaRPr lang="pt-PT"/>
+        </a:p>
+      </c:txPr>
     </c:title>
+    <c:autoTitleDeleted val="0"/>
     <c:plotArea>
       <c:layout/>
       <c:barChart>
         <c:barDir val="col"/>
         <c:grouping val="clustered"/>
+        <c:varyColors val="0"/>
         <c:ser>
           <c:idx val="0"/>
           <c:order val="0"/>
@@ -265,6 +297,7 @@
             </a:ln>
             <a:effectLst/>
           </c:spPr>
+          <c:invertIfNegative val="0"/>
           <c:dLbls>
             <c:spPr>
               <a:noFill/>
@@ -296,10 +329,15 @@
               </a:p>
             </c:txPr>
             <c:dLblPos val="outEnd"/>
+            <c:showLegendKey val="0"/>
             <c:showVal val="1"/>
+            <c:showCatName val="0"/>
+            <c:showSerName val="0"/>
+            <c:showPercent val="0"/>
+            <c:showBubbleSize val="0"/>
+            <c:showLeaderLines val="0"/>
             <c:extLst>
               <c:ext xmlns:c15="http://schemas.microsoft.com/office/drawing/2012/chart" uri="{CE6537A1-D6FC-4f65-9D91-7224C49458BB}">
-                <c15:layout/>
                 <c15:showLeaderLines val="1"/>
                 <c15:leaderLines>
                   <c:spPr>
@@ -341,7 +379,7 @@
             <c:numRef>
               <c:f>Folha1!$O$44:$R$44</c:f>
               <c:numCache>
-                <c:formatCode>Estandar</c:formatCode>
+                <c:formatCode>General</c:formatCode>
                 <c:ptCount val="4"/>
                 <c:pt idx="0">
                   <c:v>100</c:v>
@@ -379,6 +417,7 @@
             </a:ln>
             <a:effectLst/>
           </c:spPr>
+          <c:invertIfNegative val="0"/>
           <c:dLbls>
             <c:spPr>
               <a:noFill/>
@@ -410,10 +449,15 @@
               </a:p>
             </c:txPr>
             <c:dLblPos val="outEnd"/>
+            <c:showLegendKey val="0"/>
             <c:showVal val="1"/>
+            <c:showCatName val="0"/>
+            <c:showSerName val="0"/>
+            <c:showPercent val="0"/>
+            <c:showBubbleSize val="0"/>
+            <c:showLeaderLines val="0"/>
             <c:extLst>
               <c:ext xmlns:c15="http://schemas.microsoft.com/office/drawing/2012/chart" uri="{CE6537A1-D6FC-4f65-9D91-7224C49458BB}">
-                <c15:layout/>
                 <c15:showLeaderLines val="1"/>
                 <c15:leaderLines>
                   <c:spPr>
@@ -455,7 +499,7 @@
             <c:numRef>
               <c:f>Folha1!$O$45:$R$45</c:f>
               <c:numCache>
-                <c:formatCode>Estandar</c:formatCode>
+                <c:formatCode>General</c:formatCode>
                 <c:ptCount val="4"/>
                 <c:pt idx="1">
                   <c:v>93</c:v>
@@ -471,18 +515,24 @@
           </c:val>
         </c:ser>
         <c:dLbls>
+          <c:showLegendKey val="0"/>
           <c:showVal val="1"/>
+          <c:showCatName val="0"/>
+          <c:showSerName val="0"/>
+          <c:showPercent val="0"/>
+          <c:showBubbleSize val="0"/>
         </c:dLbls>
         <c:gapWidth val="444"/>
         <c:overlap val="-90"/>
-        <c:axId val="73685632"/>
-        <c:axId val="73695616"/>
+        <c:axId val="-531472784"/>
+        <c:axId val="-531477136"/>
       </c:barChart>
       <c:catAx>
-        <c:axId val="73685632"/>
+        <c:axId val="-531472784"/>
         <c:scaling>
           <c:orientation val="minMax"/>
         </c:scaling>
+        <c:delete val="0"/>
         <c:axPos val="b"/>
         <c:majorGridlines>
           <c:spPr>
@@ -498,8 +548,9 @@
             <a:effectLst/>
           </c:spPr>
         </c:majorGridlines>
-        <c:numFmt formatCode="Estandar" sourceLinked="1"/>
+        <c:numFmt formatCode="General" sourceLinked="1"/>
         <c:majorTickMark val="none"/>
+        <c:minorTickMark val="none"/>
         <c:tickLblPos val="nextTo"/>
         <c:spPr>
           <a:noFill/>
@@ -534,23 +585,25 @@
             <a:endParaRPr lang="pt-PT"/>
           </a:p>
         </c:txPr>
-        <c:crossAx val="73695616"/>
+        <c:crossAx val="-531477136"/>
         <c:crosses val="autoZero"/>
         <c:auto val="1"/>
         <c:lblAlgn val="ctr"/>
         <c:lblOffset val="100"/>
+        <c:noMultiLvlLbl val="0"/>
       </c:catAx>
       <c:valAx>
-        <c:axId val="73695616"/>
+        <c:axId val="-531477136"/>
         <c:scaling>
           <c:orientation val="minMax"/>
         </c:scaling>
         <c:delete val="1"/>
         <c:axPos val="l"/>
-        <c:numFmt formatCode="Estandar" sourceLinked="1"/>
+        <c:numFmt formatCode="General" sourceLinked="1"/>
         <c:majorTickMark val="none"/>
+        <c:minorTickMark val="none"/>
         <c:tickLblPos val="none"/>
-        <c:crossAx val="73685632"/>
+        <c:crossAx val="-531472784"/>
         <c:crosses val="autoZero"/>
         <c:crossBetween val="between"/>
       </c:valAx>
@@ -564,7 +617,7 @@
     </c:plotArea>
     <c:legend>
       <c:legendPos val="t"/>
-      <c:layout/>
+      <c:overlay val="0"/>
       <c:spPr>
         <a:noFill/>
         <a:ln>
@@ -595,6 +648,7 @@
     </c:legend>
     <c:plotVisOnly val="1"/>
     <c:dispBlanksAs val="gap"/>
+    <c:showDLblsOverMax val="0"/>
   </c:chart>
   <c:spPr>
     <a:noFill/>
@@ -613,13 +667,25 @@
       <a:endParaRPr lang="pt-PT"/>
     </a:p>
   </c:txPr>
-  <c:externalData r:id="rId1"/>
+  <c:externalData r:id="rId3">
+    <c:autoUpdate val="0"/>
+  </c:externalData>
 </c:chartSpace>
 </file>
 
 <file path=ppt/charts/chart2.xml><?xml version="1.0" encoding="utf-8"?>
 <c:chartSpace xmlns:c="http://schemas.openxmlformats.org/drawingml/2006/chart" xmlns:a="http://schemas.openxmlformats.org/drawingml/2006/main" xmlns:r="http://schemas.openxmlformats.org/officeDocument/2006/relationships">
-  <c:lang val="pt-PT"/>
+  <c:date1904 val="0"/>
+  <c:lang val="en-US"/>
+  <c:roundedCorners val="0"/>
+  <mc:AlternateContent xmlns:mc="http://schemas.openxmlformats.org/markup-compatibility/2006">
+    <mc:Choice xmlns:c14="http://schemas.microsoft.com/office/drawing/2007/8/2/chart" Requires="c14">
+      <c14:style val="102"/>
+    </mc:Choice>
+    <mc:Fallback>
+      <c:style val="2"/>
+    </mc:Fallback>
+  </mc:AlternateContent>
   <c:chart>
     <c:title>
       <c:tx>
@@ -655,6 +721,7 @@
           <c:y val="2.4482108622810726E-2"/>
         </c:manualLayout>
       </c:layout>
+      <c:overlay val="0"/>
       <c:spPr>
         <a:noFill/>
         <a:ln>
@@ -662,12 +729,34 @@
         </a:ln>
         <a:effectLst/>
       </c:spPr>
+      <c:txPr>
+        <a:bodyPr rot="0" spcFirstLastPara="1" vertOverflow="ellipsis" vert="horz" wrap="square" anchor="ctr" anchorCtr="1"/>
+        <a:lstStyle/>
+        <a:p>
+          <a:pPr>
+            <a:defRPr sz="2128" b="1" i="0" u="none" strike="noStrike" kern="1200" cap="all" spc="120" normalizeH="0" baseline="0">
+              <a:solidFill>
+                <a:schemeClr val="tx1">
+                  <a:lumMod val="65000"/>
+                  <a:lumOff val="35000"/>
+                </a:schemeClr>
+              </a:solidFill>
+              <a:latin typeface="+mn-lt"/>
+              <a:ea typeface="+mn-ea"/>
+              <a:cs typeface="+mn-cs"/>
+            </a:defRPr>
+          </a:pPr>
+          <a:endParaRPr lang="pt-PT"/>
+        </a:p>
+      </c:txPr>
     </c:title>
+    <c:autoTitleDeleted val="0"/>
     <c:plotArea>
       <c:layout/>
       <c:barChart>
         <c:barDir val="col"/>
         <c:grouping val="clustered"/>
+        <c:varyColors val="0"/>
         <c:ser>
           <c:idx val="0"/>
           <c:order val="0"/>
@@ -691,6 +780,7 @@
             </a:ln>
             <a:effectLst/>
           </c:spPr>
+          <c:invertIfNegative val="0"/>
           <c:dLbls>
             <c:spPr>
               <a:noFill/>
@@ -722,10 +812,15 @@
               </a:p>
             </c:txPr>
             <c:dLblPos val="outEnd"/>
+            <c:showLegendKey val="0"/>
             <c:showVal val="1"/>
+            <c:showCatName val="0"/>
+            <c:showSerName val="0"/>
+            <c:showPercent val="0"/>
+            <c:showBubbleSize val="0"/>
+            <c:showLeaderLines val="0"/>
             <c:extLst>
               <c:ext xmlns:c15="http://schemas.microsoft.com/office/drawing/2012/chart" uri="{CE6537A1-D6FC-4f65-9D91-7224C49458BB}">
-                <c15:layout/>
                 <c15:showLeaderLines val="1"/>
                 <c15:leaderLines>
                   <c:spPr>
@@ -767,7 +862,7 @@
             <c:numRef>
               <c:f>Folha1!$L$69:$O$69</c:f>
               <c:numCache>
-                <c:formatCode>Estandar</c:formatCode>
+                <c:formatCode>General</c:formatCode>
                 <c:ptCount val="4"/>
                 <c:pt idx="0">
                   <c:v>100</c:v>
@@ -808,6 +903,7 @@
             </a:ln>
             <a:effectLst/>
           </c:spPr>
+          <c:invertIfNegative val="0"/>
           <c:dLbls>
             <c:spPr>
               <a:noFill/>
@@ -839,10 +935,15 @@
               </a:p>
             </c:txPr>
             <c:dLblPos val="outEnd"/>
+            <c:showLegendKey val="0"/>
             <c:showVal val="1"/>
+            <c:showCatName val="0"/>
+            <c:showSerName val="0"/>
+            <c:showPercent val="0"/>
+            <c:showBubbleSize val="0"/>
+            <c:showLeaderLines val="0"/>
             <c:extLst>
               <c:ext xmlns:c15="http://schemas.microsoft.com/office/drawing/2012/chart" uri="{CE6537A1-D6FC-4f65-9D91-7224C49458BB}">
-                <c15:layout/>
                 <c15:showLeaderLines val="1"/>
                 <c15:leaderLines>
                   <c:spPr>
@@ -884,7 +985,7 @@
             <c:numRef>
               <c:f>Folha1!$L$70:$O$70</c:f>
               <c:numCache>
-                <c:formatCode>Estandar</c:formatCode>
+                <c:formatCode>General</c:formatCode>
                 <c:ptCount val="4"/>
                 <c:pt idx="0">
                   <c:v>107.75</c:v>
@@ -903,18 +1004,24 @@
           </c:val>
         </c:ser>
         <c:dLbls>
+          <c:showLegendKey val="0"/>
           <c:showVal val="1"/>
+          <c:showCatName val="0"/>
+          <c:showSerName val="0"/>
+          <c:showPercent val="0"/>
+          <c:showBubbleSize val="0"/>
         </c:dLbls>
         <c:gapWidth val="444"/>
         <c:overlap val="-90"/>
-        <c:axId val="76577408"/>
-        <c:axId val="76587392"/>
+        <c:axId val="-368772832"/>
+        <c:axId val="-368771744"/>
       </c:barChart>
       <c:catAx>
-        <c:axId val="76577408"/>
+        <c:axId val="-368772832"/>
         <c:scaling>
           <c:orientation val="minMax"/>
         </c:scaling>
+        <c:delete val="0"/>
         <c:axPos val="b"/>
         <c:majorGridlines>
           <c:spPr>
@@ -930,8 +1037,9 @@
             <a:effectLst/>
           </c:spPr>
         </c:majorGridlines>
-        <c:numFmt formatCode="Estandar" sourceLinked="1"/>
+        <c:numFmt formatCode="General" sourceLinked="1"/>
         <c:majorTickMark val="none"/>
+        <c:minorTickMark val="none"/>
         <c:tickLblPos val="nextTo"/>
         <c:spPr>
           <a:noFill/>
@@ -966,23 +1074,25 @@
             <a:endParaRPr lang="pt-PT"/>
           </a:p>
         </c:txPr>
-        <c:crossAx val="76587392"/>
+        <c:crossAx val="-368771744"/>
         <c:crosses val="autoZero"/>
         <c:auto val="1"/>
         <c:lblAlgn val="ctr"/>
         <c:lblOffset val="100"/>
+        <c:noMultiLvlLbl val="0"/>
       </c:catAx>
       <c:valAx>
-        <c:axId val="76587392"/>
+        <c:axId val="-368771744"/>
         <c:scaling>
           <c:orientation val="minMax"/>
         </c:scaling>
         <c:delete val="1"/>
         <c:axPos val="l"/>
-        <c:numFmt formatCode="Estandar" sourceLinked="1"/>
+        <c:numFmt formatCode="General" sourceLinked="1"/>
         <c:majorTickMark val="none"/>
+        <c:minorTickMark val="none"/>
         <c:tickLblPos val="none"/>
-        <c:crossAx val="76577408"/>
+        <c:crossAx val="-368772832"/>
         <c:crosses val="autoZero"/>
         <c:crossBetween val="between"/>
       </c:valAx>
@@ -1042,7 +1152,7 @@
           </a:p>
         </c:txPr>
       </c:legendEntry>
-      <c:layout/>
+      <c:overlay val="0"/>
       <c:spPr>
         <a:noFill/>
         <a:ln>
@@ -1073,6 +1183,7 @@
     </c:legend>
     <c:plotVisOnly val="1"/>
     <c:dispBlanksAs val="gap"/>
+    <c:showDLblsOverMax val="0"/>
   </c:chart>
   <c:spPr>
     <a:noFill/>
@@ -1091,13 +1202,25 @@
       <a:endParaRPr lang="pt-PT"/>
     </a:p>
   </c:txPr>
-  <c:externalData r:id="rId1"/>
+  <c:externalData r:id="rId3">
+    <c:autoUpdate val="0"/>
+  </c:externalData>
 </c:chartSpace>
 </file>
 
 <file path=ppt/charts/chart3.xml><?xml version="1.0" encoding="utf-8"?>
 <c:chartSpace xmlns:c="http://schemas.openxmlformats.org/drawingml/2006/chart" xmlns:a="http://schemas.openxmlformats.org/drawingml/2006/main" xmlns:r="http://schemas.openxmlformats.org/officeDocument/2006/relationships">
-  <c:lang val="pt-PT"/>
+  <c:date1904 val="0"/>
+  <c:lang val="en-US"/>
+  <c:roundedCorners val="0"/>
+  <mc:AlternateContent xmlns:mc="http://schemas.openxmlformats.org/markup-compatibility/2006">
+    <mc:Choice xmlns:c14="http://schemas.microsoft.com/office/drawing/2007/8/2/chart" Requires="c14">
+      <c14:style val="102"/>
+    </mc:Choice>
+    <mc:Fallback>
+      <c:style val="2"/>
+    </mc:Fallback>
+  </mc:AlternateContent>
   <c:chart>
     <c:title>
       <c:tx>
@@ -1125,7 +1248,7 @@
           </a:p>
         </c:rich>
       </c:tx>
-      <c:layout/>
+      <c:overlay val="0"/>
       <c:spPr>
         <a:noFill/>
         <a:ln>
@@ -1133,12 +1256,34 @@
         </a:ln>
         <a:effectLst/>
       </c:spPr>
+      <c:txPr>
+        <a:bodyPr rot="0" spcFirstLastPara="1" vertOverflow="ellipsis" vert="horz" wrap="square" anchor="ctr" anchorCtr="1"/>
+        <a:lstStyle/>
+        <a:p>
+          <a:pPr>
+            <a:defRPr sz="2128" b="1" i="0" u="none" strike="noStrike" kern="1200" cap="all" spc="120" normalizeH="0" baseline="0">
+              <a:solidFill>
+                <a:schemeClr val="tx1">
+                  <a:lumMod val="65000"/>
+                  <a:lumOff val="35000"/>
+                </a:schemeClr>
+              </a:solidFill>
+              <a:latin typeface="+mn-lt"/>
+              <a:ea typeface="+mn-ea"/>
+              <a:cs typeface="+mn-cs"/>
+            </a:defRPr>
+          </a:pPr>
+          <a:endParaRPr lang="pt-PT"/>
+        </a:p>
+      </c:txPr>
     </c:title>
+    <c:autoTitleDeleted val="0"/>
     <c:plotArea>
       <c:layout/>
       <c:barChart>
         <c:barDir val="col"/>
         <c:grouping val="clustered"/>
+        <c:varyColors val="0"/>
         <c:ser>
           <c:idx val="0"/>
           <c:order val="0"/>
@@ -1151,6 +1296,7 @@
             </a:ln>
             <a:effectLst/>
           </c:spPr>
+          <c:invertIfNegative val="0"/>
           <c:dLbls>
             <c:spPr>
               <a:noFill/>
@@ -1182,10 +1328,15 @@
               </a:p>
             </c:txPr>
             <c:dLblPos val="outEnd"/>
+            <c:showLegendKey val="0"/>
             <c:showVal val="1"/>
+            <c:showCatName val="0"/>
+            <c:showSerName val="0"/>
+            <c:showPercent val="0"/>
+            <c:showBubbleSize val="0"/>
+            <c:showLeaderLines val="0"/>
             <c:extLst>
               <c:ext xmlns:c15="http://schemas.microsoft.com/office/drawing/2012/chart" uri="{CE6537A1-D6FC-4f65-9D91-7224C49458BB}">
-                <c15:layout/>
                 <c15:showLeaderLines val="1"/>
                 <c15:leaderLines>
                   <c:spPr>
@@ -1230,7 +1381,7 @@
             <c:numRef>
               <c:f>'Team Log'!$G$2:$G$6</c:f>
               <c:numCache>
-                <c:formatCode>Estandar</c:formatCode>
+                <c:formatCode>General</c:formatCode>
                 <c:ptCount val="5"/>
                 <c:pt idx="0">
                   <c:v>262</c:v>
@@ -1252,18 +1403,24 @@
           </c:val>
         </c:ser>
         <c:dLbls>
+          <c:showLegendKey val="0"/>
           <c:showVal val="1"/>
+          <c:showCatName val="0"/>
+          <c:showSerName val="0"/>
+          <c:showPercent val="0"/>
+          <c:showBubbleSize val="0"/>
         </c:dLbls>
         <c:gapWidth val="444"/>
         <c:overlap val="-90"/>
-        <c:axId val="73750784"/>
-        <c:axId val="73756672"/>
+        <c:axId val="-368774464"/>
+        <c:axId val="-368769024"/>
       </c:barChart>
       <c:catAx>
-        <c:axId val="73750784"/>
+        <c:axId val="-368774464"/>
         <c:scaling>
           <c:orientation val="minMax"/>
         </c:scaling>
+        <c:delete val="0"/>
         <c:axPos val="b"/>
         <c:majorGridlines>
           <c:spPr>
@@ -1279,8 +1436,9 @@
             <a:effectLst/>
           </c:spPr>
         </c:majorGridlines>
-        <c:numFmt formatCode="Estandar" sourceLinked="1"/>
+        <c:numFmt formatCode="General" sourceLinked="1"/>
         <c:majorTickMark val="none"/>
+        <c:minorTickMark val="none"/>
         <c:tickLblPos val="nextTo"/>
         <c:spPr>
           <a:noFill/>
@@ -1315,23 +1473,25 @@
             <a:endParaRPr lang="pt-PT"/>
           </a:p>
         </c:txPr>
-        <c:crossAx val="73756672"/>
+        <c:crossAx val="-368769024"/>
         <c:crosses val="autoZero"/>
         <c:auto val="1"/>
         <c:lblAlgn val="ctr"/>
         <c:lblOffset val="100"/>
+        <c:noMultiLvlLbl val="0"/>
       </c:catAx>
       <c:valAx>
-        <c:axId val="73756672"/>
+        <c:axId val="-368769024"/>
         <c:scaling>
           <c:orientation val="minMax"/>
         </c:scaling>
         <c:delete val="1"/>
         <c:axPos val="l"/>
-        <c:numFmt formatCode="Estandar" sourceLinked="1"/>
+        <c:numFmt formatCode="General" sourceLinked="1"/>
         <c:majorTickMark val="none"/>
+        <c:minorTickMark val="none"/>
         <c:tickLblPos val="none"/>
-        <c:crossAx val="73750784"/>
+        <c:crossAx val="-368774464"/>
         <c:crosses val="autoZero"/>
         <c:crossBetween val="between"/>
       </c:valAx>
@@ -1345,6 +1505,7 @@
     </c:plotArea>
     <c:plotVisOnly val="1"/>
     <c:dispBlanksAs val="gap"/>
+    <c:showDLblsOverMax val="0"/>
   </c:chart>
   <c:spPr>
     <a:noFill/>
@@ -1363,13 +1524,25 @@
       <a:endParaRPr lang="pt-PT"/>
     </a:p>
   </c:txPr>
-  <c:externalData r:id="rId1"/>
+  <c:externalData r:id="rId3">
+    <c:autoUpdate val="0"/>
+  </c:externalData>
 </c:chartSpace>
 </file>
 
 <file path=ppt/charts/chart4.xml><?xml version="1.0" encoding="utf-8"?>
 <c:chartSpace xmlns:c="http://schemas.openxmlformats.org/drawingml/2006/chart" xmlns:a="http://schemas.openxmlformats.org/drawingml/2006/main" xmlns:r="http://schemas.openxmlformats.org/officeDocument/2006/relationships">
-  <c:lang val="pt-PT"/>
+  <c:date1904 val="0"/>
+  <c:lang val="en-US"/>
+  <c:roundedCorners val="0"/>
+  <mc:AlternateContent xmlns:mc="http://schemas.openxmlformats.org/markup-compatibility/2006">
+    <mc:Choice xmlns:c14="http://schemas.microsoft.com/office/drawing/2007/8/2/chart" Requires="c14">
+      <c14:style val="102"/>
+    </mc:Choice>
+    <mc:Fallback>
+      <c:style val="2"/>
+    </mc:Fallback>
+  </mc:AlternateContent>
   <c:chart>
     <c:autoTitleDeleted val="1"/>
     <c:plotArea>
@@ -1377,6 +1550,7 @@
       <c:barChart>
         <c:barDir val="col"/>
         <c:grouping val="clustered"/>
+        <c:varyColors val="0"/>
         <c:ser>
           <c:idx val="0"/>
           <c:order val="0"/>
@@ -1400,8 +1574,11 @@
             </a:ln>
             <a:effectLst/>
           </c:spPr>
+          <c:invertIfNegative val="0"/>
           <c:dPt>
             <c:idx val="7"/>
+            <c:invertIfNegative val="0"/>
+            <c:bubble3D val="0"/>
             <c:spPr>
               <a:solidFill>
                 <a:schemeClr val="accent1">
@@ -1450,7 +1627,7 @@
             <c:numRef>
               <c:f>'Team Log'!$F$23:$F$30</c:f>
               <c:numCache>
-                <c:formatCode>Estandar</c:formatCode>
+                <c:formatCode>General</c:formatCode>
                 <c:ptCount val="8"/>
                 <c:pt idx="0">
                   <c:v>40.5</c:v>
@@ -1503,8 +1680,11 @@
             </a:ln>
             <a:effectLst/>
           </c:spPr>
+          <c:invertIfNegative val="0"/>
           <c:dPt>
             <c:idx val="7"/>
+            <c:invertIfNegative val="0"/>
+            <c:bubble3D val="0"/>
             <c:spPr>
               <a:solidFill>
                 <a:schemeClr val="bg2">
@@ -1553,7 +1733,7 @@
             <c:numRef>
               <c:f>'Team Log'!$G$23:$G$30</c:f>
               <c:numCache>
-                <c:formatCode>Estandar</c:formatCode>
+                <c:formatCode>General</c:formatCode>
                 <c:ptCount val="8"/>
                 <c:pt idx="0">
                   <c:v>45.5</c:v>
@@ -1606,6 +1786,7 @@
             </a:ln>
             <a:effectLst/>
           </c:spPr>
+          <c:invertIfNegative val="0"/>
           <c:cat>
             <c:strRef>
               <c:f>'Team Log'!$E$23:$E$30</c:f>
@@ -1642,7 +1823,7 @@
             <c:numRef>
               <c:f>'Team Log'!$H$23:$H$30</c:f>
               <c:numCache>
-                <c:formatCode>Estandar</c:formatCode>
+                <c:formatCode>General</c:formatCode>
                 <c:ptCount val="8"/>
                 <c:pt idx="0">
                   <c:v>3</c:v>
@@ -1657,20 +1838,29 @@
             </c:numRef>
           </c:val>
         </c:ser>
-        <c:dLbls/>
+        <c:dLbls>
+          <c:showLegendKey val="0"/>
+          <c:showVal val="0"/>
+          <c:showCatName val="0"/>
+          <c:showSerName val="0"/>
+          <c:showPercent val="0"/>
+          <c:showBubbleSize val="0"/>
+        </c:dLbls>
         <c:gapWidth val="219"/>
         <c:overlap val="-27"/>
-        <c:axId val="77359744"/>
-        <c:axId val="77369728"/>
+        <c:axId val="-368771200"/>
+        <c:axId val="-368763040"/>
       </c:barChart>
       <c:catAx>
-        <c:axId val="77359744"/>
+        <c:axId val="-368771200"/>
         <c:scaling>
           <c:orientation val="minMax"/>
         </c:scaling>
+        <c:delete val="0"/>
         <c:axPos val="b"/>
-        <c:numFmt formatCode="Estandar" sourceLinked="1"/>
+        <c:numFmt formatCode="General" sourceLinked="1"/>
         <c:majorTickMark val="none"/>
+        <c:minorTickMark val="none"/>
         <c:tickLblPos val="nextTo"/>
         <c:spPr>
           <a:noFill/>
@@ -1705,17 +1895,19 @@
             <a:endParaRPr lang="pt-PT"/>
           </a:p>
         </c:txPr>
-        <c:crossAx val="77369728"/>
+        <c:crossAx val="-368763040"/>
         <c:crosses val="autoZero"/>
         <c:auto val="1"/>
         <c:lblAlgn val="ctr"/>
         <c:lblOffset val="100"/>
+        <c:noMultiLvlLbl val="0"/>
       </c:catAx>
       <c:valAx>
-        <c:axId val="77369728"/>
+        <c:axId val="-368763040"/>
         <c:scaling>
           <c:orientation val="minMax"/>
         </c:scaling>
+        <c:delete val="0"/>
         <c:axPos val="l"/>
         <c:majorGridlines>
           <c:spPr>
@@ -1731,8 +1923,9 @@
             <a:effectLst/>
           </c:spPr>
         </c:majorGridlines>
-        <c:numFmt formatCode="Estandar" sourceLinked="1"/>
+        <c:numFmt formatCode="General" sourceLinked="1"/>
         <c:majorTickMark val="none"/>
+        <c:minorTickMark val="none"/>
         <c:tickLblPos val="nextTo"/>
         <c:spPr>
           <a:noFill/>
@@ -1761,7 +1954,7 @@
             <a:endParaRPr lang="pt-PT"/>
           </a:p>
         </c:txPr>
-        <c:crossAx val="77359744"/>
+        <c:crossAx val="-368771200"/>
         <c:crosses val="autoZero"/>
         <c:crossBetween val="between"/>
       </c:valAx>
@@ -1775,7 +1968,7 @@
     </c:plotArea>
     <c:legend>
       <c:legendPos val="b"/>
-      <c:layout/>
+      <c:overlay val="0"/>
       <c:spPr>
         <a:noFill/>
         <a:ln>
@@ -1806,6 +1999,7 @@
     </c:legend>
     <c:plotVisOnly val="1"/>
     <c:dispBlanksAs val="gap"/>
+    <c:showDLblsOverMax val="0"/>
   </c:chart>
   <c:spPr>
     <a:noFill/>
@@ -1824,13 +2018,25 @@
       <a:endParaRPr lang="pt-PT"/>
     </a:p>
   </c:txPr>
-  <c:externalData r:id="rId1"/>
+  <c:externalData r:id="rId1">
+    <c:autoUpdate val="0"/>
+  </c:externalData>
 </c:chartSpace>
 </file>
 
 <file path=ppt/charts/chart5.xml><?xml version="1.0" encoding="utf-8"?>
 <c:chartSpace xmlns:c="http://schemas.openxmlformats.org/drawingml/2006/chart" xmlns:a="http://schemas.openxmlformats.org/drawingml/2006/main" xmlns:r="http://schemas.openxmlformats.org/officeDocument/2006/relationships">
-  <c:lang val="pt-PT"/>
+  <c:date1904 val="0"/>
+  <c:lang val="en-US"/>
+  <c:roundedCorners val="0"/>
+  <mc:AlternateContent xmlns:mc="http://schemas.openxmlformats.org/markup-compatibility/2006">
+    <mc:Choice xmlns:c14="http://schemas.microsoft.com/office/drawing/2007/8/2/chart" Requires="c14">
+      <c14:style val="102"/>
+    </mc:Choice>
+    <mc:Fallback>
+      <c:style val="2"/>
+    </mc:Fallback>
+  </mc:AlternateContent>
   <c:chart>
     <c:autoTitleDeleted val="1"/>
     <c:plotArea>
@@ -1899,7 +2105,7 @@
             <c:numRef>
               <c:f>Folha1!$C$2:$C$8</c:f>
               <c:numCache>
-                <c:formatCode>Estandar</c:formatCode>
+                <c:formatCode>General</c:formatCode>
                 <c:ptCount val="7"/>
                 <c:pt idx="0">
                   <c:v>5.5</c:v>
@@ -1925,6 +2131,7 @@
               </c:numCache>
             </c:numRef>
           </c:val>
+          <c:smooth val="0"/>
         </c:ser>
         <c:ser>
           <c:idx val="2"/>
@@ -1989,7 +2196,7 @@
             <c:numRef>
               <c:f>Folha1!$D$2:$D$8</c:f>
               <c:numCache>
-                <c:formatCode>Estandar</c:formatCode>
+                <c:formatCode>General</c:formatCode>
                 <c:ptCount val="7"/>
                 <c:pt idx="0">
                   <c:v>8.5</c:v>
@@ -2015,6 +2222,7 @@
               </c:numCache>
             </c:numRef>
           </c:val>
+          <c:smooth val="0"/>
         </c:ser>
         <c:ser>
           <c:idx val="3"/>
@@ -2098,7 +2306,7 @@
             <c:numRef>
               <c:f>Folha1!$E$2:$E$8</c:f>
               <c:numCache>
-                <c:formatCode>Estandar</c:formatCode>
+                <c:formatCode>General</c:formatCode>
                 <c:ptCount val="7"/>
                 <c:pt idx="0">
                   <c:v>6.615384615384615</c:v>
@@ -2124,8 +2332,16 @@
               </c:numCache>
             </c:numRef>
           </c:val>
+          <c:smooth val="0"/>
         </c:ser>
-        <c:dLbls/>
+        <c:dLbls>
+          <c:showLegendKey val="0"/>
+          <c:showVal val="0"/>
+          <c:showCatName val="0"/>
+          <c:showSerName val="0"/>
+          <c:showPercent val="0"/>
+          <c:showBubbleSize val="0"/>
+        </c:dLbls>
         <c:hiLowLines>
           <c:spPr>
             <a:ln w="9525" cap="flat" cmpd="sng" algn="ctr">
@@ -2140,17 +2356,19 @@
             <a:effectLst/>
           </c:spPr>
         </c:hiLowLines>
-        <c:axId val="82594816"/>
-        <c:axId val="82621184"/>
+        <c:axId val="-368761952"/>
+        <c:axId val="-368765216"/>
       </c:stockChart>
       <c:catAx>
-        <c:axId val="82594816"/>
+        <c:axId val="-368761952"/>
         <c:scaling>
           <c:orientation val="minMax"/>
         </c:scaling>
+        <c:delete val="0"/>
         <c:axPos val="b"/>
-        <c:numFmt formatCode="Estandar" sourceLinked="1"/>
+        <c:numFmt formatCode="General" sourceLinked="1"/>
         <c:majorTickMark val="none"/>
+        <c:minorTickMark val="none"/>
         <c:tickLblPos val="nextTo"/>
         <c:spPr>
           <a:noFill/>
@@ -2185,17 +2403,19 @@
             <a:endParaRPr lang="pt-PT"/>
           </a:p>
         </c:txPr>
-        <c:crossAx val="82621184"/>
+        <c:crossAx val="-368765216"/>
         <c:crosses val="autoZero"/>
         <c:auto val="1"/>
         <c:lblAlgn val="ctr"/>
         <c:lblOffset val="100"/>
+        <c:noMultiLvlLbl val="0"/>
       </c:catAx>
       <c:valAx>
-        <c:axId val="82621184"/>
+        <c:axId val="-368765216"/>
         <c:scaling>
           <c:orientation val="minMax"/>
         </c:scaling>
+        <c:delete val="0"/>
         <c:axPos val="l"/>
         <c:majorGridlines>
           <c:spPr>
@@ -2211,8 +2431,9 @@
             <a:effectLst/>
           </c:spPr>
         </c:majorGridlines>
-        <c:numFmt formatCode="Estandar" sourceLinked="1"/>
+        <c:numFmt formatCode="General" sourceLinked="1"/>
         <c:majorTickMark val="none"/>
+        <c:minorTickMark val="none"/>
         <c:tickLblPos val="nextTo"/>
         <c:spPr>
           <a:noFill/>
@@ -2241,7 +2462,7 @@
             <a:endParaRPr lang="pt-PT"/>
           </a:p>
         </c:txPr>
-        <c:crossAx val="82594816"/>
+        <c:crossAx val="-368761952"/>
         <c:crosses val="autoZero"/>
         <c:crossBetween val="between"/>
         <c:majorUnit val="1"/>
@@ -2257,6 +2478,7 @@
     </c:plotArea>
     <c:plotVisOnly val="1"/>
     <c:dispBlanksAs val="gap"/>
+    <c:showDLblsOverMax val="0"/>
   </c:chart>
   <c:spPr>
     <a:noFill/>
@@ -2275,14 +2497,25 @@
       <a:endParaRPr lang="pt-PT"/>
     </a:p>
   </c:txPr>
-  <c:externalData r:id="rId1"/>
+  <c:externalData r:id="rId1">
+    <c:autoUpdate val="0"/>
+  </c:externalData>
 </c:chartSpace>
 </file>
 
 <file path=ppt/charts/chart6.xml><?xml version="1.0" encoding="utf-8"?>
 <c:chartSpace xmlns:c="http://schemas.openxmlformats.org/drawingml/2006/chart" xmlns:a="http://schemas.openxmlformats.org/drawingml/2006/main" xmlns:r="http://schemas.openxmlformats.org/officeDocument/2006/relationships">
-  <c:lang val="pt-PT"/>
-  <c:style val="34"/>
+  <c:date1904 val="0"/>
+  <c:lang val="en-US"/>
+  <c:roundedCorners val="0"/>
+  <mc:AlternateContent xmlns:mc="http://schemas.openxmlformats.org/markup-compatibility/2006">
+    <mc:Choice xmlns:c14="http://schemas.microsoft.com/office/drawing/2007/8/2/chart" Requires="c14">
+      <c14:style val="134"/>
+    </mc:Choice>
+    <mc:Fallback>
+      <c:style val="34"/>
+    </mc:Fallback>
+  </mc:AlternateContent>
   <c:chart>
     <c:title>
       <c:tx>
@@ -2300,8 +2533,9 @@
           </a:p>
         </c:rich>
       </c:tx>
-      <c:layout/>
+      <c:overlay val="0"/>
     </c:title>
+    <c:autoTitleDeleted val="0"/>
     <c:plotArea>
       <c:layout>
         <c:manualLayout>
@@ -2340,12 +2574,15 @@
               <a:effectLst/>
             </c:spPr>
             <c:dLblPos val="bestFit"/>
+            <c:showLegendKey val="0"/>
+            <c:showVal val="0"/>
+            <c:showCatName val="0"/>
+            <c:showSerName val="0"/>
             <c:showPercent val="1"/>
+            <c:showBubbleSize val="0"/>
             <c:showLeaderLines val="1"/>
             <c:extLst>
-              <c:ext xmlns:c15="http://schemas.microsoft.com/office/drawing/2012/chart" uri="{CE6537A1-D6FC-4f65-9D91-7224C49458BB}">
-                <c15:layout/>
-              </c:ext>
+              <c:ext xmlns:c15="http://schemas.microsoft.com/office/drawing/2012/chart" uri="{CE6537A1-D6FC-4f65-9D91-7224C49458BB}"/>
             </c:extLst>
           </c:dLbls>
           <c:cat>
@@ -2372,7 +2609,7 @@
             <c:numRef>
               <c:f>Folha1!$B$2:$B$5</c:f>
               <c:numCache>
-                <c:formatCode>Estandar</c:formatCode>
+                <c:formatCode>General</c:formatCode>
                 <c:ptCount val="4"/>
                 <c:pt idx="0">
                   <c:v>46</c:v>
@@ -2391,7 +2628,13 @@
           </c:val>
         </c:ser>
         <c:dLbls>
+          <c:showLegendKey val="0"/>
+          <c:showVal val="0"/>
+          <c:showCatName val="0"/>
+          <c:showSerName val="0"/>
           <c:showPercent val="1"/>
+          <c:showBubbleSize val="0"/>
+          <c:showLeaderLines val="1"/>
         </c:dLbls>
         <c:gapWidth val="150"/>
         <c:secondPieSize val="75"/>
@@ -2410,11 +2653,15 @@
           <c:h val="6.8887289088863907E-2"/>
         </c:manualLayout>
       </c:layout>
+      <c:overlay val="0"/>
     </c:legend>
     <c:plotVisOnly val="1"/>
     <c:dispBlanksAs val="zero"/>
+    <c:showDLblsOverMax val="0"/>
   </c:chart>
-  <c:externalData r:id="rId1"/>
+  <c:externalData r:id="rId1">
+    <c:autoUpdate val="0"/>
+  </c:externalData>
 </c:chartSpace>
 </file>
 
@@ -5327,21 +5574,21 @@
     </dgm:pt>
   </dgm:ptLst>
   <dgm:cxnLst>
+    <dgm:cxn modelId="{1FFE94F7-1A23-436C-BE75-E8E800979E17}" srcId="{C306C341-D599-4B1B-99D5-C33838902528}" destId="{2FDC2C24-CC4E-4D25-B09B-59FD6E82C3EE}" srcOrd="1" destOrd="0" parTransId="{E7F2584E-86F9-4ED7-9B8D-A99EC47827F9}" sibTransId="{81A6B66D-8321-4A73-A293-0D29707D523C}"/>
+    <dgm:cxn modelId="{74AB5348-BE90-4678-A34C-0914E1E30C30}" type="presOf" srcId="{D7A1B3F6-9A96-443D-918B-6A83D726860E}" destId="{6810232A-C069-4BBA-BBD2-7BC82D197AC8}" srcOrd="0" destOrd="0" presId="urn:microsoft.com/office/officeart/2005/8/layout/hProcess11"/>
+    <dgm:cxn modelId="{30F53C6F-EC07-427E-851F-3E97E605AFC9}" srcId="{C306C341-D599-4B1B-99D5-C33838902528}" destId="{454E9A41-EB5C-4D21-A500-1A0F7280DF0F}" srcOrd="6" destOrd="0" parTransId="{1E224352-DCA1-4654-B392-6D76C795B7BE}" sibTransId="{AA42D578-BCA4-460B-AE10-0875155B9415}"/>
+    <dgm:cxn modelId="{8B924237-C27F-443D-B948-7413A94D4D27}" type="presOf" srcId="{136AD6A2-B441-479A-860B-9C60598DF083}" destId="{DF520769-FC51-4284-84DC-D345C7025315}" srcOrd="0" destOrd="0" presId="urn:microsoft.com/office/officeart/2005/8/layout/hProcess11"/>
+    <dgm:cxn modelId="{A8E9508F-E201-4F3A-B45C-83967300D4A6}" type="presOf" srcId="{BB8E58C9-394E-4BB7-956B-15FD8F0F4DF6}" destId="{F622832A-050B-4EB9-99E6-8F1AAFA7A166}" srcOrd="0" destOrd="0" presId="urn:microsoft.com/office/officeart/2005/8/layout/hProcess11"/>
+    <dgm:cxn modelId="{FB5D8D0E-9186-481B-B91B-876243A2F8C3}" srcId="{C306C341-D599-4B1B-99D5-C33838902528}" destId="{9059B768-CD7D-43D2-80D2-6FDF0EAA0156}" srcOrd="2" destOrd="0" parTransId="{1EDF92A5-B373-4C08-A41F-FC4842BC317C}" sibTransId="{7F219E18-92F5-4220-8440-CDF23E2C86DD}"/>
+    <dgm:cxn modelId="{7DB08E90-EBF1-4B81-81C1-240E3FCE3996}" type="presOf" srcId="{C306C341-D599-4B1B-99D5-C33838902528}" destId="{6BAF5AC4-12C4-475D-890B-181061458B36}" srcOrd="0" destOrd="0" presId="urn:microsoft.com/office/officeart/2005/8/layout/hProcess11"/>
+    <dgm:cxn modelId="{2531456E-1B85-4C5E-8AF6-C60E58F43067}" srcId="{C306C341-D599-4B1B-99D5-C33838902528}" destId="{BB8E58C9-394E-4BB7-956B-15FD8F0F4DF6}" srcOrd="3" destOrd="0" parTransId="{A1E3FDCD-492B-4046-91FD-A19D4F38F245}" sibTransId="{1808AAF0-8272-4577-B8B5-78D78CC4E805}"/>
     <dgm:cxn modelId="{531B340F-8630-438B-9B38-8C2716FAD3B4}" type="presOf" srcId="{9059B768-CD7D-43D2-80D2-6FDF0EAA0156}" destId="{49B98997-A726-433D-94FF-467BFB2ADCAF}" srcOrd="0" destOrd="0" presId="urn:microsoft.com/office/officeart/2005/8/layout/hProcess11"/>
+    <dgm:cxn modelId="{B9E36F7A-BBBE-4C6F-BF41-35D339983B88}" type="presOf" srcId="{1A49080C-0DE7-47E8-922A-4D0B1B6C485A}" destId="{50085456-D334-4C9E-B8C2-A46683D1A093}" srcOrd="0" destOrd="0" presId="urn:microsoft.com/office/officeart/2005/8/layout/hProcess11"/>
     <dgm:cxn modelId="{48AC722D-ACE2-4875-8C63-0C6D0EFEC009}" srcId="{C306C341-D599-4B1B-99D5-C33838902528}" destId="{136AD6A2-B441-479A-860B-9C60598DF083}" srcOrd="5" destOrd="0" parTransId="{B3AAAF1D-C6F6-49CE-A21B-B1132F4E369E}" sibTransId="{B013FFB8-9869-4AB3-A2B5-FDAEE2CD0557}"/>
-    <dgm:cxn modelId="{2531456E-1B85-4C5E-8AF6-C60E58F43067}" srcId="{C306C341-D599-4B1B-99D5-C33838902528}" destId="{BB8E58C9-394E-4BB7-956B-15FD8F0F4DF6}" srcOrd="3" destOrd="0" parTransId="{A1E3FDCD-492B-4046-91FD-A19D4F38F245}" sibTransId="{1808AAF0-8272-4577-B8B5-78D78CC4E805}"/>
-    <dgm:cxn modelId="{B9E36F7A-BBBE-4C6F-BF41-35D339983B88}" type="presOf" srcId="{1A49080C-0DE7-47E8-922A-4D0B1B6C485A}" destId="{50085456-D334-4C9E-B8C2-A46683D1A093}" srcOrd="0" destOrd="0" presId="urn:microsoft.com/office/officeart/2005/8/layout/hProcess11"/>
-    <dgm:cxn modelId="{FB5D8D0E-9186-481B-B91B-876243A2F8C3}" srcId="{C306C341-D599-4B1B-99D5-C33838902528}" destId="{9059B768-CD7D-43D2-80D2-6FDF0EAA0156}" srcOrd="2" destOrd="0" parTransId="{1EDF92A5-B373-4C08-A41F-FC4842BC317C}" sibTransId="{7F219E18-92F5-4220-8440-CDF23E2C86DD}"/>
     <dgm:cxn modelId="{02A0FDDF-750D-4E70-AEEE-212E089D8451}" srcId="{C306C341-D599-4B1B-99D5-C33838902528}" destId="{D7A1B3F6-9A96-443D-918B-6A83D726860E}" srcOrd="0" destOrd="0" parTransId="{E621CA8E-4955-42BA-A043-EA33F0C1521B}" sibTransId="{39AA8962-6813-4284-95C5-BF4AE6D9DB14}"/>
+    <dgm:cxn modelId="{4EF651BC-29A7-4411-A2C1-5D5C76CDC2E0}" type="presOf" srcId="{454E9A41-EB5C-4D21-A500-1A0F7280DF0F}" destId="{03D8AACE-E855-4D1F-9736-1957EAD159E9}" srcOrd="0" destOrd="0" presId="urn:microsoft.com/office/officeart/2005/8/layout/hProcess11"/>
+    <dgm:cxn modelId="{5B4D9666-1585-4473-894E-27F0786F7A9C}" srcId="{C306C341-D599-4B1B-99D5-C33838902528}" destId="{1A49080C-0DE7-47E8-922A-4D0B1B6C485A}" srcOrd="4" destOrd="0" parTransId="{F7B8845B-EEB5-4952-882F-D415FAF8B60E}" sibTransId="{1A70AC7A-7F03-4D55-B5D0-E2003D1A4324}"/>
     <dgm:cxn modelId="{767A3C01-869E-45E9-9525-49AE88355A73}" type="presOf" srcId="{2FDC2C24-CC4E-4D25-B09B-59FD6E82C3EE}" destId="{D9A28F98-9710-4524-B177-E78A77379D8B}" srcOrd="0" destOrd="0" presId="urn:microsoft.com/office/officeart/2005/8/layout/hProcess11"/>
-    <dgm:cxn modelId="{74AB5348-BE90-4678-A34C-0914E1E30C30}" type="presOf" srcId="{D7A1B3F6-9A96-443D-918B-6A83D726860E}" destId="{6810232A-C069-4BBA-BBD2-7BC82D197AC8}" srcOrd="0" destOrd="0" presId="urn:microsoft.com/office/officeart/2005/8/layout/hProcess11"/>
-    <dgm:cxn modelId="{5B4D9666-1585-4473-894E-27F0786F7A9C}" srcId="{C306C341-D599-4B1B-99D5-C33838902528}" destId="{1A49080C-0DE7-47E8-922A-4D0B1B6C485A}" srcOrd="4" destOrd="0" parTransId="{F7B8845B-EEB5-4952-882F-D415FAF8B60E}" sibTransId="{1A70AC7A-7F03-4D55-B5D0-E2003D1A4324}"/>
-    <dgm:cxn modelId="{8B924237-C27F-443D-B948-7413A94D4D27}" type="presOf" srcId="{136AD6A2-B441-479A-860B-9C60598DF083}" destId="{DF520769-FC51-4284-84DC-D345C7025315}" srcOrd="0" destOrd="0" presId="urn:microsoft.com/office/officeart/2005/8/layout/hProcess11"/>
-    <dgm:cxn modelId="{30F53C6F-EC07-427E-851F-3E97E605AFC9}" srcId="{C306C341-D599-4B1B-99D5-C33838902528}" destId="{454E9A41-EB5C-4D21-A500-1A0F7280DF0F}" srcOrd="6" destOrd="0" parTransId="{1E224352-DCA1-4654-B392-6D76C795B7BE}" sibTransId="{AA42D578-BCA4-460B-AE10-0875155B9415}"/>
-    <dgm:cxn modelId="{4EF651BC-29A7-4411-A2C1-5D5C76CDC2E0}" type="presOf" srcId="{454E9A41-EB5C-4D21-A500-1A0F7280DF0F}" destId="{03D8AACE-E855-4D1F-9736-1957EAD159E9}" srcOrd="0" destOrd="0" presId="urn:microsoft.com/office/officeart/2005/8/layout/hProcess11"/>
-    <dgm:cxn modelId="{1FFE94F7-1A23-436C-BE75-E8E800979E17}" srcId="{C306C341-D599-4B1B-99D5-C33838902528}" destId="{2FDC2C24-CC4E-4D25-B09B-59FD6E82C3EE}" srcOrd="1" destOrd="0" parTransId="{E7F2584E-86F9-4ED7-9B8D-A99EC47827F9}" sibTransId="{81A6B66D-8321-4A73-A293-0D29707D523C}"/>
-    <dgm:cxn modelId="{A8E9508F-E201-4F3A-B45C-83967300D4A6}" type="presOf" srcId="{BB8E58C9-394E-4BB7-956B-15FD8F0F4DF6}" destId="{F622832A-050B-4EB9-99E6-8F1AAFA7A166}" srcOrd="0" destOrd="0" presId="urn:microsoft.com/office/officeart/2005/8/layout/hProcess11"/>
-    <dgm:cxn modelId="{7DB08E90-EBF1-4B81-81C1-240E3FCE3996}" type="presOf" srcId="{C306C341-D599-4B1B-99D5-C33838902528}" destId="{6BAF5AC4-12C4-475D-890B-181061458B36}" srcOrd="0" destOrd="0" presId="urn:microsoft.com/office/officeart/2005/8/layout/hProcess11"/>
     <dgm:cxn modelId="{B10D7C1E-A564-43B7-8CF6-53A3B45427EA}" type="presParOf" srcId="{6BAF5AC4-12C4-475D-890B-181061458B36}" destId="{60799F41-7989-4AA1-B9E8-4EF51F0FF333}" srcOrd="0" destOrd="0" presId="urn:microsoft.com/office/officeart/2005/8/layout/hProcess11"/>
     <dgm:cxn modelId="{3D4CF2F4-D5DA-4E6E-B60C-17291E4CBF35}" type="presParOf" srcId="{6BAF5AC4-12C4-475D-890B-181061458B36}" destId="{5CCD0D81-360B-4CC0-98C6-6C8129CE7187}" srcOrd="1" destOrd="0" presId="urn:microsoft.com/office/officeart/2005/8/layout/hProcess11"/>
     <dgm:cxn modelId="{CB43A1D7-7FEB-4CF0-8076-B30824FA5BA7}" type="presParOf" srcId="{5CCD0D81-360B-4CC0-98C6-6C8129CE7187}" destId="{1683355D-447B-4404-8E2E-EE43BAA2B137}" srcOrd="0" destOrd="0" presId="urn:microsoft.com/office/officeart/2005/8/layout/hProcess11"/>
@@ -5383,14 +5630,14 @@
   <dgm:whole/>
   <dgm:extLst>
     <a:ext uri="http://schemas.microsoft.com/office/drawing/2008/diagram">
-      <dsp:dataModelExt xmlns:dsp="http://schemas.microsoft.com/office/drawing/2008/diagram" xmlns="" relId="rId6" minVer="http://schemas.openxmlformats.org/drawingml/2006/diagram"/>
+      <dsp:dataModelExt xmlns:dsp="http://schemas.microsoft.com/office/drawing/2008/diagram" relId="rId6" minVer="http://schemas.openxmlformats.org/drawingml/2006/diagram"/>
     </a:ext>
   </dgm:extLst>
 </dgm:dataModel>
 </file>
 
 <file path=ppt/diagrams/drawing1.xml><?xml version="1.0" encoding="utf-8"?>
-<dsp:drawing xmlns:dgm="http://schemas.openxmlformats.org/drawingml/2006/diagram" xmlns:a="http://schemas.openxmlformats.org/drawingml/2006/main" xmlns:dsp="http://schemas.microsoft.com/office/drawing/2008/diagram">
+<dsp:drawing xmlns:dgm="http://schemas.openxmlformats.org/drawingml/2006/diagram" xmlns:dsp="http://schemas.microsoft.com/office/drawing/2008/diagram" xmlns:a="http://schemas.openxmlformats.org/drawingml/2006/main">
   <dsp:spTree>
     <dsp:nvGrpSpPr>
       <dsp:cNvPr id="0" name=""/>
@@ -7565,7 +7812,7 @@
             <a:fld id="{82948236-07A4-447C-AC43-06AAF24DC65B}" type="datetimeFigureOut">
               <a:rPr lang="pt-PT" smtClean="0"/>
               <a:pPr/>
-              <a:t>02-07-2013</a:t>
+              <a:t>02/07/2013</a:t>
             </a:fld>
             <a:endParaRPr lang="pt-PT"/>
           </a:p>
@@ -7725,7 +7972,7 @@
             <a:fld id="{0E4FF081-3A8B-4019-8856-6C60FECB4303}" type="slidenum">
               <a:rPr lang="pt-PT" smtClean="0"/>
               <a:pPr/>
-              <a:t>‹nº›</a:t>
+              <a:t>‹#›</a:t>
             </a:fld>
             <a:endParaRPr lang="pt-PT"/>
           </a:p>
@@ -7734,7 +7981,7 @@
     </p:spTree>
     <p:extLst>
       <p:ext uri="{BB962C8B-B14F-4D97-AF65-F5344CB8AC3E}">
-        <p14:creationId xmlns:p14="http://schemas.microsoft.com/office/powerpoint/2010/main" xmlns="" val="2332033991"/>
+        <p14:creationId xmlns:p14="http://schemas.microsoft.com/office/powerpoint/2010/main" val="2332033991"/>
       </p:ext>
     </p:extLst>
   </p:cSld>
@@ -8209,7 +8456,7 @@
     </p:spTree>
     <p:extLst>
       <p:ext uri="{BB962C8B-B14F-4D97-AF65-F5344CB8AC3E}">
-        <p14:creationId xmlns:p14="http://schemas.microsoft.com/office/powerpoint/2010/main" xmlns="" val="2905257727"/>
+        <p14:creationId xmlns:p14="http://schemas.microsoft.com/office/powerpoint/2010/main" val="2905257727"/>
       </p:ext>
     </p:extLst>
   </p:cSld>
@@ -8429,7 +8676,7 @@
     </p:spTree>
     <p:extLst>
       <p:ext uri="{BB962C8B-B14F-4D97-AF65-F5344CB8AC3E}">
-        <p14:creationId xmlns:p14="http://schemas.microsoft.com/office/powerpoint/2010/main" xmlns="" val="4251687254"/>
+        <p14:creationId xmlns:p14="http://schemas.microsoft.com/office/powerpoint/2010/main" val="4251687254"/>
       </p:ext>
     </p:extLst>
   </p:cSld>
@@ -8514,7 +8761,7 @@
     </p:spTree>
     <p:extLst>
       <p:ext uri="{BB962C8B-B14F-4D97-AF65-F5344CB8AC3E}">
-        <p14:creationId xmlns:p14="http://schemas.microsoft.com/office/powerpoint/2010/main" xmlns="" val="2118353209"/>
+        <p14:creationId xmlns:p14="http://schemas.microsoft.com/office/powerpoint/2010/main" val="2118353209"/>
       </p:ext>
     </p:extLst>
   </p:cSld>
@@ -8599,7 +8846,7 @@
     </p:spTree>
     <p:extLst>
       <p:ext uri="{BB962C8B-B14F-4D97-AF65-F5344CB8AC3E}">
-        <p14:creationId xmlns:p14="http://schemas.microsoft.com/office/powerpoint/2010/main" xmlns="" val="1216955315"/>
+        <p14:creationId xmlns:p14="http://schemas.microsoft.com/office/powerpoint/2010/main" val="1216955315"/>
       </p:ext>
     </p:extLst>
   </p:cSld>
@@ -8759,7 +9006,7 @@
     </p:spTree>
     <p:extLst>
       <p:ext uri="{BB962C8B-B14F-4D97-AF65-F5344CB8AC3E}">
-        <p14:creationId xmlns:p14="http://schemas.microsoft.com/office/powerpoint/2010/main" xmlns="" val="4072347644"/>
+        <p14:creationId xmlns:p14="http://schemas.microsoft.com/office/powerpoint/2010/main" val="4072347644"/>
       </p:ext>
     </p:extLst>
   </p:cSld>
@@ -8844,7 +9091,7 @@
     </p:spTree>
     <p:extLst>
       <p:ext uri="{BB962C8B-B14F-4D97-AF65-F5344CB8AC3E}">
-        <p14:creationId xmlns:p14="http://schemas.microsoft.com/office/powerpoint/2010/main" xmlns="" val="2598853279"/>
+        <p14:creationId xmlns:p14="http://schemas.microsoft.com/office/powerpoint/2010/main" val="2598853279"/>
       </p:ext>
     </p:extLst>
   </p:cSld>
@@ -8929,7 +9176,7 @@
     </p:spTree>
     <p:extLst>
       <p:ext uri="{BB962C8B-B14F-4D97-AF65-F5344CB8AC3E}">
-        <p14:creationId xmlns:p14="http://schemas.microsoft.com/office/powerpoint/2010/main" xmlns="" val="3001826006"/>
+        <p14:creationId xmlns:p14="http://schemas.microsoft.com/office/powerpoint/2010/main" val="3001826006"/>
       </p:ext>
     </p:extLst>
   </p:cSld>
@@ -9014,7 +9261,7 @@
     </p:spTree>
     <p:extLst>
       <p:ext uri="{BB962C8B-B14F-4D97-AF65-F5344CB8AC3E}">
-        <p14:creationId xmlns:p14="http://schemas.microsoft.com/office/powerpoint/2010/main" xmlns="" val="3337223467"/>
+        <p14:creationId xmlns:p14="http://schemas.microsoft.com/office/powerpoint/2010/main" val="3337223467"/>
       </p:ext>
     </p:extLst>
   </p:cSld>
@@ -9099,7 +9346,7 @@
     </p:spTree>
     <p:extLst>
       <p:ext uri="{BB962C8B-B14F-4D97-AF65-F5344CB8AC3E}">
-        <p14:creationId xmlns:p14="http://schemas.microsoft.com/office/powerpoint/2010/main" xmlns="" val="2724149497"/>
+        <p14:creationId xmlns:p14="http://schemas.microsoft.com/office/powerpoint/2010/main" val="2724149497"/>
       </p:ext>
     </p:extLst>
   </p:cSld>
@@ -9220,7 +9467,7 @@
     </p:spTree>
     <p:extLst>
       <p:ext uri="{BB962C8B-B14F-4D97-AF65-F5344CB8AC3E}">
-        <p14:creationId xmlns:p14="http://schemas.microsoft.com/office/powerpoint/2010/main" xmlns="" val="572649040"/>
+        <p14:creationId xmlns:p14="http://schemas.microsoft.com/office/powerpoint/2010/main" val="572649040"/>
       </p:ext>
     </p:extLst>
   </p:cSld>
@@ -9394,7 +9641,7 @@
     </p:spTree>
     <p:extLst>
       <p:ext uri="{BB962C8B-B14F-4D97-AF65-F5344CB8AC3E}">
-        <p14:creationId xmlns:p14="http://schemas.microsoft.com/office/powerpoint/2010/main" xmlns="" val="474988129"/>
+        <p14:creationId xmlns:p14="http://schemas.microsoft.com/office/powerpoint/2010/main" val="474988129"/>
       </p:ext>
     </p:extLst>
   </p:cSld>
@@ -9514,7 +9761,7 @@
     </p:spTree>
     <p:extLst>
       <p:ext uri="{BB962C8B-B14F-4D97-AF65-F5344CB8AC3E}">
-        <p14:creationId xmlns:p14="http://schemas.microsoft.com/office/powerpoint/2010/main" xmlns="" val="3919745491"/>
+        <p14:creationId xmlns:p14="http://schemas.microsoft.com/office/powerpoint/2010/main" val="3919745491"/>
       </p:ext>
     </p:extLst>
   </p:cSld>
@@ -9757,7 +10004,7 @@
     </p:spTree>
     <p:extLst>
       <p:ext uri="{BB962C8B-B14F-4D97-AF65-F5344CB8AC3E}">
-        <p14:creationId xmlns:p14="http://schemas.microsoft.com/office/powerpoint/2010/main" xmlns="" val="2006419056"/>
+        <p14:creationId xmlns:p14="http://schemas.microsoft.com/office/powerpoint/2010/main" val="2006419056"/>
       </p:ext>
     </p:extLst>
   </p:cSld>
@@ -9846,7 +10093,7 @@
     </p:spTree>
     <p:extLst>
       <p:ext uri="{BB962C8B-B14F-4D97-AF65-F5344CB8AC3E}">
-        <p14:creationId xmlns:p14="http://schemas.microsoft.com/office/powerpoint/2010/main" xmlns="" val="1979049812"/>
+        <p14:creationId xmlns:p14="http://schemas.microsoft.com/office/powerpoint/2010/main" val="1979049812"/>
       </p:ext>
     </p:extLst>
   </p:cSld>
@@ -9957,7 +10204,7 @@
     </p:spTree>
     <p:extLst>
       <p:ext uri="{BB962C8B-B14F-4D97-AF65-F5344CB8AC3E}">
-        <p14:creationId xmlns:p14="http://schemas.microsoft.com/office/powerpoint/2010/main" xmlns="" val="736461960"/>
+        <p14:creationId xmlns:p14="http://schemas.microsoft.com/office/powerpoint/2010/main" val="736461960"/>
       </p:ext>
     </p:extLst>
   </p:cSld>
@@ -10046,7 +10293,7 @@
     </p:spTree>
     <p:extLst>
       <p:ext uri="{BB962C8B-B14F-4D97-AF65-F5344CB8AC3E}">
-        <p14:creationId xmlns:p14="http://schemas.microsoft.com/office/powerpoint/2010/main" xmlns="" val="184239105"/>
+        <p14:creationId xmlns:p14="http://schemas.microsoft.com/office/powerpoint/2010/main" val="184239105"/>
       </p:ext>
     </p:extLst>
   </p:cSld>
@@ -10085,7 +10332,7 @@
           <a:blip r:embed="rId2" cstate="print">
             <a:extLst>
               <a:ext uri="{28A0092B-C50C-407E-A947-70E740481C1C}">
-                <a14:useLocalDpi xmlns:a14="http://schemas.microsoft.com/office/drawing/2010/main" xmlns="" val="0"/>
+                <a14:useLocalDpi xmlns:a14="http://schemas.microsoft.com/office/drawing/2010/main" val="0"/>
               </a:ext>
             </a:extLst>
           </a:blip>
@@ -10281,7 +10528,7 @@
             <a:fld id="{F71B3DB1-8543-40E0-A2D1-830196AD91DE}" type="datetimeFigureOut">
               <a:rPr lang="pt-PT" smtClean="0"/>
               <a:pPr/>
-              <a:t>02-07-2013</a:t>
+              <a:t>02/07/2013</a:t>
             </a:fld>
             <a:endParaRPr lang="pt-PT" dirty="0"/>
           </a:p>
@@ -10334,7 +10581,7 @@
             <a:fld id="{5D26EDD4-363A-4236-A170-49C0FA725754}" type="slidenum">
               <a:rPr lang="pt-PT" smtClean="0"/>
               <a:pPr/>
-              <a:t>‹nº›</a:t>
+              <a:t>‹#›</a:t>
             </a:fld>
             <a:endParaRPr lang="pt-PT" dirty="0"/>
           </a:p>
@@ -10381,7 +10628,7 @@
     </p:spTree>
     <p:extLst>
       <p:ext uri="{BB962C8B-B14F-4D97-AF65-F5344CB8AC3E}">
-        <p14:creationId xmlns:p14="http://schemas.microsoft.com/office/powerpoint/2010/main" xmlns="" val="4283900998"/>
+        <p14:creationId xmlns:p14="http://schemas.microsoft.com/office/powerpoint/2010/main" val="4283900998"/>
       </p:ext>
     </p:extLst>
   </p:cSld>
@@ -10615,7 +10862,7 @@
             <a:fld id="{F71B3DB1-8543-40E0-A2D1-830196AD91DE}" type="datetimeFigureOut">
               <a:rPr lang="pt-PT" smtClean="0"/>
               <a:pPr/>
-              <a:t>02-07-2013</a:t>
+              <a:t>02/07/2013</a:t>
             </a:fld>
             <a:endParaRPr lang="pt-PT" dirty="0"/>
           </a:p>
@@ -10658,7 +10905,7 @@
             <a:fld id="{5D26EDD4-363A-4236-A170-49C0FA725754}" type="slidenum">
               <a:rPr lang="pt-PT" smtClean="0"/>
               <a:pPr/>
-              <a:t>‹nº›</a:t>
+              <a:t>‹#›</a:t>
             </a:fld>
             <a:endParaRPr lang="pt-PT" dirty="0"/>
           </a:p>
@@ -10667,7 +10914,7 @@
     </p:spTree>
     <p:extLst>
       <p:ext uri="{BB962C8B-B14F-4D97-AF65-F5344CB8AC3E}">
-        <p14:creationId xmlns:p14="http://schemas.microsoft.com/office/powerpoint/2010/main" xmlns="" val="3834483316"/>
+        <p14:creationId xmlns:p14="http://schemas.microsoft.com/office/powerpoint/2010/main" val="3834483316"/>
       </p:ext>
     </p:extLst>
   </p:cSld>
@@ -10865,7 +11112,7 @@
             <a:fld id="{F71B3DB1-8543-40E0-A2D1-830196AD91DE}" type="datetimeFigureOut">
               <a:rPr lang="pt-PT" smtClean="0"/>
               <a:pPr/>
-              <a:t>02-07-2013</a:t>
+              <a:t>02/07/2013</a:t>
             </a:fld>
             <a:endParaRPr lang="pt-PT" dirty="0"/>
           </a:p>
@@ -10908,7 +11155,7 @@
             <a:fld id="{5D26EDD4-363A-4236-A170-49C0FA725754}" type="slidenum">
               <a:rPr lang="pt-PT" smtClean="0"/>
               <a:pPr/>
-              <a:t>‹nº›</a:t>
+              <a:t>‹#›</a:t>
             </a:fld>
             <a:endParaRPr lang="pt-PT" dirty="0"/>
           </a:p>
@@ -10955,7 +11202,7 @@
     </p:spTree>
     <p:extLst>
       <p:ext uri="{BB962C8B-B14F-4D97-AF65-F5344CB8AC3E}">
-        <p14:creationId xmlns:p14="http://schemas.microsoft.com/office/powerpoint/2010/main" xmlns="" val="3278742630"/>
+        <p14:creationId xmlns:p14="http://schemas.microsoft.com/office/powerpoint/2010/main" val="3278742630"/>
       </p:ext>
     </p:extLst>
   </p:cSld>
@@ -11213,7 +11460,7 @@
             <a:fld id="{F71B3DB1-8543-40E0-A2D1-830196AD91DE}" type="datetimeFigureOut">
               <a:rPr lang="pt-PT" smtClean="0"/>
               <a:pPr/>
-              <a:t>02-07-2013</a:t>
+              <a:t>02/07/2013</a:t>
             </a:fld>
             <a:endParaRPr lang="pt-PT" dirty="0"/>
           </a:p>
@@ -11256,7 +11503,7 @@
             <a:fld id="{5D26EDD4-363A-4236-A170-49C0FA725754}" type="slidenum">
               <a:rPr lang="pt-PT" smtClean="0"/>
               <a:pPr/>
-              <a:t>‹nº›</a:t>
+              <a:t>‹#›</a:t>
             </a:fld>
             <a:endParaRPr lang="pt-PT" dirty="0"/>
           </a:p>
@@ -11371,7 +11618,7 @@
     </p:spTree>
     <p:extLst>
       <p:ext uri="{BB962C8B-B14F-4D97-AF65-F5344CB8AC3E}">
-        <p14:creationId xmlns:p14="http://schemas.microsoft.com/office/powerpoint/2010/main" xmlns="" val="1960482330"/>
+        <p14:creationId xmlns:p14="http://schemas.microsoft.com/office/powerpoint/2010/main" val="1960482330"/>
       </p:ext>
     </p:extLst>
   </p:cSld>
@@ -11569,7 +11816,7 @@
             <a:fld id="{F71B3DB1-8543-40E0-A2D1-830196AD91DE}" type="datetimeFigureOut">
               <a:rPr lang="pt-PT" smtClean="0"/>
               <a:pPr/>
-              <a:t>02-07-2013</a:t>
+              <a:t>02/07/2013</a:t>
             </a:fld>
             <a:endParaRPr lang="pt-PT" dirty="0"/>
           </a:p>
@@ -11612,7 +11859,7 @@
             <a:fld id="{5D26EDD4-363A-4236-A170-49C0FA725754}" type="slidenum">
               <a:rPr lang="pt-PT" smtClean="0"/>
               <a:pPr/>
-              <a:t>‹nº›</a:t>
+              <a:t>‹#›</a:t>
             </a:fld>
             <a:endParaRPr lang="pt-PT" dirty="0"/>
           </a:p>
@@ -11621,7 +11868,7 @@
     </p:spTree>
     <p:extLst>
       <p:ext uri="{BB962C8B-B14F-4D97-AF65-F5344CB8AC3E}">
-        <p14:creationId xmlns:p14="http://schemas.microsoft.com/office/powerpoint/2010/main" xmlns="" val="1169910341"/>
+        <p14:creationId xmlns:p14="http://schemas.microsoft.com/office/powerpoint/2010/main" val="1169910341"/>
       </p:ext>
     </p:extLst>
   </p:cSld>
@@ -11945,7 +12192,7 @@
             <a:fld id="{F71B3DB1-8543-40E0-A2D1-830196AD91DE}" type="datetimeFigureOut">
               <a:rPr lang="pt-PT" smtClean="0"/>
               <a:pPr/>
-              <a:t>02-07-2013</a:t>
+              <a:t>02/07/2013</a:t>
             </a:fld>
             <a:endParaRPr lang="pt-PT" dirty="0"/>
           </a:p>
@@ -11988,7 +12235,7 @@
             <a:fld id="{5D26EDD4-363A-4236-A170-49C0FA725754}" type="slidenum">
               <a:rPr lang="pt-PT" smtClean="0"/>
               <a:pPr/>
-              <a:t>‹nº›</a:t>
+              <a:t>‹#›</a:t>
             </a:fld>
             <a:endParaRPr lang="pt-PT" dirty="0"/>
           </a:p>
@@ -12103,7 +12350,7 @@
     </p:spTree>
     <p:extLst>
       <p:ext uri="{BB962C8B-B14F-4D97-AF65-F5344CB8AC3E}">
-        <p14:creationId xmlns:p14="http://schemas.microsoft.com/office/powerpoint/2010/main" xmlns="" val="2244926200"/>
+        <p14:creationId xmlns:p14="http://schemas.microsoft.com/office/powerpoint/2010/main" val="2244926200"/>
       </p:ext>
     </p:extLst>
   </p:cSld>
@@ -12424,7 +12671,7 @@
             <a:fld id="{F71B3DB1-8543-40E0-A2D1-830196AD91DE}" type="datetimeFigureOut">
               <a:rPr lang="pt-PT" smtClean="0"/>
               <a:pPr/>
-              <a:t>02-07-2013</a:t>
+              <a:t>02/07/2013</a:t>
             </a:fld>
             <a:endParaRPr lang="pt-PT" dirty="0"/>
           </a:p>
@@ -12467,7 +12714,7 @@
             <a:fld id="{5D26EDD4-363A-4236-A170-49C0FA725754}" type="slidenum">
               <a:rPr lang="pt-PT" smtClean="0"/>
               <a:pPr/>
-              <a:t>‹nº›</a:t>
+              <a:t>‹#›</a:t>
             </a:fld>
             <a:endParaRPr lang="pt-PT" dirty="0"/>
           </a:p>
@@ -12514,7 +12761,7 @@
     </p:spTree>
     <p:extLst>
       <p:ext uri="{BB962C8B-B14F-4D97-AF65-F5344CB8AC3E}">
-        <p14:creationId xmlns:p14="http://schemas.microsoft.com/office/powerpoint/2010/main" xmlns="" val="3141152998"/>
+        <p14:creationId xmlns:p14="http://schemas.microsoft.com/office/powerpoint/2010/main" val="3141152998"/>
       </p:ext>
     </p:extLst>
   </p:cSld>
@@ -12638,7 +12885,7 @@
             <a:fld id="{F71B3DB1-8543-40E0-A2D1-830196AD91DE}" type="datetimeFigureOut">
               <a:rPr lang="pt-PT" smtClean="0"/>
               <a:pPr/>
-              <a:t>02-07-2013</a:t>
+              <a:t>02/07/2013</a:t>
             </a:fld>
             <a:endParaRPr lang="pt-PT" dirty="0"/>
           </a:p>
@@ -12681,7 +12928,7 @@
             <a:fld id="{5D26EDD4-363A-4236-A170-49C0FA725754}" type="slidenum">
               <a:rPr lang="pt-PT" smtClean="0"/>
               <a:pPr/>
-              <a:t>‹nº›</a:t>
+              <a:t>‹#›</a:t>
             </a:fld>
             <a:endParaRPr lang="pt-PT" dirty="0"/>
           </a:p>
@@ -12728,7 +12975,7 @@
     </p:spTree>
     <p:extLst>
       <p:ext uri="{BB962C8B-B14F-4D97-AF65-F5344CB8AC3E}">
-        <p14:creationId xmlns:p14="http://schemas.microsoft.com/office/powerpoint/2010/main" xmlns="" val="4127282010"/>
+        <p14:creationId xmlns:p14="http://schemas.microsoft.com/office/powerpoint/2010/main" val="4127282010"/>
       </p:ext>
     </p:extLst>
   </p:cSld>
@@ -12858,7 +13105,7 @@
             <a:fld id="{F71B3DB1-8543-40E0-A2D1-830196AD91DE}" type="datetimeFigureOut">
               <a:rPr lang="pt-PT" smtClean="0"/>
               <a:pPr/>
-              <a:t>02-07-2013</a:t>
+              <a:t>02/07/2013</a:t>
             </a:fld>
             <a:endParaRPr lang="pt-PT" dirty="0"/>
           </a:p>
@@ -12901,7 +13148,7 @@
             <a:fld id="{5D26EDD4-363A-4236-A170-49C0FA725754}" type="slidenum">
               <a:rPr lang="pt-PT" smtClean="0"/>
               <a:pPr/>
-              <a:t>‹nº›</a:t>
+              <a:t>‹#›</a:t>
             </a:fld>
             <a:endParaRPr lang="pt-PT" dirty="0"/>
           </a:p>
@@ -12948,7 +13195,7 @@
     </p:spTree>
     <p:extLst>
       <p:ext uri="{BB962C8B-B14F-4D97-AF65-F5344CB8AC3E}">
-        <p14:creationId xmlns:p14="http://schemas.microsoft.com/office/powerpoint/2010/main" xmlns="" val="1016382411"/>
+        <p14:creationId xmlns:p14="http://schemas.microsoft.com/office/powerpoint/2010/main" val="1016382411"/>
       </p:ext>
     </p:extLst>
   </p:cSld>
@@ -13106,7 +13353,7 @@
             <a:fld id="{F71B3DB1-8543-40E0-A2D1-830196AD91DE}" type="datetimeFigureOut">
               <a:rPr lang="pt-PT" smtClean="0"/>
               <a:pPr/>
-              <a:t>02-07-2013</a:t>
+              <a:t>02/07/2013</a:t>
             </a:fld>
             <a:endParaRPr lang="pt-PT" dirty="0"/>
           </a:p>
@@ -13149,7 +13396,7 @@
             <a:fld id="{5D26EDD4-363A-4236-A170-49C0FA725754}" type="slidenum">
               <a:rPr lang="pt-PT" smtClean="0"/>
               <a:pPr/>
-              <a:t>‹nº›</a:t>
+              <a:t>‹#›</a:t>
             </a:fld>
             <a:endParaRPr lang="pt-PT" dirty="0"/>
           </a:p>
@@ -13158,7 +13405,7 @@
     </p:spTree>
     <p:extLst>
       <p:ext uri="{BB962C8B-B14F-4D97-AF65-F5344CB8AC3E}">
-        <p14:creationId xmlns:p14="http://schemas.microsoft.com/office/powerpoint/2010/main" xmlns="" val="548973029"/>
+        <p14:creationId xmlns:p14="http://schemas.microsoft.com/office/powerpoint/2010/main" val="548973029"/>
       </p:ext>
     </p:extLst>
   </p:cSld>
@@ -13356,7 +13603,7 @@
             <a:fld id="{F71B3DB1-8543-40E0-A2D1-830196AD91DE}" type="datetimeFigureOut">
               <a:rPr lang="pt-PT" smtClean="0"/>
               <a:pPr/>
-              <a:t>02-07-2013</a:t>
+              <a:t>02/07/2013</a:t>
             </a:fld>
             <a:endParaRPr lang="pt-PT" dirty="0"/>
           </a:p>
@@ -13399,7 +13646,7 @@
             <a:fld id="{5D26EDD4-363A-4236-A170-49C0FA725754}" type="slidenum">
               <a:rPr lang="pt-PT" smtClean="0"/>
               <a:pPr/>
-              <a:t>‹nº›</a:t>
+              <a:t>‹#›</a:t>
             </a:fld>
             <a:endParaRPr lang="pt-PT" dirty="0"/>
           </a:p>
@@ -13446,7 +13693,7 @@
     </p:spTree>
     <p:extLst>
       <p:ext uri="{BB962C8B-B14F-4D97-AF65-F5344CB8AC3E}">
-        <p14:creationId xmlns:p14="http://schemas.microsoft.com/office/powerpoint/2010/main" xmlns="" val="963473943"/>
+        <p14:creationId xmlns:p14="http://schemas.microsoft.com/office/powerpoint/2010/main" val="963473943"/>
       </p:ext>
     </p:extLst>
   </p:cSld>
@@ -13670,7 +13917,7 @@
             <a:fld id="{F71B3DB1-8543-40E0-A2D1-830196AD91DE}" type="datetimeFigureOut">
               <a:rPr lang="pt-PT" smtClean="0"/>
               <a:pPr/>
-              <a:t>02-07-2013</a:t>
+              <a:t>02/07/2013</a:t>
             </a:fld>
             <a:endParaRPr lang="pt-PT" dirty="0"/>
           </a:p>
@@ -13713,7 +13960,7 @@
             <a:fld id="{5D26EDD4-363A-4236-A170-49C0FA725754}" type="slidenum">
               <a:rPr lang="pt-PT" smtClean="0"/>
               <a:pPr/>
-              <a:t>‹nº›</a:t>
+              <a:t>‹#›</a:t>
             </a:fld>
             <a:endParaRPr lang="pt-PT" dirty="0"/>
           </a:p>
@@ -13722,7 +13969,7 @@
     </p:spTree>
     <p:extLst>
       <p:ext uri="{BB962C8B-B14F-4D97-AF65-F5344CB8AC3E}">
-        <p14:creationId xmlns:p14="http://schemas.microsoft.com/office/powerpoint/2010/main" xmlns="" val="2490349985"/>
+        <p14:creationId xmlns:p14="http://schemas.microsoft.com/office/powerpoint/2010/main" val="2490349985"/>
       </p:ext>
     </p:extLst>
   </p:cSld>
@@ -14054,7 +14301,7 @@
             <a:fld id="{F71B3DB1-8543-40E0-A2D1-830196AD91DE}" type="datetimeFigureOut">
               <a:rPr lang="pt-PT" smtClean="0"/>
               <a:pPr/>
-              <a:t>02-07-2013</a:t>
+              <a:t>02/07/2013</a:t>
             </a:fld>
             <a:endParaRPr lang="pt-PT" dirty="0"/>
           </a:p>
@@ -14097,7 +14344,7 @@
             <a:fld id="{5D26EDD4-363A-4236-A170-49C0FA725754}" type="slidenum">
               <a:rPr lang="pt-PT" smtClean="0"/>
               <a:pPr/>
-              <a:t>‹nº›</a:t>
+              <a:t>‹#›</a:t>
             </a:fld>
             <a:endParaRPr lang="pt-PT" dirty="0"/>
           </a:p>
@@ -14144,7 +14391,7 @@
     </p:spTree>
     <p:extLst>
       <p:ext uri="{BB962C8B-B14F-4D97-AF65-F5344CB8AC3E}">
-        <p14:creationId xmlns:p14="http://schemas.microsoft.com/office/powerpoint/2010/main" xmlns="" val="1183446009"/>
+        <p14:creationId xmlns:p14="http://schemas.microsoft.com/office/powerpoint/2010/main" val="1183446009"/>
       </p:ext>
     </p:extLst>
   </p:cSld>
@@ -14212,7 +14459,7 @@
             <a:fld id="{F71B3DB1-8543-40E0-A2D1-830196AD91DE}" type="datetimeFigureOut">
               <a:rPr lang="pt-PT" smtClean="0"/>
               <a:pPr/>
-              <a:t>02-07-2013</a:t>
+              <a:t>02/07/2013</a:t>
             </a:fld>
             <a:endParaRPr lang="pt-PT" dirty="0"/>
           </a:p>
@@ -14255,7 +14502,7 @@
             <a:fld id="{5D26EDD4-363A-4236-A170-49C0FA725754}" type="slidenum">
               <a:rPr lang="pt-PT" smtClean="0"/>
               <a:pPr/>
-              <a:t>‹nº›</a:t>
+              <a:t>‹#›</a:t>
             </a:fld>
             <a:endParaRPr lang="pt-PT" dirty="0"/>
           </a:p>
@@ -14302,7 +14549,7 @@
     </p:spTree>
     <p:extLst>
       <p:ext uri="{BB962C8B-B14F-4D97-AF65-F5344CB8AC3E}">
-        <p14:creationId xmlns:p14="http://schemas.microsoft.com/office/powerpoint/2010/main" xmlns="" val="1349716058"/>
+        <p14:creationId xmlns:p14="http://schemas.microsoft.com/office/powerpoint/2010/main" val="1349716058"/>
       </p:ext>
     </p:extLst>
   </p:cSld>
@@ -14347,7 +14594,7 @@
             <a:fld id="{F71B3DB1-8543-40E0-A2D1-830196AD91DE}" type="datetimeFigureOut">
               <a:rPr lang="pt-PT" smtClean="0"/>
               <a:pPr/>
-              <a:t>02-07-2013</a:t>
+              <a:t>02/07/2013</a:t>
             </a:fld>
             <a:endParaRPr lang="pt-PT" dirty="0"/>
           </a:p>
@@ -14390,7 +14637,7 @@
             <a:fld id="{5D26EDD4-363A-4236-A170-49C0FA725754}" type="slidenum">
               <a:rPr lang="pt-PT" smtClean="0"/>
               <a:pPr/>
-              <a:t>‹nº›</a:t>
+              <a:t>‹#›</a:t>
             </a:fld>
             <a:endParaRPr lang="pt-PT" dirty="0"/>
           </a:p>
@@ -14399,7 +14646,7 @@
     </p:spTree>
     <p:extLst>
       <p:ext uri="{BB962C8B-B14F-4D97-AF65-F5344CB8AC3E}">
-        <p14:creationId xmlns:p14="http://schemas.microsoft.com/office/powerpoint/2010/main" xmlns="" val="1135282261"/>
+        <p14:creationId xmlns:p14="http://schemas.microsoft.com/office/powerpoint/2010/main" val="1135282261"/>
       </p:ext>
     </p:extLst>
   </p:cSld>
@@ -14604,7 +14851,7 @@
             <a:fld id="{F71B3DB1-8543-40E0-A2D1-830196AD91DE}" type="datetimeFigureOut">
               <a:rPr lang="pt-PT" smtClean="0"/>
               <a:pPr/>
-              <a:t>02-07-2013</a:t>
+              <a:t>02/07/2013</a:t>
             </a:fld>
             <a:endParaRPr lang="pt-PT" dirty="0"/>
           </a:p>
@@ -14647,7 +14894,7 @@
             <a:fld id="{5D26EDD4-363A-4236-A170-49C0FA725754}" type="slidenum">
               <a:rPr lang="pt-PT" smtClean="0"/>
               <a:pPr/>
-              <a:t>‹nº›</a:t>
+              <a:t>‹#›</a:t>
             </a:fld>
             <a:endParaRPr lang="pt-PT" dirty="0"/>
           </a:p>
@@ -14694,7 +14941,7 @@
     </p:spTree>
     <p:extLst>
       <p:ext uri="{BB962C8B-B14F-4D97-AF65-F5344CB8AC3E}">
-        <p14:creationId xmlns:p14="http://schemas.microsoft.com/office/powerpoint/2010/main" xmlns="" val="3016415161"/>
+        <p14:creationId xmlns:p14="http://schemas.microsoft.com/office/powerpoint/2010/main" val="3016415161"/>
       </p:ext>
     </p:extLst>
   </p:cSld>
@@ -14928,7 +15175,7 @@
             <a:fld id="{F71B3DB1-8543-40E0-A2D1-830196AD91DE}" type="datetimeFigureOut">
               <a:rPr lang="pt-PT" smtClean="0"/>
               <a:pPr/>
-              <a:t>02-07-2013</a:t>
+              <a:t>02/07/2013</a:t>
             </a:fld>
             <a:endParaRPr lang="pt-PT" dirty="0"/>
           </a:p>
@@ -14971,7 +15218,7 @@
             <a:fld id="{5D26EDD4-363A-4236-A170-49C0FA725754}" type="slidenum">
               <a:rPr lang="pt-PT" smtClean="0"/>
               <a:pPr/>
-              <a:t>‹nº›</a:t>
+              <a:t>‹#›</a:t>
             </a:fld>
             <a:endParaRPr lang="pt-PT" dirty="0"/>
           </a:p>
@@ -14980,7 +15227,7 @@
     </p:spTree>
     <p:extLst>
       <p:ext uri="{BB962C8B-B14F-4D97-AF65-F5344CB8AC3E}">
-        <p14:creationId xmlns:p14="http://schemas.microsoft.com/office/powerpoint/2010/main" xmlns="" val="2799130186"/>
+        <p14:creationId xmlns:p14="http://schemas.microsoft.com/office/powerpoint/2010/main" val="2799130186"/>
       </p:ext>
     </p:extLst>
   </p:cSld>
@@ -15024,7 +15271,7 @@
           <a:blip r:embed="rId19" cstate="print">
             <a:extLst>
               <a:ext uri="{28A0092B-C50C-407E-A947-70E740481C1C}">
-                <a14:useLocalDpi xmlns:a14="http://schemas.microsoft.com/office/drawing/2010/main" xmlns="" val="0"/>
+                <a14:useLocalDpi xmlns:a14="http://schemas.microsoft.com/office/drawing/2010/main" val="0"/>
               </a:ext>
             </a:extLst>
           </a:blip>
@@ -15174,7 +15421,7 @@
             <a:fld id="{F71B3DB1-8543-40E0-A2D1-830196AD91DE}" type="datetimeFigureOut">
               <a:rPr lang="pt-PT" smtClean="0"/>
               <a:pPr/>
-              <a:t>02-07-2013</a:t>
+              <a:t>02/07/2013</a:t>
             </a:fld>
             <a:endParaRPr lang="pt-PT" dirty="0"/>
           </a:p>
@@ -15253,7 +15500,7 @@
             <a:fld id="{5D26EDD4-363A-4236-A170-49C0FA725754}" type="slidenum">
               <a:rPr lang="pt-PT" smtClean="0"/>
               <a:pPr/>
-              <a:t>‹nº›</a:t>
+              <a:t>‹#›</a:t>
             </a:fld>
             <a:endParaRPr lang="pt-PT" dirty="0"/>
           </a:p>
@@ -15262,7 +15509,7 @@
     </p:spTree>
     <p:extLst>
       <p:ext uri="{BB962C8B-B14F-4D97-AF65-F5344CB8AC3E}">
-        <p14:creationId xmlns:p14="http://schemas.microsoft.com/office/powerpoint/2010/main" xmlns="" val="3664009446"/>
+        <p14:creationId xmlns:p14="http://schemas.microsoft.com/office/powerpoint/2010/main" val="3664009446"/>
       </p:ext>
     </p:extLst>
   </p:cSld>
@@ -15770,7 +16017,7 @@
     </p:spTree>
     <p:extLst>
       <p:ext uri="{BB962C8B-B14F-4D97-AF65-F5344CB8AC3E}">
-        <p14:creationId xmlns:p14="http://schemas.microsoft.com/office/powerpoint/2010/main" xmlns="" val="404200990"/>
+        <p14:creationId xmlns:p14="http://schemas.microsoft.com/office/powerpoint/2010/main" val="404200990"/>
       </p:ext>
     </p:extLst>
   </p:cSld>
@@ -15853,7 +16100,7 @@
     </p:spTree>
     <p:extLst>
       <p:ext uri="{BB962C8B-B14F-4D97-AF65-F5344CB8AC3E}">
-        <p14:creationId xmlns:p14="http://schemas.microsoft.com/office/powerpoint/2010/main" xmlns="" val="1280194573"/>
+        <p14:creationId xmlns:p14="http://schemas.microsoft.com/office/powerpoint/2010/main" val="1280194573"/>
       </p:ext>
     </p:extLst>
   </p:cSld>
@@ -15928,7 +16175,7 @@
     </p:spTree>
     <p:extLst>
       <p:ext uri="{BB962C8B-B14F-4D97-AF65-F5344CB8AC3E}">
-        <p14:creationId xmlns:p14="http://schemas.microsoft.com/office/powerpoint/2010/main" xmlns="" val="3292307339"/>
+        <p14:creationId xmlns:p14="http://schemas.microsoft.com/office/powerpoint/2010/main" val="3292307339"/>
       </p:ext>
     </p:extLst>
   </p:cSld>
@@ -16011,7 +16258,7 @@
     </p:spTree>
     <p:extLst>
       <p:ext uri="{BB962C8B-B14F-4D97-AF65-F5344CB8AC3E}">
-        <p14:creationId xmlns:p14="http://schemas.microsoft.com/office/powerpoint/2010/main" xmlns="" val="2525735037"/>
+        <p14:creationId xmlns:p14="http://schemas.microsoft.com/office/powerpoint/2010/main" val="2525735037"/>
       </p:ext>
     </p:extLst>
   </p:cSld>
@@ -16283,7 +16530,7 @@
     </p:spTree>
     <p:extLst>
       <p:ext uri="{BB962C8B-B14F-4D97-AF65-F5344CB8AC3E}">
-        <p14:creationId xmlns:p14="http://schemas.microsoft.com/office/powerpoint/2010/main" xmlns="" val="95242113"/>
+        <p14:creationId xmlns:p14="http://schemas.microsoft.com/office/powerpoint/2010/main" val="95242113"/>
       </p:ext>
     </p:extLst>
   </p:cSld>
@@ -17194,7 +17441,7 @@
     </p:spTree>
     <p:extLst>
       <p:ext uri="{BB962C8B-B14F-4D97-AF65-F5344CB8AC3E}">
-        <p14:creationId xmlns:p14="http://schemas.microsoft.com/office/powerpoint/2010/main" xmlns="" val="2652038306"/>
+        <p14:creationId xmlns:p14="http://schemas.microsoft.com/office/powerpoint/2010/main" val="2652038306"/>
       </p:ext>
     </p:extLst>
   </p:cSld>
@@ -17448,7 +17695,7 @@
     </p:spTree>
     <p:extLst>
       <p:ext uri="{BB962C8B-B14F-4D97-AF65-F5344CB8AC3E}">
-        <p14:creationId xmlns:p14="http://schemas.microsoft.com/office/powerpoint/2010/main" xmlns="" val="2278680210"/>
+        <p14:creationId xmlns:p14="http://schemas.microsoft.com/office/powerpoint/2010/main" val="2278680210"/>
       </p:ext>
     </p:extLst>
   </p:cSld>
@@ -17799,7 +18046,7 @@
     </p:spTree>
     <p:extLst>
       <p:ext uri="{BB962C8B-B14F-4D97-AF65-F5344CB8AC3E}">
-        <p14:creationId xmlns:p14="http://schemas.microsoft.com/office/powerpoint/2010/main" xmlns="" val="2466546361"/>
+        <p14:creationId xmlns:p14="http://schemas.microsoft.com/office/powerpoint/2010/main" val="2466546361"/>
       </p:ext>
     </p:extLst>
   </p:cSld>
@@ -17881,7 +18128,7 @@
           <p:nvPr>
             <p:extLst>
               <p:ext uri="{D42A27DB-BD31-4B8C-83A1-F6EECF244321}">
-                <p14:modId xmlns:p14="http://schemas.microsoft.com/office/powerpoint/2010/main" xmlns="" val="2639408096"/>
+                <p14:modId xmlns:p14="http://schemas.microsoft.com/office/powerpoint/2010/main" val="2639408096"/>
               </p:ext>
             </p:extLst>
           </p:nvPr>
@@ -17899,7 +18146,7 @@
     </p:spTree>
     <p:extLst>
       <p:ext uri="{BB962C8B-B14F-4D97-AF65-F5344CB8AC3E}">
-        <p14:creationId xmlns:p14="http://schemas.microsoft.com/office/powerpoint/2010/main" xmlns="" val="980046083"/>
+        <p14:creationId xmlns:p14="http://schemas.microsoft.com/office/powerpoint/2010/main" val="980046083"/>
       </p:ext>
     </p:extLst>
   </p:cSld>
@@ -17981,7 +18228,7 @@
           <p:nvPr>
             <p:extLst>
               <p:ext uri="{D42A27DB-BD31-4B8C-83A1-F6EECF244321}">
-                <p14:modId xmlns:p14="http://schemas.microsoft.com/office/powerpoint/2010/main" xmlns="" val="3968378676"/>
+                <p14:modId xmlns:p14="http://schemas.microsoft.com/office/powerpoint/2010/main" val="3968378676"/>
               </p:ext>
             </p:extLst>
           </p:nvPr>
@@ -17999,7 +18246,7 @@
     </p:spTree>
     <p:extLst>
       <p:ext uri="{BB962C8B-B14F-4D97-AF65-F5344CB8AC3E}">
-        <p14:creationId xmlns:p14="http://schemas.microsoft.com/office/powerpoint/2010/main" xmlns="" val="197448477"/>
+        <p14:creationId xmlns:p14="http://schemas.microsoft.com/office/powerpoint/2010/main" val="197448477"/>
       </p:ext>
     </p:extLst>
   </p:cSld>
@@ -18133,7 +18380,7 @@
           <p:nvPr>
             <p:extLst>
               <p:ext uri="{D42A27DB-BD31-4B8C-83A1-F6EECF244321}">
-                <p14:modId xmlns:p14="http://schemas.microsoft.com/office/powerpoint/2010/main" xmlns="" val="2079267717"/>
+                <p14:modId xmlns:p14="http://schemas.microsoft.com/office/powerpoint/2010/main" val="2079267717"/>
               </p:ext>
             </p:extLst>
           </p:nvPr>
@@ -18151,7 +18398,7 @@
     </p:spTree>
     <p:extLst>
       <p:ext uri="{BB962C8B-B14F-4D97-AF65-F5344CB8AC3E}">
-        <p14:creationId xmlns:p14="http://schemas.microsoft.com/office/powerpoint/2010/main" xmlns="" val="3967897178"/>
+        <p14:creationId xmlns:p14="http://schemas.microsoft.com/office/powerpoint/2010/main" val="3967897178"/>
       </p:ext>
     </p:extLst>
   </p:cSld>
@@ -18230,7 +18477,7 @@
     </p:spTree>
     <p:extLst>
       <p:ext uri="{BB962C8B-B14F-4D97-AF65-F5344CB8AC3E}">
-        <p14:creationId xmlns:p14="http://schemas.microsoft.com/office/powerpoint/2010/main" xmlns="" val="3708106417"/>
+        <p14:creationId xmlns:p14="http://schemas.microsoft.com/office/powerpoint/2010/main" val="3708106417"/>
       </p:ext>
     </p:extLst>
   </p:cSld>
@@ -19235,7 +19482,7 @@
     </p:spTree>
     <p:extLst>
       <p:ext uri="{BB962C8B-B14F-4D97-AF65-F5344CB8AC3E}">
-        <p14:creationId xmlns:p14="http://schemas.microsoft.com/office/powerpoint/2010/main" xmlns="" val="810377202"/>
+        <p14:creationId xmlns:p14="http://schemas.microsoft.com/office/powerpoint/2010/main" val="810377202"/>
       </p:ext>
     </p:extLst>
   </p:cSld>
@@ -19313,7 +19560,7 @@
           <p:nvPr>
             <p:extLst>
               <p:ext uri="{D42A27DB-BD31-4B8C-83A1-F6EECF244321}">
-                <p14:modId xmlns:p14="http://schemas.microsoft.com/office/powerpoint/2010/main" xmlns="" val="2002974256"/>
+                <p14:modId xmlns:p14="http://schemas.microsoft.com/office/powerpoint/2010/main" val="2002974256"/>
               </p:ext>
             </p:extLst>
           </p:nvPr>
@@ -19331,7 +19578,7 @@
     </p:spTree>
     <p:extLst>
       <p:ext uri="{BB962C8B-B14F-4D97-AF65-F5344CB8AC3E}">
-        <p14:creationId xmlns:p14="http://schemas.microsoft.com/office/powerpoint/2010/main" xmlns="" val="1637874217"/>
+        <p14:creationId xmlns:p14="http://schemas.microsoft.com/office/powerpoint/2010/main" val="1637874217"/>
       </p:ext>
     </p:extLst>
   </p:cSld>
@@ -19407,7 +19654,7 @@
           <p:nvPr>
             <p:extLst>
               <p:ext uri="{D42A27DB-BD31-4B8C-83A1-F6EECF244321}">
-                <p14:modId xmlns:p14="http://schemas.microsoft.com/office/powerpoint/2010/main" xmlns="" val="3456624213"/>
+                <p14:modId xmlns:p14="http://schemas.microsoft.com/office/powerpoint/2010/main" val="3456624213"/>
               </p:ext>
             </p:extLst>
           </p:nvPr>
@@ -19425,7 +19672,7 @@
     </p:spTree>
     <p:extLst>
       <p:ext uri="{BB962C8B-B14F-4D97-AF65-F5344CB8AC3E}">
-        <p14:creationId xmlns:p14="http://schemas.microsoft.com/office/powerpoint/2010/main" xmlns="" val="2330439383"/>
+        <p14:creationId xmlns:p14="http://schemas.microsoft.com/office/powerpoint/2010/main" val="2330439383"/>
       </p:ext>
     </p:extLst>
   </p:cSld>
@@ -19774,7 +20021,7 @@
     </p:spTree>
     <p:extLst>
       <p:ext uri="{BB962C8B-B14F-4D97-AF65-F5344CB8AC3E}">
-        <p14:creationId xmlns:p14="http://schemas.microsoft.com/office/powerpoint/2010/main" xmlns="" val="3651665137"/>
+        <p14:creationId xmlns:p14="http://schemas.microsoft.com/office/powerpoint/2010/main" val="3651665137"/>
       </p:ext>
     </p:extLst>
   </p:cSld>
@@ -20172,7 +20419,7 @@
     </p:spTree>
     <p:extLst>
       <p:ext uri="{BB962C8B-B14F-4D97-AF65-F5344CB8AC3E}">
-        <p14:creationId xmlns:p14="http://schemas.microsoft.com/office/powerpoint/2010/main" xmlns="" val="4024771090"/>
+        <p14:creationId xmlns:p14="http://schemas.microsoft.com/office/powerpoint/2010/main" val="4024771090"/>
       </p:ext>
     </p:extLst>
   </p:cSld>
@@ -20402,7 +20649,7 @@
     </p:spTree>
     <p:extLst>
       <p:ext uri="{BB962C8B-B14F-4D97-AF65-F5344CB8AC3E}">
-        <p14:creationId xmlns:p14="http://schemas.microsoft.com/office/powerpoint/2010/main" xmlns="" val="3337746042"/>
+        <p14:creationId xmlns:p14="http://schemas.microsoft.com/office/powerpoint/2010/main" val="3337746042"/>
       </p:ext>
     </p:extLst>
   </p:cSld>
@@ -20485,7 +20732,7 @@
     </p:spTree>
     <p:extLst>
       <p:ext uri="{BB962C8B-B14F-4D97-AF65-F5344CB8AC3E}">
-        <p14:creationId xmlns:p14="http://schemas.microsoft.com/office/powerpoint/2010/main" xmlns="" val="1036071785"/>
+        <p14:creationId xmlns:p14="http://schemas.microsoft.com/office/powerpoint/2010/main" val="1036071785"/>
       </p:ext>
     </p:extLst>
   </p:cSld>
@@ -20560,7 +20807,7 @@
     </p:spTree>
     <p:extLst>
       <p:ext uri="{BB962C8B-B14F-4D97-AF65-F5344CB8AC3E}">
-        <p14:creationId xmlns:p14="http://schemas.microsoft.com/office/powerpoint/2010/main" xmlns="" val="4029259654"/>
+        <p14:creationId xmlns:p14="http://schemas.microsoft.com/office/powerpoint/2010/main" val="4029259654"/>
       </p:ext>
     </p:extLst>
   </p:cSld>
@@ -20952,18 +21199,18 @@
     </p:spTree>
     <p:extLst>
       <p:ext uri="{BB962C8B-B14F-4D97-AF65-F5344CB8AC3E}">
-        <p14:creationId xmlns:p14="http://schemas.microsoft.com/office/powerpoint/2010/main" xmlns="" val="2323100813"/>
+        <p14:creationId xmlns:p14="http://schemas.microsoft.com/office/powerpoint/2010/main" val="2323100813"/>
       </p:ext>
     </p:extLst>
   </p:cSld>
   <p:clrMapOvr>
     <a:masterClrMapping/>
   </p:clrMapOvr>
-  <mc:AlternateContent xmlns:mc="http://schemas.openxmlformats.org/markup-compatibility/2006">
-    <mc:Choice xmlns:p14="http://schemas.microsoft.com/office/powerpoint/2010/main" xmlns="" Requires="p14">
+  <mc:AlternateContent xmlns:mc="http://schemas.openxmlformats.org/markup-compatibility/2006" xmlns:p14="http://schemas.microsoft.com/office/powerpoint/2010/main">
+    <mc:Choice Requires="p14">
       <p:transition p14:dur="0"/>
     </mc:Choice>
-    <mc:Fallback>
+    <mc:Fallback xmlns="">
       <p:transition/>
     </mc:Fallback>
   </mc:AlternateContent>
@@ -21228,7 +21475,7 @@
           <p:nvPr>
             <p:extLst>
               <p:ext uri="{D42A27DB-BD31-4B8C-83A1-F6EECF244321}">
-                <p14:modId xmlns:p14="http://schemas.microsoft.com/office/powerpoint/2010/main" xmlns="" val="963427250"/>
+                <p14:modId xmlns:p14="http://schemas.microsoft.com/office/powerpoint/2010/main" val="963427250"/>
               </p:ext>
             </p:extLst>
           </p:nvPr>
@@ -21762,7 +22009,7 @@
     </p:spTree>
     <p:extLst>
       <p:ext uri="{BB962C8B-B14F-4D97-AF65-F5344CB8AC3E}">
-        <p14:creationId xmlns:p14="http://schemas.microsoft.com/office/powerpoint/2010/main" xmlns="" val="2960815596"/>
+        <p14:creationId xmlns:p14="http://schemas.microsoft.com/office/powerpoint/2010/main" val="2960815596"/>
       </p:ext>
     </p:extLst>
   </p:cSld>
@@ -21837,12 +22084,12 @@
           <a:lstStyle/>
           <a:p>
             <a:r>
-              <a:rPr lang="pt-PT" dirty="0"/>
-              <a:t> </a:t>
+              <a:rPr lang="pt-PT" b="1" smtClean="0"/>
+              <a:t>Carla </a:t>
             </a:r>
             <a:r>
               <a:rPr lang="pt-PT" b="1" dirty="0"/>
-              <a:t>Carla Machado </a:t>
+              <a:t>Machado </a:t>
             </a:r>
             <a:r>
               <a:rPr lang="pt-PT" dirty="0"/>
@@ -22000,7 +22247,7 @@
     </p:spTree>
     <p:extLst>
       <p:ext uri="{BB962C8B-B14F-4D97-AF65-F5344CB8AC3E}">
-        <p14:creationId xmlns:p14="http://schemas.microsoft.com/office/powerpoint/2010/main" xmlns="" val="1616575088"/>
+        <p14:creationId xmlns:p14="http://schemas.microsoft.com/office/powerpoint/2010/main" val="1616575088"/>
       </p:ext>
     </p:extLst>
   </p:cSld>
@@ -22197,7 +22444,7 @@
     </p:spTree>
     <p:extLst>
       <p:ext uri="{BB962C8B-B14F-4D97-AF65-F5344CB8AC3E}">
-        <p14:creationId xmlns:p14="http://schemas.microsoft.com/office/powerpoint/2010/main" xmlns="" val="1314162854"/>
+        <p14:creationId xmlns:p14="http://schemas.microsoft.com/office/powerpoint/2010/main" val="1314162854"/>
       </p:ext>
     </p:extLst>
   </p:cSld>
@@ -22284,7 +22531,7 @@
     </p:spTree>
     <p:extLst>
       <p:ext uri="{BB962C8B-B14F-4D97-AF65-F5344CB8AC3E}">
-        <p14:creationId xmlns:p14="http://schemas.microsoft.com/office/powerpoint/2010/main" xmlns="" val="1350559237"/>
+        <p14:creationId xmlns:p14="http://schemas.microsoft.com/office/powerpoint/2010/main" val="1350559237"/>
       </p:ext>
     </p:extLst>
   </p:cSld>
@@ -22380,7 +22627,7 @@
           <a:blip r:embed="rId2" cstate="print">
             <a:extLst>
               <a:ext uri="{28A0092B-C50C-407E-A947-70E740481C1C}">
-                <a14:useLocalDpi xmlns:a14="http://schemas.microsoft.com/office/drawing/2010/main" xmlns="" val="0"/>
+                <a14:useLocalDpi xmlns:a14="http://schemas.microsoft.com/office/drawing/2010/main" val="0"/>
               </a:ext>
             </a:extLst>
           </a:blip>
@@ -22410,7 +22657,7 @@
           <a:blip r:embed="rId3" cstate="print">
             <a:extLst>
               <a:ext uri="{28A0092B-C50C-407E-A947-70E740481C1C}">
-                <a14:useLocalDpi xmlns:a14="http://schemas.microsoft.com/office/drawing/2010/main" xmlns="" val="0"/>
+                <a14:useLocalDpi xmlns:a14="http://schemas.microsoft.com/office/drawing/2010/main" val="0"/>
               </a:ext>
             </a:extLst>
           </a:blip>
@@ -22440,7 +22687,7 @@
           <a:blip r:embed="rId4" cstate="print">
             <a:extLst>
               <a:ext uri="{28A0092B-C50C-407E-A947-70E740481C1C}">
-                <a14:useLocalDpi xmlns:a14="http://schemas.microsoft.com/office/drawing/2010/main" xmlns="" val="0"/>
+                <a14:useLocalDpi xmlns:a14="http://schemas.microsoft.com/office/drawing/2010/main" val="0"/>
               </a:ext>
             </a:extLst>
           </a:blip>
@@ -22470,7 +22717,7 @@
           <a:blip r:embed="rId5" cstate="print">
             <a:extLst>
               <a:ext uri="{28A0092B-C50C-407E-A947-70E740481C1C}">
-                <a14:useLocalDpi xmlns:a14="http://schemas.microsoft.com/office/drawing/2010/main" xmlns="" val="0"/>
+                <a14:useLocalDpi xmlns:a14="http://schemas.microsoft.com/office/drawing/2010/main" val="0"/>
               </a:ext>
             </a:extLst>
           </a:blip>
@@ -22500,7 +22747,7 @@
           <a:blip r:embed="rId6" cstate="print">
             <a:extLst>
               <a:ext uri="{28A0092B-C50C-407E-A947-70E740481C1C}">
-                <a14:useLocalDpi xmlns:a14="http://schemas.microsoft.com/office/drawing/2010/main" xmlns="" val="0"/>
+                <a14:useLocalDpi xmlns:a14="http://schemas.microsoft.com/office/drawing/2010/main" val="0"/>
               </a:ext>
             </a:extLst>
           </a:blip>
@@ -22530,7 +22777,7 @@
           <a:blip r:embed="rId7" cstate="print">
             <a:extLst>
               <a:ext uri="{28A0092B-C50C-407E-A947-70E740481C1C}">
-                <a14:useLocalDpi xmlns:a14="http://schemas.microsoft.com/office/drawing/2010/main" xmlns="" val="0"/>
+                <a14:useLocalDpi xmlns:a14="http://schemas.microsoft.com/office/drawing/2010/main" val="0"/>
               </a:ext>
             </a:extLst>
           </a:blip>
@@ -22662,7 +22909,7 @@
     </p:spTree>
     <p:extLst>
       <p:ext uri="{BB962C8B-B14F-4D97-AF65-F5344CB8AC3E}">
-        <p14:creationId xmlns:p14="http://schemas.microsoft.com/office/powerpoint/2010/main" xmlns="" val="3857988853"/>
+        <p14:creationId xmlns:p14="http://schemas.microsoft.com/office/powerpoint/2010/main" val="3857988853"/>
       </p:ext>
     </p:extLst>
   </p:cSld>
@@ -23003,7 +23250,7 @@
     </p:spTree>
     <p:extLst>
       <p:ext uri="{BB962C8B-B14F-4D97-AF65-F5344CB8AC3E}">
-        <p14:creationId xmlns:p14="http://schemas.microsoft.com/office/powerpoint/2010/main" xmlns="" val="837742913"/>
+        <p14:creationId xmlns:p14="http://schemas.microsoft.com/office/powerpoint/2010/main" val="837742913"/>
       </p:ext>
     </p:extLst>
   </p:cSld>
@@ -23165,7 +23412,7 @@
     </p:spTree>
     <p:extLst>
       <p:ext uri="{BB962C8B-B14F-4D97-AF65-F5344CB8AC3E}">
-        <p14:creationId xmlns:p14="http://schemas.microsoft.com/office/powerpoint/2010/main" xmlns="" val="2325686505"/>
+        <p14:creationId xmlns:p14="http://schemas.microsoft.com/office/powerpoint/2010/main" val="2325686505"/>
       </p:ext>
     </p:extLst>
   </p:cSld>
@@ -23718,7 +23965,7 @@
     </p:spTree>
     <p:extLst>
       <p:ext uri="{BB962C8B-B14F-4D97-AF65-F5344CB8AC3E}">
-        <p14:creationId xmlns:p14="http://schemas.microsoft.com/office/powerpoint/2010/main" xmlns="" val="3104365819"/>
+        <p14:creationId xmlns:p14="http://schemas.microsoft.com/office/powerpoint/2010/main" val="3104365819"/>
       </p:ext>
     </p:extLst>
   </p:cSld>
@@ -23936,7 +24183,7 @@
     </p:spTree>
     <p:extLst>
       <p:ext uri="{BB962C8B-B14F-4D97-AF65-F5344CB8AC3E}">
-        <p14:creationId xmlns:p14="http://schemas.microsoft.com/office/powerpoint/2010/main" xmlns="" val="996600230"/>
+        <p14:creationId xmlns:p14="http://schemas.microsoft.com/office/powerpoint/2010/main" val="996600230"/>
       </p:ext>
     </p:extLst>
   </p:cSld>
@@ -24146,7 +24393,7 @@
     </p:spTree>
     <p:extLst>
       <p:ext uri="{BB962C8B-B14F-4D97-AF65-F5344CB8AC3E}">
-        <p14:creationId xmlns:p14="http://schemas.microsoft.com/office/powerpoint/2010/main" xmlns="" val="3857988853"/>
+        <p14:creationId xmlns:p14="http://schemas.microsoft.com/office/powerpoint/2010/main" val="3857988853"/>
       </p:ext>
     </p:extLst>
   </p:cSld>
@@ -24335,7 +24582,7 @@
     </p:spTree>
     <p:extLst>
       <p:ext uri="{BB962C8B-B14F-4D97-AF65-F5344CB8AC3E}">
-        <p14:creationId xmlns:p14="http://schemas.microsoft.com/office/powerpoint/2010/main" xmlns="" val="755519461"/>
+        <p14:creationId xmlns:p14="http://schemas.microsoft.com/office/powerpoint/2010/main" val="755519461"/>
       </p:ext>
     </p:extLst>
   </p:cSld>
@@ -25237,7 +25484,7 @@
     </p:spTree>
     <p:extLst>
       <p:ext uri="{BB962C8B-B14F-4D97-AF65-F5344CB8AC3E}">
-        <p14:creationId xmlns:p14="http://schemas.microsoft.com/office/powerpoint/2010/main" xmlns="" val="1569197944"/>
+        <p14:creationId xmlns:p14="http://schemas.microsoft.com/office/powerpoint/2010/main" val="1569197944"/>
       </p:ext>
     </p:extLst>
   </p:cSld>
@@ -25276,7 +25523,7 @@
           <a:blip r:embed="rId2" cstate="print">
             <a:extLst>
               <a:ext uri="{28A0092B-C50C-407E-A947-70E740481C1C}">
-                <a14:useLocalDpi xmlns:a14="http://schemas.microsoft.com/office/drawing/2010/main" xmlns="" val="0"/>
+                <a14:useLocalDpi xmlns:a14="http://schemas.microsoft.com/office/drawing/2010/main" val="0"/>
               </a:ext>
             </a:extLst>
           </a:blip>
@@ -25396,7 +25643,7 @@
           <a:blip r:embed="rId3" cstate="print">
             <a:extLst>
               <a:ext uri="{28A0092B-C50C-407E-A947-70E740481C1C}">
-                <a14:useLocalDpi xmlns:a14="http://schemas.microsoft.com/office/drawing/2010/main" xmlns="" val="0"/>
+                <a14:useLocalDpi xmlns:a14="http://schemas.microsoft.com/office/drawing/2010/main" val="0"/>
               </a:ext>
             </a:extLst>
           </a:blip>
@@ -25426,7 +25673,7 @@
           <a:blip r:embed="rId4" cstate="print">
             <a:extLst>
               <a:ext uri="{28A0092B-C50C-407E-A947-70E740481C1C}">
-                <a14:useLocalDpi xmlns:a14="http://schemas.microsoft.com/office/drawing/2010/main" xmlns="" val="0"/>
+                <a14:useLocalDpi xmlns:a14="http://schemas.microsoft.com/office/drawing/2010/main" val="0"/>
               </a:ext>
             </a:extLst>
           </a:blip>
@@ -25474,7 +25721,7 @@
           <a:blip r:embed="rId5" cstate="print">
             <a:extLst>
               <a:ext uri="{28A0092B-C50C-407E-A947-70E740481C1C}">
-                <a14:useLocalDpi xmlns:a14="http://schemas.microsoft.com/office/drawing/2010/main" xmlns="" val="0"/>
+                <a14:useLocalDpi xmlns:a14="http://schemas.microsoft.com/office/drawing/2010/main" val="0"/>
               </a:ext>
             </a:extLst>
           </a:blip>
@@ -25495,7 +25742,7 @@
     </p:spTree>
     <p:extLst>
       <p:ext uri="{BB962C8B-B14F-4D97-AF65-F5344CB8AC3E}">
-        <p14:creationId xmlns:p14="http://schemas.microsoft.com/office/powerpoint/2010/main" xmlns="" val="3458532491"/>
+        <p14:creationId xmlns:p14="http://schemas.microsoft.com/office/powerpoint/2010/main" val="3458532491"/>
       </p:ext>
     </p:extLst>
   </p:cSld>
@@ -25640,7 +25887,7 @@
     </p:spTree>
     <p:extLst>
       <p:ext uri="{BB962C8B-B14F-4D97-AF65-F5344CB8AC3E}">
-        <p14:creationId xmlns:p14="http://schemas.microsoft.com/office/powerpoint/2010/main" xmlns="" val="3599542048"/>
+        <p14:creationId xmlns:p14="http://schemas.microsoft.com/office/powerpoint/2010/main" val="3599542048"/>
       </p:ext>
     </p:extLst>
   </p:cSld>
@@ -26072,7 +26319,7 @@
     </p:spTree>
     <p:extLst>
       <p:ext uri="{BB962C8B-B14F-4D97-AF65-F5344CB8AC3E}">
-        <p14:creationId xmlns:p14="http://schemas.microsoft.com/office/powerpoint/2010/main" xmlns="" val="1933947800"/>
+        <p14:creationId xmlns:p14="http://schemas.microsoft.com/office/powerpoint/2010/main" val="1933947800"/>
       </p:ext>
     </p:extLst>
   </p:cSld>
@@ -26166,7 +26413,7 @@
     </p:spTree>
     <p:extLst>
       <p:ext uri="{BB962C8B-B14F-4D97-AF65-F5344CB8AC3E}">
-        <p14:creationId xmlns:p14="http://schemas.microsoft.com/office/powerpoint/2010/main" xmlns="" val="1515372593"/>
+        <p14:creationId xmlns:p14="http://schemas.microsoft.com/office/powerpoint/2010/main" val="1515372593"/>
       </p:ext>
     </p:extLst>
   </p:cSld>
@@ -26252,7 +26499,7 @@
     </p:spTree>
     <p:extLst>
       <p:ext uri="{BB962C8B-B14F-4D97-AF65-F5344CB8AC3E}">
-        <p14:creationId xmlns:p14="http://schemas.microsoft.com/office/powerpoint/2010/main" xmlns="" val="256484290"/>
+        <p14:creationId xmlns:p14="http://schemas.microsoft.com/office/powerpoint/2010/main" val="256484290"/>
       </p:ext>
     </p:extLst>
   </p:cSld>
@@ -26371,7 +26618,7 @@
     </p:spTree>
     <p:extLst>
       <p:ext uri="{BB962C8B-B14F-4D97-AF65-F5344CB8AC3E}">
-        <p14:creationId xmlns:p14="http://schemas.microsoft.com/office/powerpoint/2010/main" xmlns="" val="286368229"/>
+        <p14:creationId xmlns:p14="http://schemas.microsoft.com/office/powerpoint/2010/main" val="286368229"/>
       </p:ext>
     </p:extLst>
   </p:cSld>
@@ -26447,7 +26694,7 @@
     </p:spTree>
     <p:extLst>
       <p:ext uri="{BB962C8B-B14F-4D97-AF65-F5344CB8AC3E}">
-        <p14:creationId xmlns:p14="http://schemas.microsoft.com/office/powerpoint/2010/main" xmlns="" val="745076154"/>
+        <p14:creationId xmlns:p14="http://schemas.microsoft.com/office/powerpoint/2010/main" val="745076154"/>
       </p:ext>
     </p:extLst>
   </p:cSld>
@@ -26571,7 +26818,7 @@
                   <p:nvPr>
                     <p:extLst>
                       <p:ext uri="{D42A27DB-BD31-4B8C-83A1-F6EECF244321}">
-                        <p14:modId xmlns:p14="http://schemas.microsoft.com/office/powerpoint/2010/main" xmlns="" val="568955525"/>
+                        <p14:modId xmlns:p14="http://schemas.microsoft.com/office/powerpoint/2010/main" val="568955525"/>
                       </p:ext>
                     </p:extLst>
                   </p:nvPr>
@@ -27503,7 +27750,7 @@
     </p:spTree>
     <p:extLst>
       <p:ext uri="{BB962C8B-B14F-4D97-AF65-F5344CB8AC3E}">
-        <p14:creationId xmlns:p14="http://schemas.microsoft.com/office/powerpoint/2010/main" xmlns="" val="3857988853"/>
+        <p14:creationId xmlns:p14="http://schemas.microsoft.com/office/powerpoint/2010/main" val="3857988853"/>
       </p:ext>
     </p:extLst>
   </p:cSld>
@@ -27694,7 +27941,7 @@
     </p:spTree>
     <p:extLst>
       <p:ext uri="{BB962C8B-B14F-4D97-AF65-F5344CB8AC3E}">
-        <p14:creationId xmlns:p14="http://schemas.microsoft.com/office/powerpoint/2010/main" xmlns="" val="576009203"/>
+        <p14:creationId xmlns:p14="http://schemas.microsoft.com/office/powerpoint/2010/main" val="576009203"/>
       </p:ext>
     </p:extLst>
   </p:cSld>
@@ -27843,7 +28090,7 @@
     </p:spTree>
     <p:extLst>
       <p:ext uri="{BB962C8B-B14F-4D97-AF65-F5344CB8AC3E}">
-        <p14:creationId xmlns:p14="http://schemas.microsoft.com/office/powerpoint/2010/main" xmlns="" val="2359148607"/>
+        <p14:creationId xmlns:p14="http://schemas.microsoft.com/office/powerpoint/2010/main" val="2359148607"/>
       </p:ext>
     </p:extLst>
   </p:cSld>
@@ -28233,7 +28480,7 @@
     </p:spTree>
     <p:extLst>
       <p:ext uri="{BB962C8B-B14F-4D97-AF65-F5344CB8AC3E}">
-        <p14:creationId xmlns:p14="http://schemas.microsoft.com/office/powerpoint/2010/main" xmlns="" val="139459399"/>
+        <p14:creationId xmlns:p14="http://schemas.microsoft.com/office/powerpoint/2010/main" val="139459399"/>
       </p:ext>
     </p:extLst>
   </p:cSld>
@@ -28812,7 +29059,7 @@
     </p:spTree>
     <p:extLst>
       <p:ext uri="{BB962C8B-B14F-4D97-AF65-F5344CB8AC3E}">
-        <p14:creationId xmlns:p14="http://schemas.microsoft.com/office/powerpoint/2010/main" xmlns="" val="529958241"/>
+        <p14:creationId xmlns:p14="http://schemas.microsoft.com/office/powerpoint/2010/main" val="529958241"/>
       </p:ext>
     </p:extLst>
   </p:cSld>
@@ -29006,7 +29253,7 @@
     </p:spTree>
     <p:extLst>
       <p:ext uri="{BB962C8B-B14F-4D97-AF65-F5344CB8AC3E}">
-        <p14:creationId xmlns:p14="http://schemas.microsoft.com/office/powerpoint/2010/main" xmlns="" val="1756093289"/>
+        <p14:creationId xmlns:p14="http://schemas.microsoft.com/office/powerpoint/2010/main" val="1756093289"/>
       </p:ext>
     </p:extLst>
   </p:cSld>
@@ -29671,7 +29918,7 @@
     </p:spTree>
     <p:extLst>
       <p:ext uri="{BB962C8B-B14F-4D97-AF65-F5344CB8AC3E}">
-        <p14:creationId xmlns:p14="http://schemas.microsoft.com/office/powerpoint/2010/main" xmlns="" val="3608220894"/>
+        <p14:creationId xmlns:p14="http://schemas.microsoft.com/office/powerpoint/2010/main" val="3608220894"/>
       </p:ext>
     </p:extLst>
   </p:cSld>
@@ -29978,7 +30225,7 @@
     </p:spTree>
     <p:extLst>
       <p:ext uri="{BB962C8B-B14F-4D97-AF65-F5344CB8AC3E}">
-        <p14:creationId xmlns:p14="http://schemas.microsoft.com/office/powerpoint/2010/main" xmlns="" val="1960690833"/>
+        <p14:creationId xmlns:p14="http://schemas.microsoft.com/office/powerpoint/2010/main" val="1960690833"/>
       </p:ext>
     </p:extLst>
   </p:cSld>
@@ -30096,7 +30343,7 @@
     </p:spTree>
     <p:extLst>
       <p:ext uri="{BB962C8B-B14F-4D97-AF65-F5344CB8AC3E}">
-        <p14:creationId xmlns:p14="http://schemas.microsoft.com/office/powerpoint/2010/main" xmlns="" val="1996551084"/>
+        <p14:creationId xmlns:p14="http://schemas.microsoft.com/office/powerpoint/2010/main" val="1996551084"/>
       </p:ext>
     </p:extLst>
   </p:cSld>
@@ -30457,13 +30704,8 @@
             <a:pPr lvl="1"/>
             <a:r>
               <a:rPr lang="en-US" smtClean="0"/>
-              <a:t>The structure of the application should be well </a:t>
-            </a:r>
-            <a:r>
-              <a:rPr lang="en-US" smtClean="0"/>
-              <a:t>planned</a:t>
-            </a:r>
-            <a:endParaRPr lang="en-US" smtClean="0"/>
+              <a:t>The structure of the application should be well planned</a:t>
+            </a:r>
           </a:p>
           <a:p>
             <a:endParaRPr lang="en-US"/>
@@ -30473,7 +30715,7 @@
     </p:spTree>
     <p:extLst>
       <p:ext uri="{BB962C8B-B14F-4D97-AF65-F5344CB8AC3E}">
-        <p14:creationId xmlns:p14="http://schemas.microsoft.com/office/powerpoint/2010/main" xmlns="" val="323619009"/>
+        <p14:creationId xmlns:p14="http://schemas.microsoft.com/office/powerpoint/2010/main" val="323619009"/>
       </p:ext>
     </p:extLst>
   </p:cSld>
@@ -30774,7 +31016,7 @@
     </p:spTree>
     <p:extLst>
       <p:ext uri="{BB962C8B-B14F-4D97-AF65-F5344CB8AC3E}">
-        <p14:creationId xmlns:p14="http://schemas.microsoft.com/office/powerpoint/2010/main" xmlns="" val="1399430186"/>
+        <p14:creationId xmlns:p14="http://schemas.microsoft.com/office/powerpoint/2010/main" val="1399430186"/>
       </p:ext>
     </p:extLst>
   </p:cSld>
@@ -30854,7 +31096,7 @@
     </p:spTree>
     <p:extLst>
       <p:ext uri="{BB962C8B-B14F-4D97-AF65-F5344CB8AC3E}">
-        <p14:creationId xmlns:p14="http://schemas.microsoft.com/office/powerpoint/2010/main" xmlns="" val="4109416244"/>
+        <p14:creationId xmlns:p14="http://schemas.microsoft.com/office/powerpoint/2010/main" val="4109416244"/>
       </p:ext>
     </p:extLst>
   </p:cSld>
@@ -31092,7 +31334,7 @@
     </p:spTree>
     <p:extLst>
       <p:ext uri="{BB962C8B-B14F-4D97-AF65-F5344CB8AC3E}">
-        <p14:creationId xmlns:p14="http://schemas.microsoft.com/office/powerpoint/2010/main" xmlns="" val="3388566770"/>
+        <p14:creationId xmlns:p14="http://schemas.microsoft.com/office/powerpoint/2010/main" val="3388566770"/>
       </p:ext>
     </p:extLst>
   </p:cSld>
@@ -31336,7 +31578,7 @@
   <a:extraClrSchemeLst/>
   <a:extLst>
     <a:ext uri="{05A4C25C-085E-4340-85A3-A5531E510DB2}">
-      <thm15:themeFamily xmlns:thm15="http://schemas.microsoft.com/office/thememl/2012/main" xmlns="" name="Organic" id="{28CDC826-8792-45C0-861B-85EB3ADEDA33}" vid="{E4E49EB0-FB00-41F5-9359-4843D783A23D}"/>
+      <thm15:themeFamily xmlns:thm15="http://schemas.microsoft.com/office/thememl/2012/main" name="Organic" id="{28CDC826-8792-45C0-861B-85EB3ADEDA33}" vid="{E4E49EB0-FB00-41F5-9359-4843D783A23D}"/>
     </a:ext>
   </a:extLst>
 </a:theme>
@@ -31597,7 +31839,7 @@
   <a:extraClrSchemeLst/>
   <a:extLst>
     <a:ext uri="{05A4C25C-085E-4340-85A3-A5531E510DB2}">
-      <thm15:themeFamily xmlns:thm15="http://schemas.microsoft.com/office/thememl/2012/main" xmlns="" name="Office Theme" id="{62F939B6-93AF-4DB8-9C6B-D6C7DFDC589F}" vid="{4A3C46E8-61CC-4603-A589-7422A47A8E4A}"/>
+      <thm15:themeFamily xmlns:thm15="http://schemas.microsoft.com/office/thememl/2012/main" name="Office Theme" id="{62F939B6-93AF-4DB8-9C6B-D6C7DFDC589F}" vid="{4A3C46E8-61CC-4603-A589-7422A47A8E4A}"/>
     </a:ext>
   </a:extLst>
 </a:theme>

</xml_diff>

<commit_message>
David Silva section written
</commit_message>
<xml_diff>
--- a/Final Presentation/Presentation.pptx
+++ b/Final Presentation/Presentation.pptx
@@ -5,7 +5,7 @@
     <p:sldMasterId id="2147484047" r:id="rId1"/>
   </p:sldMasterIdLst>
   <p:notesMasterIdLst>
-    <p:notesMasterId r:id="rId71"/>
+    <p:notesMasterId r:id="rId72"/>
   </p:notesMasterIdLst>
   <p:sldIdLst>
     <p:sldId id="256" r:id="rId2"/>
@@ -65,18 +65,19 @@
     <p:sldId id="286" r:id="rId56"/>
     <p:sldId id="336" r:id="rId57"/>
     <p:sldId id="287" r:id="rId58"/>
-    <p:sldId id="288" r:id="rId59"/>
-    <p:sldId id="327" r:id="rId60"/>
-    <p:sldId id="328" r:id="rId61"/>
-    <p:sldId id="329" r:id="rId62"/>
-    <p:sldId id="343" r:id="rId63"/>
-    <p:sldId id="344" r:id="rId64"/>
-    <p:sldId id="290" r:id="rId65"/>
-    <p:sldId id="306" r:id="rId66"/>
-    <p:sldId id="291" r:id="rId67"/>
-    <p:sldId id="342" r:id="rId68"/>
-    <p:sldId id="292" r:id="rId69"/>
-    <p:sldId id="337" r:id="rId70"/>
+    <p:sldId id="345" r:id="rId59"/>
+    <p:sldId id="288" r:id="rId60"/>
+    <p:sldId id="327" r:id="rId61"/>
+    <p:sldId id="328" r:id="rId62"/>
+    <p:sldId id="329" r:id="rId63"/>
+    <p:sldId id="343" r:id="rId64"/>
+    <p:sldId id="344" r:id="rId65"/>
+    <p:sldId id="290" r:id="rId66"/>
+    <p:sldId id="306" r:id="rId67"/>
+    <p:sldId id="291" r:id="rId68"/>
+    <p:sldId id="342" r:id="rId69"/>
+    <p:sldId id="292" r:id="rId70"/>
+    <p:sldId id="337" r:id="rId71"/>
   </p:sldIdLst>
   <p:sldSz cx="12192000" cy="6858000"/>
   <p:notesSz cx="6858000" cy="9144000"/>
@@ -177,7 +178,7 @@
   </p:defaultTextStyle>
   <p:extLst>
     <p:ext uri="{EFAFB233-063F-42B5-8137-9DF3F51BA10A}">
-      <p15:sldGuideLst xmlns:p15="http://schemas.microsoft.com/office/powerpoint/2012/main" xmlns="">
+      <p15:sldGuideLst xmlns:p15="http://schemas.microsoft.com/office/powerpoint/2012/main">
         <p15:guide id="1" orient="horz" pos="2160">
           <p15:clr>
             <a:srgbClr val="A4A3A4"/>
@@ -203,7 +204,7 @@
 <file path=ppt/charts/chart1.xml><?xml version="1.0" encoding="utf-8"?>
 <c:chartSpace xmlns:c="http://schemas.openxmlformats.org/drawingml/2006/chart" xmlns:a="http://schemas.openxmlformats.org/drawingml/2006/main" xmlns:r="http://schemas.openxmlformats.org/officeDocument/2006/relationships">
   <c:date1904 val="0"/>
-  <c:lang val="pt-PT"/>
+  <c:lang val="en-US"/>
   <c:roundedCorners val="0"/>
   <mc:AlternateContent xmlns:mc="http://schemas.openxmlformats.org/markup-compatibility/2006">
     <mc:Choice xmlns:c14="http://schemas.microsoft.com/office/drawing/2007/8/2/chart" Requires="c14">
@@ -248,6 +249,26 @@
         </a:ln>
         <a:effectLst/>
       </c:spPr>
+      <c:txPr>
+        <a:bodyPr rot="0" spcFirstLastPara="1" vertOverflow="ellipsis" vert="horz" wrap="square" anchor="ctr" anchorCtr="1"/>
+        <a:lstStyle/>
+        <a:p>
+          <a:pPr>
+            <a:defRPr sz="2128" b="1" i="0" u="none" strike="noStrike" kern="1200" cap="all" spc="120" normalizeH="0" baseline="0">
+              <a:solidFill>
+                <a:schemeClr val="tx1">
+                  <a:lumMod val="65000"/>
+                  <a:lumOff val="35000"/>
+                </a:schemeClr>
+              </a:solidFill>
+              <a:latin typeface="+mn-lt"/>
+              <a:ea typeface="+mn-ea"/>
+              <a:cs typeface="+mn-cs"/>
+            </a:defRPr>
+          </a:pPr>
+          <a:endParaRPr lang="pt-PT"/>
+        </a:p>
+      </c:txPr>
     </c:title>
     <c:autoTitleDeleted val="0"/>
     <c:plotArea>
@@ -506,11 +527,11 @@
         </c:dLbls>
         <c:gapWidth val="444"/>
         <c:overlap val="-90"/>
-        <c:axId val="94465024"/>
-        <c:axId val="70739072"/>
+        <c:axId val="39560544"/>
+        <c:axId val="143740416"/>
       </c:barChart>
       <c:catAx>
-        <c:axId val="94465024"/>
+        <c:axId val="39560544"/>
         <c:scaling>
           <c:orientation val="minMax"/>
         </c:scaling>
@@ -567,7 +588,7 @@
             <a:endParaRPr lang="pt-PT"/>
           </a:p>
         </c:txPr>
-        <c:crossAx val="70739072"/>
+        <c:crossAx val="143740416"/>
         <c:crosses val="autoZero"/>
         <c:auto val="1"/>
         <c:lblAlgn val="ctr"/>
@@ -575,7 +596,7 @@
         <c:noMultiLvlLbl val="0"/>
       </c:catAx>
       <c:valAx>
-        <c:axId val="70739072"/>
+        <c:axId val="143740416"/>
         <c:scaling>
           <c:orientation val="minMax"/>
         </c:scaling>
@@ -585,7 +606,7 @@
         <c:majorTickMark val="none"/>
         <c:minorTickMark val="none"/>
         <c:tickLblPos val="none"/>
-        <c:crossAx val="94465024"/>
+        <c:crossAx val="39560544"/>
         <c:crosses val="autoZero"/>
         <c:crossBetween val="between"/>
       </c:valAx>
@@ -649,7 +670,7 @@
       <a:endParaRPr lang="pt-PT"/>
     </a:p>
   </c:txPr>
-  <c:externalData r:id="rId1">
+  <c:externalData r:id="rId3">
     <c:autoUpdate val="0"/>
   </c:externalData>
 </c:chartSpace>
@@ -658,7 +679,7 @@
 <file path=ppt/charts/chart2.xml><?xml version="1.0" encoding="utf-8"?>
 <c:chartSpace xmlns:c="http://schemas.openxmlformats.org/drawingml/2006/chart" xmlns:a="http://schemas.openxmlformats.org/drawingml/2006/main" xmlns:r="http://schemas.openxmlformats.org/officeDocument/2006/relationships">
   <c:date1904 val="0"/>
-  <c:lang val="pt-PT"/>
+  <c:lang val="en-US"/>
   <c:roundedCorners val="0"/>
   <mc:AlternateContent xmlns:mc="http://schemas.openxmlformats.org/markup-compatibility/2006">
     <mc:Choice xmlns:c14="http://schemas.microsoft.com/office/drawing/2007/8/2/chart" Requires="c14">
@@ -711,6 +732,26 @@
         </a:ln>
         <a:effectLst/>
       </c:spPr>
+      <c:txPr>
+        <a:bodyPr rot="0" spcFirstLastPara="1" vertOverflow="ellipsis" vert="horz" wrap="square" anchor="ctr" anchorCtr="1"/>
+        <a:lstStyle/>
+        <a:p>
+          <a:pPr>
+            <a:defRPr sz="2128" b="1" i="0" u="none" strike="noStrike" kern="1200" cap="all" spc="120" normalizeH="0" baseline="0">
+              <a:solidFill>
+                <a:schemeClr val="tx1">
+                  <a:lumMod val="65000"/>
+                  <a:lumOff val="35000"/>
+                </a:schemeClr>
+              </a:solidFill>
+              <a:latin typeface="+mn-lt"/>
+              <a:ea typeface="+mn-ea"/>
+              <a:cs typeface="+mn-cs"/>
+            </a:defRPr>
+          </a:pPr>
+          <a:endParaRPr lang="pt-PT"/>
+        </a:p>
+      </c:txPr>
     </c:title>
     <c:autoTitleDeleted val="0"/>
     <c:plotArea>
@@ -975,11 +1016,11 @@
         </c:dLbls>
         <c:gapWidth val="444"/>
         <c:overlap val="-90"/>
-        <c:axId val="99560448"/>
-        <c:axId val="59949632"/>
+        <c:axId val="143701920"/>
+        <c:axId val="143702304"/>
       </c:barChart>
       <c:catAx>
-        <c:axId val="99560448"/>
+        <c:axId val="143701920"/>
         <c:scaling>
           <c:orientation val="minMax"/>
         </c:scaling>
@@ -1036,7 +1077,7 @@
             <a:endParaRPr lang="pt-PT"/>
           </a:p>
         </c:txPr>
-        <c:crossAx val="59949632"/>
+        <c:crossAx val="143702304"/>
         <c:crosses val="autoZero"/>
         <c:auto val="1"/>
         <c:lblAlgn val="ctr"/>
@@ -1044,7 +1085,7 @@
         <c:noMultiLvlLbl val="0"/>
       </c:catAx>
       <c:valAx>
-        <c:axId val="59949632"/>
+        <c:axId val="143702304"/>
         <c:scaling>
           <c:orientation val="minMax"/>
         </c:scaling>
@@ -1054,7 +1095,7 @@
         <c:majorTickMark val="none"/>
         <c:minorTickMark val="none"/>
         <c:tickLblPos val="none"/>
-        <c:crossAx val="99560448"/>
+        <c:crossAx val="143701920"/>
         <c:crosses val="autoZero"/>
         <c:crossBetween val="between"/>
       </c:valAx>
@@ -1164,7 +1205,7 @@
       <a:endParaRPr lang="pt-PT"/>
     </a:p>
   </c:txPr>
-  <c:externalData r:id="rId1">
+  <c:externalData r:id="rId3">
     <c:autoUpdate val="0"/>
   </c:externalData>
 </c:chartSpace>
@@ -1173,7 +1214,7 @@
 <file path=ppt/charts/chart3.xml><?xml version="1.0" encoding="utf-8"?>
 <c:chartSpace xmlns:c="http://schemas.openxmlformats.org/drawingml/2006/chart" xmlns:a="http://schemas.openxmlformats.org/drawingml/2006/main" xmlns:r="http://schemas.openxmlformats.org/officeDocument/2006/relationships">
   <c:date1904 val="0"/>
-  <c:lang val="pt-PT"/>
+  <c:lang val="en-US"/>
   <c:roundedCorners val="0"/>
   <mc:AlternateContent xmlns:mc="http://schemas.openxmlformats.org/markup-compatibility/2006">
     <mc:Choice xmlns:c14="http://schemas.microsoft.com/office/drawing/2007/8/2/chart" Requires="c14">
@@ -1218,6 +1259,26 @@
         </a:ln>
         <a:effectLst/>
       </c:spPr>
+      <c:txPr>
+        <a:bodyPr rot="0" spcFirstLastPara="1" vertOverflow="ellipsis" vert="horz" wrap="square" anchor="ctr" anchorCtr="1"/>
+        <a:lstStyle/>
+        <a:p>
+          <a:pPr>
+            <a:defRPr sz="2128" b="1" i="0" u="none" strike="noStrike" kern="1200" cap="all" spc="120" normalizeH="0" baseline="0">
+              <a:solidFill>
+                <a:schemeClr val="tx1">
+                  <a:lumMod val="65000"/>
+                  <a:lumOff val="35000"/>
+                </a:schemeClr>
+              </a:solidFill>
+              <a:latin typeface="+mn-lt"/>
+              <a:ea typeface="+mn-ea"/>
+              <a:cs typeface="+mn-cs"/>
+            </a:defRPr>
+          </a:pPr>
+          <a:endParaRPr lang="pt-PT"/>
+        </a:p>
+      </c:txPr>
     </c:title>
     <c:autoTitleDeleted val="0"/>
     <c:plotArea>
@@ -1354,11 +1415,11 @@
         </c:dLbls>
         <c:gapWidth val="444"/>
         <c:overlap val="-90"/>
-        <c:axId val="99929088"/>
-        <c:axId val="59952512"/>
+        <c:axId val="143798864"/>
+        <c:axId val="142903864"/>
       </c:barChart>
       <c:catAx>
-        <c:axId val="99929088"/>
+        <c:axId val="143798864"/>
         <c:scaling>
           <c:orientation val="minMax"/>
         </c:scaling>
@@ -1415,7 +1476,7 @@
             <a:endParaRPr lang="pt-PT"/>
           </a:p>
         </c:txPr>
-        <c:crossAx val="59952512"/>
+        <c:crossAx val="142903864"/>
         <c:crosses val="autoZero"/>
         <c:auto val="1"/>
         <c:lblAlgn val="ctr"/>
@@ -1423,7 +1484,7 @@
         <c:noMultiLvlLbl val="0"/>
       </c:catAx>
       <c:valAx>
-        <c:axId val="59952512"/>
+        <c:axId val="142903864"/>
         <c:scaling>
           <c:orientation val="minMax"/>
         </c:scaling>
@@ -1433,7 +1494,7 @@
         <c:majorTickMark val="none"/>
         <c:minorTickMark val="none"/>
         <c:tickLblPos val="none"/>
-        <c:crossAx val="99929088"/>
+        <c:crossAx val="143798864"/>
         <c:crosses val="autoZero"/>
         <c:crossBetween val="between"/>
       </c:valAx>
@@ -1466,7 +1527,7 @@
       <a:endParaRPr lang="pt-PT"/>
     </a:p>
   </c:txPr>
-  <c:externalData r:id="rId1">
+  <c:externalData r:id="rId3">
     <c:autoUpdate val="0"/>
   </c:externalData>
 </c:chartSpace>
@@ -1475,7 +1536,7 @@
 <file path=ppt/charts/chart4.xml><?xml version="1.0" encoding="utf-8"?>
 <c:chartSpace xmlns:c="http://schemas.openxmlformats.org/drawingml/2006/chart" xmlns:a="http://schemas.openxmlformats.org/drawingml/2006/main" xmlns:r="http://schemas.openxmlformats.org/officeDocument/2006/relationships">
   <c:date1904 val="0"/>
-  <c:lang val="pt-PT"/>
+  <c:lang val="en-US"/>
   <c:roundedCorners val="0"/>
   <mc:AlternateContent xmlns:mc="http://schemas.openxmlformats.org/markup-compatibility/2006">
     <mc:Choice xmlns:c14="http://schemas.microsoft.com/office/drawing/2007/8/2/chart" Requires="c14">
@@ -1790,11 +1851,11 @@
         </c:dLbls>
         <c:gapWidth val="219"/>
         <c:overlap val="-27"/>
-        <c:axId val="99675648"/>
-        <c:axId val="59954240"/>
+        <c:axId val="143761912"/>
+        <c:axId val="143762304"/>
       </c:barChart>
       <c:catAx>
-        <c:axId val="99675648"/>
+        <c:axId val="143761912"/>
         <c:scaling>
           <c:orientation val="minMax"/>
         </c:scaling>
@@ -1837,7 +1898,7 @@
             <a:endParaRPr lang="pt-PT"/>
           </a:p>
         </c:txPr>
-        <c:crossAx val="59954240"/>
+        <c:crossAx val="143762304"/>
         <c:crosses val="autoZero"/>
         <c:auto val="1"/>
         <c:lblAlgn val="ctr"/>
@@ -1845,7 +1906,7 @@
         <c:noMultiLvlLbl val="0"/>
       </c:catAx>
       <c:valAx>
-        <c:axId val="59954240"/>
+        <c:axId val="143762304"/>
         <c:scaling>
           <c:orientation val="minMax"/>
         </c:scaling>
@@ -1896,7 +1957,7 @@
             <a:endParaRPr lang="pt-PT"/>
           </a:p>
         </c:txPr>
-        <c:crossAx val="99675648"/>
+        <c:crossAx val="143761912"/>
         <c:crosses val="autoZero"/>
         <c:crossBetween val="between"/>
       </c:valAx>
@@ -1969,7 +2030,7 @@
 <file path=ppt/charts/chart5.xml><?xml version="1.0" encoding="utf-8"?>
 <c:chartSpace xmlns:c="http://schemas.openxmlformats.org/drawingml/2006/chart" xmlns:a="http://schemas.openxmlformats.org/drawingml/2006/main" xmlns:r="http://schemas.openxmlformats.org/officeDocument/2006/relationships">
   <c:date1904 val="0"/>
-  <c:lang val="pt-PT"/>
+  <c:lang val="en-US"/>
   <c:roundedCorners val="0"/>
   <mc:AlternateContent xmlns:mc="http://schemas.openxmlformats.org/markup-compatibility/2006">
     <mc:Choice xmlns:c14="http://schemas.microsoft.com/office/drawing/2007/8/2/chart" Requires="c14">
@@ -2298,11 +2359,11 @@
             <a:effectLst/>
           </c:spPr>
         </c:hiLowLines>
-        <c:axId val="99843584"/>
-        <c:axId val="59956544"/>
+        <c:axId val="143763088"/>
+        <c:axId val="143763480"/>
       </c:stockChart>
       <c:catAx>
-        <c:axId val="99843584"/>
+        <c:axId val="143763088"/>
         <c:scaling>
           <c:orientation val="minMax"/>
         </c:scaling>
@@ -2345,7 +2406,7 @@
             <a:endParaRPr lang="pt-PT"/>
           </a:p>
         </c:txPr>
-        <c:crossAx val="59956544"/>
+        <c:crossAx val="143763480"/>
         <c:crosses val="autoZero"/>
         <c:auto val="1"/>
         <c:lblAlgn val="ctr"/>
@@ -2353,7 +2414,7 @@
         <c:noMultiLvlLbl val="0"/>
       </c:catAx>
       <c:valAx>
-        <c:axId val="59956544"/>
+        <c:axId val="143763480"/>
         <c:scaling>
           <c:orientation val="minMax"/>
         </c:scaling>
@@ -2404,7 +2465,7 @@
             <a:endParaRPr lang="pt-PT"/>
           </a:p>
         </c:txPr>
-        <c:crossAx val="99843584"/>
+        <c:crossAx val="143763088"/>
         <c:crosses val="autoZero"/>
         <c:crossBetween val="between"/>
         <c:majorUnit val="1"/>
@@ -2448,7 +2509,7 @@
 <file path=ppt/charts/chart6.xml><?xml version="1.0" encoding="utf-8"?>
 <c:chartSpace xmlns:c="http://schemas.openxmlformats.org/drawingml/2006/chart" xmlns:a="http://schemas.openxmlformats.org/drawingml/2006/main" xmlns:r="http://schemas.openxmlformats.org/officeDocument/2006/relationships">
   <c:date1904 val="0"/>
-  <c:lang val="pt-PT"/>
+  <c:lang val="en-US"/>
   <c:roundedCorners val="0"/>
   <mc:AlternateContent xmlns:mc="http://schemas.openxmlformats.org/markup-compatibility/2006">
     <mc:Choice xmlns:c14="http://schemas.microsoft.com/office/drawing/2007/8/2/chart" Requires="c14">
@@ -2610,7 +2671,7 @@
 <file path=ppt/charts/chart7.xml><?xml version="1.0" encoding="utf-8"?>
 <c:chartSpace xmlns:c="http://schemas.openxmlformats.org/drawingml/2006/chart" xmlns:a="http://schemas.openxmlformats.org/drawingml/2006/main" xmlns:r="http://schemas.openxmlformats.org/officeDocument/2006/relationships">
   <c:date1904 val="0"/>
-  <c:lang val="pt-PT"/>
+  <c:lang val="en-US"/>
   <c:roundedCorners val="0"/>
   <mc:AlternateContent xmlns:mc="http://schemas.openxmlformats.org/markup-compatibility/2006">
     <mc:Choice xmlns:c14="http://schemas.microsoft.com/office/drawing/2007/8/2/chart" Requires="c14">
@@ -3079,7 +3140,7 @@
       <a:endParaRPr lang="pt-PT"/>
     </a:p>
   </c:txPr>
-  <c:externalData r:id="rId1">
+  <c:externalData r:id="rId3">
     <c:autoUpdate val="0"/>
   </c:externalData>
 </c:chartSpace>
@@ -10094,7 +10155,7 @@
             <a:fld id="{3969ECAC-4CC7-4FDF-8D22-C5AD85B730EC}" type="slidenum">
               <a:rPr lang="pt-PT" smtClean="0"/>
               <a:pPr/>
-              <a:t>59</a:t>
+              <a:t>60</a:t>
             </a:fld>
             <a:endParaRPr lang="pt-PT"/>
           </a:p>
@@ -10179,7 +10240,7 @@
             <a:fld id="{3969ECAC-4CC7-4FDF-8D22-C5AD85B730EC}" type="slidenum">
               <a:rPr lang="pt-PT" smtClean="0"/>
               <a:pPr/>
-              <a:t>60</a:t>
+              <a:t>61</a:t>
             </a:fld>
             <a:endParaRPr lang="pt-PT"/>
           </a:p>
@@ -10264,7 +10325,7 @@
             <a:fld id="{3969ECAC-4CC7-4FDF-8D22-C5AD85B730EC}" type="slidenum">
               <a:rPr lang="pt-PT" smtClean="0"/>
               <a:pPr/>
-              <a:t>61</a:t>
+              <a:t>62</a:t>
             </a:fld>
             <a:endParaRPr lang="pt-PT"/>
           </a:p>
@@ -10349,7 +10410,7 @@
             <a:fld id="{0E4FF081-3A8B-4019-8856-6C60FECB4303}" type="slidenum">
               <a:rPr lang="pt-PT" smtClean="0"/>
               <a:pPr/>
-              <a:t>62</a:t>
+              <a:t>63</a:t>
             </a:fld>
             <a:endParaRPr lang="pt-PT"/>
           </a:p>
@@ -20202,7 +20263,6 @@
               <a:rPr lang="en-US" dirty="0"/>
               <a:t>Analysis and Conclusions</a:t>
             </a:r>
-            <a:endParaRPr lang="en-US" dirty="0"/>
           </a:p>
         </p:txBody>
       </p:sp>
@@ -28829,10 +28889,69 @@
         </p:nvSpPr>
         <p:spPr/>
         <p:txBody>
-          <a:bodyPr/>
+          <a:bodyPr>
+            <a:normAutofit fontScale="92500" lnSpcReduction="10000"/>
+          </a:bodyPr>
           <a:lstStyle/>
           <a:p>
-            <a:endParaRPr lang="pt-PT"/>
+            <a:r>
+              <a:rPr lang="en-US" dirty="0"/>
+              <a:t>Main contributions</a:t>
+            </a:r>
+          </a:p>
+          <a:p>
+            <a:pPr lvl="1"/>
+            <a:r>
+              <a:rPr lang="en-US" dirty="0"/>
+              <a:t>Help tweaking and improving software requirements</a:t>
+            </a:r>
+            <a:endParaRPr lang="pt-PT" dirty="0"/>
+          </a:p>
+          <a:p>
+            <a:pPr lvl="1"/>
+            <a:r>
+              <a:rPr lang="en-US" dirty="0"/>
+              <a:t>Writing of test plan</a:t>
+            </a:r>
+            <a:endParaRPr lang="pt-PT" dirty="0"/>
+          </a:p>
+          <a:p>
+            <a:pPr lvl="1"/>
+            <a:r>
+              <a:rPr lang="en-US" dirty="0"/>
+              <a:t>Development of some software modules</a:t>
+            </a:r>
+            <a:endParaRPr lang="pt-PT" dirty="0"/>
+          </a:p>
+          <a:p>
+            <a:pPr lvl="1"/>
+            <a:r>
+              <a:rPr lang="en-US" dirty="0"/>
+              <a:t>Any other help needed</a:t>
+            </a:r>
+            <a:endParaRPr lang="en-US" dirty="0"/>
+          </a:p>
+          <a:p>
+            <a:r>
+              <a:rPr lang="en-US" dirty="0"/>
+              <a:t>Participation analysis</a:t>
+            </a:r>
+          </a:p>
+          <a:p>
+            <a:pPr lvl="1"/>
+            <a:r>
+              <a:rPr lang="en-US" dirty="0"/>
+              <a:t>Doesn’t have the biggest initiative, but do a little of anything</a:t>
+            </a:r>
+            <a:endParaRPr lang="pt-PT" dirty="0"/>
+          </a:p>
+          <a:p>
+            <a:pPr lvl="1"/>
+            <a:r>
+              <a:rPr lang="en-US" dirty="0"/>
+              <a:t>Analyze things and talk when find a possible improvement</a:t>
+            </a:r>
+            <a:endParaRPr lang="pt-PT" dirty="0"/>
           </a:p>
         </p:txBody>
       </p:sp>
@@ -28878,7 +28997,7 @@
           <a:p>
             <a:r>
               <a:rPr lang="pt-PT" dirty="0" smtClean="0"/>
-              <a:t>Filipe Brandão</a:t>
+              <a:t>David João</a:t>
             </a:r>
             <a:endParaRPr lang="pt-PT" dirty="0"/>
           </a:p>
@@ -28896,14 +29015,80 @@
         </p:nvSpPr>
         <p:spPr/>
         <p:txBody>
-          <a:bodyPr/>
+          <a:bodyPr>
+            <a:normAutofit/>
+          </a:bodyPr>
           <a:lstStyle/>
           <a:p>
-            <a:endParaRPr lang="pt-PT"/>
+            <a:r>
+              <a:rPr lang="en-US" dirty="0"/>
+              <a:t>Lessons Learned</a:t>
+            </a:r>
+          </a:p>
+          <a:p>
+            <a:pPr lvl="1"/>
+            <a:r>
+              <a:rPr lang="en-US" dirty="0"/>
+              <a:t>Team work on a big team isn’t easy</a:t>
+            </a:r>
+            <a:endParaRPr lang="pt-PT" dirty="0"/>
+          </a:p>
+          <a:p>
+            <a:pPr lvl="1"/>
+            <a:r>
+              <a:rPr lang="en-US" dirty="0"/>
+              <a:t>There are 11 types of software developers:</a:t>
+            </a:r>
+            <a:endParaRPr lang="pt-PT" dirty="0"/>
+          </a:p>
+          <a:p>
+            <a:pPr lvl="2"/>
+            <a:r>
+              <a:rPr lang="en-US" dirty="0"/>
+              <a:t>The programmer</a:t>
+            </a:r>
+            <a:endParaRPr lang="pt-PT" dirty="0"/>
+          </a:p>
+          <a:p>
+            <a:pPr lvl="2"/>
+            <a:r>
+              <a:rPr lang="en-US" dirty="0"/>
+              <a:t>The tester</a:t>
+            </a:r>
+            <a:endParaRPr lang="pt-PT" dirty="0"/>
+          </a:p>
+          <a:p>
+            <a:pPr lvl="2"/>
+            <a:r>
+              <a:rPr lang="en-US" dirty="0"/>
+              <a:t>The dude how read in binary</a:t>
+            </a:r>
+            <a:endParaRPr lang="pt-PT" dirty="0"/>
+          </a:p>
+          <a:p>
+            <a:pPr lvl="1"/>
+            <a:r>
+              <a:rPr lang="en-US" dirty="0"/>
+              <a:t>If neither you  nor the testers can detect more bugs, give it to your master and grab a pen and a notepad, you </a:t>
+            </a:r>
+            <a:r>
+              <a:rPr lang="en-US" dirty="0" err="1"/>
+              <a:t>gonna</a:t>
+            </a:r>
+            <a:r>
+              <a:rPr lang="en-US" dirty="0"/>
+              <a:t> need it</a:t>
+            </a:r>
+            <a:endParaRPr lang="pt-PT" dirty="0"/>
           </a:p>
         </p:txBody>
       </p:sp>
     </p:spTree>
+    <p:extLst>
+      <p:ext uri="{BB962C8B-B14F-4D97-AF65-F5344CB8AC3E}">
+        <p14:creationId xmlns:p14="http://schemas.microsoft.com/office/powerpoint/2010/main" val="972600345"/>
+      </p:ext>
+    </p:extLst>
   </p:cSld>
   <p:clrMapOvr>
     <a:masterClrMapping/>
@@ -28944,18 +29129,10 @@
           <a:lstStyle/>
           <a:p>
             <a:r>
-              <a:rPr lang="pt-PT" dirty="0"/>
-              <a:t>Filipe </a:t>
-            </a:r>
-            <a:r>
               <a:rPr lang="pt-PT" dirty="0" smtClean="0"/>
-              <a:t>Brandão - </a:t>
-            </a:r>
-            <a:r>
-              <a:rPr lang="pt-PT" b="1" dirty="0" err="1" smtClean="0"/>
-              <a:t>Contributions</a:t>
-            </a:r>
-            <a:endParaRPr lang="pt-PT" b="1" dirty="0"/>
+              <a:t>Filipe Brandão</a:t>
+            </a:r>
+            <a:endParaRPr lang="pt-PT" dirty="0"/>
           </a:p>
         </p:txBody>
       </p:sp>
@@ -28974,60 +29151,15 @@
           <a:bodyPr/>
           <a:lstStyle/>
           <a:p>
-            <a:pPr lvl="1"/>
-            <a:r>
-              <a:rPr lang="en-US" dirty="0" smtClean="0"/>
-              <a:t>Previous experience :</a:t>
-            </a:r>
-          </a:p>
-          <a:p>
-            <a:pPr lvl="2"/>
-            <a:r>
-              <a:rPr lang="en-US" dirty="0" smtClean="0"/>
-              <a:t>allowed a more direct approach to the problems presented</a:t>
-            </a:r>
-          </a:p>
-          <a:p>
-            <a:pPr lvl="2"/>
-            <a:r>
-              <a:rPr lang="en-US" dirty="0" smtClean="0"/>
-              <a:t>allowed me to help other members providing guidance</a:t>
-            </a:r>
-          </a:p>
-          <a:p>
-            <a:pPr lvl="1"/>
-            <a:endParaRPr lang="pt-PT" dirty="0" smtClean="0"/>
-          </a:p>
-          <a:p>
-            <a:pPr lvl="1"/>
-            <a:endParaRPr lang="pt-PT" dirty="0" smtClean="0"/>
-          </a:p>
-          <a:p>
-            <a:pPr lvl="1"/>
-            <a:endParaRPr lang="pt-PT" dirty="0"/>
-          </a:p>
-          <a:p>
-            <a:endParaRPr lang="pt-PT" dirty="0"/>
+            <a:endParaRPr lang="pt-PT"/>
           </a:p>
         </p:txBody>
       </p:sp>
     </p:spTree>
-    <p:extLst>
-      <p:ext uri="{BB962C8B-B14F-4D97-AF65-F5344CB8AC3E}">
-        <p14:creationId xmlns:p14="http://schemas.microsoft.com/office/powerpoint/2010/main" val="529958241"/>
-      </p:ext>
-    </p:extLst>
   </p:cSld>
   <p:clrMapOvr>
     <a:masterClrMapping/>
   </p:clrMapOvr>
-  <p:timing>
-    <p:tnLst>
-      <p:par>
-        <p:cTn id="1" dur="indefinite" restart="never" nodeType="tmRoot"/>
-      </p:par>
-    </p:tnLst>
-  </p:timing>
 </p:sld>
 </file>
 
@@ -29160,15 +29292,7 @@
             </a:r>
             <a:r>
               <a:rPr lang="pt-PT" b="1" dirty="0" err="1" smtClean="0"/>
-              <a:t>Lessons</a:t>
-            </a:r>
-            <a:r>
-              <a:rPr lang="pt-PT" b="1" dirty="0" smtClean="0"/>
-              <a:t> </a:t>
-            </a:r>
-            <a:r>
-              <a:rPr lang="pt-PT" b="1" dirty="0" err="1" smtClean="0"/>
-              <a:t>Learned</a:t>
+              <a:t>Contributions</a:t>
             </a:r>
             <a:endParaRPr lang="pt-PT" b="1" dirty="0"/>
           </a:p>
@@ -29186,108 +29310,42 @@
         </p:nvSpPr>
         <p:spPr/>
         <p:txBody>
-          <a:bodyPr>
-            <a:normAutofit fontScale="85000" lnSpcReduction="20000"/>
-          </a:bodyPr>
+          <a:bodyPr/>
           <a:lstStyle/>
           <a:p>
+            <a:pPr lvl="1"/>
             <a:r>
               <a:rPr lang="en-US" dirty="0" smtClean="0"/>
-              <a:t>Project Management is a lot about experience, learning lessons and adapting based on all the previous information.</a:t>
-            </a:r>
-          </a:p>
-          <a:p>
-            <a:r>
-              <a:rPr lang="pt-PT" dirty="0" smtClean="0"/>
-              <a:t>Soft </a:t>
-            </a:r>
+              <a:t>Previous experience :</a:t>
+            </a:r>
+          </a:p>
+          <a:p>
+            <a:pPr lvl="2"/>
             <a:r>
               <a:rPr lang="en-US" dirty="0" smtClean="0"/>
-              <a:t>skills</a:t>
-            </a:r>
-            <a:r>
-              <a:rPr lang="pt-PT" dirty="0" smtClean="0"/>
-              <a:t> are </a:t>
-            </a:r>
+              <a:t>allowed a more direct approach to the problems presented</a:t>
+            </a:r>
+          </a:p>
+          <a:p>
+            <a:pPr lvl="2"/>
             <a:r>
               <a:rPr lang="en-US" dirty="0" smtClean="0"/>
-              <a:t>necessary</a:t>
-            </a:r>
-            <a:r>
-              <a:rPr lang="pt-PT" dirty="0" smtClean="0"/>
-              <a:t>: </a:t>
-            </a:r>
-            <a:r>
-              <a:rPr lang="en-US" dirty="0" smtClean="0"/>
-              <a:t>communication</a:t>
-            </a:r>
-            <a:r>
-              <a:rPr lang="pt-PT" dirty="0" smtClean="0"/>
-              <a:t>, </a:t>
-            </a:r>
-            <a:r>
-              <a:rPr lang="en-US" dirty="0" smtClean="0"/>
-              <a:t>leadership</a:t>
-            </a:r>
-            <a:r>
-              <a:rPr lang="pt-PT" dirty="0" smtClean="0"/>
-              <a:t>, handling </a:t>
-            </a:r>
-            <a:r>
-              <a:rPr lang="en-US" dirty="0" smtClean="0"/>
-              <a:t>different</a:t>
-            </a:r>
-            <a:r>
-              <a:rPr lang="pt-PT" dirty="0" smtClean="0"/>
-              <a:t> </a:t>
-            </a:r>
-            <a:r>
-              <a:rPr lang="en-US" dirty="0" smtClean="0"/>
-              <a:t>personalities</a:t>
-            </a:r>
-            <a:r>
-              <a:rPr lang="pt-PT" dirty="0" smtClean="0"/>
-              <a:t>, etc.</a:t>
-            </a:r>
-          </a:p>
-          <a:p>
-            <a:r>
-              <a:rPr lang="en-US" dirty="0" smtClean="0"/>
-              <a:t>A tool, doesn’t matter how many value it can add to our work, is worth nothing if not correctly used.</a:t>
-            </a:r>
-          </a:p>
-          <a:p>
-            <a:r>
-              <a:rPr lang="en-US" dirty="0" smtClean="0"/>
-              <a:t>Regular meetings are essential. Working together is beneficial.</a:t>
-            </a:r>
-          </a:p>
-          <a:p>
-            <a:r>
-              <a:rPr lang="en-US" dirty="0" smtClean="0"/>
-              <a:t>Project control implies different aspects depending on the project state.</a:t>
-            </a:r>
-          </a:p>
-          <a:p>
-            <a:r>
-              <a:rPr lang="en-US" dirty="0" smtClean="0"/>
-              <a:t>Transparency during the whole project is essential. </a:t>
-            </a:r>
-          </a:p>
-          <a:p>
-            <a:r>
-              <a:rPr lang="en-US" dirty="0" smtClean="0"/>
-              <a:t>Motivation is key.</a:t>
-            </a:r>
-          </a:p>
-          <a:p>
+              <a:t>allowed me to help other members providing guidance</a:t>
+            </a:r>
+          </a:p>
+          <a:p>
+            <a:pPr lvl="1"/>
+            <a:endParaRPr lang="pt-PT" dirty="0" smtClean="0"/>
+          </a:p>
+          <a:p>
+            <a:pPr lvl="1"/>
+            <a:endParaRPr lang="pt-PT" dirty="0" smtClean="0"/>
+          </a:p>
+          <a:p>
+            <a:pPr lvl="1"/>
             <a:endParaRPr lang="pt-PT" dirty="0"/>
           </a:p>
           <a:p>
-            <a:endParaRPr lang="pt-PT" dirty="0" smtClean="0"/>
-          </a:p>
-          <a:p>
-            <a:pPr lvl="1"/>
             <a:endParaRPr lang="pt-PT" dirty="0"/>
           </a:p>
         </p:txBody>
@@ -29295,7 +29353,7 @@
     </p:spTree>
     <p:extLst>
       <p:ext uri="{BB962C8B-B14F-4D97-AF65-F5344CB8AC3E}">
-        <p14:creationId xmlns:p14="http://schemas.microsoft.com/office/powerpoint/2010/main" val="1756093289"/>
+        <p14:creationId xmlns:p14="http://schemas.microsoft.com/office/powerpoint/2010/main" val="529958241"/>
       </p:ext>
     </p:extLst>
   </p:cSld>
@@ -29381,46 +29439,115 @@
         <p:spPr/>
         <p:txBody>
           <a:bodyPr>
-            <a:normAutofit/>
+            <a:normAutofit fontScale="85000" lnSpcReduction="20000"/>
           </a:bodyPr>
           <a:lstStyle/>
           <a:p>
             <a:r>
               <a:rPr lang="en-US" dirty="0" smtClean="0"/>
-              <a:t>A good Work Breakdown Chart is a good foundation for the project plan.</a:t>
-            </a:r>
-          </a:p>
-          <a:p>
+              <a:t>Project Management is a lot about experience, learning lessons and adapting based on all the previous information.</a:t>
+            </a:r>
+          </a:p>
+          <a:p>
+            <a:r>
+              <a:rPr lang="pt-PT" dirty="0" smtClean="0"/>
+              <a:t>Soft </a:t>
+            </a:r>
             <a:r>
               <a:rPr lang="en-US" dirty="0" smtClean="0"/>
-              <a:t>Earned Value Graph tasks should be related to one member. If more members are allocated to that task, repeat it.</a:t>
-            </a:r>
-          </a:p>
-          <a:p>
-            <a:r>
-              <a:rPr lang="en-US" dirty="0" smtClean="0">
-                <a:sym typeface="Wingdings" panose="05000000000000000000" pitchFamily="2" charset="2"/>
-              </a:rPr>
-              <a:t>Project Planning Process seemed OK for this project but should be added hints on how to develop a good WBS.</a:t>
-            </a:r>
-          </a:p>
-          <a:p>
-            <a:r>
-              <a:rPr lang="en-US" dirty="0" smtClean="0">
-                <a:sym typeface="Wingdings" panose="05000000000000000000" pitchFamily="2" charset="2"/>
-              </a:rPr>
-              <a:t>Regarding tools, SVN is a keeper. Facebook is good for communication but it doesn’t have search functionality.</a:t>
-            </a:r>
-            <a:endParaRPr lang="en-US" dirty="0">
-              <a:sym typeface="Wingdings" panose="05000000000000000000" pitchFamily="2" charset="2"/>
-            </a:endParaRPr>
+              <a:t>skills</a:t>
+            </a:r>
+            <a:r>
+              <a:rPr lang="pt-PT" dirty="0" smtClean="0"/>
+              <a:t> are </a:t>
+            </a:r>
+            <a:r>
+              <a:rPr lang="en-US" dirty="0" smtClean="0"/>
+              <a:t>necessary</a:t>
+            </a:r>
+            <a:r>
+              <a:rPr lang="pt-PT" dirty="0" smtClean="0"/>
+              <a:t>: </a:t>
+            </a:r>
+            <a:r>
+              <a:rPr lang="en-US" dirty="0" smtClean="0"/>
+              <a:t>communication</a:t>
+            </a:r>
+            <a:r>
+              <a:rPr lang="pt-PT" dirty="0" smtClean="0"/>
+              <a:t>, </a:t>
+            </a:r>
+            <a:r>
+              <a:rPr lang="en-US" dirty="0" smtClean="0"/>
+              <a:t>leadership</a:t>
+            </a:r>
+            <a:r>
+              <a:rPr lang="pt-PT" dirty="0" smtClean="0"/>
+              <a:t>, handling </a:t>
+            </a:r>
+            <a:r>
+              <a:rPr lang="en-US" dirty="0" smtClean="0"/>
+              <a:t>different</a:t>
+            </a:r>
+            <a:r>
+              <a:rPr lang="pt-PT" dirty="0" smtClean="0"/>
+              <a:t> </a:t>
+            </a:r>
+            <a:r>
+              <a:rPr lang="en-US" dirty="0" smtClean="0"/>
+              <a:t>personalities</a:t>
+            </a:r>
+            <a:r>
+              <a:rPr lang="pt-PT" dirty="0" smtClean="0"/>
+              <a:t>, etc.</a:t>
+            </a:r>
+          </a:p>
+          <a:p>
+            <a:r>
+              <a:rPr lang="en-US" dirty="0" smtClean="0"/>
+              <a:t>A tool, doesn’t matter how many value it can add to our work, is worth nothing if not correctly used.</a:t>
+            </a:r>
+          </a:p>
+          <a:p>
+            <a:r>
+              <a:rPr lang="en-US" dirty="0" smtClean="0"/>
+              <a:t>Regular meetings are essential. Working together is beneficial.</a:t>
+            </a:r>
+          </a:p>
+          <a:p>
+            <a:r>
+              <a:rPr lang="en-US" dirty="0" smtClean="0"/>
+              <a:t>Project control implies different aspects depending on the project state.</a:t>
+            </a:r>
+          </a:p>
+          <a:p>
+            <a:r>
+              <a:rPr lang="en-US" dirty="0" smtClean="0"/>
+              <a:t>Transparency during the whole project is essential. </a:t>
+            </a:r>
+          </a:p>
+          <a:p>
+            <a:r>
+              <a:rPr lang="en-US" dirty="0" smtClean="0"/>
+              <a:t>Motivation is key.</a:t>
+            </a:r>
+          </a:p>
+          <a:p>
+            <a:endParaRPr lang="pt-PT" dirty="0"/>
+          </a:p>
+          <a:p>
+            <a:endParaRPr lang="pt-PT" dirty="0" smtClean="0"/>
+          </a:p>
+          <a:p>
+            <a:pPr lvl="1"/>
+            <a:endParaRPr lang="pt-PT" dirty="0"/>
           </a:p>
         </p:txBody>
       </p:sp>
     </p:spTree>
     <p:extLst>
       <p:ext uri="{BB962C8B-B14F-4D97-AF65-F5344CB8AC3E}">
-        <p14:creationId xmlns:p14="http://schemas.microsoft.com/office/powerpoint/2010/main" val="3608220894"/>
+        <p14:creationId xmlns:p14="http://schemas.microsoft.com/office/powerpoint/2010/main" val="1756093289"/>
       </p:ext>
     </p:extLst>
   </p:cSld>
@@ -29470,6 +29597,131 @@
           <a:lstStyle/>
           <a:p>
             <a:r>
+              <a:rPr lang="pt-PT" dirty="0"/>
+              <a:t>Filipe </a:t>
+            </a:r>
+            <a:r>
+              <a:rPr lang="pt-PT" dirty="0" smtClean="0"/>
+              <a:t>Brandão - </a:t>
+            </a:r>
+            <a:r>
+              <a:rPr lang="pt-PT" b="1" dirty="0" err="1" smtClean="0"/>
+              <a:t>Lessons</a:t>
+            </a:r>
+            <a:r>
+              <a:rPr lang="pt-PT" b="1" dirty="0" smtClean="0"/>
+              <a:t> </a:t>
+            </a:r>
+            <a:r>
+              <a:rPr lang="pt-PT" b="1" dirty="0" err="1" smtClean="0"/>
+              <a:t>Learned</a:t>
+            </a:r>
+            <a:endParaRPr lang="pt-PT" b="1" dirty="0"/>
+          </a:p>
+        </p:txBody>
+      </p:sp>
+      <p:sp>
+        <p:nvSpPr>
+          <p:cNvPr id="3" name="Marcador de Posição de Conteúdo 2"/>
+          <p:cNvSpPr>
+            <a:spLocks noGrp="1"/>
+          </p:cNvSpPr>
+          <p:nvPr>
+            <p:ph idx="1"/>
+          </p:nvPr>
+        </p:nvSpPr>
+        <p:spPr/>
+        <p:txBody>
+          <a:bodyPr>
+            <a:normAutofit/>
+          </a:bodyPr>
+          <a:lstStyle/>
+          <a:p>
+            <a:r>
+              <a:rPr lang="en-US" dirty="0" smtClean="0"/>
+              <a:t>A good Work Breakdown Chart is a good foundation for the project plan.</a:t>
+            </a:r>
+          </a:p>
+          <a:p>
+            <a:r>
+              <a:rPr lang="en-US" dirty="0" smtClean="0"/>
+              <a:t>Earned Value Graph tasks should be related to one member. If more members are allocated to that task, repeat it.</a:t>
+            </a:r>
+          </a:p>
+          <a:p>
+            <a:r>
+              <a:rPr lang="en-US" dirty="0" smtClean="0">
+                <a:sym typeface="Wingdings" panose="05000000000000000000" pitchFamily="2" charset="2"/>
+              </a:rPr>
+              <a:t>Project Planning Process seemed OK for this project but should be added hints on how to develop a good WBS.</a:t>
+            </a:r>
+          </a:p>
+          <a:p>
+            <a:r>
+              <a:rPr lang="en-US" dirty="0" smtClean="0">
+                <a:sym typeface="Wingdings" panose="05000000000000000000" pitchFamily="2" charset="2"/>
+              </a:rPr>
+              <a:t>Regarding tools, SVN is a keeper. Facebook is good for communication but it doesn’t have search functionality.</a:t>
+            </a:r>
+            <a:endParaRPr lang="en-US" dirty="0">
+              <a:sym typeface="Wingdings" panose="05000000000000000000" pitchFamily="2" charset="2"/>
+            </a:endParaRPr>
+          </a:p>
+        </p:txBody>
+      </p:sp>
+    </p:spTree>
+    <p:extLst>
+      <p:ext uri="{BB962C8B-B14F-4D97-AF65-F5344CB8AC3E}">
+        <p14:creationId xmlns:p14="http://schemas.microsoft.com/office/powerpoint/2010/main" val="3608220894"/>
+      </p:ext>
+    </p:extLst>
+  </p:cSld>
+  <p:clrMapOvr>
+    <a:masterClrMapping/>
+  </p:clrMapOvr>
+  <p:timing>
+    <p:tnLst>
+      <p:par>
+        <p:cTn id="1" dur="indefinite" restart="never" nodeType="tmRoot"/>
+      </p:par>
+    </p:tnLst>
+  </p:timing>
+</p:sld>
+</file>
+
+<file path=ppt/slides/slide63.xml><?xml version="1.0" encoding="utf-8"?>
+<p:sld xmlns:a="http://schemas.openxmlformats.org/drawingml/2006/main" xmlns:r="http://schemas.openxmlformats.org/officeDocument/2006/relationships" xmlns:p="http://schemas.openxmlformats.org/presentationml/2006/main">
+  <p:cSld>
+    <p:spTree>
+      <p:nvGrpSpPr>
+        <p:cNvPr id="1" name=""/>
+        <p:cNvGrpSpPr/>
+        <p:nvPr/>
+      </p:nvGrpSpPr>
+      <p:grpSpPr>
+        <a:xfrm>
+          <a:off x="0" y="0"/>
+          <a:ext cx="0" cy="0"/>
+          <a:chOff x="0" y="0"/>
+          <a:chExt cx="0" cy="0"/>
+        </a:xfrm>
+      </p:grpSpPr>
+      <p:sp>
+        <p:nvSpPr>
+          <p:cNvPr id="2" name="Título 1"/>
+          <p:cNvSpPr>
+            <a:spLocks noGrp="1"/>
+          </p:cNvSpPr>
+          <p:nvPr>
+            <p:ph type="title"/>
+          </p:nvPr>
+        </p:nvSpPr>
+        <p:spPr/>
+        <p:txBody>
+          <a:bodyPr/>
+          <a:lstStyle/>
+          <a:p>
+            <a:r>
               <a:rPr lang="pt-PT" dirty="0" smtClean="0"/>
               <a:t>João Girão</a:t>
             </a:r>
@@ -29627,7 +29879,7 @@
 </p:sld>
 </file>
 
-<file path=ppt/slides/slide63.xml><?xml version="1.0" encoding="utf-8"?>
+<file path=ppt/slides/slide64.xml><?xml version="1.0" encoding="utf-8"?>
 <p:sld xmlns:a="http://schemas.openxmlformats.org/drawingml/2006/main" xmlns:r="http://schemas.openxmlformats.org/officeDocument/2006/relationships" xmlns:p="http://schemas.openxmlformats.org/presentationml/2006/main">
   <p:cSld>
     <p:spTree>
@@ -30112,134 +30364,6 @@
 </p:sld>
 </file>
 
-<file path=ppt/slides/slide64.xml><?xml version="1.0" encoding="utf-8"?>
-<p:sld xmlns:a="http://schemas.openxmlformats.org/drawingml/2006/main" xmlns:r="http://schemas.openxmlformats.org/officeDocument/2006/relationships" xmlns:p="http://schemas.openxmlformats.org/presentationml/2006/main">
-  <p:cSld>
-    <p:spTree>
-      <p:nvGrpSpPr>
-        <p:cNvPr id="1" name=""/>
-        <p:cNvGrpSpPr/>
-        <p:nvPr/>
-      </p:nvGrpSpPr>
-      <p:grpSpPr>
-        <a:xfrm>
-          <a:off x="0" y="0"/>
-          <a:ext cx="0" cy="0"/>
-          <a:chOff x="0" y="0"/>
-          <a:chExt cx="0" cy="0"/>
-        </a:xfrm>
-      </p:grpSpPr>
-      <p:sp>
-        <p:nvSpPr>
-          <p:cNvPr id="2" name="Título 1"/>
-          <p:cNvSpPr>
-            <a:spLocks noGrp="1"/>
-          </p:cNvSpPr>
-          <p:nvPr>
-            <p:ph type="title"/>
-          </p:nvPr>
-        </p:nvSpPr>
-        <p:spPr/>
-        <p:txBody>
-          <a:bodyPr/>
-          <a:lstStyle/>
-          <a:p>
-            <a:r>
-              <a:rPr lang="pt-PT" dirty="0" smtClean="0"/>
-              <a:t>João Martins</a:t>
-            </a:r>
-            <a:endParaRPr lang="pt-PT" dirty="0"/>
-          </a:p>
-        </p:txBody>
-      </p:sp>
-      <p:sp>
-        <p:nvSpPr>
-          <p:cNvPr id="3" name="Marcador de Posição de Conteúdo 2"/>
-          <p:cNvSpPr>
-            <a:spLocks noGrp="1"/>
-          </p:cNvSpPr>
-          <p:nvPr>
-            <p:ph idx="1"/>
-          </p:nvPr>
-        </p:nvSpPr>
-        <p:spPr/>
-        <p:txBody>
-          <a:bodyPr>
-            <a:normAutofit fontScale="92500" lnSpcReduction="10000"/>
-          </a:bodyPr>
-          <a:lstStyle/>
-          <a:p>
-            <a:r>
-              <a:rPr lang="en-US" dirty="0" smtClean="0"/>
-              <a:t>Main Contributions:</a:t>
-            </a:r>
-          </a:p>
-          <a:p>
-            <a:pPr lvl="1"/>
-            <a:r>
-              <a:rPr lang="en-US" dirty="0" smtClean="0"/>
-              <a:t>Project plan process definition</a:t>
-            </a:r>
-          </a:p>
-          <a:p>
-            <a:pPr lvl="1"/>
-            <a:r>
-              <a:rPr lang="en-US" dirty="0" smtClean="0"/>
-              <a:t>Verification and Validation process</a:t>
-            </a:r>
-          </a:p>
-          <a:p>
-            <a:pPr lvl="1"/>
-            <a:r>
-              <a:rPr lang="en-US" dirty="0" smtClean="0"/>
-              <a:t>Test plan</a:t>
-            </a:r>
-          </a:p>
-          <a:p>
-            <a:pPr lvl="1"/>
-            <a:r>
-              <a:rPr lang="en-US" smtClean="0"/>
-              <a:t>Settings code</a:t>
-            </a:r>
-            <a:endParaRPr lang="en-US" dirty="0" smtClean="0"/>
-          </a:p>
-          <a:p>
-            <a:r>
-              <a:rPr lang="en-US" dirty="0" smtClean="0"/>
-              <a:t>Lessons Learned:</a:t>
-            </a:r>
-          </a:p>
-          <a:p>
-            <a:pPr lvl="1"/>
-            <a:r>
-              <a:rPr lang="en-US" dirty="0" smtClean="0"/>
-              <a:t>Teamwork is important</a:t>
-            </a:r>
-          </a:p>
-          <a:p>
-            <a:pPr lvl="1"/>
-            <a:r>
-              <a:rPr lang="en-US" dirty="0" smtClean="0"/>
-              <a:t>Communication is a must!</a:t>
-            </a:r>
-          </a:p>
-        </p:txBody>
-      </p:sp>
-    </p:spTree>
-  </p:cSld>
-  <p:clrMapOvr>
-    <a:masterClrMapping/>
-  </p:clrMapOvr>
-  <p:timing>
-    <p:tnLst>
-      <p:par>
-        <p:cTn id="1" dur="indefinite" restart="never" nodeType="tmRoot"/>
-      </p:par>
-    </p:tnLst>
-  </p:timing>
-</p:sld>
-</file>
-
 <file path=ppt/slides/slide65.xml><?xml version="1.0" encoding="utf-8"?>
 <p:sld xmlns:a="http://schemas.openxmlformats.org/drawingml/2006/main" xmlns:r="http://schemas.openxmlformats.org/officeDocument/2006/relationships" xmlns:p="http://schemas.openxmlformats.org/presentationml/2006/main">
   <p:cSld>
@@ -30292,8 +30416,45 @@
         </p:nvSpPr>
         <p:spPr/>
         <p:txBody>
-          <a:bodyPr/>
+          <a:bodyPr>
+            <a:normAutofit fontScale="92500" lnSpcReduction="10000"/>
+          </a:bodyPr>
           <a:lstStyle/>
+          <a:p>
+            <a:r>
+              <a:rPr lang="en-US" dirty="0" smtClean="0"/>
+              <a:t>Main Contributions:</a:t>
+            </a:r>
+          </a:p>
+          <a:p>
+            <a:pPr lvl="1"/>
+            <a:r>
+              <a:rPr lang="en-US" dirty="0" smtClean="0"/>
+              <a:t>Project plan process definition</a:t>
+            </a:r>
+          </a:p>
+          <a:p>
+            <a:pPr lvl="1"/>
+            <a:r>
+              <a:rPr lang="en-US" dirty="0" smtClean="0"/>
+              <a:t>Verification and Validation process</a:t>
+            </a:r>
+          </a:p>
+          <a:p>
+            <a:pPr lvl="1"/>
+            <a:r>
+              <a:rPr lang="en-US" dirty="0" smtClean="0"/>
+              <a:t>Test plan</a:t>
+            </a:r>
+          </a:p>
+          <a:p>
+            <a:pPr lvl="1"/>
+            <a:r>
+              <a:rPr lang="en-US" smtClean="0"/>
+              <a:t>Settings code</a:t>
+            </a:r>
+            <a:endParaRPr lang="en-US" dirty="0" smtClean="0"/>
+          </a:p>
           <a:p>
             <a:r>
               <a:rPr lang="en-US" dirty="0" smtClean="0"/>
@@ -30304,50 +30465,19 @@
             <a:pPr lvl="1"/>
             <a:r>
               <a:rPr lang="en-US" dirty="0" smtClean="0"/>
-              <a:t>Test plan is not easy to make</a:t>
+              <a:t>Teamwork is important</a:t>
             </a:r>
           </a:p>
           <a:p>
             <a:pPr lvl="1"/>
             <a:r>
-              <a:rPr lang="en-US" dirty="0"/>
-              <a:t>W</a:t>
-            </a:r>
-            <a:r>
               <a:rPr lang="en-US" dirty="0" smtClean="0"/>
-              <a:t>hen anything can go wrong, it will go wrong.</a:t>
-            </a:r>
-            <a:endParaRPr lang="en-US" dirty="0"/>
-          </a:p>
-          <a:p>
-            <a:pPr marL="285750" lvl="1"/>
-            <a:r>
-              <a:rPr lang="en-US" dirty="0"/>
-              <a:t>Participation in Team Results:</a:t>
-            </a:r>
-          </a:p>
-          <a:p>
-            <a:pPr lvl="1"/>
-            <a:r>
-              <a:rPr lang="en-US" dirty="0" smtClean="0"/>
-              <a:t>Application Quality (Test plan)</a:t>
-            </a:r>
-          </a:p>
-          <a:p>
-            <a:pPr lvl="1"/>
-            <a:r>
-              <a:rPr lang="en-US" dirty="0" smtClean="0"/>
-              <a:t>Do everything that it’s needed.</a:t>
+              <a:t>Communication is a must!</a:t>
             </a:r>
           </a:p>
         </p:txBody>
       </p:sp>
     </p:spTree>
-    <p:extLst>
-      <p:ext uri="{BB962C8B-B14F-4D97-AF65-F5344CB8AC3E}">
-        <p14:creationId xmlns:p14="http://schemas.microsoft.com/office/powerpoint/2010/main" val="1960690833"/>
-      </p:ext>
-    </p:extLst>
   </p:cSld>
   <p:clrMapOvr>
     <a:masterClrMapping/>
@@ -30396,7 +30526,7 @@
           <a:p>
             <a:r>
               <a:rPr lang="pt-PT" dirty="0" smtClean="0"/>
-              <a:t>Mário Oliveira</a:t>
+              <a:t>João Martins</a:t>
             </a:r>
             <a:endParaRPr lang="pt-PT" dirty="0"/>
           </a:p>
@@ -30412,206 +30542,64 @@
             <p:ph idx="1"/>
           </p:nvPr>
         </p:nvSpPr>
-        <p:spPr>
-          <a:xfrm>
-            <a:off x="1295401" y="2556932"/>
-            <a:ext cx="5223386" cy="3318936"/>
-          </a:xfrm>
-        </p:spPr>
+        <p:spPr/>
         <p:txBody>
           <a:bodyPr/>
           <a:lstStyle/>
           <a:p>
             <a:r>
+              <a:rPr lang="en-US" dirty="0" smtClean="0"/>
+              <a:t>Lessons Learned:</a:t>
+            </a:r>
+          </a:p>
+          <a:p>
+            <a:pPr lvl="1"/>
+            <a:r>
+              <a:rPr lang="en-US" dirty="0" smtClean="0"/>
+              <a:t>Test plan is not easy to make</a:t>
+            </a:r>
+          </a:p>
+          <a:p>
+            <a:pPr lvl="1"/>
+            <a:r>
               <a:rPr lang="en-US" dirty="0"/>
-              <a:t>Main </a:t>
+              <a:t>W</a:t>
             </a:r>
             <a:r>
               <a:rPr lang="en-US" dirty="0" smtClean="0"/>
-              <a:t>contributions</a:t>
-            </a:r>
-            <a:endParaRPr lang="pt-PT" dirty="0"/>
+              <a:t>hen anything can go wrong, it will go wrong.</a:t>
+            </a:r>
+            <a:endParaRPr lang="en-US" dirty="0"/>
+          </a:p>
+          <a:p>
+            <a:pPr marL="285750" lvl="1"/>
+            <a:r>
+              <a:rPr lang="en-US" dirty="0"/>
+              <a:t>Participation in Team Results:</a:t>
+            </a:r>
           </a:p>
           <a:p>
             <a:pPr lvl="1"/>
             <a:r>
               <a:rPr lang="en-US" dirty="0" smtClean="0"/>
-              <a:t>Updating the repository</a:t>
+              <a:t>Application Quality (Test plan)</a:t>
             </a:r>
           </a:p>
           <a:p>
             <a:pPr lvl="1"/>
             <a:r>
               <a:rPr lang="en-US" dirty="0" smtClean="0"/>
-              <a:t>Writing some processes</a:t>
-            </a:r>
-          </a:p>
-          <a:p>
-            <a:pPr lvl="1"/>
-            <a:r>
-              <a:rPr lang="en-US" dirty="0" smtClean="0"/>
-              <a:t>SRS and Requirements Definition</a:t>
-            </a:r>
-          </a:p>
-          <a:p>
-            <a:pPr lvl="1"/>
-            <a:r>
-              <a:rPr lang="en-US" dirty="0" smtClean="0"/>
-              <a:t>Review and approval of some documents</a:t>
-            </a:r>
-          </a:p>
-          <a:p>
-            <a:pPr lvl="1"/>
-            <a:r>
-              <a:rPr lang="en-US" dirty="0" smtClean="0"/>
-              <a:t>Coding some features</a:t>
-            </a:r>
-          </a:p>
-          <a:p>
-            <a:endParaRPr lang="pt-PT" dirty="0"/>
-          </a:p>
-        </p:txBody>
-      </p:sp>
-      <p:sp>
-        <p:nvSpPr>
-          <p:cNvPr id="4" name="CaixaDeTexto 3"/>
-          <p:cNvSpPr txBox="1"/>
-          <p:nvPr/>
-        </p:nvSpPr>
-        <p:spPr>
-          <a:xfrm>
-            <a:off x="6518787" y="2556932"/>
-            <a:ext cx="4377811" cy="2376035"/>
-          </a:xfrm>
-          <a:prstGeom prst="rect">
-            <a:avLst/>
-          </a:prstGeom>
-          <a:noFill/>
-        </p:spPr>
-        <p:txBody>
-          <a:bodyPr wrap="square" rtlCol="0">
-            <a:spAutoFit/>
-          </a:bodyPr>
-          <a:lstStyle/>
-          <a:p>
-            <a:pPr marL="285750" indent="-285750" defTabSz="457200">
-              <a:spcBef>
-                <a:spcPct val="20000"/>
-              </a:spcBef>
-              <a:spcAft>
-                <a:spcPts val="600"/>
-              </a:spcAft>
-              <a:buClr>
-                <a:schemeClr val="accent1"/>
-              </a:buClr>
-              <a:buSzPct val="115000"/>
-              <a:buFont typeface="Arial"/>
-              <a:buChar char="•"/>
-            </a:pPr>
-            <a:r>
-              <a:rPr lang="en-US" sz="2400" dirty="0"/>
-              <a:t>Participation </a:t>
-            </a:r>
-            <a:r>
-              <a:rPr lang="en-US" sz="2400" dirty="0" smtClean="0"/>
-              <a:t>analysis</a:t>
-            </a:r>
-            <a:endParaRPr lang="pt-PT" sz="2400" dirty="0" smtClean="0">
-              <a:solidFill>
-                <a:schemeClr val="tx1">
-                  <a:lumMod val="85000"/>
-                  <a:lumOff val="15000"/>
-                </a:schemeClr>
-              </a:solidFill>
-            </a:endParaRPr>
-          </a:p>
-          <a:p>
-            <a:pPr marL="742950" lvl="1" indent="-285750" defTabSz="457200">
-              <a:spcBef>
-                <a:spcPct val="20000"/>
-              </a:spcBef>
-              <a:spcAft>
-                <a:spcPts val="600"/>
-              </a:spcAft>
-              <a:buClr>
-                <a:schemeClr val="accent1"/>
-              </a:buClr>
-              <a:buSzPct val="115000"/>
-              <a:buFont typeface="Arial"/>
-              <a:buChar char="•"/>
-            </a:pPr>
-            <a:r>
-              <a:rPr lang="en-US" sz="2400" dirty="0" smtClean="0">
-                <a:solidFill>
-                  <a:schemeClr val="tx1">
-                    <a:lumMod val="85000"/>
-                    <a:lumOff val="15000"/>
-                  </a:schemeClr>
-                </a:solidFill>
-              </a:rPr>
-              <a:t>Helped when required </a:t>
-            </a:r>
-          </a:p>
-          <a:p>
-            <a:pPr marL="742950" lvl="1" indent="-285750" defTabSz="457200">
-              <a:spcBef>
-                <a:spcPct val="20000"/>
-              </a:spcBef>
-              <a:spcAft>
-                <a:spcPts val="600"/>
-              </a:spcAft>
-              <a:buClr>
-                <a:schemeClr val="accent1"/>
-              </a:buClr>
-              <a:buSzPct val="115000"/>
-              <a:buFont typeface="Arial"/>
-              <a:buChar char="•"/>
-            </a:pPr>
-            <a:r>
-              <a:rPr lang="en-US" sz="2400" dirty="0" smtClean="0">
-                <a:solidFill>
-                  <a:schemeClr val="tx1">
-                    <a:lumMod val="85000"/>
-                    <a:lumOff val="15000"/>
-                  </a:schemeClr>
-                </a:solidFill>
-              </a:rPr>
-              <a:t>Did the assigned tasks</a:t>
-            </a:r>
-          </a:p>
-          <a:p>
-            <a:pPr marL="742950" lvl="1" indent="-285750" defTabSz="457200">
-              <a:spcBef>
-                <a:spcPct val="20000"/>
-              </a:spcBef>
-              <a:spcAft>
-                <a:spcPts val="600"/>
-              </a:spcAft>
-              <a:buClr>
-                <a:schemeClr val="accent1"/>
-              </a:buClr>
-              <a:buSzPct val="115000"/>
-              <a:buFont typeface="Arial"/>
-              <a:buChar char="•"/>
-            </a:pPr>
-            <a:r>
-              <a:rPr lang="en-US" sz="2400" dirty="0" smtClean="0">
-                <a:solidFill>
-                  <a:schemeClr val="tx1">
-                    <a:lumMod val="85000"/>
-                    <a:lumOff val="15000"/>
-                  </a:schemeClr>
-                </a:solidFill>
-              </a:rPr>
-              <a:t>Interest in the project</a:t>
-            </a:r>
-          </a:p>
-          <a:p>
-            <a:endParaRPr lang="pt-PT" dirty="0"/>
+              <a:t>Do everything that it’s needed.</a:t>
+            </a:r>
           </a:p>
         </p:txBody>
       </p:sp>
     </p:spTree>
+    <p:extLst>
+      <p:ext uri="{BB962C8B-B14F-4D97-AF65-F5344CB8AC3E}">
+        <p14:creationId xmlns:p14="http://schemas.microsoft.com/office/powerpoint/2010/main" val="1960690833"/>
+      </p:ext>
+    </p:extLst>
   </p:cSld>
   <p:clrMapOvr>
     <a:masterClrMapping/>
@@ -30659,9 +30647,10 @@
           <a:lstStyle/>
           <a:p>
             <a:r>
-              <a:rPr lang="pt-PT" dirty="0"/>
+              <a:rPr lang="pt-PT" dirty="0" smtClean="0"/>
               <a:t>Mário Oliveira</a:t>
             </a:r>
+            <a:endParaRPr lang="pt-PT" dirty="0"/>
           </a:p>
         </p:txBody>
       </p:sp>
@@ -30675,46 +30664,206 @@
             <p:ph idx="1"/>
           </p:nvPr>
         </p:nvSpPr>
-        <p:spPr/>
+        <p:spPr>
+          <a:xfrm>
+            <a:off x="1295401" y="2556932"/>
+            <a:ext cx="5223386" cy="3318936"/>
+          </a:xfrm>
+        </p:spPr>
         <p:txBody>
           <a:bodyPr/>
           <a:lstStyle/>
           <a:p>
             <a:r>
               <a:rPr lang="en-US" dirty="0"/>
-              <a:t>Lessons </a:t>
+              <a:t>Main </a:t>
             </a:r>
             <a:r>
               <a:rPr lang="en-US" dirty="0" smtClean="0"/>
-              <a:t>Learned</a:t>
-            </a:r>
-            <a:endParaRPr lang="en-US" dirty="0"/>
+              <a:t>contributions</a:t>
+            </a:r>
+            <a:endParaRPr lang="pt-PT" dirty="0"/>
           </a:p>
           <a:p>
             <a:pPr lvl="1"/>
             <a:r>
               <a:rPr lang="en-US" dirty="0" smtClean="0"/>
-              <a:t>Teamwork is the key to success</a:t>
+              <a:t>Updating the repository</a:t>
             </a:r>
           </a:p>
           <a:p>
             <a:pPr lvl="1"/>
             <a:r>
               <a:rPr lang="en-US" dirty="0" smtClean="0"/>
-              <a:t>The structure of the application should be well planned</a:t>
-            </a:r>
-          </a:p>
-          <a:p>
-            <a:endParaRPr lang="en-US" dirty="0"/>
+              <a:t>Writing some processes</a:t>
+            </a:r>
+          </a:p>
+          <a:p>
+            <a:pPr lvl="1"/>
+            <a:r>
+              <a:rPr lang="en-US" dirty="0" smtClean="0"/>
+              <a:t>SRS and Requirements Definition</a:t>
+            </a:r>
+          </a:p>
+          <a:p>
+            <a:pPr lvl="1"/>
+            <a:r>
+              <a:rPr lang="en-US" dirty="0" smtClean="0"/>
+              <a:t>Review and approval of some documents</a:t>
+            </a:r>
+          </a:p>
+          <a:p>
+            <a:pPr lvl="1"/>
+            <a:r>
+              <a:rPr lang="en-US" dirty="0" smtClean="0"/>
+              <a:t>Coding some features</a:t>
+            </a:r>
+          </a:p>
+          <a:p>
+            <a:endParaRPr lang="pt-PT" dirty="0"/>
+          </a:p>
+        </p:txBody>
+      </p:sp>
+      <p:sp>
+        <p:nvSpPr>
+          <p:cNvPr id="4" name="CaixaDeTexto 3"/>
+          <p:cNvSpPr txBox="1"/>
+          <p:nvPr/>
+        </p:nvSpPr>
+        <p:spPr>
+          <a:xfrm>
+            <a:off x="6518787" y="2556932"/>
+            <a:ext cx="4377811" cy="2376035"/>
+          </a:xfrm>
+          <a:prstGeom prst="rect">
+            <a:avLst/>
+          </a:prstGeom>
+          <a:noFill/>
+        </p:spPr>
+        <p:txBody>
+          <a:bodyPr wrap="square" rtlCol="0">
+            <a:spAutoFit/>
+          </a:bodyPr>
+          <a:lstStyle/>
+          <a:p>
+            <a:pPr marL="285750" indent="-285750" defTabSz="457200">
+              <a:spcBef>
+                <a:spcPct val="20000"/>
+              </a:spcBef>
+              <a:spcAft>
+                <a:spcPts val="600"/>
+              </a:spcAft>
+              <a:buClr>
+                <a:schemeClr val="accent1"/>
+              </a:buClr>
+              <a:buSzPct val="115000"/>
+              <a:buFont typeface="Arial"/>
+              <a:buChar char="•"/>
+            </a:pPr>
+            <a:r>
+              <a:rPr lang="en-US" sz="2400" dirty="0"/>
+              <a:t>Participation </a:t>
+            </a:r>
+            <a:r>
+              <a:rPr lang="en-US" sz="2400" dirty="0" smtClean="0"/>
+              <a:t>analysis</a:t>
+            </a:r>
+            <a:endParaRPr lang="pt-PT" sz="2400" dirty="0" smtClean="0">
+              <a:solidFill>
+                <a:schemeClr val="tx1">
+                  <a:lumMod val="85000"/>
+                  <a:lumOff val="15000"/>
+                </a:schemeClr>
+              </a:solidFill>
+            </a:endParaRPr>
+          </a:p>
+          <a:p>
+            <a:pPr marL="742950" lvl="1" indent="-285750" defTabSz="457200">
+              <a:spcBef>
+                <a:spcPct val="20000"/>
+              </a:spcBef>
+              <a:spcAft>
+                <a:spcPts val="600"/>
+              </a:spcAft>
+              <a:buClr>
+                <a:schemeClr val="accent1"/>
+              </a:buClr>
+              <a:buSzPct val="115000"/>
+              <a:buFont typeface="Arial"/>
+              <a:buChar char="•"/>
+            </a:pPr>
+            <a:r>
+              <a:rPr lang="en-US" sz="2400" dirty="0" smtClean="0">
+                <a:solidFill>
+                  <a:schemeClr val="tx1">
+                    <a:lumMod val="85000"/>
+                    <a:lumOff val="15000"/>
+                  </a:schemeClr>
+                </a:solidFill>
+              </a:rPr>
+              <a:t>Helped when required </a:t>
+            </a:r>
+          </a:p>
+          <a:p>
+            <a:pPr marL="742950" lvl="1" indent="-285750" defTabSz="457200">
+              <a:spcBef>
+                <a:spcPct val="20000"/>
+              </a:spcBef>
+              <a:spcAft>
+                <a:spcPts val="600"/>
+              </a:spcAft>
+              <a:buClr>
+                <a:schemeClr val="accent1"/>
+              </a:buClr>
+              <a:buSzPct val="115000"/>
+              <a:buFont typeface="Arial"/>
+              <a:buChar char="•"/>
+            </a:pPr>
+            <a:r>
+              <a:rPr lang="en-US" sz="2400" dirty="0" smtClean="0">
+                <a:solidFill>
+                  <a:schemeClr val="tx1">
+                    <a:lumMod val="85000"/>
+                    <a:lumOff val="15000"/>
+                  </a:schemeClr>
+                </a:solidFill>
+              </a:rPr>
+              <a:t>Did the assigned tasks</a:t>
+            </a:r>
+          </a:p>
+          <a:p>
+            <a:pPr marL="742950" lvl="1" indent="-285750" defTabSz="457200">
+              <a:spcBef>
+                <a:spcPct val="20000"/>
+              </a:spcBef>
+              <a:spcAft>
+                <a:spcPts val="600"/>
+              </a:spcAft>
+              <a:buClr>
+                <a:schemeClr val="accent1"/>
+              </a:buClr>
+              <a:buSzPct val="115000"/>
+              <a:buFont typeface="Arial"/>
+              <a:buChar char="•"/>
+            </a:pPr>
+            <a:r>
+              <a:rPr lang="en-US" sz="2400" dirty="0" smtClean="0">
+                <a:solidFill>
+                  <a:schemeClr val="tx1">
+                    <a:lumMod val="85000"/>
+                    <a:lumOff val="15000"/>
+                  </a:schemeClr>
+                </a:solidFill>
+              </a:rPr>
+              <a:t>Interest in the project</a:t>
+            </a:r>
+          </a:p>
+          <a:p>
+            <a:endParaRPr lang="pt-PT" dirty="0"/>
           </a:p>
         </p:txBody>
       </p:sp>
     </p:spTree>
-    <p:extLst>
-      <p:ext uri="{BB962C8B-B14F-4D97-AF65-F5344CB8AC3E}">
-        <p14:creationId xmlns:p14="http://schemas.microsoft.com/office/powerpoint/2010/main" val="323619009"/>
-      </p:ext>
-    </p:extLst>
   </p:cSld>
   <p:clrMapOvr>
     <a:masterClrMapping/>
@@ -30762,10 +30911,9 @@
           <a:lstStyle/>
           <a:p>
             <a:r>
-              <a:rPr lang="pt-PT" dirty="0" smtClean="0"/>
-              <a:t>Rui Ganhoto</a:t>
-            </a:r>
-            <a:endParaRPr lang="pt-PT" dirty="0"/>
+              <a:rPr lang="pt-PT" dirty="0"/>
+              <a:t>Mário Oliveira</a:t>
+            </a:r>
           </a:p>
         </p:txBody>
       </p:sp>
@@ -30781,93 +30929,55 @@
         </p:nvSpPr>
         <p:spPr/>
         <p:txBody>
-          <a:bodyPr>
-            <a:normAutofit/>
-          </a:bodyPr>
+          <a:bodyPr/>
           <a:lstStyle/>
           <a:p>
             <a:r>
+              <a:rPr lang="en-US" dirty="0"/>
+              <a:t>Lessons </a:t>
+            </a:r>
+            <a:r>
               <a:rPr lang="en-US" dirty="0" smtClean="0"/>
-              <a:t>Main Contributions</a:t>
-            </a:r>
+              <a:t>Learned</a:t>
+            </a:r>
+            <a:endParaRPr lang="en-US" dirty="0"/>
           </a:p>
           <a:p>
             <a:pPr lvl="1"/>
             <a:r>
-              <a:rPr lang="en-US" dirty="0"/>
-              <a:t>Software Main </a:t>
-            </a:r>
-            <a:r>
               <a:rPr lang="en-US" dirty="0" smtClean="0"/>
-              <a:t>Idea</a:t>
+              <a:t>Teamwork is the key to success</a:t>
             </a:r>
           </a:p>
           <a:p>
             <a:pPr lvl="1"/>
             <a:r>
               <a:rPr lang="en-US" dirty="0" smtClean="0"/>
-              <a:t>Technical </a:t>
-            </a:r>
-            <a:r>
-              <a:rPr lang="en-US" dirty="0"/>
-              <a:t>Knowledge and Helping the whole team in developing their </a:t>
-            </a:r>
-            <a:r>
-              <a:rPr lang="en-US" dirty="0" smtClean="0"/>
-              <a:t>assignments</a:t>
-            </a:r>
-          </a:p>
-          <a:p>
-            <a:pPr lvl="1"/>
-            <a:r>
-              <a:rPr lang="en-US" dirty="0"/>
-              <a:t>Software Base Architecture, </a:t>
-            </a:r>
-            <a:r>
-              <a:rPr lang="en-US" dirty="0" smtClean="0"/>
-              <a:t>Functionality </a:t>
-            </a:r>
-            <a:r>
-              <a:rPr lang="en-US" dirty="0"/>
-              <a:t>and UI </a:t>
-            </a:r>
-            <a:r>
-              <a:rPr lang="en-US" dirty="0" smtClean="0"/>
-              <a:t>Development</a:t>
-            </a:r>
-          </a:p>
-          <a:p>
-            <a:pPr lvl="1"/>
-            <a:r>
-              <a:rPr lang="en-US" dirty="0"/>
-              <a:t>Help In Requirement definitions when </a:t>
-            </a:r>
-            <a:r>
-              <a:rPr lang="en-US" dirty="0" smtClean="0"/>
-              <a:t>prompted</a:t>
-            </a:r>
-            <a:endParaRPr lang="en-US" dirty="0"/>
-          </a:p>
-          <a:p>
-            <a:pPr lvl="1"/>
-            <a:r>
-              <a:rPr lang="en-US" dirty="0" smtClean="0"/>
-              <a:t>Trying to help the team thinking about the future helping them get focused</a:t>
-            </a:r>
-          </a:p>
-          <a:p>
-            <a:pPr marL="457200" lvl="1" indent="0">
-              <a:buNone/>
-            </a:pPr>
+              <a:t>The structure of the application should be well planned</a:t>
+            </a:r>
+          </a:p>
+          <a:p>
             <a:endParaRPr lang="en-US" dirty="0"/>
           </a:p>
         </p:txBody>
       </p:sp>
     </p:spTree>
+    <p:extLst>
+      <p:ext uri="{BB962C8B-B14F-4D97-AF65-F5344CB8AC3E}">
+        <p14:creationId xmlns:p14="http://schemas.microsoft.com/office/powerpoint/2010/main" val="323619009"/>
+      </p:ext>
+    </p:extLst>
   </p:cSld>
   <p:clrMapOvr>
     <a:masterClrMapping/>
   </p:clrMapOvr>
+  <p:timing>
+    <p:tnLst>
+      <p:par>
+        <p:cTn id="1" dur="indefinite" restart="never" nodeType="tmRoot"/>
+      </p:par>
+    </p:tnLst>
+  </p:timing>
 </p:sld>
 </file>
 
@@ -30924,97 +31034,77 @@
         <p:spPr/>
         <p:txBody>
           <a:bodyPr>
-            <a:normAutofit fontScale="92500" lnSpcReduction="10000"/>
+            <a:normAutofit/>
           </a:bodyPr>
           <a:lstStyle/>
           <a:p>
             <a:r>
               <a:rPr lang="en-US" dirty="0" smtClean="0"/>
-              <a:t>Participation in Team Results</a:t>
+              <a:t>Main Contributions</a:t>
             </a:r>
           </a:p>
           <a:p>
             <a:pPr lvl="1"/>
             <a:r>
               <a:rPr lang="en-US" dirty="0"/>
-              <a:t>Active </a:t>
+              <a:t>Software Main </a:t>
             </a:r>
             <a:r>
               <a:rPr lang="en-US" dirty="0" smtClean="0"/>
-              <a:t>participation</a:t>
+              <a:t>Idea</a:t>
             </a:r>
           </a:p>
           <a:p>
             <a:pPr lvl="1"/>
             <a:r>
+              <a:rPr lang="en-US" dirty="0" smtClean="0"/>
+              <a:t>Technical </a:t>
+            </a:r>
+            <a:r>
               <a:rPr lang="en-US" dirty="0"/>
-              <a:t>Always trying to help my coworkers when </a:t>
+              <a:t>Knowledge and Helping the whole team in developing their </a:t>
             </a:r>
             <a:r>
               <a:rPr lang="en-US" dirty="0" smtClean="0"/>
-              <a:t>necessary</a:t>
+              <a:t>assignments</a:t>
             </a:r>
           </a:p>
           <a:p>
             <a:pPr lvl="1"/>
             <a:r>
               <a:rPr lang="en-US" dirty="0"/>
-              <a:t>Good commitment and positive </a:t>
+              <a:t>Software Base Architecture, </a:t>
             </a:r>
             <a:r>
               <a:rPr lang="en-US" dirty="0" smtClean="0"/>
-              <a:t>participation </a:t>
+              <a:t>Functionality </a:t>
             </a:r>
             <a:r>
               <a:rPr lang="en-US" dirty="0"/>
-              <a:t>in the </a:t>
+              <a:t>and UI </a:t>
             </a:r>
             <a:r>
               <a:rPr lang="en-US" dirty="0" smtClean="0"/>
-              <a:t>team</a:t>
+              <a:t>Development</a:t>
             </a:r>
           </a:p>
           <a:p>
             <a:pPr lvl="1"/>
             <a:r>
+              <a:rPr lang="en-US" dirty="0"/>
+              <a:t>Help In Requirement definitions when </a:t>
+            </a:r>
+            <a:r>
               <a:rPr lang="en-US" dirty="0" smtClean="0"/>
-              <a:t>While developing, I tried to keep the team focused on the task</a:t>
-            </a:r>
-          </a:p>
-          <a:p>
+              <a:t>prompted</a:t>
+            </a:r>
+            <a:endParaRPr lang="en-US" dirty="0"/>
+          </a:p>
+          <a:p>
+            <a:pPr lvl="1"/>
             <a:r>
               <a:rPr lang="en-US" dirty="0" smtClean="0"/>
-              <a:t>Lessons Learned</a:t>
-            </a:r>
-          </a:p>
-          <a:p>
-            <a:pPr lvl="1"/>
-            <a:r>
-              <a:rPr lang="en-US" dirty="0"/>
-              <a:t>It's not easy to keep a big team </a:t>
-            </a:r>
-            <a:r>
-              <a:rPr lang="en-US" dirty="0" smtClean="0"/>
-              <a:t>working in synchrony</a:t>
-            </a:r>
-          </a:p>
-          <a:p>
-            <a:pPr lvl="1"/>
-            <a:r>
-              <a:rPr lang="en-US" dirty="0"/>
-              <a:t>Rigid documents that </a:t>
-            </a:r>
-            <a:r>
-              <a:rPr lang="en-US" dirty="0" smtClean="0"/>
-              <a:t>don't </a:t>
-            </a:r>
-            <a:r>
-              <a:rPr lang="en-US" dirty="0"/>
-              <a:t>predict exceptions, sometimes </a:t>
-            </a:r>
-            <a:r>
-              <a:rPr lang="en-US" dirty="0" smtClean="0"/>
-              <a:t>will not fit the reality.</a:t>
+              <a:t>Trying to help the team thinking about the future helping them get focused</a:t>
             </a:r>
           </a:p>
           <a:p>
@@ -31026,11 +31116,6 @@
         </p:txBody>
       </p:sp>
     </p:spTree>
-    <p:extLst>
-      <p:ext uri="{BB962C8B-B14F-4D97-AF65-F5344CB8AC3E}">
-        <p14:creationId xmlns:p14="http://schemas.microsoft.com/office/powerpoint/2010/main" val="1399430186"/>
-      </p:ext>
-    </p:extLst>
   </p:cSld>
   <p:clrMapOvr>
     <a:masterClrMapping/>
@@ -31273,6 +31358,173 @@
       </p:par>
     </p:tnLst>
   </p:timing>
+</p:sld>
+</file>
+
+<file path=ppt/slides/slide70.xml><?xml version="1.0" encoding="utf-8"?>
+<p:sld xmlns:a="http://schemas.openxmlformats.org/drawingml/2006/main" xmlns:r="http://schemas.openxmlformats.org/officeDocument/2006/relationships" xmlns:p="http://schemas.openxmlformats.org/presentationml/2006/main">
+  <p:cSld>
+    <p:spTree>
+      <p:nvGrpSpPr>
+        <p:cNvPr id="1" name=""/>
+        <p:cNvGrpSpPr/>
+        <p:nvPr/>
+      </p:nvGrpSpPr>
+      <p:grpSpPr>
+        <a:xfrm>
+          <a:off x="0" y="0"/>
+          <a:ext cx="0" cy="0"/>
+          <a:chOff x="0" y="0"/>
+          <a:chExt cx="0" cy="0"/>
+        </a:xfrm>
+      </p:grpSpPr>
+      <p:sp>
+        <p:nvSpPr>
+          <p:cNvPr id="2" name="Título 1"/>
+          <p:cNvSpPr>
+            <a:spLocks noGrp="1"/>
+          </p:cNvSpPr>
+          <p:nvPr>
+            <p:ph type="title"/>
+          </p:nvPr>
+        </p:nvSpPr>
+        <p:spPr/>
+        <p:txBody>
+          <a:bodyPr/>
+          <a:lstStyle/>
+          <a:p>
+            <a:r>
+              <a:rPr lang="pt-PT" dirty="0" smtClean="0"/>
+              <a:t>Rui Ganhoto</a:t>
+            </a:r>
+            <a:endParaRPr lang="pt-PT" dirty="0"/>
+          </a:p>
+        </p:txBody>
+      </p:sp>
+      <p:sp>
+        <p:nvSpPr>
+          <p:cNvPr id="3" name="Marcador de Posição de Conteúdo 2"/>
+          <p:cNvSpPr>
+            <a:spLocks noGrp="1"/>
+          </p:cNvSpPr>
+          <p:nvPr>
+            <p:ph idx="1"/>
+          </p:nvPr>
+        </p:nvSpPr>
+        <p:spPr/>
+        <p:txBody>
+          <a:bodyPr>
+            <a:normAutofit fontScale="92500" lnSpcReduction="10000"/>
+          </a:bodyPr>
+          <a:lstStyle/>
+          <a:p>
+            <a:r>
+              <a:rPr lang="en-US" dirty="0" smtClean="0"/>
+              <a:t>Participation in Team Results</a:t>
+            </a:r>
+          </a:p>
+          <a:p>
+            <a:pPr lvl="1"/>
+            <a:r>
+              <a:rPr lang="en-US" dirty="0"/>
+              <a:t>Active </a:t>
+            </a:r>
+            <a:r>
+              <a:rPr lang="en-US" dirty="0" smtClean="0"/>
+              <a:t>participation</a:t>
+            </a:r>
+          </a:p>
+          <a:p>
+            <a:pPr lvl="1"/>
+            <a:r>
+              <a:rPr lang="en-US" dirty="0"/>
+              <a:t>Always trying to help my coworkers when </a:t>
+            </a:r>
+            <a:r>
+              <a:rPr lang="en-US" dirty="0" smtClean="0"/>
+              <a:t>necessary</a:t>
+            </a:r>
+          </a:p>
+          <a:p>
+            <a:pPr lvl="1"/>
+            <a:r>
+              <a:rPr lang="en-US" dirty="0"/>
+              <a:t>Good commitment and positive </a:t>
+            </a:r>
+            <a:r>
+              <a:rPr lang="en-US" dirty="0" smtClean="0"/>
+              <a:t>participation </a:t>
+            </a:r>
+            <a:r>
+              <a:rPr lang="en-US" dirty="0"/>
+              <a:t>in the </a:t>
+            </a:r>
+            <a:r>
+              <a:rPr lang="en-US" dirty="0" smtClean="0"/>
+              <a:t>team</a:t>
+            </a:r>
+          </a:p>
+          <a:p>
+            <a:pPr lvl="1"/>
+            <a:r>
+              <a:rPr lang="en-US" dirty="0" smtClean="0"/>
+              <a:t>While developing, I tried to keep the team focused on the task</a:t>
+            </a:r>
+          </a:p>
+          <a:p>
+            <a:r>
+              <a:rPr lang="en-US" dirty="0" smtClean="0"/>
+              <a:t>Lessons Learned</a:t>
+            </a:r>
+          </a:p>
+          <a:p>
+            <a:pPr lvl="1"/>
+            <a:r>
+              <a:rPr lang="en-US" dirty="0"/>
+              <a:t>It's not easy to keep a big team </a:t>
+            </a:r>
+            <a:r>
+              <a:rPr lang="en-US" dirty="0" smtClean="0"/>
+              <a:t>working in synchrony</a:t>
+            </a:r>
+          </a:p>
+          <a:p>
+            <a:pPr lvl="1"/>
+            <a:r>
+              <a:rPr lang="en-US" dirty="0"/>
+              <a:t>Rigid documents that </a:t>
+            </a:r>
+            <a:r>
+              <a:rPr lang="en-US" dirty="0" smtClean="0"/>
+              <a:t>don't </a:t>
+            </a:r>
+            <a:r>
+              <a:rPr lang="en-US" dirty="0"/>
+              <a:t>predict exceptions, sometimes </a:t>
+            </a:r>
+            <a:r>
+              <a:rPr lang="en-US" dirty="0" smtClean="0"/>
+              <a:t>will not fit the reality.</a:t>
+            </a:r>
+          </a:p>
+          <a:p>
+            <a:pPr marL="457200" lvl="1" indent="0">
+              <a:buNone/>
+            </a:pPr>
+            <a:endParaRPr lang="en-US" dirty="0"/>
+          </a:p>
+        </p:txBody>
+      </p:sp>
+    </p:spTree>
+    <p:extLst>
+      <p:ext uri="{BB962C8B-B14F-4D97-AF65-F5344CB8AC3E}">
+        <p14:creationId xmlns:p14="http://schemas.microsoft.com/office/powerpoint/2010/main" val="1399430186"/>
+      </p:ext>
+    </p:extLst>
+  </p:cSld>
+  <p:clrMapOvr>
+    <a:masterClrMapping/>
+  </p:clrMapOvr>
 </p:sld>
 </file>
 
@@ -31858,7 +32110,7 @@
   <a:extraClrSchemeLst/>
   <a:extLst>
     <a:ext uri="{05A4C25C-085E-4340-85A3-A5531E510DB2}">
-      <thm15:themeFamily xmlns:thm15="http://schemas.microsoft.com/office/thememl/2012/main" xmlns="" name="Organic" id="{28CDC826-8792-45C0-861B-85EB3ADEDA33}" vid="{E4E49EB0-FB00-41F5-9359-4843D783A23D}"/>
+      <thm15:themeFamily xmlns:thm15="http://schemas.microsoft.com/office/thememl/2012/main" name="Organic" id="{28CDC826-8792-45C0-861B-85EB3ADEDA33}" vid="{E4E49EB0-FB00-41F5-9359-4843D783A23D}"/>
     </a:ext>
   </a:extLst>
 </a:theme>
@@ -32119,7 +32371,7 @@
   <a:extraClrSchemeLst/>
   <a:extLst>
     <a:ext uri="{05A4C25C-085E-4340-85A3-A5531E510DB2}">
-      <thm15:themeFamily xmlns:thm15="http://schemas.microsoft.com/office/thememl/2012/main" xmlns="" name="Office Theme" id="{62F939B6-93AF-4DB8-9C6B-D6C7DFDC589F}" vid="{4A3C46E8-61CC-4603-A589-7422A47A8E4A}"/>
+      <thm15:themeFamily xmlns:thm15="http://schemas.microsoft.com/office/thememl/2012/main" name="Office Theme" id="{62F939B6-93AF-4DB8-9C6B-D6C7DFDC589F}" vid="{4A3C46E8-61CC-4603-A589-7422A47A8E4A}"/>
     </a:ext>
   </a:extLst>
 </a:theme>

</xml_diff>

<commit_message>
David Silva section correction
</commit_message>
<xml_diff>
--- a/Final Presentation/Presentation.pptx
+++ b/Final Presentation/Presentation.pptx
@@ -178,7 +178,7 @@
   </p:defaultTextStyle>
   <p:extLst>
     <p:ext uri="{EFAFB233-063F-42B5-8137-9DF3F51BA10A}">
-      <p15:sldGuideLst xmlns:p15="http://schemas.microsoft.com/office/powerpoint/2012/main" xmlns="">
+      <p15:sldGuideLst xmlns:p15="http://schemas.microsoft.com/office/powerpoint/2012/main">
         <p15:guide id="1" orient="horz" pos="2160">
           <p15:clr>
             <a:srgbClr val="A4A3A4"/>
@@ -204,7 +204,7 @@
 <file path=ppt/charts/chart1.xml><?xml version="1.0" encoding="utf-8"?>
 <c:chartSpace xmlns:c="http://schemas.openxmlformats.org/drawingml/2006/chart" xmlns:a="http://schemas.openxmlformats.org/drawingml/2006/main" xmlns:r="http://schemas.openxmlformats.org/officeDocument/2006/relationships">
   <c:date1904 val="0"/>
-  <c:lang val="pt-PT"/>
+  <c:lang val="en-US"/>
   <c:roundedCorners val="0"/>
   <mc:AlternateContent xmlns:mc="http://schemas.openxmlformats.org/markup-compatibility/2006">
     <mc:Choice xmlns:c14="http://schemas.microsoft.com/office/drawing/2007/8/2/chart" Requires="c14">
@@ -241,7 +241,6 @@
           </a:p>
         </c:rich>
       </c:tx>
-      <c:layout/>
       <c:overlay val="0"/>
       <c:spPr>
         <a:noFill/>
@@ -250,6 +249,26 @@
         </a:ln>
         <a:effectLst/>
       </c:spPr>
+      <c:txPr>
+        <a:bodyPr rot="0" spcFirstLastPara="1" vertOverflow="ellipsis" vert="horz" wrap="square" anchor="ctr" anchorCtr="1"/>
+        <a:lstStyle/>
+        <a:p>
+          <a:pPr>
+            <a:defRPr sz="2128" b="1" i="0" u="none" strike="noStrike" kern="1200" cap="all" spc="120" normalizeH="0" baseline="0">
+              <a:solidFill>
+                <a:schemeClr val="tx1">
+                  <a:lumMod val="65000"/>
+                  <a:lumOff val="35000"/>
+                </a:schemeClr>
+              </a:solidFill>
+              <a:latin typeface="+mn-lt"/>
+              <a:ea typeface="+mn-ea"/>
+              <a:cs typeface="+mn-cs"/>
+            </a:defRPr>
+          </a:pPr>
+          <a:endParaRPr lang="pt-PT"/>
+        </a:p>
+      </c:txPr>
     </c:title>
     <c:autoTitleDeleted val="0"/>
     <c:plotArea>
@@ -508,11 +527,11 @@
         </c:dLbls>
         <c:gapWidth val="444"/>
         <c:overlap val="-90"/>
-        <c:axId val="45575168"/>
-        <c:axId val="88872576"/>
+        <c:axId val="144210944"/>
+        <c:axId val="144211328"/>
       </c:barChart>
       <c:catAx>
-        <c:axId val="45575168"/>
+        <c:axId val="144210944"/>
         <c:scaling>
           <c:orientation val="minMax"/>
         </c:scaling>
@@ -569,7 +588,7 @@
             <a:endParaRPr lang="pt-PT"/>
           </a:p>
         </c:txPr>
-        <c:crossAx val="88872576"/>
+        <c:crossAx val="144211328"/>
         <c:crosses val="autoZero"/>
         <c:auto val="1"/>
         <c:lblAlgn val="ctr"/>
@@ -577,7 +596,7 @@
         <c:noMultiLvlLbl val="0"/>
       </c:catAx>
       <c:valAx>
-        <c:axId val="88872576"/>
+        <c:axId val="144211328"/>
         <c:scaling>
           <c:orientation val="minMax"/>
         </c:scaling>
@@ -587,7 +606,7 @@
         <c:majorTickMark val="none"/>
         <c:minorTickMark val="none"/>
         <c:tickLblPos val="none"/>
-        <c:crossAx val="45575168"/>
+        <c:crossAx val="144210944"/>
         <c:crosses val="autoZero"/>
         <c:crossBetween val="between"/>
       </c:valAx>
@@ -601,7 +620,6 @@
     </c:plotArea>
     <c:legend>
       <c:legendPos val="t"/>
-      <c:layout/>
       <c:overlay val="0"/>
       <c:spPr>
         <a:noFill/>
@@ -652,7 +670,7 @@
       <a:endParaRPr lang="pt-PT"/>
     </a:p>
   </c:txPr>
-  <c:externalData r:id="rId1">
+  <c:externalData r:id="rId3">
     <c:autoUpdate val="0"/>
   </c:externalData>
 </c:chartSpace>
@@ -661,7 +679,7 @@
 <file path=ppt/charts/chart2.xml><?xml version="1.0" encoding="utf-8"?>
 <c:chartSpace xmlns:c="http://schemas.openxmlformats.org/drawingml/2006/chart" xmlns:a="http://schemas.openxmlformats.org/drawingml/2006/main" xmlns:r="http://schemas.openxmlformats.org/officeDocument/2006/relationships">
   <c:date1904 val="0"/>
-  <c:lang val="pt-PT"/>
+  <c:lang val="en-US"/>
   <c:roundedCorners val="0"/>
   <mc:AlternateContent xmlns:mc="http://schemas.openxmlformats.org/markup-compatibility/2006">
     <mc:Choice xmlns:c14="http://schemas.microsoft.com/office/drawing/2007/8/2/chart" Requires="c14">
@@ -714,6 +732,26 @@
         </a:ln>
         <a:effectLst/>
       </c:spPr>
+      <c:txPr>
+        <a:bodyPr rot="0" spcFirstLastPara="1" vertOverflow="ellipsis" vert="horz" wrap="square" anchor="ctr" anchorCtr="1"/>
+        <a:lstStyle/>
+        <a:p>
+          <a:pPr>
+            <a:defRPr sz="2128" b="1" i="0" u="none" strike="noStrike" kern="1200" cap="all" spc="120" normalizeH="0" baseline="0">
+              <a:solidFill>
+                <a:schemeClr val="tx1">
+                  <a:lumMod val="65000"/>
+                  <a:lumOff val="35000"/>
+                </a:schemeClr>
+              </a:solidFill>
+              <a:latin typeface="+mn-lt"/>
+              <a:ea typeface="+mn-ea"/>
+              <a:cs typeface="+mn-cs"/>
+            </a:defRPr>
+          </a:pPr>
+          <a:endParaRPr lang="pt-PT"/>
+        </a:p>
+      </c:txPr>
     </c:title>
     <c:autoTitleDeleted val="0"/>
     <c:plotArea>
@@ -978,11 +1016,11 @@
         </c:dLbls>
         <c:gapWidth val="444"/>
         <c:overlap val="-90"/>
-        <c:axId val="46087168"/>
-        <c:axId val="46293568"/>
+        <c:axId val="144299288"/>
+        <c:axId val="144306840"/>
       </c:barChart>
       <c:catAx>
-        <c:axId val="46087168"/>
+        <c:axId val="144299288"/>
         <c:scaling>
           <c:orientation val="minMax"/>
         </c:scaling>
@@ -1039,7 +1077,7 @@
             <a:endParaRPr lang="pt-PT"/>
           </a:p>
         </c:txPr>
-        <c:crossAx val="46293568"/>
+        <c:crossAx val="144306840"/>
         <c:crosses val="autoZero"/>
         <c:auto val="1"/>
         <c:lblAlgn val="ctr"/>
@@ -1047,7 +1085,7 @@
         <c:noMultiLvlLbl val="0"/>
       </c:catAx>
       <c:valAx>
-        <c:axId val="46293568"/>
+        <c:axId val="144306840"/>
         <c:scaling>
           <c:orientation val="minMax"/>
         </c:scaling>
@@ -1057,7 +1095,7 @@
         <c:majorTickMark val="none"/>
         <c:minorTickMark val="none"/>
         <c:tickLblPos val="none"/>
-        <c:crossAx val="46087168"/>
+        <c:crossAx val="144299288"/>
         <c:crosses val="autoZero"/>
         <c:crossBetween val="between"/>
       </c:valAx>
@@ -1117,7 +1155,6 @@
           </a:p>
         </c:txPr>
       </c:legendEntry>
-      <c:layout/>
       <c:overlay val="0"/>
       <c:spPr>
         <a:noFill/>
@@ -1168,7 +1205,7 @@
       <a:endParaRPr lang="pt-PT"/>
     </a:p>
   </c:txPr>
-  <c:externalData r:id="rId1">
+  <c:externalData r:id="rId3">
     <c:autoUpdate val="0"/>
   </c:externalData>
 </c:chartSpace>
@@ -1177,7 +1214,7 @@
 <file path=ppt/charts/chart3.xml><?xml version="1.0" encoding="utf-8"?>
 <c:chartSpace xmlns:c="http://schemas.openxmlformats.org/drawingml/2006/chart" xmlns:a="http://schemas.openxmlformats.org/drawingml/2006/main" xmlns:r="http://schemas.openxmlformats.org/officeDocument/2006/relationships">
   <c:date1904 val="0"/>
-  <c:lang val="pt-PT"/>
+  <c:lang val="en-US"/>
   <c:roundedCorners val="0"/>
   <mc:AlternateContent xmlns:mc="http://schemas.openxmlformats.org/markup-compatibility/2006">
     <mc:Choice xmlns:c14="http://schemas.microsoft.com/office/drawing/2007/8/2/chart" Requires="c14">
@@ -1214,7 +1251,6 @@
           </a:p>
         </c:rich>
       </c:tx>
-      <c:layout/>
       <c:overlay val="0"/>
       <c:spPr>
         <a:noFill/>
@@ -1223,6 +1259,26 @@
         </a:ln>
         <a:effectLst/>
       </c:spPr>
+      <c:txPr>
+        <a:bodyPr rot="0" spcFirstLastPara="1" vertOverflow="ellipsis" vert="horz" wrap="square" anchor="ctr" anchorCtr="1"/>
+        <a:lstStyle/>
+        <a:p>
+          <a:pPr>
+            <a:defRPr sz="2128" b="1" i="0" u="none" strike="noStrike" kern="1200" cap="all" spc="120" normalizeH="0" baseline="0">
+              <a:solidFill>
+                <a:schemeClr val="tx1">
+                  <a:lumMod val="65000"/>
+                  <a:lumOff val="35000"/>
+                </a:schemeClr>
+              </a:solidFill>
+              <a:latin typeface="+mn-lt"/>
+              <a:ea typeface="+mn-ea"/>
+              <a:cs typeface="+mn-cs"/>
+            </a:defRPr>
+          </a:pPr>
+          <a:endParaRPr lang="pt-PT"/>
+        </a:p>
+      </c:txPr>
     </c:title>
     <c:autoTitleDeleted val="0"/>
     <c:plotArea>
@@ -1359,11 +1415,11 @@
         </c:dLbls>
         <c:gapWidth val="444"/>
         <c:overlap val="-90"/>
-        <c:axId val="46086656"/>
-        <c:axId val="46296448"/>
+        <c:axId val="144377072"/>
+        <c:axId val="2839384"/>
       </c:barChart>
       <c:catAx>
-        <c:axId val="46086656"/>
+        <c:axId val="144377072"/>
         <c:scaling>
           <c:orientation val="minMax"/>
         </c:scaling>
@@ -1420,7 +1476,7 @@
             <a:endParaRPr lang="pt-PT"/>
           </a:p>
         </c:txPr>
-        <c:crossAx val="46296448"/>
+        <c:crossAx val="2839384"/>
         <c:crosses val="autoZero"/>
         <c:auto val="1"/>
         <c:lblAlgn val="ctr"/>
@@ -1428,7 +1484,7 @@
         <c:noMultiLvlLbl val="0"/>
       </c:catAx>
       <c:valAx>
-        <c:axId val="46296448"/>
+        <c:axId val="2839384"/>
         <c:scaling>
           <c:orientation val="minMax"/>
         </c:scaling>
@@ -1438,7 +1494,7 @@
         <c:majorTickMark val="none"/>
         <c:minorTickMark val="none"/>
         <c:tickLblPos val="none"/>
-        <c:crossAx val="46086656"/>
+        <c:crossAx val="144377072"/>
         <c:crosses val="autoZero"/>
         <c:crossBetween val="between"/>
       </c:valAx>
@@ -1471,7 +1527,7 @@
       <a:endParaRPr lang="pt-PT"/>
     </a:p>
   </c:txPr>
-  <c:externalData r:id="rId1">
+  <c:externalData r:id="rId3">
     <c:autoUpdate val="0"/>
   </c:externalData>
 </c:chartSpace>
@@ -1480,7 +1536,7 @@
 <file path=ppt/charts/chart4.xml><?xml version="1.0" encoding="utf-8"?>
 <c:chartSpace xmlns:c="http://schemas.openxmlformats.org/drawingml/2006/chart" xmlns:a="http://schemas.openxmlformats.org/drawingml/2006/main" xmlns:r="http://schemas.openxmlformats.org/officeDocument/2006/relationships">
   <c:date1904 val="0"/>
-  <c:lang val="pt-PT"/>
+  <c:lang val="en-US"/>
   <c:roundedCorners val="0"/>
   <mc:AlternateContent xmlns:mc="http://schemas.openxmlformats.org/markup-compatibility/2006">
     <mc:Choice xmlns:c14="http://schemas.microsoft.com/office/drawing/2007/8/2/chart" Requires="c14">
@@ -1795,11 +1851,11 @@
         </c:dLbls>
         <c:gapWidth val="219"/>
         <c:overlap val="-27"/>
-        <c:axId val="45477376"/>
-        <c:axId val="46298176"/>
+        <c:axId val="2838992"/>
+        <c:axId val="2840952"/>
       </c:barChart>
       <c:catAx>
-        <c:axId val="45477376"/>
+        <c:axId val="2838992"/>
         <c:scaling>
           <c:orientation val="minMax"/>
         </c:scaling>
@@ -1842,7 +1898,7 @@
             <a:endParaRPr lang="pt-PT"/>
           </a:p>
         </c:txPr>
-        <c:crossAx val="46298176"/>
+        <c:crossAx val="2840952"/>
         <c:crosses val="autoZero"/>
         <c:auto val="1"/>
         <c:lblAlgn val="ctr"/>
@@ -1850,7 +1906,7 @@
         <c:noMultiLvlLbl val="0"/>
       </c:catAx>
       <c:valAx>
-        <c:axId val="46298176"/>
+        <c:axId val="2840952"/>
         <c:scaling>
           <c:orientation val="minMax"/>
         </c:scaling>
@@ -1901,7 +1957,7 @@
             <a:endParaRPr lang="pt-PT"/>
           </a:p>
         </c:txPr>
-        <c:crossAx val="45477376"/>
+        <c:crossAx val="2838992"/>
         <c:crosses val="autoZero"/>
         <c:crossBetween val="between"/>
       </c:valAx>
@@ -1915,7 +1971,6 @@
     </c:plotArea>
     <c:legend>
       <c:legendPos val="b"/>
-      <c:layout/>
       <c:overlay val="0"/>
       <c:spPr>
         <a:noFill/>
@@ -1975,7 +2030,7 @@
 <file path=ppt/charts/chart5.xml><?xml version="1.0" encoding="utf-8"?>
 <c:chartSpace xmlns:c="http://schemas.openxmlformats.org/drawingml/2006/chart" xmlns:a="http://schemas.openxmlformats.org/drawingml/2006/main" xmlns:r="http://schemas.openxmlformats.org/officeDocument/2006/relationships">
   <c:date1904 val="0"/>
-  <c:lang val="pt-PT"/>
+  <c:lang val="en-US"/>
   <c:roundedCorners val="0"/>
   <mc:AlternateContent xmlns:mc="http://schemas.openxmlformats.org/markup-compatibility/2006">
     <mc:Choice xmlns:c14="http://schemas.microsoft.com/office/drawing/2007/8/2/chart" Requires="c14">
@@ -2304,11 +2359,11 @@
             <a:effectLst/>
           </c:spPr>
         </c:hiLowLines>
-        <c:axId val="45514240"/>
-        <c:axId val="46300480"/>
+        <c:axId val="145129080"/>
+        <c:axId val="145129472"/>
       </c:stockChart>
       <c:catAx>
-        <c:axId val="45514240"/>
+        <c:axId val="145129080"/>
         <c:scaling>
           <c:orientation val="minMax"/>
         </c:scaling>
@@ -2351,7 +2406,7 @@
             <a:endParaRPr lang="pt-PT"/>
           </a:p>
         </c:txPr>
-        <c:crossAx val="46300480"/>
+        <c:crossAx val="145129472"/>
         <c:crosses val="autoZero"/>
         <c:auto val="1"/>
         <c:lblAlgn val="ctr"/>
@@ -2359,7 +2414,7 @@
         <c:noMultiLvlLbl val="0"/>
       </c:catAx>
       <c:valAx>
-        <c:axId val="46300480"/>
+        <c:axId val="145129472"/>
         <c:scaling>
           <c:orientation val="minMax"/>
         </c:scaling>
@@ -2410,7 +2465,7 @@
             <a:endParaRPr lang="pt-PT"/>
           </a:p>
         </c:txPr>
-        <c:crossAx val="45514240"/>
+        <c:crossAx val="145129080"/>
         <c:crosses val="autoZero"/>
         <c:crossBetween val="between"/>
         <c:majorUnit val="1"/>
@@ -2454,7 +2509,7 @@
 <file path=ppt/charts/chart6.xml><?xml version="1.0" encoding="utf-8"?>
 <c:chartSpace xmlns:c="http://schemas.openxmlformats.org/drawingml/2006/chart" xmlns:a="http://schemas.openxmlformats.org/drawingml/2006/main" xmlns:r="http://schemas.openxmlformats.org/officeDocument/2006/relationships">
   <c:date1904 val="0"/>
-  <c:lang val="pt-PT"/>
+  <c:lang val="en-US"/>
   <c:roundedCorners val="0"/>
   <mc:AlternateContent xmlns:mc="http://schemas.openxmlformats.org/markup-compatibility/2006">
     <mc:Choice xmlns:c14="http://schemas.microsoft.com/office/drawing/2007/8/2/chart" Requires="c14">
@@ -2481,7 +2536,6 @@
           </a:p>
         </c:rich>
       </c:tx>
-      <c:layout/>
       <c:overlay val="0"/>
     </c:title>
     <c:autoTitleDeleted val="0"/>
@@ -2617,7 +2671,7 @@
 <file path=ppt/charts/chart7.xml><?xml version="1.0" encoding="utf-8"?>
 <c:chartSpace xmlns:c="http://schemas.openxmlformats.org/drawingml/2006/chart" xmlns:a="http://schemas.openxmlformats.org/drawingml/2006/main" xmlns:r="http://schemas.openxmlformats.org/officeDocument/2006/relationships">
   <c:date1904 val="0"/>
-  <c:lang val="pt-PT"/>
+  <c:lang val="en-US"/>
   <c:roundedCorners val="0"/>
   <mc:AlternateContent xmlns:mc="http://schemas.openxmlformats.org/markup-compatibility/2006">
     <mc:Choice xmlns:c14="http://schemas.microsoft.com/office/drawing/2007/8/2/chart" Requires="c14">
@@ -2629,7 +2683,6 @@
   </mc:AlternateContent>
   <c:chart>
     <c:title>
-      <c:layout/>
       <c:overlay val="0"/>
       <c:spPr>
         <a:noFill/>
@@ -3037,7 +3090,6 @@
           </a:p>
         </c:txPr>
       </c:legendEntry>
-      <c:layout/>
       <c:overlay val="0"/>
       <c:spPr>
         <a:noFill/>
@@ -3088,7 +3140,7 @@
       <a:endParaRPr lang="pt-PT"/>
     </a:p>
   </c:txPr>
-  <c:externalData r:id="rId1">
+  <c:externalData r:id="rId3">
     <c:autoUpdate val="0"/>
   </c:externalData>
 </c:chartSpace>
@@ -5374,34 +5426,6 @@
     <p:text>It's also possible to export all the data into a CSV file.
 acho que fica melhor
 </p:text>
-  </p:cm>
-</p:cmLst>
-</file>
-
-<file path=ppt/comments/comment3.xml><?xml version="1.0" encoding="utf-8"?>
-<p:cmLst xmlns:a="http://schemas.openxmlformats.org/drawingml/2006/main" xmlns:r="http://schemas.openxmlformats.org/officeDocument/2006/relationships" xmlns:p="http://schemas.openxmlformats.org/presentationml/2006/main">
-  <p:cm authorId="0" dt="2013-07-03T11:41:35.504" idx="7">
-    <p:pos x="5022" y="3147"/>
-    <p:text>não quereras dizer everything, um pouco de tudo </p:text>
-  </p:cm>
-</p:cmLst>
-</file>
-
-<file path=ppt/comments/comment4.xml><?xml version="1.0" encoding="utf-8"?>
-<p:cmLst xmlns:a="http://schemas.openxmlformats.org/drawingml/2006/main" xmlns:r="http://schemas.openxmlformats.org/officeDocument/2006/relationships" xmlns:p="http://schemas.openxmlformats.org/presentationml/2006/main">
-  <p:cm authorId="0" dt="2013-07-03T11:44:39.933" idx="8">
-    <p:pos x="3273" y="2978"/>
-    <p:text>trasduzido isto diz 
-o gajo como le em binario
-que nao faz sentido</p:text>
-  </p:cm>
-  <p:cm authorId="0" dt="2013-07-03T11:45:37.945" idx="9">
-    <p:pos x="5964" y="3238"/>
-    <p:text>?? explicar melhor ou por escrito ou depois ao apresentares</p:text>
-  </p:cm>
-  <p:cm authorId="0" dt="2013-07-03T11:46:42.851" idx="10">
-    <p:pos x="4025" y="2192"/>
-    <p:text>se calhar este e um ponto que depois deves explicar melhor na apresentação</p:text>
   </p:cm>
 </p:cmLst>
 </file>
@@ -28948,7 +28972,11 @@
             </a:r>
             <a:r>
               <a:rPr lang="en-US" dirty="0"/>
-              <a:t>of anything</a:t>
+              <a:t>of </a:t>
+            </a:r>
+            <a:r>
+              <a:rPr lang="en-US" dirty="0" smtClean="0"/>
+              <a:t>everything</a:t>
             </a:r>
             <a:endParaRPr lang="pt-PT" dirty="0"/>
           </a:p>
@@ -32141,7 +32169,7 @@
   <a:extraClrSchemeLst/>
   <a:extLst>
     <a:ext uri="{05A4C25C-085E-4340-85A3-A5531E510DB2}">
-      <thm15:themeFamily xmlns:thm15="http://schemas.microsoft.com/office/thememl/2012/main" xmlns="" name="Organic" id="{28CDC826-8792-45C0-861B-85EB3ADEDA33}" vid="{E4E49EB0-FB00-41F5-9359-4843D783A23D}"/>
+      <thm15:themeFamily xmlns:thm15="http://schemas.microsoft.com/office/thememl/2012/main" name="Organic" id="{28CDC826-8792-45C0-861B-85EB3ADEDA33}" vid="{E4E49EB0-FB00-41F5-9359-4843D783A23D}"/>
     </a:ext>
   </a:extLst>
 </a:theme>
@@ -32402,7 +32430,7 @@
   <a:extraClrSchemeLst/>
   <a:extLst>
     <a:ext uri="{05A4C25C-085E-4340-85A3-A5531E510DB2}">
-      <thm15:themeFamily xmlns:thm15="http://schemas.microsoft.com/office/thememl/2012/main" xmlns="" name="Office Theme" id="{62F939B6-93AF-4DB8-9C6B-D6C7DFDC589F}" vid="{4A3C46E8-61CC-4603-A589-7422A47A8E4A}"/>
+      <thm15:themeFamily xmlns:thm15="http://schemas.microsoft.com/office/thememl/2012/main" name="Office Theme" id="{62F939B6-93AF-4DB8-9C6B-D6C7DFDC589F}" vid="{4A3C46E8-61CC-4603-A589-7422A47A8E4A}"/>
     </a:ext>
   </a:extLst>
 </a:theme>

</xml_diff>

<commit_message>
David Silva section correction again
</commit_message>
<xml_diff>
--- a/Final Presentation/Presentation.pptx
+++ b/Final Presentation/Presentation.pptx
@@ -527,11 +527,11 @@
         </c:dLbls>
         <c:gapWidth val="444"/>
         <c:overlap val="-90"/>
-        <c:axId val="144210944"/>
-        <c:axId val="144211328"/>
+        <c:axId val="106240656"/>
+        <c:axId val="106241040"/>
       </c:barChart>
       <c:catAx>
-        <c:axId val="144210944"/>
+        <c:axId val="106240656"/>
         <c:scaling>
           <c:orientation val="minMax"/>
         </c:scaling>
@@ -588,7 +588,7 @@
             <a:endParaRPr lang="pt-PT"/>
           </a:p>
         </c:txPr>
-        <c:crossAx val="144211328"/>
+        <c:crossAx val="106241040"/>
         <c:crosses val="autoZero"/>
         <c:auto val="1"/>
         <c:lblAlgn val="ctr"/>
@@ -596,7 +596,7 @@
         <c:noMultiLvlLbl val="0"/>
       </c:catAx>
       <c:valAx>
-        <c:axId val="144211328"/>
+        <c:axId val="106241040"/>
         <c:scaling>
           <c:orientation val="minMax"/>
         </c:scaling>
@@ -606,7 +606,7 @@
         <c:majorTickMark val="none"/>
         <c:minorTickMark val="none"/>
         <c:tickLblPos val="none"/>
-        <c:crossAx val="144210944"/>
+        <c:crossAx val="106240656"/>
         <c:crosses val="autoZero"/>
         <c:crossBetween val="between"/>
       </c:valAx>
@@ -1016,11 +1016,11 @@
         </c:dLbls>
         <c:gapWidth val="444"/>
         <c:overlap val="-90"/>
-        <c:axId val="144299288"/>
-        <c:axId val="144306840"/>
+        <c:axId val="106181872"/>
+        <c:axId val="106324144"/>
       </c:barChart>
       <c:catAx>
-        <c:axId val="144299288"/>
+        <c:axId val="106181872"/>
         <c:scaling>
           <c:orientation val="minMax"/>
         </c:scaling>
@@ -1077,7 +1077,7 @@
             <a:endParaRPr lang="pt-PT"/>
           </a:p>
         </c:txPr>
-        <c:crossAx val="144306840"/>
+        <c:crossAx val="106324144"/>
         <c:crosses val="autoZero"/>
         <c:auto val="1"/>
         <c:lblAlgn val="ctr"/>
@@ -1085,7 +1085,7 @@
         <c:noMultiLvlLbl val="0"/>
       </c:catAx>
       <c:valAx>
-        <c:axId val="144306840"/>
+        <c:axId val="106324144"/>
         <c:scaling>
           <c:orientation val="minMax"/>
         </c:scaling>
@@ -1095,7 +1095,7 @@
         <c:majorTickMark val="none"/>
         <c:minorTickMark val="none"/>
         <c:tickLblPos val="none"/>
-        <c:crossAx val="144299288"/>
+        <c:crossAx val="106181872"/>
         <c:crosses val="autoZero"/>
         <c:crossBetween val="between"/>
       </c:valAx>
@@ -1415,11 +1415,11 @@
         </c:dLbls>
         <c:gapWidth val="444"/>
         <c:overlap val="-90"/>
-        <c:axId val="144377072"/>
-        <c:axId val="2839384"/>
+        <c:axId val="106145008"/>
+        <c:axId val="105768512"/>
       </c:barChart>
       <c:catAx>
-        <c:axId val="144377072"/>
+        <c:axId val="106145008"/>
         <c:scaling>
           <c:orientation val="minMax"/>
         </c:scaling>
@@ -1476,7 +1476,7 @@
             <a:endParaRPr lang="pt-PT"/>
           </a:p>
         </c:txPr>
-        <c:crossAx val="2839384"/>
+        <c:crossAx val="105768512"/>
         <c:crosses val="autoZero"/>
         <c:auto val="1"/>
         <c:lblAlgn val="ctr"/>
@@ -1484,7 +1484,7 @@
         <c:noMultiLvlLbl val="0"/>
       </c:catAx>
       <c:valAx>
-        <c:axId val="2839384"/>
+        <c:axId val="105768512"/>
         <c:scaling>
           <c:orientation val="minMax"/>
         </c:scaling>
@@ -1494,7 +1494,7 @@
         <c:majorTickMark val="none"/>
         <c:minorTickMark val="none"/>
         <c:tickLblPos val="none"/>
-        <c:crossAx val="144377072"/>
+        <c:crossAx val="106145008"/>
         <c:crosses val="autoZero"/>
         <c:crossBetween val="between"/>
       </c:valAx>
@@ -1851,11 +1851,11 @@
         </c:dLbls>
         <c:gapWidth val="219"/>
         <c:overlap val="-27"/>
-        <c:axId val="2838992"/>
-        <c:axId val="2840952"/>
+        <c:axId val="106383192"/>
+        <c:axId val="106383584"/>
       </c:barChart>
       <c:catAx>
-        <c:axId val="2838992"/>
+        <c:axId val="106383192"/>
         <c:scaling>
           <c:orientation val="minMax"/>
         </c:scaling>
@@ -1898,7 +1898,7 @@
             <a:endParaRPr lang="pt-PT"/>
           </a:p>
         </c:txPr>
-        <c:crossAx val="2840952"/>
+        <c:crossAx val="106383584"/>
         <c:crosses val="autoZero"/>
         <c:auto val="1"/>
         <c:lblAlgn val="ctr"/>
@@ -1906,7 +1906,7 @@
         <c:noMultiLvlLbl val="0"/>
       </c:catAx>
       <c:valAx>
-        <c:axId val="2840952"/>
+        <c:axId val="106383584"/>
         <c:scaling>
           <c:orientation val="minMax"/>
         </c:scaling>
@@ -1957,7 +1957,7 @@
             <a:endParaRPr lang="pt-PT"/>
           </a:p>
         </c:txPr>
-        <c:crossAx val="2838992"/>
+        <c:crossAx val="106383192"/>
         <c:crosses val="autoZero"/>
         <c:crossBetween val="between"/>
       </c:valAx>
@@ -2359,11 +2359,11 @@
             <a:effectLst/>
           </c:spPr>
         </c:hiLowLines>
-        <c:axId val="145129080"/>
-        <c:axId val="145129472"/>
+        <c:axId val="106384368"/>
+        <c:axId val="106384760"/>
       </c:stockChart>
       <c:catAx>
-        <c:axId val="145129080"/>
+        <c:axId val="106384368"/>
         <c:scaling>
           <c:orientation val="minMax"/>
         </c:scaling>
@@ -2406,7 +2406,7 @@
             <a:endParaRPr lang="pt-PT"/>
           </a:p>
         </c:txPr>
-        <c:crossAx val="145129472"/>
+        <c:crossAx val="106384760"/>
         <c:crosses val="autoZero"/>
         <c:auto val="1"/>
         <c:lblAlgn val="ctr"/>
@@ -2414,7 +2414,7 @@
         <c:noMultiLvlLbl val="0"/>
       </c:catAx>
       <c:valAx>
-        <c:axId val="145129472"/>
+        <c:axId val="106384760"/>
         <c:scaling>
           <c:orientation val="minMax"/>
         </c:scaling>
@@ -2465,7 +2465,7 @@
             <a:endParaRPr lang="pt-PT"/>
           </a:p>
         </c:txPr>
-        <c:crossAx val="145129080"/>
+        <c:crossAx val="106384368"/>
         <c:crosses val="autoZero"/>
         <c:crossBetween val="between"/>
         <c:majorUnit val="1"/>
@@ -29120,7 +29120,11 @@
             <a:pPr lvl="2"/>
             <a:r>
               <a:rPr lang="en-US" dirty="0"/>
-              <a:t>The dude how read in binary</a:t>
+              <a:t>The dude how </a:t>
+            </a:r>
+            <a:r>
+              <a:rPr lang="en-US" dirty="0" smtClean="0"/>
+              <a:t>reads binary</a:t>
             </a:r>
             <a:endParaRPr lang="pt-PT" dirty="0"/>
           </a:p>

</xml_diff>